<commit_message>
second draft poster sunday
</commit_message>
<xml_diff>
--- a/documentation/poster.pptx
+++ b/documentation/poster.pptx
@@ -1686,7 +1686,14 @@
     </dgm:pt>
     <dgm:pt modelId="{96D2705E-7225-4E32-BBCA-73AADEC51771}">
       <dgm:prSet custT="1"/>
-      <dgm:spPr/>
+      <dgm:spPr>
+        <a:solidFill>
+          <a:schemeClr val="bg1">
+            <a:lumMod val="85000"/>
+            <a:alpha val="90000"/>
+          </a:schemeClr>
+        </a:solidFill>
+      </dgm:spPr>
       <dgm:t>
         <a:bodyPr/>
         <a:lstStyle/>
@@ -1741,7 +1748,14 @@
     </dgm:pt>
     <dgm:pt modelId="{E4B44728-031A-45B4-A960-6D7C98163EB4}">
       <dgm:prSet custT="1"/>
-      <dgm:spPr/>
+      <dgm:spPr>
+        <a:solidFill>
+          <a:schemeClr val="bg1">
+            <a:lumMod val="85000"/>
+            <a:alpha val="90000"/>
+          </a:schemeClr>
+        </a:solidFill>
+      </dgm:spPr>
       <dgm:t>
         <a:bodyPr/>
         <a:lstStyle/>
@@ -1839,7 +1853,14 @@
     </dgm:pt>
     <dgm:pt modelId="{FD7D5C93-D69E-40C6-971E-DE23F823AC96}">
       <dgm:prSet custT="1"/>
-      <dgm:spPr/>
+      <dgm:spPr>
+        <a:solidFill>
+          <a:schemeClr val="bg1">
+            <a:lumMod val="85000"/>
+            <a:alpha val="90000"/>
+          </a:schemeClr>
+        </a:solidFill>
+      </dgm:spPr>
       <dgm:t>
         <a:bodyPr/>
         <a:lstStyle/>
@@ -1905,7 +1926,14 @@
     </dgm:pt>
     <dgm:pt modelId="{5F3C6D8C-49F5-414A-9B7D-37B3F73CBB71}">
       <dgm:prSet custT="1"/>
-      <dgm:spPr/>
+      <dgm:spPr>
+        <a:solidFill>
+          <a:schemeClr val="bg1">
+            <a:lumMod val="85000"/>
+            <a:alpha val="90000"/>
+          </a:schemeClr>
+        </a:solidFill>
+      </dgm:spPr>
       <dgm:t>
         <a:bodyPr/>
         <a:lstStyle/>
@@ -2014,7 +2042,14 @@
     </dgm:pt>
     <dgm:pt modelId="{491443E3-89AE-4FE4-92A7-C951F26ADF15}">
       <dgm:prSet custT="1"/>
-      <dgm:spPr/>
+      <dgm:spPr>
+        <a:solidFill>
+          <a:schemeClr val="bg1">
+            <a:lumMod val="85000"/>
+            <a:alpha val="90000"/>
+          </a:schemeClr>
+        </a:solidFill>
+      </dgm:spPr>
       <dgm:t>
         <a:bodyPr/>
         <a:lstStyle/>
@@ -2080,14 +2115,21 @@
     </dgm:pt>
     <dgm:pt modelId="{72B0AA1E-CB07-4D66-8C5F-5084D4F61D84}">
       <dgm:prSet custT="1"/>
-      <dgm:spPr/>
+      <dgm:spPr>
+        <a:solidFill>
+          <a:schemeClr val="bg1">
+            <a:lumMod val="85000"/>
+            <a:alpha val="90000"/>
+          </a:schemeClr>
+        </a:solidFill>
+      </dgm:spPr>
       <dgm:t>
         <a:bodyPr/>
         <a:lstStyle/>
         <a:p>
           <a:r>
             <a:rPr lang="en-US" sz="2000" dirty="0"/>
-            <a:t>After:      </a:t>
+            <a:t>After:       </a:t>
           </a:r>
           <a:r>
             <a:rPr lang="en-US" sz="2000" b="0" i="0" dirty="0" err="1">
@@ -2262,7 +2304,7 @@
   <dgm:whole/>
   <dgm:extLst>
     <a:ext uri="http://schemas.microsoft.com/office/drawing/2008/diagram">
-      <dsp:dataModelExt xmlns:dsp="http://schemas.microsoft.com/office/drawing/2008/diagram" relId="rId8" minVer="http://schemas.openxmlformats.org/drawingml/2006/diagram"/>
+      <dsp:dataModelExt xmlns:dsp="http://schemas.microsoft.com/office/drawing/2008/diagram" relId="rId7" minVer="http://schemas.openxmlformats.org/drawingml/2006/diagram"/>
     </a:ext>
   </dgm:extLst>
 </dgm:dataModel>
@@ -2327,7 +2369,14 @@
     </dgm:pt>
     <dgm:pt modelId="{AD1158AF-1744-4807-9ED0-BAA14AAB0471}">
       <dgm:prSet custT="1"/>
-      <dgm:spPr/>
+      <dgm:spPr>
+        <a:solidFill>
+          <a:schemeClr val="bg1">
+            <a:lumMod val="85000"/>
+            <a:alpha val="90000"/>
+          </a:schemeClr>
+        </a:solidFill>
+      </dgm:spPr>
       <dgm:t>
         <a:bodyPr/>
         <a:lstStyle/>
@@ -2439,7 +2488,14 @@
     </dgm:pt>
     <dgm:pt modelId="{ACA9C505-CD0B-4752-9300-8A1863EE07ED}">
       <dgm:prSet custT="1"/>
-      <dgm:spPr/>
+      <dgm:spPr>
+        <a:solidFill>
+          <a:schemeClr val="bg1">
+            <a:lumMod val="85000"/>
+            <a:alpha val="90000"/>
+          </a:schemeClr>
+        </a:solidFill>
+      </dgm:spPr>
       <dgm:t>
         <a:bodyPr/>
         <a:lstStyle/>
@@ -2545,7 +2601,14 @@
     </dgm:pt>
     <dgm:pt modelId="{BA2DB30F-C26A-4431-8C29-A5CB73928175}">
       <dgm:prSet custT="1"/>
-      <dgm:spPr/>
+      <dgm:spPr>
+        <a:solidFill>
+          <a:schemeClr val="bg1">
+            <a:lumMod val="85000"/>
+            <a:alpha val="90000"/>
+          </a:schemeClr>
+        </a:solidFill>
+      </dgm:spPr>
       <dgm:t>
         <a:bodyPr/>
         <a:lstStyle/>
@@ -2645,7 +2708,14 @@
     </dgm:pt>
     <dgm:pt modelId="{DAD6FF4F-6573-44CA-BBA6-AA6673522659}">
       <dgm:prSet custT="1"/>
-      <dgm:spPr/>
+      <dgm:spPr>
+        <a:solidFill>
+          <a:schemeClr val="bg1">
+            <a:lumMod val="85000"/>
+            <a:alpha val="90000"/>
+          </a:schemeClr>
+        </a:solidFill>
+      </dgm:spPr>
       <dgm:t>
         <a:bodyPr/>
         <a:lstStyle/>
@@ -2729,7 +2799,14 @@
     </dgm:pt>
     <dgm:pt modelId="{23807C4C-2DCB-4551-8F2D-7F715C6742A2}">
       <dgm:prSet custT="1"/>
-      <dgm:spPr/>
+      <dgm:spPr>
+        <a:solidFill>
+          <a:schemeClr val="bg1">
+            <a:lumMod val="85000"/>
+            <a:alpha val="90000"/>
+          </a:schemeClr>
+        </a:solidFill>
+      </dgm:spPr>
       <dgm:t>
         <a:bodyPr/>
         <a:lstStyle/>
@@ -2798,7 +2875,14 @@
     </dgm:pt>
     <dgm:pt modelId="{BB977D72-290E-42DF-B6F8-2AD2E69D3762}">
       <dgm:prSet custT="1"/>
-      <dgm:spPr/>
+      <dgm:spPr>
+        <a:solidFill>
+          <a:schemeClr val="bg1">
+            <a:lumMod val="85000"/>
+            <a:alpha val="90000"/>
+          </a:schemeClr>
+        </a:solidFill>
+      </dgm:spPr>
       <dgm:t>
         <a:bodyPr/>
         <a:lstStyle/>
@@ -2861,7 +2945,14 @@
     </dgm:pt>
     <dgm:pt modelId="{E9A1F835-6E14-423F-892C-1E5350F4D404}">
       <dgm:prSet custT="1"/>
-      <dgm:spPr/>
+      <dgm:spPr>
+        <a:solidFill>
+          <a:schemeClr val="bg1">
+            <a:lumMod val="85000"/>
+            <a:alpha val="90000"/>
+          </a:schemeClr>
+        </a:solidFill>
+      </dgm:spPr>
       <dgm:t>
         <a:bodyPr/>
         <a:lstStyle/>
@@ -2918,7 +3009,14 @@
     </dgm:pt>
     <dgm:pt modelId="{9BE3BF22-2E45-4160-B620-9D51AEC383B5}">
       <dgm:prSet custT="1"/>
-      <dgm:spPr/>
+      <dgm:spPr>
+        <a:solidFill>
+          <a:schemeClr val="bg1">
+            <a:lumMod val="85000"/>
+            <a:alpha val="90000"/>
+          </a:schemeClr>
+        </a:solidFill>
+      </dgm:spPr>
       <dgm:t>
         <a:bodyPr/>
         <a:lstStyle/>
@@ -3153,7 +3251,7 @@
   <dgm:whole/>
   <dgm:extLst>
     <a:ext uri="http://schemas.microsoft.com/office/drawing/2008/diagram">
-      <dsp:dataModelExt xmlns:dsp="http://schemas.microsoft.com/office/drawing/2008/diagram" relId="rId13" minVer="http://schemas.openxmlformats.org/drawingml/2006/diagram"/>
+      <dsp:dataModelExt xmlns:dsp="http://schemas.microsoft.com/office/drawing/2008/diagram" relId="rId12" minVer="http://schemas.openxmlformats.org/drawingml/2006/diagram"/>
     </a:ext>
   </dgm:extLst>
 </dgm:dataModel>
@@ -3181,13 +3279,9 @@
           <a:avLst/>
         </a:prstGeom>
         <a:solidFill>
-          <a:schemeClr val="accent1">
+          <a:schemeClr val="bg1">
+            <a:lumMod val="85000"/>
             <a:alpha val="90000"/>
-            <a:tint val="40000"/>
-            <a:hueOff val="0"/>
-            <a:satOff val="0"/>
-            <a:lumOff val="0"/>
-            <a:alphaOff val="0"/>
           </a:schemeClr>
         </a:solidFill>
         <a:ln w="12700" cap="flat" cmpd="sng" algn="ctr">
@@ -3383,13 +3477,9 @@
           <a:avLst/>
         </a:prstGeom>
         <a:solidFill>
-          <a:schemeClr val="accent1">
+          <a:schemeClr val="bg1">
+            <a:lumMod val="85000"/>
             <a:alpha val="90000"/>
-            <a:tint val="40000"/>
-            <a:hueOff val="0"/>
-            <a:satOff val="0"/>
-            <a:lumOff val="0"/>
-            <a:alphaOff val="0"/>
           </a:schemeClr>
         </a:solidFill>
         <a:ln w="12700" cap="flat" cmpd="sng" algn="ctr">
@@ -3607,13 +3697,9 @@
           <a:avLst/>
         </a:prstGeom>
         <a:solidFill>
-          <a:schemeClr val="accent1">
+          <a:schemeClr val="bg1">
+            <a:lumMod val="85000"/>
             <a:alpha val="90000"/>
-            <a:tint val="40000"/>
-            <a:hueOff val="0"/>
-            <a:satOff val="0"/>
-            <a:lumOff val="0"/>
-            <a:alphaOff val="0"/>
           </a:schemeClr>
         </a:solidFill>
         <a:ln w="12700" cap="flat" cmpd="sng" algn="ctr">
@@ -3712,7 +3798,7 @@
           </a:pPr>
           <a:r>
             <a:rPr lang="en-US" sz="2000" kern="1200" dirty="0"/>
-            <a:t>After:      </a:t>
+            <a:t>After:       </a:t>
           </a:r>
           <a:r>
             <a:rPr lang="en-US" sz="2000" b="0" i="0" kern="1200" dirty="0" err="1">
@@ -3843,13 +3929,9 @@
           <a:avLst/>
         </a:prstGeom>
         <a:solidFill>
-          <a:schemeClr val="accent1">
+          <a:schemeClr val="bg1">
+            <a:lumMod val="85000"/>
             <a:alpha val="90000"/>
-            <a:tint val="40000"/>
-            <a:hueOff val="0"/>
-            <a:satOff val="0"/>
-            <a:lumOff val="0"/>
-            <a:alphaOff val="0"/>
           </a:schemeClr>
         </a:solidFill>
         <a:ln w="12700" cap="flat" cmpd="sng" algn="ctr">
@@ -4073,13 +4155,9 @@
           <a:avLst/>
         </a:prstGeom>
         <a:solidFill>
-          <a:schemeClr val="accent1">
+          <a:schemeClr val="bg1">
+            <a:lumMod val="85000"/>
             <a:alpha val="90000"/>
-            <a:tint val="40000"/>
-            <a:hueOff val="0"/>
-            <a:satOff val="0"/>
-            <a:lumOff val="0"/>
-            <a:alphaOff val="0"/>
           </a:schemeClr>
         </a:solidFill>
         <a:ln w="12700" cap="flat" cmpd="sng" algn="ctr">
@@ -4291,13 +4369,9 @@
           <a:avLst/>
         </a:prstGeom>
         <a:solidFill>
-          <a:schemeClr val="accent1">
+          <a:schemeClr val="bg1">
+            <a:lumMod val="85000"/>
             <a:alpha val="90000"/>
-            <a:tint val="40000"/>
-            <a:hueOff val="0"/>
-            <a:satOff val="0"/>
-            <a:lumOff val="0"/>
-            <a:alphaOff val="0"/>
           </a:schemeClr>
         </a:solidFill>
         <a:ln w="12700" cap="flat" cmpd="sng" algn="ctr">
@@ -4497,13 +4571,9 @@
           <a:avLst/>
         </a:prstGeom>
         <a:solidFill>
-          <a:schemeClr val="accent1">
+          <a:schemeClr val="bg1">
+            <a:lumMod val="85000"/>
             <a:alpha val="90000"/>
-            <a:tint val="40000"/>
-            <a:hueOff val="0"/>
-            <a:satOff val="0"/>
-            <a:lumOff val="0"/>
-            <a:alphaOff val="0"/>
           </a:schemeClr>
         </a:solidFill>
         <a:ln w="12700" cap="flat" cmpd="sng" algn="ctr">
@@ -7412,7 +7482,7 @@
           <a:p>
             <a:fld id="{A571AFFD-B6CA-41D9-95E6-3CB99A4967AC}" type="datetimeFigureOut">
               <a:rPr lang="en-US" smtClean="0"/>
-              <a:t>4/20/2017</a:t>
+              <a:t>4/22/2017</a:t>
             </a:fld>
             <a:endParaRPr lang="en-US"/>
           </a:p>
@@ -7582,7 +7652,7 @@
           <a:p>
             <a:fld id="{A571AFFD-B6CA-41D9-95E6-3CB99A4967AC}" type="datetimeFigureOut">
               <a:rPr lang="en-US" smtClean="0"/>
-              <a:t>4/20/2017</a:t>
+              <a:t>4/22/2017</a:t>
             </a:fld>
             <a:endParaRPr lang="en-US"/>
           </a:p>
@@ -7762,7 +7832,7 @@
           <a:p>
             <a:fld id="{A571AFFD-B6CA-41D9-95E6-3CB99A4967AC}" type="datetimeFigureOut">
               <a:rPr lang="en-US" smtClean="0"/>
-              <a:t>4/20/2017</a:t>
+              <a:t>4/22/2017</a:t>
             </a:fld>
             <a:endParaRPr lang="en-US"/>
           </a:p>
@@ -7932,7 +8002,7 @@
           <a:p>
             <a:fld id="{A571AFFD-B6CA-41D9-95E6-3CB99A4967AC}" type="datetimeFigureOut">
               <a:rPr lang="en-US" smtClean="0"/>
-              <a:t>4/20/2017</a:t>
+              <a:t>4/22/2017</a:t>
             </a:fld>
             <a:endParaRPr lang="en-US"/>
           </a:p>
@@ -8176,7 +8246,7 @@
           <a:p>
             <a:fld id="{A571AFFD-B6CA-41D9-95E6-3CB99A4967AC}" type="datetimeFigureOut">
               <a:rPr lang="en-US" smtClean="0"/>
-              <a:t>4/20/2017</a:t>
+              <a:t>4/22/2017</a:t>
             </a:fld>
             <a:endParaRPr lang="en-US"/>
           </a:p>
@@ -8408,7 +8478,7 @@
           <a:p>
             <a:fld id="{A571AFFD-B6CA-41D9-95E6-3CB99A4967AC}" type="datetimeFigureOut">
               <a:rPr lang="en-US" smtClean="0"/>
-              <a:t>4/20/2017</a:t>
+              <a:t>4/22/2017</a:t>
             </a:fld>
             <a:endParaRPr lang="en-US"/>
           </a:p>
@@ -8775,7 +8845,7 @@
           <a:p>
             <a:fld id="{A571AFFD-B6CA-41D9-95E6-3CB99A4967AC}" type="datetimeFigureOut">
               <a:rPr lang="en-US" smtClean="0"/>
-              <a:t>4/20/2017</a:t>
+              <a:t>4/22/2017</a:t>
             </a:fld>
             <a:endParaRPr lang="en-US"/>
           </a:p>
@@ -8893,7 +8963,7 @@
           <a:p>
             <a:fld id="{A571AFFD-B6CA-41D9-95E6-3CB99A4967AC}" type="datetimeFigureOut">
               <a:rPr lang="en-US" smtClean="0"/>
-              <a:t>4/20/2017</a:t>
+              <a:t>4/22/2017</a:t>
             </a:fld>
             <a:endParaRPr lang="en-US"/>
           </a:p>
@@ -8988,7 +9058,7 @@
           <a:p>
             <a:fld id="{A571AFFD-B6CA-41D9-95E6-3CB99A4967AC}" type="datetimeFigureOut">
               <a:rPr lang="en-US" smtClean="0"/>
-              <a:t>4/20/2017</a:t>
+              <a:t>4/22/2017</a:t>
             </a:fld>
             <a:endParaRPr lang="en-US"/>
           </a:p>
@@ -9265,7 +9335,7 @@
           <a:p>
             <a:fld id="{A571AFFD-B6CA-41D9-95E6-3CB99A4967AC}" type="datetimeFigureOut">
               <a:rPr lang="en-US" smtClean="0"/>
-              <a:t>4/20/2017</a:t>
+              <a:t>4/22/2017</a:t>
             </a:fld>
             <a:endParaRPr lang="en-US"/>
           </a:p>
@@ -9522,7 +9592,7 @@
           <a:p>
             <a:fld id="{A571AFFD-B6CA-41D9-95E6-3CB99A4967AC}" type="datetimeFigureOut">
               <a:rPr lang="en-US" smtClean="0"/>
-              <a:t>4/20/2017</a:t>
+              <a:t>4/22/2017</a:t>
             </a:fld>
             <a:endParaRPr lang="en-US"/>
           </a:p>
@@ -9735,7 +9805,7 @@
           <a:p>
             <a:fld id="{A571AFFD-B6CA-41D9-95E6-3CB99A4967AC}" type="datetimeFigureOut">
               <a:rPr lang="en-US" smtClean="0"/>
-              <a:t>4/20/2017</a:t>
+              <a:t>4/22/2017</a:t>
             </a:fld>
             <a:endParaRPr lang="en-US"/>
           </a:p>
@@ -10172,7 +10242,7 @@
       </p:grpSpPr>
       <p:pic>
         <p:nvPicPr>
-          <p:cNvPr id="35" name="Picture 34"/>
+          <p:cNvPr id="25" name="Picture 24"/>
           <p:cNvPicPr>
             <a:picLocks noChangeAspect="1"/>
           </p:cNvPicPr>
@@ -10192,8 +10262,8 @@
         </p:blipFill>
         <p:spPr>
           <a:xfrm>
-            <a:off x="11633220" y="9853277"/>
-            <a:ext cx="14409730" cy="6356730"/>
+            <a:off x="24626495" y="8298867"/>
+            <a:ext cx="11504254" cy="5800349"/>
           </a:xfrm>
           <a:prstGeom prst="rect">
             <a:avLst/>
@@ -10241,8 +10311,8 @@
         </p:nvSpPr>
         <p:spPr>
           <a:xfrm>
-            <a:off x="493344" y="3357829"/>
-            <a:ext cx="8722453" cy="7848302"/>
+            <a:off x="390731" y="3814704"/>
+            <a:ext cx="8722453" cy="7294305"/>
           </a:xfrm>
           <a:prstGeom prst="rect">
             <a:avLst/>
@@ -10255,26 +10325,75 @@
           </a:bodyPr>
           <a:lstStyle/>
           <a:p>
+            <a:pPr marL="571500" indent="-571500">
+              <a:buFont typeface="Arial" panose="020B0604020202020204" pitchFamily="34" charset="0"/>
+              <a:buChar char="•"/>
+            </a:pPr>
             <a:r>
               <a:rPr lang="en-US" sz="3600" dirty="0"/>
-              <a:t>Fujitsu develops certain SDKs that clients use and these SDKs are undergoing refactoring. SDKs contain sets of critical artifacts which include namespaces, class names, and assembly (</a:t>
-            </a:r>
-            <a:r>
-              <a:rPr lang="en-US" sz="3600" dirty="0" err="1"/>
+              <a:t>Fujitsu develops C# and Visual Basic SDKs that clients use, but some of the SDKs are being refactored</a:t>
+            </a:r>
+          </a:p>
+          <a:p>
+            <a:pPr marL="571500" indent="-571500">
+              <a:buFont typeface="Arial" panose="020B0604020202020204" pitchFamily="34" charset="0"/>
+              <a:buChar char="•"/>
+            </a:pPr>
+            <a:r>
+              <a:rPr lang="en-US" sz="3600" dirty="0"/>
+              <a:t>The SDKs contain sets of critical artifacts which include </a:t>
+            </a:r>
+            <a:r>
+              <a:rPr lang="en-US" sz="3600" b="1" dirty="0"/>
+              <a:t>namespaces</a:t>
+            </a:r>
+            <a:r>
+              <a:rPr lang="en-US" sz="3600" dirty="0"/>
+              <a:t>, </a:t>
+            </a:r>
+            <a:r>
+              <a:rPr lang="en-US" sz="3600" b="1" dirty="0"/>
+              <a:t>class names</a:t>
+            </a:r>
+            <a:r>
+              <a:rPr lang="en-US" sz="3600" dirty="0"/>
+              <a:t>, and </a:t>
+            </a:r>
+            <a:r>
+              <a:rPr lang="en-US" sz="3600" b="1" dirty="0"/>
+              <a:t>assembly (</a:t>
+            </a:r>
+            <a:r>
+              <a:rPr lang="en-US" sz="3600" b="1" dirty="0" err="1"/>
               <a:t>dll</a:t>
             </a:r>
             <a:r>
+              <a:rPr lang="en-US" sz="3600" b="1" dirty="0"/>
+              <a:t>) file path </a:t>
+            </a:r>
+            <a:r>
               <a:rPr lang="en-US" sz="3600" dirty="0"/>
-              <a:t>) file path references. In the refactored SDKs, some of these artifacts may have changed. If a client tries to use the new SDK with their existing project, then their project will not compile. </a:t>
-            </a:r>
-          </a:p>
-          <a:p>
-            <a:endParaRPr lang="en-US" sz="3600" dirty="0"/>
-          </a:p>
-          <a:p>
+              <a:t>references</a:t>
+            </a:r>
+          </a:p>
+          <a:p>
+            <a:pPr marL="571500" indent="-571500">
+              <a:buFont typeface="Arial" panose="020B0604020202020204" pitchFamily="34" charset="0"/>
+              <a:buChar char="•"/>
+            </a:pPr>
             <a:r>
               <a:rPr lang="en-US" sz="3600" dirty="0"/>
-              <a:t>Due to the complexity of the SDKs and the client source code, the process of building a working client project that uses the new SDK has been automated.</a:t>
+              <a:t>In the refactored SDKs, some of these artifacts may have changed. If a client tries to use the new SDK with their existing project, then their project will not compile</a:t>
+            </a:r>
+          </a:p>
+          <a:p>
+            <a:pPr marL="571500" indent="-571500">
+              <a:buFont typeface="Arial" panose="020B0604020202020204" pitchFamily="34" charset="0"/>
+              <a:buChar char="•"/>
+            </a:pPr>
+            <a:r>
+              <a:rPr lang="en-US" sz="3600" dirty="0"/>
+              <a:t>Our project automates changing client source code and project files to use artifacts from the new SDKs</a:t>
             </a:r>
           </a:p>
         </p:txBody>
@@ -10287,8 +10406,8 @@
         </p:nvSpPr>
         <p:spPr>
           <a:xfrm>
-            <a:off x="14888657" y="19183782"/>
-            <a:ext cx="5883021" cy="1023037"/>
+            <a:off x="32298134" y="8867715"/>
+            <a:ext cx="2698175" cy="1023037"/>
           </a:xfrm>
           <a:prstGeom prst="rect">
             <a:avLst/>
@@ -10303,39 +10422,11 @@
           <a:p>
             <a:r>
               <a:rPr lang="en-US" b="1" dirty="0"/>
-              <a:t>Database Schema</a:t>
+              <a:t>Schema</a:t>
             </a:r>
           </a:p>
         </p:txBody>
       </p:sp>
-      <p:pic>
-        <p:nvPicPr>
-          <p:cNvPr id="15" name="Shape 109"/>
-          <p:cNvPicPr preferRelativeResize="0"/>
-          <p:nvPr/>
-        </p:nvPicPr>
-        <p:blipFill>
-          <a:blip r:embed="rId3">
-            <a:alphaModFix/>
-          </a:blip>
-          <a:stretch>
-            <a:fillRect/>
-          </a:stretch>
-        </p:blipFill>
-        <p:spPr>
-          <a:xfrm>
-            <a:off x="27601333" y="10094800"/>
-            <a:ext cx="8589343" cy="8751459"/>
-          </a:xfrm>
-          <a:prstGeom prst="rect">
-            <a:avLst/>
-          </a:prstGeom>
-          <a:noFill/>
-          <a:ln>
-            <a:noFill/>
-          </a:ln>
-        </p:spPr>
-      </p:pic>
       <p:sp>
         <p:nvSpPr>
           <p:cNvPr id="16" name="TextBox 15"/>
@@ -10344,8 +10435,61 @@
         </p:nvSpPr>
         <p:spPr>
           <a:xfrm>
-            <a:off x="28117991" y="8901407"/>
-            <a:ext cx="2307811" cy="1023037"/>
+            <a:off x="16970838" y="17303627"/>
+            <a:ext cx="2363578" cy="1023037"/>
+          </a:xfrm>
+          <a:prstGeom prst="rect">
+            <a:avLst/>
+          </a:prstGeom>
+          <a:noFill/>
+        </p:spPr>
+        <p:txBody>
+          <a:bodyPr wrap="square" rtlCol="0">
+            <a:spAutoFit/>
+          </a:bodyPr>
+          <a:lstStyle/>
+          <a:p>
+            <a:r>
+              <a:rPr lang="en-US" b="1" dirty="0"/>
+              <a:t>Roslyn</a:t>
+            </a:r>
+          </a:p>
+        </p:txBody>
+      </p:sp>
+      <p:graphicFrame>
+        <p:nvGraphicFramePr>
+          <p:cNvPr id="20" name="Content Placeholder 3"/>
+          <p:cNvGraphicFramePr>
+            <a:graphicFrameLocks/>
+          </p:cNvGraphicFramePr>
+          <p:nvPr>
+            <p:extLst>
+              <p:ext uri="{D42A27DB-BD31-4B8C-83A1-F6EECF244321}">
+                <p14:modId xmlns:p14="http://schemas.microsoft.com/office/powerpoint/2010/main" val="3377572275"/>
+              </p:ext>
+            </p:extLst>
+          </p:nvPr>
+        </p:nvGraphicFramePr>
+        <p:xfrm>
+          <a:off x="9113184" y="3357829"/>
+          <a:ext cx="13882611" cy="4334123"/>
+        </p:xfrm>
+        <a:graphic>
+          <a:graphicData uri="http://schemas.openxmlformats.org/drawingml/2006/diagram">
+            <dgm:relIds xmlns:dgm="http://schemas.openxmlformats.org/drawingml/2006/diagram" xmlns:r="http://schemas.openxmlformats.org/officeDocument/2006/relationships" r:dm="rId3" r:lo="rId4" r:qs="rId5" r:cs="rId6"/>
+          </a:graphicData>
+        </a:graphic>
+      </p:graphicFrame>
+      <p:sp>
+        <p:nvSpPr>
+          <p:cNvPr id="21" name="TextBox 20"/>
+          <p:cNvSpPr txBox="1"/>
+          <p:nvPr/>
+        </p:nvSpPr>
+        <p:spPr>
+          <a:xfrm>
+            <a:off x="13657686" y="2224887"/>
+            <a:ext cx="7035837" cy="1023037"/>
           </a:xfrm>
           <a:prstGeom prst="rect">
             <a:avLst/>
@@ -10360,60 +10504,7 @@
           <a:p>
             <a:r>
               <a:rPr lang="en-US" b="1" dirty="0"/>
-              <a:t>Roslyn</a:t>
-            </a:r>
-          </a:p>
-        </p:txBody>
-      </p:sp>
-      <p:graphicFrame>
-        <p:nvGraphicFramePr>
-          <p:cNvPr id="20" name="Content Placeholder 3"/>
-          <p:cNvGraphicFramePr>
-            <a:graphicFrameLocks/>
-          </p:cNvGraphicFramePr>
-          <p:nvPr>
-            <p:extLst>
-              <p:ext uri="{D42A27DB-BD31-4B8C-83A1-F6EECF244321}">
-                <p14:modId xmlns:p14="http://schemas.microsoft.com/office/powerpoint/2010/main" val="552611786"/>
-              </p:ext>
-            </p:extLst>
-          </p:nvPr>
-        </p:nvGraphicFramePr>
-        <p:xfrm>
-          <a:off x="9113184" y="3357829"/>
-          <a:ext cx="13882611" cy="4334123"/>
-        </p:xfrm>
-        <a:graphic>
-          <a:graphicData uri="http://schemas.openxmlformats.org/drawingml/2006/diagram">
-            <dgm:relIds xmlns:dgm="http://schemas.openxmlformats.org/drawingml/2006/diagram" xmlns:r="http://schemas.openxmlformats.org/officeDocument/2006/relationships" r:dm="rId4" r:lo="rId5" r:qs="rId6" r:cs="rId7"/>
-          </a:graphicData>
-        </a:graphic>
-      </p:graphicFrame>
-      <p:sp>
-        <p:nvSpPr>
-          <p:cNvPr id="21" name="TextBox 20"/>
-          <p:cNvSpPr txBox="1"/>
-          <p:nvPr/>
-        </p:nvSpPr>
-        <p:spPr>
-          <a:xfrm>
-            <a:off x="9700516" y="2233748"/>
-            <a:ext cx="5960734" cy="1023037"/>
-          </a:xfrm>
-          <a:prstGeom prst="rect">
-            <a:avLst/>
-          </a:prstGeom>
-          <a:noFill/>
-        </p:spPr>
-        <p:txBody>
-          <a:bodyPr wrap="none" rtlCol="0">
-            <a:spAutoFit/>
-          </a:bodyPr>
-          <a:lstStyle/>
-          <a:p>
-            <a:r>
-              <a:rPr lang="en-US" b="1" dirty="0"/>
-              <a:t>Required Changes</a:t>
+              <a:t>Source Code Changes</a:t>
             </a:r>
           </a:p>
         </p:txBody>
@@ -10427,50 +10518,21 @@
           <p:nvPr>
             <p:extLst>
               <p:ext uri="{D42A27DB-BD31-4B8C-83A1-F6EECF244321}">
-                <p14:modId xmlns:p14="http://schemas.microsoft.com/office/powerpoint/2010/main" val="3908717019"/>
+                <p14:modId xmlns:p14="http://schemas.microsoft.com/office/powerpoint/2010/main" val="3560934225"/>
               </p:ext>
             </p:extLst>
           </p:nvPr>
         </p:nvGraphicFramePr>
         <p:xfrm>
-          <a:off x="22790649" y="3335747"/>
+          <a:off x="22995795" y="2584162"/>
           <a:ext cx="12192000" cy="5113421"/>
         </p:xfrm>
         <a:graphic>
           <a:graphicData uri="http://schemas.openxmlformats.org/drawingml/2006/diagram">
-            <dgm:relIds xmlns:dgm="http://schemas.openxmlformats.org/drawingml/2006/diagram" xmlns:r="http://schemas.openxmlformats.org/officeDocument/2006/relationships" r:dm="rId9" r:lo="rId10" r:qs="rId11" r:cs="rId12"/>
+            <dgm:relIds xmlns:dgm="http://schemas.openxmlformats.org/drawingml/2006/diagram" xmlns:r="http://schemas.openxmlformats.org/officeDocument/2006/relationships" r:dm="rId8" r:lo="rId9" r:qs="rId10" r:cs="rId11"/>
           </a:graphicData>
         </a:graphic>
       </p:graphicFrame>
-      <p:sp>
-        <p:nvSpPr>
-          <p:cNvPr id="23" name="TextBox 22"/>
-          <p:cNvSpPr txBox="1"/>
-          <p:nvPr/>
-        </p:nvSpPr>
-        <p:spPr>
-          <a:xfrm>
-            <a:off x="22726793" y="2233748"/>
-            <a:ext cx="3696397" cy="1023037"/>
-          </a:xfrm>
-          <a:prstGeom prst="rect">
-            <a:avLst/>
-          </a:prstGeom>
-          <a:noFill/>
-        </p:spPr>
-        <p:txBody>
-          <a:bodyPr wrap="none" rtlCol="0">
-            <a:spAutoFit/>
-          </a:bodyPr>
-          <a:lstStyle/>
-          <a:p>
-            <a:r>
-              <a:rPr lang="en-US" b="1" dirty="0"/>
-              <a:t>Edge Cases</a:t>
-            </a:r>
-          </a:p>
-        </p:txBody>
-      </p:sp>
       <p:pic>
         <p:nvPicPr>
           <p:cNvPr id="36" name="Picture 35"/>
@@ -10480,7 +10542,7 @@
           <p:nvPr/>
         </p:nvPicPr>
         <p:blipFill>
-          <a:blip r:embed="rId14" cstate="print">
+          <a:blip r:embed="rId13" cstate="print">
             <a:extLst>
               <a:ext uri="{28A0092B-C50C-407E-A947-70E740481C1C}">
                 <a14:useLocalDpi xmlns:a14="http://schemas.microsoft.com/office/drawing/2010/main" val="0"/>
@@ -10493,8 +10555,8 @@
         </p:blipFill>
         <p:spPr>
           <a:xfrm>
-            <a:off x="33951324" y="229929"/>
-            <a:ext cx="2239352" cy="887671"/>
+            <a:off x="64931" y="26210248"/>
+            <a:ext cx="3082147" cy="1221752"/>
           </a:xfrm>
           <a:prstGeom prst="rect">
             <a:avLst/>
@@ -10509,8 +10571,8 @@
         </p:nvSpPr>
         <p:spPr>
           <a:xfrm>
-            <a:off x="26445724" y="1287817"/>
-            <a:ext cx="9744952" cy="528843"/>
+            <a:off x="24186505" y="941401"/>
+            <a:ext cx="15418998" cy="646331"/>
           </a:xfrm>
           <a:prstGeom prst="rect">
             <a:avLst/>
@@ -10524,22 +10586,22 @@
           <a:lstStyle/>
           <a:p>
             <a:r>
-              <a:rPr lang="en-US" sz="2800" dirty="0"/>
+              <a:rPr lang="en-US" sz="3600" dirty="0"/>
               <a:t>Patrick Clouse   Nathan Faulkner   Christopher </a:t>
             </a:r>
             <a:r>
-              <a:rPr lang="en-US" sz="2800" dirty="0" err="1"/>
+              <a:rPr lang="en-US" sz="3600" dirty="0" err="1"/>
               <a:t>Lupo</a:t>
             </a:r>
             <a:r>
-              <a:rPr lang="en-US" sz="2800" dirty="0"/>
+              <a:rPr lang="en-US" sz="3600" dirty="0"/>
               <a:t>   Joshua </a:t>
             </a:r>
             <a:r>
-              <a:rPr lang="en-US" sz="2800" dirty="0" err="1"/>
+              <a:rPr lang="en-US" sz="3600" dirty="0" err="1"/>
               <a:t>Zelin</a:t>
             </a:r>
-            <a:endParaRPr lang="en-US" sz="2800" dirty="0"/>
+            <a:endParaRPr lang="en-US" sz="3600" dirty="0"/>
           </a:p>
         </p:txBody>
       </p:sp>
@@ -10551,7 +10613,7 @@
         </p:nvSpPr>
         <p:spPr>
           <a:xfrm>
-            <a:off x="5951495" y="538458"/>
+            <a:off x="5428983" y="407830"/>
             <a:ext cx="19810568" cy="1323439"/>
           </a:xfrm>
           <a:prstGeom prst="rect">
@@ -10581,7 +10643,7 @@
         </p:nvCxnSpPr>
         <p:spPr>
           <a:xfrm>
-            <a:off x="0" y="1760004"/>
+            <a:off x="195942" y="1760004"/>
             <a:ext cx="36576000" cy="1588"/>
           </a:xfrm>
           <a:prstGeom prst="line">
@@ -10616,7 +10678,7 @@
         </p:nvSpPr>
         <p:spPr>
           <a:xfrm>
-            <a:off x="2536360" y="11818595"/>
+            <a:off x="6504138" y="12954224"/>
             <a:ext cx="3054041" cy="1023037"/>
           </a:xfrm>
           <a:prstGeom prst="rect">
@@ -10639,14 +10701,14 @@
       </p:sp>
       <p:sp>
         <p:nvSpPr>
-          <p:cNvPr id="2" name="TextBox 1"/>
+          <p:cNvPr id="12" name="TextBox 11"/>
           <p:cNvSpPr txBox="1"/>
           <p:nvPr/>
         </p:nvSpPr>
         <p:spPr>
           <a:xfrm>
-            <a:off x="26462409" y="20693650"/>
-            <a:ext cx="9368524" cy="6186309"/>
+            <a:off x="14786015" y="12569730"/>
+            <a:ext cx="4644748" cy="1023037"/>
           </a:xfrm>
           <a:prstGeom prst="rect">
             <a:avLst/>
@@ -10660,96 +10722,52 @@
           <a:lstStyle/>
           <a:p>
             <a:r>
-              <a:rPr lang="en-US" sz="3600" dirty="0"/>
-              <a:t>Automated Black Box tests using Visual Studio’s built in testing suite and Roslyn.</a:t>
-            </a:r>
-          </a:p>
-          <a:p>
-            <a:endParaRPr lang="en-US" sz="3600" dirty="0"/>
-          </a:p>
-          <a:p>
-            <a:r>
-              <a:rPr lang="en-US" sz="3600" dirty="0"/>
-              <a:t>The black box tests do the following</a:t>
-            </a:r>
-          </a:p>
-          <a:p>
-            <a:pPr marL="742950" indent="-742950">
-              <a:buFont typeface="+mj-lt"/>
-              <a:buAutoNum type="arabicPeriod"/>
-            </a:pPr>
-            <a:r>
-              <a:rPr lang="en-US" sz="3600" dirty="0"/>
-              <a:t>Run the </a:t>
-            </a:r>
-            <a:r>
-              <a:rPr lang="en-US" sz="3600" dirty="0" err="1"/>
-              <a:t>CreateMappings</a:t>
-            </a:r>
-            <a:r>
-              <a:rPr lang="en-US" sz="3600" dirty="0"/>
-              <a:t> program</a:t>
-            </a:r>
-          </a:p>
-          <a:p>
-            <a:pPr marL="742950" indent="-742950">
-              <a:buFont typeface="+mj-lt"/>
-              <a:buAutoNum type="arabicPeriod"/>
-            </a:pPr>
-            <a:r>
-              <a:rPr lang="en-US" sz="3600" dirty="0"/>
-              <a:t>Run the </a:t>
-            </a:r>
-            <a:r>
-              <a:rPr lang="en-US" sz="3600" dirty="0" err="1"/>
-              <a:t>TransformClient</a:t>
-            </a:r>
-            <a:r>
-              <a:rPr lang="en-US" sz="3600" dirty="0"/>
-              <a:t> program</a:t>
-            </a:r>
-          </a:p>
-          <a:p>
-            <a:pPr marL="742950" indent="-742950">
-              <a:buFont typeface="+mj-lt"/>
-              <a:buAutoNum type="arabicPeriod"/>
-            </a:pPr>
-            <a:r>
-              <a:rPr lang="en-US" sz="3600" dirty="0"/>
-              <a:t>Use Roslyn to make sure the project compiles </a:t>
-            </a:r>
-          </a:p>
-          <a:p>
-            <a:pPr marL="742950" indent="-742950">
-              <a:buFont typeface="+mj-lt"/>
-              <a:buAutoNum type="arabicPeriod"/>
-            </a:pPr>
-            <a:r>
-              <a:rPr lang="en-US" sz="3600" dirty="0"/>
-              <a:t>Run the compiled project and verify output</a:t>
-            </a:r>
-          </a:p>
-          <a:p>
-            <a:endParaRPr lang="en-US" sz="3600" dirty="0"/>
-          </a:p>
-          <a:p>
-            <a:r>
-              <a:rPr lang="en-US" sz="3600" dirty="0"/>
-              <a:t>The tests use a common file structure, allowing more tests to be added with minimal effort.</a:t>
+              <a:rPr lang="en-US" b="1" dirty="0"/>
+              <a:t>Project Flow</a:t>
             </a:r>
           </a:p>
         </p:txBody>
       </p:sp>
+      <p:pic>
+        <p:nvPicPr>
+          <p:cNvPr id="31" name="Picture 30"/>
+          <p:cNvPicPr>
+            <a:picLocks noChangeAspect="1"/>
+          </p:cNvPicPr>
+          <p:nvPr/>
+        </p:nvPicPr>
+        <p:blipFill>
+          <a:blip r:embed="rId14" cstate="print">
+            <a:extLst>
+              <a:ext uri="{28A0092B-C50C-407E-A947-70E740481C1C}">
+                <a14:useLocalDpi xmlns:a14="http://schemas.microsoft.com/office/drawing/2010/main" val="0"/>
+              </a:ext>
+            </a:extLst>
+          </a:blip>
+          <a:stretch>
+            <a:fillRect/>
+          </a:stretch>
+        </p:blipFill>
+        <p:spPr>
+          <a:xfrm>
+            <a:off x="183567" y="176052"/>
+            <a:ext cx="3082147" cy="1448609"/>
+          </a:xfrm>
+          <a:prstGeom prst="rect">
+            <a:avLst/>
+          </a:prstGeom>
+        </p:spPr>
+      </p:pic>
       <p:sp>
         <p:nvSpPr>
-          <p:cNvPr id="3" name="TextBox 2"/>
+          <p:cNvPr id="4" name="TextBox 3"/>
           <p:cNvSpPr txBox="1"/>
           <p:nvPr/>
         </p:nvSpPr>
         <p:spPr>
           <a:xfrm>
-            <a:off x="28553471" y="19628465"/>
-            <a:ext cx="3744663" cy="1023037"/>
+            <a:off x="10106629" y="8004892"/>
+            <a:ext cx="9643801" cy="1200329"/>
           </a:xfrm>
           <a:prstGeom prst="rect">
             <a:avLst/>
@@ -10763,22 +10781,22 @@
           <a:lstStyle/>
           <a:p>
             <a:r>
-              <a:rPr lang="en-US" b="1" dirty="0"/>
-              <a:t>Testing</a:t>
+              <a:rPr lang="en-US" sz="3600" dirty="0"/>
+              <a:t>We generalized the changes for all cases of source code artifacts. Examples above</a:t>
             </a:r>
           </a:p>
         </p:txBody>
       </p:sp>
       <p:sp>
         <p:nvSpPr>
-          <p:cNvPr id="12" name="TextBox 11"/>
+          <p:cNvPr id="7" name="TextBox 6"/>
           <p:cNvSpPr txBox="1"/>
           <p:nvPr/>
         </p:nvSpPr>
         <p:spPr>
           <a:xfrm>
-            <a:off x="17830168" y="10531400"/>
-            <a:ext cx="5497632" cy="1349461"/>
+            <a:off x="16585772" y="18587605"/>
+            <a:ext cx="8171548" cy="2862322"/>
           </a:xfrm>
           <a:prstGeom prst="rect">
             <a:avLst/>
@@ -10786,21 +10804,45 @@
           <a:noFill/>
         </p:spPr>
         <p:txBody>
-          <a:bodyPr wrap="none" rtlCol="0">
+          <a:bodyPr wrap="square" rtlCol="0">
             <a:spAutoFit/>
           </a:bodyPr>
           <a:lstStyle/>
           <a:p>
-            <a:r>
-              <a:rPr lang="en-US" b="1" dirty="0"/>
-              <a:t>Project Flow</a:t>
+            <a:pPr marL="571500" indent="-571500">
+              <a:buFont typeface="Arial" panose="020B0604020202020204" pitchFamily="34" charset="0"/>
+              <a:buChar char="•"/>
+            </a:pPr>
+            <a:r>
+              <a:rPr lang="en-US" sz="3600" dirty="0"/>
+              <a:t>A .NET compiler with an API for application developers</a:t>
+            </a:r>
+          </a:p>
+          <a:p>
+            <a:pPr marL="571500" indent="-571500">
+              <a:buFont typeface="Arial" panose="020B0604020202020204" pitchFamily="34" charset="0"/>
+              <a:buChar char="•"/>
+            </a:pPr>
+            <a:r>
+              <a:rPr lang="en-US" sz="3600" dirty="0"/>
+              <a:t>Roslyn exposes compiler syntax tree</a:t>
+            </a:r>
+          </a:p>
+          <a:p>
+            <a:pPr marL="571500" indent="-571500">
+              <a:buFont typeface="Arial" panose="020B0604020202020204" pitchFamily="34" charset="0"/>
+              <a:buChar char="•"/>
+            </a:pPr>
+            <a:r>
+              <a:rPr lang="en-US" sz="3600" dirty="0"/>
+              <a:t>Allows developers to easily make changes to source code</a:t>
             </a:r>
           </a:p>
         </p:txBody>
       </p:sp>
       <p:pic>
         <p:nvPicPr>
-          <p:cNvPr id="18" name="Picture 17"/>
+          <p:cNvPr id="9" name="Picture 8"/>
           <p:cNvPicPr>
             <a:picLocks noChangeAspect="1"/>
           </p:cNvPicPr>
@@ -10820,68 +10862,1033 @@
         </p:blipFill>
         <p:spPr>
           <a:xfrm>
-            <a:off x="493344" y="13900261"/>
-            <a:ext cx="13414374" cy="7673943"/>
+            <a:off x="378307" y="13683345"/>
+            <a:ext cx="15603252" cy="8926132"/>
           </a:xfrm>
           <a:prstGeom prst="rect">
             <a:avLst/>
           </a:prstGeom>
         </p:spPr>
       </p:pic>
+      <p:sp>
+        <p:nvSpPr>
+          <p:cNvPr id="11" name="TextBox 10"/>
+          <p:cNvSpPr txBox="1"/>
+          <p:nvPr/>
+        </p:nvSpPr>
+        <p:spPr>
+          <a:xfrm>
+            <a:off x="532301" y="22952684"/>
+            <a:ext cx="12593076" cy="2862322"/>
+          </a:xfrm>
+          <a:prstGeom prst="rect">
+            <a:avLst/>
+          </a:prstGeom>
+          <a:noFill/>
+        </p:spPr>
+        <p:txBody>
+          <a:bodyPr wrap="square" rtlCol="0">
+            <a:spAutoFit/>
+          </a:bodyPr>
+          <a:lstStyle/>
+          <a:p>
+            <a:pPr marL="571500" indent="-571500">
+              <a:buFont typeface="Arial" panose="020B0604020202020204" pitchFamily="34" charset="0"/>
+              <a:buChar char="•"/>
+            </a:pPr>
+            <a:r>
+              <a:rPr lang="en-US" sz="3600" dirty="0"/>
+              <a:t>Basic data structure used to handle transformation</a:t>
+            </a:r>
+          </a:p>
+          <a:p>
+            <a:pPr marL="571500" indent="-571500">
+              <a:buFont typeface="Arial" panose="020B0604020202020204" pitchFamily="34" charset="0"/>
+              <a:buChar char="•"/>
+            </a:pPr>
+            <a:r>
+              <a:rPr lang="en-US" sz="3600" dirty="0"/>
+              <a:t>Artifacts are found using Reflection on the assembly files</a:t>
+            </a:r>
+          </a:p>
+          <a:p>
+            <a:pPr marL="571500" indent="-571500">
+              <a:buFont typeface="Arial" panose="020B0604020202020204" pitchFamily="34" charset="0"/>
+              <a:buChar char="•"/>
+            </a:pPr>
+            <a:r>
+              <a:rPr lang="en-US" sz="3600" dirty="0"/>
+              <a:t>ModelIdentifier is a guaranteed unique identifier for a class</a:t>
+            </a:r>
+          </a:p>
+          <a:p>
+            <a:pPr marL="571500" indent="-571500">
+              <a:buFont typeface="Arial" panose="020B0604020202020204" pitchFamily="34" charset="0"/>
+              <a:buChar char="•"/>
+            </a:pPr>
+            <a:r>
+              <a:rPr lang="en-US" sz="3600" dirty="0"/>
+              <a:t>Maps old SDK artifacts to corresponding new SDK artifacts</a:t>
+            </a:r>
+          </a:p>
+          <a:p>
+            <a:pPr marL="571500" indent="-571500">
+              <a:buFont typeface="Arial" panose="020B0604020202020204" pitchFamily="34" charset="0"/>
+              <a:buChar char="•"/>
+            </a:pPr>
+            <a:r>
+              <a:rPr lang="en-US" sz="3600" dirty="0"/>
+              <a:t>Mapping is stored in the database</a:t>
+            </a:r>
+          </a:p>
+        </p:txBody>
+      </p:sp>
+      <p:sp>
+        <p:nvSpPr>
+          <p:cNvPr id="29" name="TextBox 28"/>
+          <p:cNvSpPr txBox="1"/>
+          <p:nvPr/>
+        </p:nvSpPr>
+        <p:spPr>
+          <a:xfrm>
+            <a:off x="25446891" y="14850997"/>
+            <a:ext cx="9457558" cy="2862322"/>
+          </a:xfrm>
+          <a:prstGeom prst="rect">
+            <a:avLst/>
+          </a:prstGeom>
+          <a:noFill/>
+        </p:spPr>
+        <p:txBody>
+          <a:bodyPr wrap="square" rtlCol="0">
+            <a:spAutoFit/>
+          </a:bodyPr>
+          <a:lstStyle/>
+          <a:p>
+            <a:pPr marL="571500" indent="-571500">
+              <a:buFont typeface="Arial" panose="020B0604020202020204" pitchFamily="34" charset="0"/>
+              <a:buChar char="•"/>
+            </a:pPr>
+            <a:r>
+              <a:rPr lang="en-US" sz="3600" dirty="0"/>
+              <a:t>Persistence of mappings between executions</a:t>
+            </a:r>
+          </a:p>
+          <a:p>
+            <a:pPr marL="571500" indent="-571500">
+              <a:buFont typeface="Arial" panose="020B0604020202020204" pitchFamily="34" charset="0"/>
+              <a:buChar char="•"/>
+            </a:pPr>
+            <a:r>
+              <a:rPr lang="en-US" sz="3600" dirty="0"/>
+              <a:t>Solves large memory problem</a:t>
+            </a:r>
+          </a:p>
+          <a:p>
+            <a:pPr marL="571500" indent="-571500">
+              <a:buFont typeface="Arial" panose="020B0604020202020204" pitchFamily="34" charset="0"/>
+              <a:buChar char="•"/>
+            </a:pPr>
+            <a:r>
+              <a:rPr lang="en-US" sz="3600" dirty="0"/>
+              <a:t>Divides mapping into foreign key relationships</a:t>
+            </a:r>
+          </a:p>
+          <a:p>
+            <a:pPr marL="571500" indent="-571500">
+              <a:buFont typeface="Arial" panose="020B0604020202020204" pitchFamily="34" charset="0"/>
+              <a:buChar char="•"/>
+            </a:pPr>
+            <a:r>
+              <a:rPr lang="en-US" sz="3600" dirty="0"/>
+              <a:t>Allows batch processing for Stage 2 when Stage 1 is complete</a:t>
+            </a:r>
+          </a:p>
+        </p:txBody>
+      </p:sp>
+      <p:sp>
+        <p:nvSpPr>
+          <p:cNvPr id="17" name="Rectangle: Rounded Corners 16"/>
+          <p:cNvSpPr/>
+          <p:nvPr/>
+        </p:nvSpPr>
+        <p:spPr>
+          <a:xfrm>
+            <a:off x="12681864" y="10095796"/>
+            <a:ext cx="4735286" cy="2076704"/>
+          </a:xfrm>
+          <a:prstGeom prst="roundRect">
+            <a:avLst/>
+          </a:prstGeom>
+          <a:solidFill>
+            <a:srgbClr val="2B5583"/>
+          </a:solidFill>
+        </p:spPr>
+        <p:style>
+          <a:lnRef idx="2">
+            <a:schemeClr val="accent1">
+              <a:shade val="50000"/>
+            </a:schemeClr>
+          </a:lnRef>
+          <a:fillRef idx="1">
+            <a:schemeClr val="accent1"/>
+          </a:fillRef>
+          <a:effectRef idx="0">
+            <a:schemeClr val="accent1"/>
+          </a:effectRef>
+          <a:fontRef idx="minor">
+            <a:schemeClr val="lt1"/>
+          </a:fontRef>
+        </p:style>
+        <p:txBody>
+          <a:bodyPr rtlCol="0" anchor="ctr"/>
+          <a:lstStyle/>
+          <a:p>
+            <a:pPr algn="ctr"/>
+            <a:r>
+              <a:rPr lang="en-US" sz="3600" dirty="0"/>
+              <a:t>CreateMappings</a:t>
+            </a:r>
+          </a:p>
+          <a:p>
+            <a:pPr algn="ctr"/>
+            <a:r>
+              <a:rPr lang="en-US" sz="2800" dirty="0"/>
+              <a:t>Stage 1</a:t>
+            </a:r>
+          </a:p>
+        </p:txBody>
+      </p:sp>
+      <p:sp>
+        <p:nvSpPr>
+          <p:cNvPr id="34" name="Rectangle: Rounded Corners 33"/>
+          <p:cNvSpPr/>
+          <p:nvPr/>
+        </p:nvSpPr>
+        <p:spPr>
+          <a:xfrm>
+            <a:off x="19334416" y="10038760"/>
+            <a:ext cx="4735286" cy="2076704"/>
+          </a:xfrm>
+          <a:prstGeom prst="roundRect">
+            <a:avLst/>
+          </a:prstGeom>
+          <a:solidFill>
+            <a:srgbClr val="2B5583"/>
+          </a:solidFill>
+        </p:spPr>
+        <p:style>
+          <a:lnRef idx="2">
+            <a:schemeClr val="accent1">
+              <a:shade val="50000"/>
+            </a:schemeClr>
+          </a:lnRef>
+          <a:fillRef idx="1">
+            <a:schemeClr val="accent1"/>
+          </a:fillRef>
+          <a:effectRef idx="0">
+            <a:schemeClr val="accent1"/>
+          </a:effectRef>
+          <a:fontRef idx="minor">
+            <a:schemeClr val="lt1"/>
+          </a:fontRef>
+        </p:style>
+        <p:txBody>
+          <a:bodyPr rtlCol="0" anchor="ctr"/>
+          <a:lstStyle/>
+          <a:p>
+            <a:pPr algn="ctr"/>
+            <a:r>
+              <a:rPr lang="en-US" sz="3600" dirty="0"/>
+              <a:t>Database</a:t>
+            </a:r>
+          </a:p>
+        </p:txBody>
+      </p:sp>
+      <p:sp>
+        <p:nvSpPr>
+          <p:cNvPr id="39" name="Rectangle: Rounded Corners 38"/>
+          <p:cNvSpPr/>
+          <p:nvPr/>
+        </p:nvSpPr>
+        <p:spPr>
+          <a:xfrm>
+            <a:off x="19339407" y="13926953"/>
+            <a:ext cx="4735286" cy="2076704"/>
+          </a:xfrm>
+          <a:prstGeom prst="roundRect">
+            <a:avLst/>
+          </a:prstGeom>
+          <a:solidFill>
+            <a:srgbClr val="2B5583"/>
+          </a:solidFill>
+        </p:spPr>
+        <p:style>
+          <a:lnRef idx="2">
+            <a:schemeClr val="accent1">
+              <a:shade val="50000"/>
+            </a:schemeClr>
+          </a:lnRef>
+          <a:fillRef idx="1">
+            <a:schemeClr val="accent1"/>
+          </a:fillRef>
+          <a:effectRef idx="0">
+            <a:schemeClr val="accent1"/>
+          </a:effectRef>
+          <a:fontRef idx="minor">
+            <a:schemeClr val="lt1"/>
+          </a:fontRef>
+        </p:style>
+        <p:txBody>
+          <a:bodyPr rtlCol="0" anchor="ctr"/>
+          <a:lstStyle/>
+          <a:p>
+            <a:pPr algn="ctr"/>
+            <a:r>
+              <a:rPr lang="en-US" sz="3600" dirty="0"/>
+              <a:t>TransformClient</a:t>
+            </a:r>
+          </a:p>
+          <a:p>
+            <a:pPr algn="ctr"/>
+            <a:r>
+              <a:rPr lang="en-US" sz="3600" dirty="0"/>
+              <a:t>Stage 2</a:t>
+            </a:r>
+          </a:p>
+        </p:txBody>
+      </p:sp>
+      <p:sp>
+        <p:nvSpPr>
+          <p:cNvPr id="19" name="Rectangle 18"/>
+          <p:cNvSpPr/>
+          <p:nvPr/>
+        </p:nvSpPr>
+        <p:spPr>
+          <a:xfrm>
+            <a:off x="8741754" y="10106695"/>
+            <a:ext cx="2671794" cy="1038228"/>
+          </a:xfrm>
+          <a:prstGeom prst="rect">
+            <a:avLst/>
+          </a:prstGeom>
+          <a:solidFill>
+            <a:schemeClr val="bg1"/>
+          </a:solidFill>
+          <a:ln>
+            <a:solidFill>
+              <a:schemeClr val="tx1"/>
+            </a:solidFill>
+          </a:ln>
+        </p:spPr>
+        <p:style>
+          <a:lnRef idx="2">
+            <a:schemeClr val="accent1">
+              <a:shade val="50000"/>
+            </a:schemeClr>
+          </a:lnRef>
+          <a:fillRef idx="1">
+            <a:schemeClr val="accent1"/>
+          </a:fillRef>
+          <a:effectRef idx="0">
+            <a:schemeClr val="accent1"/>
+          </a:effectRef>
+          <a:fontRef idx="minor">
+            <a:schemeClr val="lt1"/>
+          </a:fontRef>
+        </p:style>
+        <p:txBody>
+          <a:bodyPr rtlCol="0" anchor="ctr"/>
+          <a:lstStyle/>
+          <a:p>
+            <a:pPr algn="ctr"/>
+            <a:r>
+              <a:rPr lang="en-US" sz="2800" dirty="0">
+                <a:solidFill>
+                  <a:schemeClr val="tx1"/>
+                </a:solidFill>
+              </a:rPr>
+              <a:t>Old Fujitsu SDK</a:t>
+            </a:r>
+          </a:p>
+          <a:p>
+            <a:pPr algn="ctr"/>
+            <a:r>
+              <a:rPr lang="en-US" sz="2800" dirty="0">
+                <a:solidFill>
+                  <a:schemeClr val="tx1"/>
+                </a:solidFill>
+              </a:rPr>
+              <a:t>Set of </a:t>
+            </a:r>
+            <a:r>
+              <a:rPr lang="en-US" sz="2800" dirty="0" err="1">
+                <a:solidFill>
+                  <a:schemeClr val="tx1"/>
+                </a:solidFill>
+              </a:rPr>
+              <a:t>dlls</a:t>
+            </a:r>
+            <a:endParaRPr lang="en-US" sz="2800" dirty="0">
+              <a:solidFill>
+                <a:schemeClr val="tx1"/>
+              </a:solidFill>
+            </a:endParaRPr>
+          </a:p>
+        </p:txBody>
+      </p:sp>
+      <p:sp>
+        <p:nvSpPr>
+          <p:cNvPr id="40" name="Rectangle 39"/>
+          <p:cNvSpPr/>
+          <p:nvPr/>
+        </p:nvSpPr>
+        <p:spPr>
+          <a:xfrm>
+            <a:off x="8741754" y="11423864"/>
+            <a:ext cx="2671794" cy="1038228"/>
+          </a:xfrm>
+          <a:prstGeom prst="rect">
+            <a:avLst/>
+          </a:prstGeom>
+          <a:solidFill>
+            <a:schemeClr val="bg1"/>
+          </a:solidFill>
+          <a:ln>
+            <a:solidFill>
+              <a:schemeClr val="tx1"/>
+            </a:solidFill>
+          </a:ln>
+        </p:spPr>
+        <p:style>
+          <a:lnRef idx="2">
+            <a:schemeClr val="accent1">
+              <a:shade val="50000"/>
+            </a:schemeClr>
+          </a:lnRef>
+          <a:fillRef idx="1">
+            <a:schemeClr val="accent1"/>
+          </a:fillRef>
+          <a:effectRef idx="0">
+            <a:schemeClr val="accent1"/>
+          </a:effectRef>
+          <a:fontRef idx="minor">
+            <a:schemeClr val="lt1"/>
+          </a:fontRef>
+        </p:style>
+        <p:txBody>
+          <a:bodyPr rtlCol="0" anchor="ctr"/>
+          <a:lstStyle/>
+          <a:p>
+            <a:pPr algn="ctr"/>
+            <a:r>
+              <a:rPr lang="en-US" sz="2800" dirty="0">
+                <a:solidFill>
+                  <a:schemeClr val="tx1"/>
+                </a:solidFill>
+              </a:rPr>
+              <a:t>New Fujitsu SDK</a:t>
+            </a:r>
+          </a:p>
+          <a:p>
+            <a:pPr algn="ctr"/>
+            <a:r>
+              <a:rPr lang="en-US" sz="2800" dirty="0">
+                <a:solidFill>
+                  <a:schemeClr val="tx1"/>
+                </a:solidFill>
+              </a:rPr>
+              <a:t>Set of </a:t>
+            </a:r>
+            <a:r>
+              <a:rPr lang="en-US" sz="2800" dirty="0" err="1">
+                <a:solidFill>
+                  <a:schemeClr val="tx1"/>
+                </a:solidFill>
+              </a:rPr>
+              <a:t>dlls</a:t>
+            </a:r>
+            <a:endParaRPr lang="en-US" sz="2800" dirty="0">
+              <a:solidFill>
+                <a:schemeClr val="tx1"/>
+              </a:solidFill>
+            </a:endParaRPr>
+          </a:p>
+        </p:txBody>
+      </p:sp>
+      <p:cxnSp>
+        <p:nvCxnSpPr>
+          <p:cNvPr id="26" name="Straight Arrow Connector 25"/>
+          <p:cNvCxnSpPr>
+            <a:stCxn id="19" idx="3"/>
+          </p:cNvCxnSpPr>
+          <p:nvPr/>
+        </p:nvCxnSpPr>
+        <p:spPr>
+          <a:xfrm>
+            <a:off x="11413548" y="10625809"/>
+            <a:ext cx="1280160" cy="0"/>
+          </a:xfrm>
+          <a:prstGeom prst="straightConnector1">
+            <a:avLst/>
+          </a:prstGeom>
+          <a:ln w="57150">
+            <a:solidFill>
+              <a:schemeClr val="tx1"/>
+            </a:solidFill>
+            <a:tailEnd type="triangle"/>
+          </a:ln>
+        </p:spPr>
+        <p:style>
+          <a:lnRef idx="1">
+            <a:schemeClr val="accent1"/>
+          </a:lnRef>
+          <a:fillRef idx="0">
+            <a:schemeClr val="accent1"/>
+          </a:fillRef>
+          <a:effectRef idx="0">
+            <a:schemeClr val="accent1"/>
+          </a:effectRef>
+          <a:fontRef idx="minor">
+            <a:schemeClr val="tx1"/>
+          </a:fontRef>
+        </p:style>
+      </p:cxnSp>
+      <p:cxnSp>
+        <p:nvCxnSpPr>
+          <p:cNvPr id="42" name="Straight Arrow Connector 41"/>
+          <p:cNvCxnSpPr/>
+          <p:nvPr/>
+        </p:nvCxnSpPr>
+        <p:spPr>
+          <a:xfrm>
+            <a:off x="11401704" y="11768809"/>
+            <a:ext cx="1280160" cy="0"/>
+          </a:xfrm>
+          <a:prstGeom prst="straightConnector1">
+            <a:avLst/>
+          </a:prstGeom>
+          <a:ln w="57150">
+            <a:solidFill>
+              <a:schemeClr val="tx1"/>
+            </a:solidFill>
+            <a:tailEnd type="triangle"/>
+          </a:ln>
+        </p:spPr>
+        <p:style>
+          <a:lnRef idx="1">
+            <a:schemeClr val="accent1"/>
+          </a:lnRef>
+          <a:fillRef idx="0">
+            <a:schemeClr val="accent1"/>
+          </a:fillRef>
+          <a:effectRef idx="0">
+            <a:schemeClr val="accent1"/>
+          </a:effectRef>
+          <a:fontRef idx="minor">
+            <a:schemeClr val="tx1"/>
+          </a:fontRef>
+        </p:style>
+      </p:cxnSp>
+      <p:cxnSp>
+        <p:nvCxnSpPr>
+          <p:cNvPr id="43" name="Straight Arrow Connector 42"/>
+          <p:cNvCxnSpPr>
+            <a:cxnSpLocks/>
+          </p:cNvCxnSpPr>
+          <p:nvPr/>
+        </p:nvCxnSpPr>
+        <p:spPr>
+          <a:xfrm>
+            <a:off x="17417150" y="11400043"/>
+            <a:ext cx="1917266" cy="0"/>
+          </a:xfrm>
+          <a:prstGeom prst="straightConnector1">
+            <a:avLst/>
+          </a:prstGeom>
+          <a:ln w="57150">
+            <a:solidFill>
+              <a:schemeClr val="tx1"/>
+            </a:solidFill>
+            <a:tailEnd type="triangle"/>
+          </a:ln>
+        </p:spPr>
+        <p:style>
+          <a:lnRef idx="1">
+            <a:schemeClr val="accent1"/>
+          </a:lnRef>
+          <a:fillRef idx="0">
+            <a:schemeClr val="accent1"/>
+          </a:fillRef>
+          <a:effectRef idx="0">
+            <a:schemeClr val="accent1"/>
+          </a:effectRef>
+          <a:fontRef idx="minor">
+            <a:schemeClr val="tx1"/>
+          </a:fontRef>
+        </p:style>
+      </p:cxnSp>
+      <p:sp>
+        <p:nvSpPr>
+          <p:cNvPr id="28" name="TextBox 27"/>
+          <p:cNvSpPr txBox="1"/>
+          <p:nvPr/>
+        </p:nvSpPr>
+        <p:spPr>
+          <a:xfrm>
+            <a:off x="17574420" y="10900644"/>
+            <a:ext cx="1981774" cy="523220"/>
+          </a:xfrm>
+          <a:prstGeom prst="rect">
+            <a:avLst/>
+          </a:prstGeom>
+          <a:noFill/>
+        </p:spPr>
+        <p:txBody>
+          <a:bodyPr wrap="square" rtlCol="0">
+            <a:spAutoFit/>
+          </a:bodyPr>
+          <a:lstStyle/>
+          <a:p>
+            <a:r>
+              <a:rPr lang="en-US" sz="2800" dirty="0"/>
+              <a:t>Mappings</a:t>
+            </a:r>
+          </a:p>
+        </p:txBody>
+      </p:sp>
+      <p:cxnSp>
+        <p:nvCxnSpPr>
+          <p:cNvPr id="46" name="Straight Arrow Connector 45"/>
+          <p:cNvCxnSpPr>
+            <a:cxnSpLocks/>
+            <a:endCxn id="39" idx="0"/>
+          </p:cNvCxnSpPr>
+          <p:nvPr/>
+        </p:nvCxnSpPr>
+        <p:spPr>
+          <a:xfrm flipH="1">
+            <a:off x="21707050" y="12115464"/>
+            <a:ext cx="17656" cy="1811489"/>
+          </a:xfrm>
+          <a:prstGeom prst="straightConnector1">
+            <a:avLst/>
+          </a:prstGeom>
+          <a:ln w="57150">
+            <a:solidFill>
+              <a:schemeClr val="tx1"/>
+            </a:solidFill>
+            <a:tailEnd type="triangle"/>
+          </a:ln>
+        </p:spPr>
+        <p:style>
+          <a:lnRef idx="1">
+            <a:schemeClr val="accent1"/>
+          </a:lnRef>
+          <a:fillRef idx="0">
+            <a:schemeClr val="accent1"/>
+          </a:fillRef>
+          <a:effectRef idx="0">
+            <a:schemeClr val="accent1"/>
+          </a:effectRef>
+          <a:fontRef idx="minor">
+            <a:schemeClr val="tx1"/>
+          </a:fontRef>
+        </p:style>
+      </p:cxnSp>
+      <p:sp>
+        <p:nvSpPr>
+          <p:cNvPr id="48" name="TextBox 47"/>
+          <p:cNvSpPr txBox="1"/>
+          <p:nvPr/>
+        </p:nvSpPr>
+        <p:spPr>
+          <a:xfrm rot="5400000">
+            <a:off x="21002863" y="12831546"/>
+            <a:ext cx="1981774" cy="523220"/>
+          </a:xfrm>
+          <a:prstGeom prst="rect">
+            <a:avLst/>
+          </a:prstGeom>
+          <a:noFill/>
+        </p:spPr>
+        <p:txBody>
+          <a:bodyPr wrap="square" rtlCol="0">
+            <a:spAutoFit/>
+          </a:bodyPr>
+          <a:lstStyle/>
+          <a:p>
+            <a:r>
+              <a:rPr lang="en-US" sz="2800" dirty="0"/>
+              <a:t>Mappings</a:t>
+            </a:r>
+          </a:p>
+        </p:txBody>
+      </p:sp>
+      <p:sp>
+        <p:nvSpPr>
+          <p:cNvPr id="50" name="Rectangle 49"/>
+          <p:cNvSpPr/>
+          <p:nvPr/>
+        </p:nvSpPr>
+        <p:spPr>
+          <a:xfrm>
+            <a:off x="20706614" y="16562125"/>
+            <a:ext cx="2000872" cy="1321566"/>
+          </a:xfrm>
+          <a:prstGeom prst="rect">
+            <a:avLst/>
+          </a:prstGeom>
+          <a:solidFill>
+            <a:srgbClr val="428A64"/>
+          </a:solidFill>
+          <a:ln>
+            <a:solidFill>
+              <a:schemeClr val="tx1"/>
+            </a:solidFill>
+          </a:ln>
+        </p:spPr>
+        <p:style>
+          <a:lnRef idx="2">
+            <a:schemeClr val="accent1">
+              <a:shade val="50000"/>
+            </a:schemeClr>
+          </a:lnRef>
+          <a:fillRef idx="1">
+            <a:schemeClr val="accent1"/>
+          </a:fillRef>
+          <a:effectRef idx="0">
+            <a:schemeClr val="accent1"/>
+          </a:effectRef>
+          <a:fontRef idx="minor">
+            <a:schemeClr val="lt1"/>
+          </a:fontRef>
+        </p:style>
+        <p:txBody>
+          <a:bodyPr rtlCol="0" anchor="ctr"/>
+          <a:lstStyle/>
+          <a:p>
+            <a:pPr algn="ctr"/>
+            <a:r>
+              <a:rPr lang="en-US" sz="2800" dirty="0">
+                <a:solidFill>
+                  <a:schemeClr val="bg1"/>
+                </a:solidFill>
+              </a:rPr>
+              <a:t>New Client Project</a:t>
+            </a:r>
+          </a:p>
+        </p:txBody>
+      </p:sp>
+      <p:cxnSp>
+        <p:nvCxnSpPr>
+          <p:cNvPr id="52" name="Straight Arrow Connector 51"/>
+          <p:cNvCxnSpPr>
+            <a:cxnSpLocks/>
+            <a:stCxn id="39" idx="2"/>
+          </p:cNvCxnSpPr>
+          <p:nvPr/>
+        </p:nvCxnSpPr>
+        <p:spPr>
+          <a:xfrm>
+            <a:off x="21707050" y="16003657"/>
+            <a:ext cx="0" cy="590350"/>
+          </a:xfrm>
+          <a:prstGeom prst="straightConnector1">
+            <a:avLst/>
+          </a:prstGeom>
+          <a:ln w="57150">
+            <a:solidFill>
+              <a:schemeClr val="tx1"/>
+            </a:solidFill>
+            <a:tailEnd type="triangle"/>
+          </a:ln>
+        </p:spPr>
+        <p:style>
+          <a:lnRef idx="1">
+            <a:schemeClr val="accent1"/>
+          </a:lnRef>
+          <a:fillRef idx="0">
+            <a:schemeClr val="accent1"/>
+          </a:fillRef>
+          <a:effectRef idx="0">
+            <a:schemeClr val="accent1"/>
+          </a:effectRef>
+          <a:fontRef idx="minor">
+            <a:schemeClr val="tx1"/>
+          </a:fontRef>
+        </p:style>
+      </p:cxnSp>
+      <p:sp>
+        <p:nvSpPr>
+          <p:cNvPr id="57" name="Rectangle 56"/>
+          <p:cNvSpPr/>
+          <p:nvPr/>
+        </p:nvSpPr>
+        <p:spPr>
+          <a:xfrm>
+            <a:off x="20074139" y="8307366"/>
+            <a:ext cx="3171517" cy="1038228"/>
+          </a:xfrm>
+          <a:prstGeom prst="rect">
+            <a:avLst/>
+          </a:prstGeom>
+          <a:solidFill>
+            <a:schemeClr val="bg1"/>
+          </a:solidFill>
+          <a:ln>
+            <a:solidFill>
+              <a:schemeClr val="tx1"/>
+            </a:solidFill>
+          </a:ln>
+        </p:spPr>
+        <p:style>
+          <a:lnRef idx="2">
+            <a:schemeClr val="accent1">
+              <a:shade val="50000"/>
+            </a:schemeClr>
+          </a:lnRef>
+          <a:fillRef idx="1">
+            <a:schemeClr val="accent1"/>
+          </a:fillRef>
+          <a:effectRef idx="0">
+            <a:schemeClr val="accent1"/>
+          </a:effectRef>
+          <a:fontRef idx="minor">
+            <a:schemeClr val="lt1"/>
+          </a:fontRef>
+        </p:style>
+        <p:txBody>
+          <a:bodyPr rtlCol="0" anchor="ctr"/>
+          <a:lstStyle/>
+          <a:p>
+            <a:pPr algn="ctr"/>
+            <a:r>
+              <a:rPr lang="en-US" sz="2800" dirty="0">
+                <a:solidFill>
+                  <a:schemeClr val="tx1"/>
+                </a:solidFill>
+              </a:rPr>
+              <a:t>Old Client Project</a:t>
+            </a:r>
+          </a:p>
+          <a:p>
+            <a:pPr algn="ctr"/>
+            <a:r>
+              <a:rPr lang="en-US" sz="2800" dirty="0">
+                <a:solidFill>
+                  <a:schemeClr val="tx1"/>
+                </a:solidFill>
+              </a:rPr>
+              <a:t>.</a:t>
+            </a:r>
+            <a:r>
+              <a:rPr lang="en-US" sz="2800" dirty="0" err="1">
+                <a:solidFill>
+                  <a:schemeClr val="tx1"/>
+                </a:solidFill>
+              </a:rPr>
+              <a:t>csproj</a:t>
+            </a:r>
+            <a:r>
+              <a:rPr lang="en-US" sz="2800" dirty="0">
+                <a:solidFill>
+                  <a:schemeClr val="tx1"/>
+                </a:solidFill>
+              </a:rPr>
+              <a:t> file</a:t>
+            </a:r>
+          </a:p>
+        </p:txBody>
+      </p:sp>
+      <p:cxnSp>
+        <p:nvCxnSpPr>
+          <p:cNvPr id="58" name="Straight Arrow Connector 57"/>
+          <p:cNvCxnSpPr>
+            <a:cxnSpLocks/>
+          </p:cNvCxnSpPr>
+          <p:nvPr/>
+        </p:nvCxnSpPr>
+        <p:spPr>
+          <a:xfrm>
+            <a:off x="21723505" y="9370322"/>
+            <a:ext cx="0" cy="668438"/>
+          </a:xfrm>
+          <a:prstGeom prst="straightConnector1">
+            <a:avLst/>
+          </a:prstGeom>
+          <a:ln w="57150">
+            <a:solidFill>
+              <a:schemeClr val="tx1"/>
+            </a:solidFill>
+            <a:tailEnd type="triangle"/>
+          </a:ln>
+        </p:spPr>
+        <p:style>
+          <a:lnRef idx="1">
+            <a:schemeClr val="accent1"/>
+          </a:lnRef>
+          <a:fillRef idx="0">
+            <a:schemeClr val="accent1"/>
+          </a:fillRef>
+          <a:effectRef idx="0">
+            <a:schemeClr val="accent1"/>
+          </a:effectRef>
+          <a:fontRef idx="minor">
+            <a:schemeClr val="tx1"/>
+          </a:fontRef>
+        </p:style>
+      </p:cxnSp>
+      <p:sp>
+        <p:nvSpPr>
+          <p:cNvPr id="61" name="TextBox 60"/>
+          <p:cNvSpPr txBox="1"/>
+          <p:nvPr/>
+        </p:nvSpPr>
+        <p:spPr>
+          <a:xfrm>
+            <a:off x="25918102" y="19859529"/>
+            <a:ext cx="9368524" cy="6186309"/>
+          </a:xfrm>
+          <a:prstGeom prst="rect">
+            <a:avLst/>
+          </a:prstGeom>
+          <a:noFill/>
+        </p:spPr>
+        <p:txBody>
+          <a:bodyPr wrap="square" rtlCol="0">
+            <a:spAutoFit/>
+          </a:bodyPr>
+          <a:lstStyle/>
+          <a:p>
+            <a:r>
+              <a:rPr lang="en-US" sz="3600" dirty="0"/>
+              <a:t>Automated Black Box tests using Visual Studio’s built in testing suite and Roslyn.</a:t>
+            </a:r>
+          </a:p>
+          <a:p>
+            <a:endParaRPr lang="en-US" sz="3600" dirty="0"/>
+          </a:p>
+          <a:p>
+            <a:r>
+              <a:rPr lang="en-US" sz="3600" dirty="0"/>
+              <a:t>The black box tests do the following</a:t>
+            </a:r>
+          </a:p>
+          <a:p>
+            <a:pPr marL="742950" indent="-742950">
+              <a:buFont typeface="Arial" panose="020B0604020202020204" pitchFamily="34" charset="0"/>
+              <a:buChar char="•"/>
+            </a:pPr>
+            <a:r>
+              <a:rPr lang="en-US" sz="3600" dirty="0"/>
+              <a:t>Run the </a:t>
+            </a:r>
+            <a:r>
+              <a:rPr lang="en-US" sz="3600" dirty="0" err="1"/>
+              <a:t>CreateMappings</a:t>
+            </a:r>
+            <a:r>
+              <a:rPr lang="en-US" sz="3600" dirty="0"/>
+              <a:t> program</a:t>
+            </a:r>
+          </a:p>
+          <a:p>
+            <a:pPr marL="742950" indent="-742950">
+              <a:buFont typeface="Arial" panose="020B0604020202020204" pitchFamily="34" charset="0"/>
+              <a:buChar char="•"/>
+            </a:pPr>
+            <a:r>
+              <a:rPr lang="en-US" sz="3600" dirty="0"/>
+              <a:t>Run the </a:t>
+            </a:r>
+            <a:r>
+              <a:rPr lang="en-US" sz="3600" dirty="0" err="1"/>
+              <a:t>TransformClient</a:t>
+            </a:r>
+            <a:r>
+              <a:rPr lang="en-US" sz="3600" dirty="0"/>
+              <a:t> program</a:t>
+            </a:r>
+          </a:p>
+          <a:p>
+            <a:pPr marL="742950" indent="-742950">
+              <a:buFont typeface="Arial" panose="020B0604020202020204" pitchFamily="34" charset="0"/>
+              <a:buChar char="•"/>
+            </a:pPr>
+            <a:r>
+              <a:rPr lang="en-US" sz="3600" dirty="0"/>
+              <a:t>Use Roslyn to make sure the project compiles </a:t>
+            </a:r>
+          </a:p>
+          <a:p>
+            <a:pPr marL="742950" indent="-742950">
+              <a:buFont typeface="Arial" panose="020B0604020202020204" pitchFamily="34" charset="0"/>
+              <a:buChar char="•"/>
+            </a:pPr>
+            <a:r>
+              <a:rPr lang="en-US" sz="3600" dirty="0"/>
+              <a:t>Run the compiled project and verify output</a:t>
+            </a:r>
+          </a:p>
+          <a:p>
+            <a:endParaRPr lang="en-US" sz="3600" dirty="0"/>
+          </a:p>
+          <a:p>
+            <a:r>
+              <a:rPr lang="en-US" sz="3600" dirty="0"/>
+              <a:t>The tests use a common file structure, allowing more tests to be added with minimal effort.</a:t>
+            </a:r>
+          </a:p>
+        </p:txBody>
+      </p:sp>
+      <p:sp>
+        <p:nvSpPr>
+          <p:cNvPr id="62" name="TextBox 61"/>
+          <p:cNvSpPr txBox="1"/>
+          <p:nvPr/>
+        </p:nvSpPr>
+        <p:spPr>
+          <a:xfrm>
+            <a:off x="25918102" y="18465100"/>
+            <a:ext cx="3901489" cy="1023037"/>
+          </a:xfrm>
+          <a:prstGeom prst="rect">
+            <a:avLst/>
+          </a:prstGeom>
+          <a:noFill/>
+        </p:spPr>
+        <p:txBody>
+          <a:bodyPr wrap="square" rtlCol="0">
+            <a:spAutoFit/>
+          </a:bodyPr>
+          <a:lstStyle/>
+          <a:p>
+            <a:r>
+              <a:rPr lang="en-US" b="1" dirty="0"/>
+              <a:t>Testing</a:t>
+            </a:r>
+          </a:p>
+        </p:txBody>
+      </p:sp>
       <p:pic>
         <p:nvPicPr>
-          <p:cNvPr id="25" name="Picture 24"/>
+          <p:cNvPr id="64" name="Picture 63"/>
           <p:cNvPicPr>
             <a:picLocks noChangeAspect="1"/>
           </p:cNvPicPr>
           <p:nvPr/>
         </p:nvPicPr>
         <p:blipFill>
-          <a:blip r:embed="rId16">
-            <a:extLst>
-              <a:ext uri="{28A0092B-C50C-407E-A947-70E740481C1C}">
-                <a14:useLocalDpi xmlns:a14="http://schemas.microsoft.com/office/drawing/2010/main" val="0"/>
-              </a:ext>
-            </a:extLst>
-          </a:blip>
+          <a:blip r:embed="rId16"/>
           <a:stretch>
             <a:fillRect/>
           </a:stretch>
         </p:blipFill>
         <p:spPr>
           <a:xfrm>
-            <a:off x="13341464" y="20752178"/>
-            <a:ext cx="11504254" cy="5800349"/>
-          </a:xfrm>
-          <a:prstGeom prst="rect">
-            <a:avLst/>
-          </a:prstGeom>
-        </p:spPr>
-      </p:pic>
-      <p:pic>
-        <p:nvPicPr>
-          <p:cNvPr id="31" name="Picture 30"/>
-          <p:cNvPicPr>
-            <a:picLocks noChangeAspect="1"/>
-          </p:cNvPicPr>
-          <p:nvPr/>
-        </p:nvPicPr>
-        <p:blipFill>
-          <a:blip r:embed="rId17" cstate="print">
-            <a:extLst>
-              <a:ext uri="{28A0092B-C50C-407E-A947-70E740481C1C}">
-                <a14:useLocalDpi xmlns:a14="http://schemas.microsoft.com/office/drawing/2010/main" val="0"/>
-              </a:ext>
-            </a:extLst>
-          </a:blip>
-          <a:stretch>
-            <a:fillRect/>
-          </a:stretch>
-        </p:blipFill>
-        <p:spPr>
-          <a:xfrm>
-            <a:off x="183567" y="-38832"/>
-            <a:ext cx="3539346" cy="1663493"/>
+            <a:off x="16348944" y="21588845"/>
+            <a:ext cx="9145301" cy="5585980"/>
           </a:xfrm>
           <a:prstGeom prst="rect">
             <a:avLst/>

</xml_diff>

<commit_message>
changed the testing section of the poster
</commit_message>
<xml_diff>
--- a/documentation/poster.pptx
+++ b/documentation/poster.pptx
@@ -2195,6 +2195,13 @@
         </dgm:presLayoutVars>
       </dgm:prSet>
       <dgm:spPr/>
+      <dgm:t>
+        <a:bodyPr/>
+        <a:lstStyle/>
+        <a:p>
+          <a:endParaRPr lang="en-US"/>
+        </a:p>
+      </dgm:t>
     </dgm:pt>
     <dgm:pt modelId="{C86DE2E3-3485-4D88-991A-33C9416C5246}" type="pres">
       <dgm:prSet presAssocID="{CE704066-F6EC-4A34-BE57-F031F6F97A0E}" presName="linNode" presStyleCnt="0"/>
@@ -2208,6 +2215,13 @@
         </dgm:presLayoutVars>
       </dgm:prSet>
       <dgm:spPr/>
+      <dgm:t>
+        <a:bodyPr/>
+        <a:lstStyle/>
+        <a:p>
+          <a:endParaRPr lang="en-US"/>
+        </a:p>
+      </dgm:t>
     </dgm:pt>
     <dgm:pt modelId="{3DC572B2-C7F7-45EE-8266-8D3A0F1AF860}" type="pres">
       <dgm:prSet presAssocID="{CE704066-F6EC-4A34-BE57-F031F6F97A0E}" presName="descendantText" presStyleLbl="alignAccFollowNode1" presStyleIdx="0" presStyleCnt="3" custScaleX="107426">
@@ -2216,6 +2230,13 @@
         </dgm:presLayoutVars>
       </dgm:prSet>
       <dgm:spPr/>
+      <dgm:t>
+        <a:bodyPr/>
+        <a:lstStyle/>
+        <a:p>
+          <a:endParaRPr lang="en-US"/>
+        </a:p>
+      </dgm:t>
     </dgm:pt>
     <dgm:pt modelId="{356BFF2B-59F5-4B2D-A37F-4D545FC129A8}" type="pres">
       <dgm:prSet presAssocID="{2190222A-E708-44B6-912C-16ACA9D69599}" presName="sp" presStyleCnt="0"/>
@@ -2233,6 +2254,13 @@
         </dgm:presLayoutVars>
       </dgm:prSet>
       <dgm:spPr/>
+      <dgm:t>
+        <a:bodyPr/>
+        <a:lstStyle/>
+        <a:p>
+          <a:endParaRPr lang="en-US"/>
+        </a:p>
+      </dgm:t>
     </dgm:pt>
     <dgm:pt modelId="{6DA4FE5C-CB21-47E7-B0F0-9CB097B5E464}" type="pres">
       <dgm:prSet presAssocID="{5D518925-A42D-44F7-8A34-D7EE8C8BA4F6}" presName="descendantText" presStyleLbl="alignAccFollowNode1" presStyleIdx="1" presStyleCnt="3" custScaleX="107426">
@@ -2241,6 +2269,13 @@
         </dgm:presLayoutVars>
       </dgm:prSet>
       <dgm:spPr/>
+      <dgm:t>
+        <a:bodyPr/>
+        <a:lstStyle/>
+        <a:p>
+          <a:endParaRPr lang="en-US"/>
+        </a:p>
+      </dgm:t>
     </dgm:pt>
     <dgm:pt modelId="{89AEE0E6-A6EE-4F95-9EFD-E7951DB92FAA}" type="pres">
       <dgm:prSet presAssocID="{8E9682BF-077B-49CE-83FC-92F75221525A}" presName="sp" presStyleCnt="0"/>
@@ -2258,6 +2293,13 @@
         </dgm:presLayoutVars>
       </dgm:prSet>
       <dgm:spPr/>
+      <dgm:t>
+        <a:bodyPr/>
+        <a:lstStyle/>
+        <a:p>
+          <a:endParaRPr lang="en-US"/>
+        </a:p>
+      </dgm:t>
     </dgm:pt>
     <dgm:pt modelId="{94FD681E-6FED-4D1A-91A3-94D9AE5BBDC1}" type="pres">
       <dgm:prSet presAssocID="{93B62B81-D7F7-431E-9439-2E3D4CD2353E}" presName="descendantText" presStyleLbl="alignAccFollowNode1" presStyleIdx="2" presStyleCnt="3" custScaleX="107426">
@@ -2266,28 +2308,35 @@
         </dgm:presLayoutVars>
       </dgm:prSet>
       <dgm:spPr/>
+      <dgm:t>
+        <a:bodyPr/>
+        <a:lstStyle/>
+        <a:p>
+          <a:endParaRPr lang="en-US"/>
+        </a:p>
+      </dgm:t>
     </dgm:pt>
   </dgm:ptLst>
   <dgm:cxnLst>
-    <dgm:cxn modelId="{670CE803-5732-44F7-8BFC-139BBB9EFD9D}" srcId="{5D518925-A42D-44F7-8A34-D7EE8C8BA4F6}" destId="{5F3C6D8C-49F5-414A-9B7D-37B3F73CBB71}" srcOrd="1" destOrd="0" parTransId="{21512CD3-C611-4379-A522-10F5A3696ED3}" sibTransId="{CE942B8A-FC02-4475-BE3F-E505BC877B1D}"/>
-    <dgm:cxn modelId="{B7847806-6502-4A85-AA95-FB3B3F9F8E85}" srcId="{93B62B81-D7F7-431E-9439-2E3D4CD2353E}" destId="{491443E3-89AE-4FE4-92A7-C951F26ADF15}" srcOrd="0" destOrd="0" parTransId="{21A27C6B-BD4F-4728-8495-2749C96FF1CC}" sibTransId="{892CAB94-5167-438E-8541-2DCB69385D70}"/>
-    <dgm:cxn modelId="{196DD02D-672C-4265-9958-28C33653829B}" type="presOf" srcId="{96D2705E-7225-4E32-BBCA-73AADEC51771}" destId="{3DC572B2-C7F7-45EE-8266-8D3A0F1AF860}" srcOrd="0" destOrd="0" presId="urn:microsoft.com/office/officeart/2005/8/layout/vList5"/>
-    <dgm:cxn modelId="{B5EA5F30-9689-4546-8120-3309418A9BF6}" type="presOf" srcId="{BE1D1458-5D71-486A-9C06-F8C2979301CE}" destId="{E4832E59-FCA4-4EC2-82F5-B4BFAF552C72}" srcOrd="0" destOrd="0" presId="urn:microsoft.com/office/officeart/2005/8/layout/vList5"/>
+    <dgm:cxn modelId="{46BEEEEA-8181-4496-8F3E-4B42C7BEC8A4}" srcId="{BE1D1458-5D71-486A-9C06-F8C2979301CE}" destId="{93B62B81-D7F7-431E-9439-2E3D4CD2353E}" srcOrd="2" destOrd="0" parTransId="{CF446EAA-D8CD-45A9-B112-FE71C0FABC3A}" sibTransId="{99D4F5D3-8426-4A0A-9AFF-9CC195309684}"/>
     <dgm:cxn modelId="{4C11CF35-6553-44AE-BF05-CC97F67390E3}" type="presOf" srcId="{E4B44728-031A-45B4-A960-6D7C98163EB4}" destId="{3DC572B2-C7F7-45EE-8266-8D3A0F1AF860}" srcOrd="0" destOrd="1" presId="urn:microsoft.com/office/officeart/2005/8/layout/vList5"/>
+    <dgm:cxn modelId="{294848E5-A50B-4122-8FC4-07D10048A02B}" type="presOf" srcId="{491443E3-89AE-4FE4-92A7-C951F26ADF15}" destId="{94FD681E-6FED-4D1A-91A3-94D9AE5BBDC1}" srcOrd="0" destOrd="0" presId="urn:microsoft.com/office/officeart/2005/8/layout/vList5"/>
+    <dgm:cxn modelId="{B3A6FD9F-23A2-4187-BE54-08ED4A00065C}" type="presOf" srcId="{93B62B81-D7F7-431E-9439-2E3D4CD2353E}" destId="{A578B4B1-012F-4704-840D-D9A1F6815359}" srcOrd="0" destOrd="0" presId="urn:microsoft.com/office/officeart/2005/8/layout/vList5"/>
+    <dgm:cxn modelId="{FB5D5687-CBA9-4DC5-BA0C-6E946062A079}" type="presOf" srcId="{72B0AA1E-CB07-4D66-8C5F-5084D4F61D84}" destId="{94FD681E-6FED-4D1A-91A3-94D9AE5BBDC1}" srcOrd="0" destOrd="1" presId="urn:microsoft.com/office/officeart/2005/8/layout/vList5"/>
     <dgm:cxn modelId="{CB5E2C5D-CEAC-421F-B401-2DA7AD423DE3}" srcId="{BE1D1458-5D71-486A-9C06-F8C2979301CE}" destId="{5D518925-A42D-44F7-8A34-D7EE8C8BA4F6}" srcOrd="1" destOrd="0" parTransId="{3F7C9D5E-9B3B-436C-98DD-9AB7ED4F3098}" sibTransId="{8E9682BF-077B-49CE-83FC-92F75221525A}"/>
     <dgm:cxn modelId="{D3E26C67-6F84-4E24-8129-8C98E7E91547}" srcId="{BE1D1458-5D71-486A-9C06-F8C2979301CE}" destId="{CE704066-F6EC-4A34-BE57-F031F6F97A0E}" srcOrd="0" destOrd="0" parTransId="{39B9789B-9256-4F63-B415-E8CB368FCE65}" sibTransId="{2190222A-E708-44B6-912C-16ACA9D69599}"/>
+    <dgm:cxn modelId="{2D5599CD-EE5D-40F9-A0FD-CC1E62ECA14E}" srcId="{CE704066-F6EC-4A34-BE57-F031F6F97A0E}" destId="{E4B44728-031A-45B4-A960-6D7C98163EB4}" srcOrd="1" destOrd="0" parTransId="{A6A79D2A-79DB-436D-AB27-E222CDBC7436}" sibTransId="{F9EF34C1-D145-4D03-BEF0-2842C4F14E8F}"/>
+    <dgm:cxn modelId="{31ED0CFA-3F9C-4EC0-89AC-690C51CC9BA5}" type="presOf" srcId="{5D518925-A42D-44F7-8A34-D7EE8C8BA4F6}" destId="{A5D97866-9099-44CF-8392-E4D04C75D305}" srcOrd="0" destOrd="0" presId="urn:microsoft.com/office/officeart/2005/8/layout/vList5"/>
+    <dgm:cxn modelId="{670CE803-5732-44F7-8BFC-139BBB9EFD9D}" srcId="{5D518925-A42D-44F7-8A34-D7EE8C8BA4F6}" destId="{5F3C6D8C-49F5-414A-9B7D-37B3F73CBB71}" srcOrd="1" destOrd="0" parTransId="{21512CD3-C611-4379-A522-10F5A3696ED3}" sibTransId="{CE942B8A-FC02-4475-BE3F-E505BC877B1D}"/>
+    <dgm:cxn modelId="{BE7532DD-61C4-419A-9602-441A2CB79061}" srcId="{5D518925-A42D-44F7-8A34-D7EE8C8BA4F6}" destId="{FD7D5C93-D69E-40C6-971E-DE23F823AC96}" srcOrd="0" destOrd="0" parTransId="{A885DEA9-B00A-4431-98A9-DE220F925B82}" sibTransId="{F77961E8-CCF0-4884-B78F-402299556199}"/>
     <dgm:cxn modelId="{5D9C2078-89FC-4FB2-BBDB-58805684377A}" srcId="{93B62B81-D7F7-431E-9439-2E3D4CD2353E}" destId="{72B0AA1E-CB07-4D66-8C5F-5084D4F61D84}" srcOrd="1" destOrd="0" parTransId="{C7FF9C0A-64CD-4E9C-AF44-B8A14C148043}" sibTransId="{432643FE-DCC3-4D28-9715-CB09FF1D1DC6}"/>
     <dgm:cxn modelId="{263AB879-3159-43DD-A7DA-56351BC654F5}" srcId="{CE704066-F6EC-4A34-BE57-F031F6F97A0E}" destId="{96D2705E-7225-4E32-BBCA-73AADEC51771}" srcOrd="0" destOrd="0" parTransId="{B6FE3FB8-829C-4505-ADEF-C25B4D0E3D19}" sibTransId="{7D84155D-6B55-476E-8E57-41C47780CABE}"/>
     <dgm:cxn modelId="{33DDB27E-1AF9-41BA-B515-48F3163A6E91}" type="presOf" srcId="{5F3C6D8C-49F5-414A-9B7D-37B3F73CBB71}" destId="{6DA4FE5C-CB21-47E7-B0F0-9CB097B5E464}" srcOrd="0" destOrd="1" presId="urn:microsoft.com/office/officeart/2005/8/layout/vList5"/>
-    <dgm:cxn modelId="{FB5D5687-CBA9-4DC5-BA0C-6E946062A079}" type="presOf" srcId="{72B0AA1E-CB07-4D66-8C5F-5084D4F61D84}" destId="{94FD681E-6FED-4D1A-91A3-94D9AE5BBDC1}" srcOrd="0" destOrd="1" presId="urn:microsoft.com/office/officeart/2005/8/layout/vList5"/>
-    <dgm:cxn modelId="{B3A6FD9F-23A2-4187-BE54-08ED4A00065C}" type="presOf" srcId="{93B62B81-D7F7-431E-9439-2E3D4CD2353E}" destId="{A578B4B1-012F-4704-840D-D9A1F6815359}" srcOrd="0" destOrd="0" presId="urn:microsoft.com/office/officeart/2005/8/layout/vList5"/>
+    <dgm:cxn modelId="{5F24A8FD-6B4A-49D3-B691-5F99C562E169}" type="presOf" srcId="{CE704066-F6EC-4A34-BE57-F031F6F97A0E}" destId="{89A3A35E-A31F-4A19-88A6-C711D22D028E}" srcOrd="0" destOrd="0" presId="urn:microsoft.com/office/officeart/2005/8/layout/vList5"/>
+    <dgm:cxn modelId="{B7847806-6502-4A85-AA95-FB3B3F9F8E85}" srcId="{93B62B81-D7F7-431E-9439-2E3D4CD2353E}" destId="{491443E3-89AE-4FE4-92A7-C951F26ADF15}" srcOrd="0" destOrd="0" parTransId="{21A27C6B-BD4F-4728-8495-2749C96FF1CC}" sibTransId="{892CAB94-5167-438E-8541-2DCB69385D70}"/>
+    <dgm:cxn modelId="{B5EA5F30-9689-4546-8120-3309418A9BF6}" type="presOf" srcId="{BE1D1458-5D71-486A-9C06-F8C2979301CE}" destId="{E4832E59-FCA4-4EC2-82F5-B4BFAF552C72}" srcOrd="0" destOrd="0" presId="urn:microsoft.com/office/officeart/2005/8/layout/vList5"/>
+    <dgm:cxn modelId="{196DD02D-672C-4265-9958-28C33653829B}" type="presOf" srcId="{96D2705E-7225-4E32-BBCA-73AADEC51771}" destId="{3DC572B2-C7F7-45EE-8266-8D3A0F1AF860}" srcOrd="0" destOrd="0" presId="urn:microsoft.com/office/officeart/2005/8/layout/vList5"/>
     <dgm:cxn modelId="{2C8F8EBD-D261-4528-82AD-750347F41495}" type="presOf" srcId="{FD7D5C93-D69E-40C6-971E-DE23F823AC96}" destId="{6DA4FE5C-CB21-47E7-B0F0-9CB097B5E464}" srcOrd="0" destOrd="0" presId="urn:microsoft.com/office/officeart/2005/8/layout/vList5"/>
-    <dgm:cxn modelId="{2D5599CD-EE5D-40F9-A0FD-CC1E62ECA14E}" srcId="{CE704066-F6EC-4A34-BE57-F031F6F97A0E}" destId="{E4B44728-031A-45B4-A960-6D7C98163EB4}" srcOrd="1" destOrd="0" parTransId="{A6A79D2A-79DB-436D-AB27-E222CDBC7436}" sibTransId="{F9EF34C1-D145-4D03-BEF0-2842C4F14E8F}"/>
-    <dgm:cxn modelId="{BE7532DD-61C4-419A-9602-441A2CB79061}" srcId="{5D518925-A42D-44F7-8A34-D7EE8C8BA4F6}" destId="{FD7D5C93-D69E-40C6-971E-DE23F823AC96}" srcOrd="0" destOrd="0" parTransId="{A885DEA9-B00A-4431-98A9-DE220F925B82}" sibTransId="{F77961E8-CCF0-4884-B78F-402299556199}"/>
-    <dgm:cxn modelId="{294848E5-A50B-4122-8FC4-07D10048A02B}" type="presOf" srcId="{491443E3-89AE-4FE4-92A7-C951F26ADF15}" destId="{94FD681E-6FED-4D1A-91A3-94D9AE5BBDC1}" srcOrd="0" destOrd="0" presId="urn:microsoft.com/office/officeart/2005/8/layout/vList5"/>
-    <dgm:cxn modelId="{46BEEEEA-8181-4496-8F3E-4B42C7BEC8A4}" srcId="{BE1D1458-5D71-486A-9C06-F8C2979301CE}" destId="{93B62B81-D7F7-431E-9439-2E3D4CD2353E}" srcOrd="2" destOrd="0" parTransId="{CF446EAA-D8CD-45A9-B112-FE71C0FABC3A}" sibTransId="{99D4F5D3-8426-4A0A-9AFF-9CC195309684}"/>
-    <dgm:cxn modelId="{31ED0CFA-3F9C-4EC0-89AC-690C51CC9BA5}" type="presOf" srcId="{5D518925-A42D-44F7-8A34-D7EE8C8BA4F6}" destId="{A5D97866-9099-44CF-8392-E4D04C75D305}" srcOrd="0" destOrd="0" presId="urn:microsoft.com/office/officeart/2005/8/layout/vList5"/>
-    <dgm:cxn modelId="{5F24A8FD-6B4A-49D3-B691-5F99C562E169}" type="presOf" srcId="{CE704066-F6EC-4A34-BE57-F031F6F97A0E}" destId="{89A3A35E-A31F-4A19-88A6-C711D22D028E}" srcOrd="0" destOrd="0" presId="urn:microsoft.com/office/officeart/2005/8/layout/vList5"/>
     <dgm:cxn modelId="{28AA4A30-AA5E-429A-819F-57E39EB52A28}" type="presParOf" srcId="{E4832E59-FCA4-4EC2-82F5-B4BFAF552C72}" destId="{C86DE2E3-3485-4D88-991A-33C9416C5246}" srcOrd="0" destOrd="0" presId="urn:microsoft.com/office/officeart/2005/8/layout/vList5"/>
     <dgm:cxn modelId="{F31821A7-9748-44E7-A0CC-6C3DEECFE1DD}" type="presParOf" srcId="{C86DE2E3-3485-4D88-991A-33C9416C5246}" destId="{89A3A35E-A31F-4A19-88A6-C711D22D028E}" srcOrd="0" destOrd="0" presId="urn:microsoft.com/office/officeart/2005/8/layout/vList5"/>
     <dgm:cxn modelId="{1CBED319-C83D-4585-8A7A-594598994B04}" type="presParOf" srcId="{C86DE2E3-3485-4D88-991A-33C9416C5246}" destId="{3DC572B2-C7F7-45EE-8266-8D3A0F1AF860}" srcOrd="1" destOrd="0" presId="urn:microsoft.com/office/officeart/2005/8/layout/vList5"/>
@@ -3107,6 +3156,13 @@
         </dgm:presLayoutVars>
       </dgm:prSet>
       <dgm:spPr/>
+      <dgm:t>
+        <a:bodyPr/>
+        <a:lstStyle/>
+        <a:p>
+          <a:endParaRPr lang="en-US"/>
+        </a:p>
+      </dgm:t>
     </dgm:pt>
     <dgm:pt modelId="{A403ADE2-8A92-4517-8307-DFE248D89559}" type="pres">
       <dgm:prSet presAssocID="{3C84C93E-F276-4672-8306-0D4EDC48291C}" presName="linNode" presStyleCnt="0"/>
@@ -3120,6 +3176,13 @@
         </dgm:presLayoutVars>
       </dgm:prSet>
       <dgm:spPr/>
+      <dgm:t>
+        <a:bodyPr/>
+        <a:lstStyle/>
+        <a:p>
+          <a:endParaRPr lang="en-US"/>
+        </a:p>
+      </dgm:t>
     </dgm:pt>
     <dgm:pt modelId="{7F9C28E1-28AC-404D-A8EF-ACDB5DFF50D9}" type="pres">
       <dgm:prSet presAssocID="{3C84C93E-F276-4672-8306-0D4EDC48291C}" presName="descendantText" presStyleLbl="alignAccFollowNode1" presStyleIdx="0" presStyleCnt="4">
@@ -3128,6 +3191,13 @@
         </dgm:presLayoutVars>
       </dgm:prSet>
       <dgm:spPr/>
+      <dgm:t>
+        <a:bodyPr/>
+        <a:lstStyle/>
+        <a:p>
+          <a:endParaRPr lang="en-US"/>
+        </a:p>
+      </dgm:t>
     </dgm:pt>
     <dgm:pt modelId="{34F37747-6784-4877-8185-2C87ABBCCC9F}" type="pres">
       <dgm:prSet presAssocID="{6F06AEEB-27E4-4060-AD12-431800289540}" presName="sp" presStyleCnt="0"/>
@@ -3145,6 +3215,13 @@
         </dgm:presLayoutVars>
       </dgm:prSet>
       <dgm:spPr/>
+      <dgm:t>
+        <a:bodyPr/>
+        <a:lstStyle/>
+        <a:p>
+          <a:endParaRPr lang="en-US"/>
+        </a:p>
+      </dgm:t>
     </dgm:pt>
     <dgm:pt modelId="{D510B8BF-35DE-4934-9EDD-BB2C766C9B1D}" type="pres">
       <dgm:prSet presAssocID="{18A5A126-9CDF-408F-AED4-1709B1B7856C}" presName="descendantText" presStyleLbl="alignAccFollowNode1" presStyleIdx="1" presStyleCnt="4">
@@ -3153,6 +3230,13 @@
         </dgm:presLayoutVars>
       </dgm:prSet>
       <dgm:spPr/>
+      <dgm:t>
+        <a:bodyPr/>
+        <a:lstStyle/>
+        <a:p>
+          <a:endParaRPr lang="en-US"/>
+        </a:p>
+      </dgm:t>
     </dgm:pt>
     <dgm:pt modelId="{3848E3C7-E4D3-4713-BA1D-B4C006AC2665}" type="pres">
       <dgm:prSet presAssocID="{1B9835CA-355C-422C-A0F3-E76C387F3609}" presName="sp" presStyleCnt="0"/>
@@ -3170,6 +3254,13 @@
         </dgm:presLayoutVars>
       </dgm:prSet>
       <dgm:spPr/>
+      <dgm:t>
+        <a:bodyPr/>
+        <a:lstStyle/>
+        <a:p>
+          <a:endParaRPr lang="en-US"/>
+        </a:p>
+      </dgm:t>
     </dgm:pt>
     <dgm:pt modelId="{37B4A69E-BEAA-483D-A27B-B8066514DC2A}" type="pres">
       <dgm:prSet presAssocID="{D0F8E683-C4DC-481A-8BCD-4B33BA43D927}" presName="descendantText" presStyleLbl="alignAccFollowNode1" presStyleIdx="2" presStyleCnt="4">
@@ -3178,6 +3269,13 @@
         </dgm:presLayoutVars>
       </dgm:prSet>
       <dgm:spPr/>
+      <dgm:t>
+        <a:bodyPr/>
+        <a:lstStyle/>
+        <a:p>
+          <a:endParaRPr lang="en-US"/>
+        </a:p>
+      </dgm:t>
     </dgm:pt>
     <dgm:pt modelId="{9CFDBF66-7A98-4500-A454-C13851DB99F5}" type="pres">
       <dgm:prSet presAssocID="{01ADA495-5465-42CE-B1D0-9C68DEAC5498}" presName="sp" presStyleCnt="0"/>
@@ -3195,6 +3293,13 @@
         </dgm:presLayoutVars>
       </dgm:prSet>
       <dgm:spPr/>
+      <dgm:t>
+        <a:bodyPr/>
+        <a:lstStyle/>
+        <a:p>
+          <a:endParaRPr lang="en-US"/>
+        </a:p>
+      </dgm:t>
     </dgm:pt>
     <dgm:pt modelId="{3248EAB6-7CD9-4AF4-8610-E82B5A9C2B0F}" type="pres">
       <dgm:prSet presAssocID="{20AC9AF4-A267-4D5E-9755-9C098B10F303}" presName="descendantText" presStyleLbl="alignAccFollowNode1" presStyleIdx="3" presStyleCnt="4">
@@ -3203,34 +3308,41 @@
         </dgm:presLayoutVars>
       </dgm:prSet>
       <dgm:spPr/>
+      <dgm:t>
+        <a:bodyPr/>
+        <a:lstStyle/>
+        <a:p>
+          <a:endParaRPr lang="en-US"/>
+        </a:p>
+      </dgm:t>
     </dgm:pt>
   </dgm:ptLst>
   <dgm:cxnLst>
+    <dgm:cxn modelId="{64DD1C90-3C90-46D1-991C-FD2892A0591D}" type="presOf" srcId="{18A5A126-9CDF-408F-AED4-1709B1B7856C}" destId="{7EFE7DE5-404E-420F-BB2C-8D177D4BD0E5}" srcOrd="0" destOrd="0" presId="urn:microsoft.com/office/officeart/2005/8/layout/vList5"/>
+    <dgm:cxn modelId="{2EC0C072-6C5C-4C35-AA9F-6D426F1E990B}" srcId="{18A5A126-9CDF-408F-AED4-1709B1B7856C}" destId="{ACA9C505-CD0B-4752-9300-8A1863EE07ED}" srcOrd="0" destOrd="0" parTransId="{722D4FBA-AFE0-4B18-9927-B3D40D502D1F}" sibTransId="{B9A8F6A4-D6F8-4C5E-9CFC-1EC774D0D933}"/>
+    <dgm:cxn modelId="{5A9C18E7-DDFB-4820-97E3-B9BF1D799526}" srcId="{D0F8E683-C4DC-481A-8BCD-4B33BA43D927}" destId="{E9A1F835-6E14-423F-892C-1E5350F4D404}" srcOrd="1" destOrd="0" parTransId="{1C8F4CC9-03DA-4CA8-B795-E109B6A3FA9D}" sibTransId="{0ADF2407-687D-4AA9-9C1D-67FF1F383CB0}"/>
+    <dgm:cxn modelId="{AFAC89D5-DCF5-433D-B507-927889F835B2}" type="presOf" srcId="{3C84C93E-F276-4672-8306-0D4EDC48291C}" destId="{9DB291ED-CC19-490E-961E-C63E51B3DEBD}" srcOrd="0" destOrd="0" presId="urn:microsoft.com/office/officeart/2005/8/layout/vList5"/>
+    <dgm:cxn modelId="{CF1D1650-F396-49FB-A873-6FE141596A3B}" type="presOf" srcId="{9BE3BF22-2E45-4160-B620-9D51AEC383B5}" destId="{3248EAB6-7CD9-4AF4-8610-E82B5A9C2B0F}" srcOrd="0" destOrd="1" presId="urn:microsoft.com/office/officeart/2005/8/layout/vList5"/>
     <dgm:cxn modelId="{31ED1609-EE0B-4F1F-AECD-9A7244C2832E}" srcId="{3C84C93E-F276-4672-8306-0D4EDC48291C}" destId="{23807C4C-2DCB-4551-8F2D-7F715C6742A2}" srcOrd="1" destOrd="0" parTransId="{3761A983-A35D-4BA9-861F-A447DD3C1B1C}" sibTransId="{DBCDE35C-4C80-483B-8006-3FB356AD5639}"/>
+    <dgm:cxn modelId="{8540A648-0CCF-4E4F-B782-9217D67E063C}" type="presOf" srcId="{BA2DB30F-C26A-4431-8C29-A5CB73928175}" destId="{37B4A69E-BEAA-483D-A27B-B8066514DC2A}" srcOrd="0" destOrd="0" presId="urn:microsoft.com/office/officeart/2005/8/layout/vList5"/>
+    <dgm:cxn modelId="{57D385A9-DE56-43F5-9116-499131FF08E3}" srcId="{D0F8E683-C4DC-481A-8BCD-4B33BA43D927}" destId="{BA2DB30F-C26A-4431-8C29-A5CB73928175}" srcOrd="0" destOrd="0" parTransId="{88C1E58E-43BE-42F9-93DF-A962F3F20EB5}" sibTransId="{31F96A22-B396-492D-AFB1-97F5589DC161}"/>
+    <dgm:cxn modelId="{84950C3F-C348-4F3F-AF7D-CF2F03A99F71}" type="presOf" srcId="{ACA9C505-CD0B-4752-9300-8A1863EE07ED}" destId="{D510B8BF-35DE-4934-9EDD-BB2C766C9B1D}" srcOrd="0" destOrd="0" presId="urn:microsoft.com/office/officeart/2005/8/layout/vList5"/>
+    <dgm:cxn modelId="{5FAAE87E-6F02-4A4D-A80D-03B20599D8C7}" srcId="{4655BB5F-4EBC-4207-A5B0-147FC724DAE7}" destId="{18A5A126-9CDF-408F-AED4-1709B1B7856C}" srcOrd="1" destOrd="0" parTransId="{C742BDC9-C7A2-4C81-9DCC-36EC82FCCFE4}" sibTransId="{1B9835CA-355C-422C-A0F3-E76C387F3609}"/>
+    <dgm:cxn modelId="{33370FC1-1A83-45E0-AB6E-3C41CF6AA528}" type="presOf" srcId="{D0F8E683-C4DC-481A-8BCD-4B33BA43D927}" destId="{2DC11702-8290-49B6-BE15-B41D2A028289}" srcOrd="0" destOrd="0" presId="urn:microsoft.com/office/officeart/2005/8/layout/vList5"/>
+    <dgm:cxn modelId="{47CC6B9E-D179-4E52-A25A-91136DB78A3D}" srcId="{20AC9AF4-A267-4D5E-9755-9C098B10F303}" destId="{DAD6FF4F-6573-44CA-BBA6-AA6673522659}" srcOrd="0" destOrd="0" parTransId="{F6B8AF35-B27F-4B48-8A04-B523895CEE27}" sibTransId="{579B0503-F442-4237-ADA4-B2E641B0E6C9}"/>
+    <dgm:cxn modelId="{A805535C-45CB-411D-B26B-CB9C35E95BCA}" type="presOf" srcId="{20AC9AF4-A267-4D5E-9755-9C098B10F303}" destId="{96A820CA-BC25-4317-9A27-1A1206B2F40D}" srcOrd="0" destOrd="0" presId="urn:microsoft.com/office/officeart/2005/8/layout/vList5"/>
+    <dgm:cxn modelId="{61184497-FB9A-4517-B4E6-9A8B93550CFE}" type="presOf" srcId="{BB977D72-290E-42DF-B6F8-2AD2E69D3762}" destId="{D510B8BF-35DE-4934-9EDD-BB2C766C9B1D}" srcOrd="0" destOrd="1" presId="urn:microsoft.com/office/officeart/2005/8/layout/vList5"/>
+    <dgm:cxn modelId="{3B1ED675-063C-47DD-8EFE-6BB9D9426764}" srcId="{4655BB5F-4EBC-4207-A5B0-147FC724DAE7}" destId="{3C84C93E-F276-4672-8306-0D4EDC48291C}" srcOrd="0" destOrd="0" parTransId="{18AAB41D-8D7F-46E1-8A66-47A6E4B44E6E}" sibTransId="{6F06AEEB-27E4-4060-AD12-431800289540}"/>
     <dgm:cxn modelId="{87C43F12-B864-4A67-B24A-3EB2710BA809}" type="presOf" srcId="{E9A1F835-6E14-423F-892C-1E5350F4D404}" destId="{37B4A69E-BEAA-483D-A27B-B8066514DC2A}" srcOrd="0" destOrd="1" presId="urn:microsoft.com/office/officeart/2005/8/layout/vList5"/>
+    <dgm:cxn modelId="{7FDA67A2-CC00-44E7-BEB5-D239152E04EE}" srcId="{18A5A126-9CDF-408F-AED4-1709B1B7856C}" destId="{BB977D72-290E-42DF-B6F8-2AD2E69D3762}" srcOrd="1" destOrd="0" parTransId="{5ED6EE6B-050F-4A62-9A97-9909BF63F3BF}" sibTransId="{C467AD86-0A99-4F7B-BF89-07FBA45FAE9A}"/>
+    <dgm:cxn modelId="{19A200BB-5E81-4D36-8DFD-4D38E266CB4A}" srcId="{4655BB5F-4EBC-4207-A5B0-147FC724DAE7}" destId="{20AC9AF4-A267-4D5E-9755-9C098B10F303}" srcOrd="3" destOrd="0" parTransId="{D44B6C09-6E5C-497C-B00C-B56B66B0907F}" sibTransId="{B7881554-C08F-43C1-AE2C-D1A37106B272}"/>
     <dgm:cxn modelId="{E631812C-6B9D-4E57-B1E9-B09F0A03AC3B}" srcId="{4655BB5F-4EBC-4207-A5B0-147FC724DAE7}" destId="{D0F8E683-C4DC-481A-8BCD-4B33BA43D927}" srcOrd="2" destOrd="0" parTransId="{6388F7F7-BC70-40EC-8FAF-DD54C0D02487}" sibTransId="{01ADA495-5465-42CE-B1D0-9C68DEAC5498}"/>
-    <dgm:cxn modelId="{84950C3F-C348-4F3F-AF7D-CF2F03A99F71}" type="presOf" srcId="{ACA9C505-CD0B-4752-9300-8A1863EE07ED}" destId="{D510B8BF-35DE-4934-9EDD-BB2C766C9B1D}" srcOrd="0" destOrd="0" presId="urn:microsoft.com/office/officeart/2005/8/layout/vList5"/>
-    <dgm:cxn modelId="{A805535C-45CB-411D-B26B-CB9C35E95BCA}" type="presOf" srcId="{20AC9AF4-A267-4D5E-9755-9C098B10F303}" destId="{96A820CA-BC25-4317-9A27-1A1206B2F40D}" srcOrd="0" destOrd="0" presId="urn:microsoft.com/office/officeart/2005/8/layout/vList5"/>
+    <dgm:cxn modelId="{CE5AC1A0-72AA-4BAE-A979-AC61D3008BD2}" type="presOf" srcId="{4655BB5F-4EBC-4207-A5B0-147FC724DAE7}" destId="{5603229D-4475-4EBD-8B80-5BF85AF5A926}" srcOrd="0" destOrd="0" presId="urn:microsoft.com/office/officeart/2005/8/layout/vList5"/>
+    <dgm:cxn modelId="{64E39D71-D718-4821-B430-7DED81A1C673}" srcId="{20AC9AF4-A267-4D5E-9755-9C098B10F303}" destId="{9BE3BF22-2E45-4160-B620-9D51AEC383B5}" srcOrd="1" destOrd="0" parTransId="{909D2861-4BA0-4F26-AE5B-7F6CE7BE93D1}" sibTransId="{0A72E7A3-C243-42B6-B3A9-01079EF60D3D}"/>
+    <dgm:cxn modelId="{B54D4BA8-2D93-401F-9369-3B9FAF11BF1D}" type="presOf" srcId="{23807C4C-2DCB-4551-8F2D-7F715C6742A2}" destId="{7F9C28E1-28AC-404D-A8EF-ACDB5DFF50D9}" srcOrd="0" destOrd="1" presId="urn:microsoft.com/office/officeart/2005/8/layout/vList5"/>
     <dgm:cxn modelId="{29AC8E5D-B1F5-4BFA-9435-5A8D5E0E78EF}" type="presOf" srcId="{DAD6FF4F-6573-44CA-BBA6-AA6673522659}" destId="{3248EAB6-7CD9-4AF4-8610-E82B5A9C2B0F}" srcOrd="0" destOrd="0" presId="urn:microsoft.com/office/officeart/2005/8/layout/vList5"/>
-    <dgm:cxn modelId="{8540A648-0CCF-4E4F-B782-9217D67E063C}" type="presOf" srcId="{BA2DB30F-C26A-4431-8C29-A5CB73928175}" destId="{37B4A69E-BEAA-483D-A27B-B8066514DC2A}" srcOrd="0" destOrd="0" presId="urn:microsoft.com/office/officeart/2005/8/layout/vList5"/>
-    <dgm:cxn modelId="{CF1D1650-F396-49FB-A873-6FE141596A3B}" type="presOf" srcId="{9BE3BF22-2E45-4160-B620-9D51AEC383B5}" destId="{3248EAB6-7CD9-4AF4-8610-E82B5A9C2B0F}" srcOrd="0" destOrd="1" presId="urn:microsoft.com/office/officeart/2005/8/layout/vList5"/>
+    <dgm:cxn modelId="{16BD44F1-3513-4BA7-9D63-32D92206830D}" srcId="{3C84C93E-F276-4672-8306-0D4EDC48291C}" destId="{AD1158AF-1744-4807-9ED0-BAA14AAB0471}" srcOrd="0" destOrd="0" parTransId="{76200662-55F0-4D2B-8F4F-9431C761ACA2}" sibTransId="{A170262A-E59C-4C66-B35F-370FAF94CB57}"/>
     <dgm:cxn modelId="{192D5A71-0F14-4D2D-B65E-968D83E4D1B9}" type="presOf" srcId="{AD1158AF-1744-4807-9ED0-BAA14AAB0471}" destId="{7F9C28E1-28AC-404D-A8EF-ACDB5DFF50D9}" srcOrd="0" destOrd="0" presId="urn:microsoft.com/office/officeart/2005/8/layout/vList5"/>
-    <dgm:cxn modelId="{64E39D71-D718-4821-B430-7DED81A1C673}" srcId="{20AC9AF4-A267-4D5E-9755-9C098B10F303}" destId="{9BE3BF22-2E45-4160-B620-9D51AEC383B5}" srcOrd="1" destOrd="0" parTransId="{909D2861-4BA0-4F26-AE5B-7F6CE7BE93D1}" sibTransId="{0A72E7A3-C243-42B6-B3A9-01079EF60D3D}"/>
-    <dgm:cxn modelId="{2EC0C072-6C5C-4C35-AA9F-6D426F1E990B}" srcId="{18A5A126-9CDF-408F-AED4-1709B1B7856C}" destId="{ACA9C505-CD0B-4752-9300-8A1863EE07ED}" srcOrd="0" destOrd="0" parTransId="{722D4FBA-AFE0-4B18-9927-B3D40D502D1F}" sibTransId="{B9A8F6A4-D6F8-4C5E-9CFC-1EC774D0D933}"/>
-    <dgm:cxn modelId="{3B1ED675-063C-47DD-8EFE-6BB9D9426764}" srcId="{4655BB5F-4EBC-4207-A5B0-147FC724DAE7}" destId="{3C84C93E-F276-4672-8306-0D4EDC48291C}" srcOrd="0" destOrd="0" parTransId="{18AAB41D-8D7F-46E1-8A66-47A6E4B44E6E}" sibTransId="{6F06AEEB-27E4-4060-AD12-431800289540}"/>
-    <dgm:cxn modelId="{5FAAE87E-6F02-4A4D-A80D-03B20599D8C7}" srcId="{4655BB5F-4EBC-4207-A5B0-147FC724DAE7}" destId="{18A5A126-9CDF-408F-AED4-1709B1B7856C}" srcOrd="1" destOrd="0" parTransId="{C742BDC9-C7A2-4C81-9DCC-36EC82FCCFE4}" sibTransId="{1B9835CA-355C-422C-A0F3-E76C387F3609}"/>
-    <dgm:cxn modelId="{64DD1C90-3C90-46D1-991C-FD2892A0591D}" type="presOf" srcId="{18A5A126-9CDF-408F-AED4-1709B1B7856C}" destId="{7EFE7DE5-404E-420F-BB2C-8D177D4BD0E5}" srcOrd="0" destOrd="0" presId="urn:microsoft.com/office/officeart/2005/8/layout/vList5"/>
-    <dgm:cxn modelId="{61184497-FB9A-4517-B4E6-9A8B93550CFE}" type="presOf" srcId="{BB977D72-290E-42DF-B6F8-2AD2E69D3762}" destId="{D510B8BF-35DE-4934-9EDD-BB2C766C9B1D}" srcOrd="0" destOrd="1" presId="urn:microsoft.com/office/officeart/2005/8/layout/vList5"/>
-    <dgm:cxn modelId="{47CC6B9E-D179-4E52-A25A-91136DB78A3D}" srcId="{20AC9AF4-A267-4D5E-9755-9C098B10F303}" destId="{DAD6FF4F-6573-44CA-BBA6-AA6673522659}" srcOrd="0" destOrd="0" parTransId="{F6B8AF35-B27F-4B48-8A04-B523895CEE27}" sibTransId="{579B0503-F442-4237-ADA4-B2E641B0E6C9}"/>
-    <dgm:cxn modelId="{CE5AC1A0-72AA-4BAE-A979-AC61D3008BD2}" type="presOf" srcId="{4655BB5F-4EBC-4207-A5B0-147FC724DAE7}" destId="{5603229D-4475-4EBD-8B80-5BF85AF5A926}" srcOrd="0" destOrd="0" presId="urn:microsoft.com/office/officeart/2005/8/layout/vList5"/>
-    <dgm:cxn modelId="{7FDA67A2-CC00-44E7-BEB5-D239152E04EE}" srcId="{18A5A126-9CDF-408F-AED4-1709B1B7856C}" destId="{BB977D72-290E-42DF-B6F8-2AD2E69D3762}" srcOrd="1" destOrd="0" parTransId="{5ED6EE6B-050F-4A62-9A97-9909BF63F3BF}" sibTransId="{C467AD86-0A99-4F7B-BF89-07FBA45FAE9A}"/>
-    <dgm:cxn modelId="{B54D4BA8-2D93-401F-9369-3B9FAF11BF1D}" type="presOf" srcId="{23807C4C-2DCB-4551-8F2D-7F715C6742A2}" destId="{7F9C28E1-28AC-404D-A8EF-ACDB5DFF50D9}" srcOrd="0" destOrd="1" presId="urn:microsoft.com/office/officeart/2005/8/layout/vList5"/>
-    <dgm:cxn modelId="{57D385A9-DE56-43F5-9116-499131FF08E3}" srcId="{D0F8E683-C4DC-481A-8BCD-4B33BA43D927}" destId="{BA2DB30F-C26A-4431-8C29-A5CB73928175}" srcOrd="0" destOrd="0" parTransId="{88C1E58E-43BE-42F9-93DF-A962F3F20EB5}" sibTransId="{31F96A22-B396-492D-AFB1-97F5589DC161}"/>
-    <dgm:cxn modelId="{19A200BB-5E81-4D36-8DFD-4D38E266CB4A}" srcId="{4655BB5F-4EBC-4207-A5B0-147FC724DAE7}" destId="{20AC9AF4-A267-4D5E-9755-9C098B10F303}" srcOrd="3" destOrd="0" parTransId="{D44B6C09-6E5C-497C-B00C-B56B66B0907F}" sibTransId="{B7881554-C08F-43C1-AE2C-D1A37106B272}"/>
-    <dgm:cxn modelId="{33370FC1-1A83-45E0-AB6E-3C41CF6AA528}" type="presOf" srcId="{D0F8E683-C4DC-481A-8BCD-4B33BA43D927}" destId="{2DC11702-8290-49B6-BE15-B41D2A028289}" srcOrd="0" destOrd="0" presId="urn:microsoft.com/office/officeart/2005/8/layout/vList5"/>
-    <dgm:cxn modelId="{AFAC89D5-DCF5-433D-B507-927889F835B2}" type="presOf" srcId="{3C84C93E-F276-4672-8306-0D4EDC48291C}" destId="{9DB291ED-CC19-490E-961E-C63E51B3DEBD}" srcOrd="0" destOrd="0" presId="urn:microsoft.com/office/officeart/2005/8/layout/vList5"/>
-    <dgm:cxn modelId="{5A9C18E7-DDFB-4820-97E3-B9BF1D799526}" srcId="{D0F8E683-C4DC-481A-8BCD-4B33BA43D927}" destId="{E9A1F835-6E14-423F-892C-1E5350F4D404}" srcOrd="1" destOrd="0" parTransId="{1C8F4CC9-03DA-4CA8-B795-E109B6A3FA9D}" sibTransId="{0ADF2407-687D-4AA9-9C1D-67FF1F383CB0}"/>
-    <dgm:cxn modelId="{16BD44F1-3513-4BA7-9D63-32D92206830D}" srcId="{3C84C93E-F276-4672-8306-0D4EDC48291C}" destId="{AD1158AF-1744-4807-9ED0-BAA14AAB0471}" srcOrd="0" destOrd="0" parTransId="{76200662-55F0-4D2B-8F4F-9431C761ACA2}" sibTransId="{A170262A-E59C-4C66-B35F-370FAF94CB57}"/>
     <dgm:cxn modelId="{834169B6-AD5A-4387-AC27-FE79BC074758}" type="presParOf" srcId="{5603229D-4475-4EBD-8B80-5BF85AF5A926}" destId="{A403ADE2-8A92-4517-8307-DFE248D89559}" srcOrd="0" destOrd="0" presId="urn:microsoft.com/office/officeart/2005/8/layout/vList5"/>
     <dgm:cxn modelId="{370D849C-3816-46B9-BFAA-D9B257DF3189}" type="presParOf" srcId="{A403ADE2-8A92-4517-8307-DFE248D89559}" destId="{9DB291ED-CC19-490E-961E-C63E51B3DEBD}" srcOrd="0" destOrd="0" presId="urn:microsoft.com/office/officeart/2005/8/layout/vList5"/>
     <dgm:cxn modelId="{385E3975-42D5-4160-9F04-51093E8257B0}" type="presParOf" srcId="{A403ADE2-8A92-4517-8307-DFE248D89559}" destId="{7F9C28E1-28AC-404D-A8EF-ACDB5DFF50D9}" srcOrd="1" destOrd="0" presId="urn:microsoft.com/office/officeart/2005/8/layout/vList5"/>
@@ -3328,7 +3440,7 @@
             <a:spcAft>
               <a:spcPct val="15000"/>
             </a:spcAft>
-            <a:buChar char="•"/>
+            <a:buChar char="••"/>
           </a:pPr>
           <a:r>
             <a:rPr lang="en-US" sz="2000" kern="1200" dirty="0"/>
@@ -3365,7 +3477,7 @@
             <a:spcAft>
               <a:spcPct val="15000"/>
             </a:spcAft>
-            <a:buChar char="•"/>
+            <a:buChar char="••"/>
           </a:pPr>
           <a:r>
             <a:rPr lang="en-US" sz="2000" kern="1200" dirty="0"/>
@@ -3440,7 +3552,7 @@
         </a:bodyPr>
         <a:lstStyle/>
         <a:p>
-          <a:pPr marL="0" lvl="0" indent="0" algn="ctr" defTabSz="1333500">
+          <a:pPr lvl="0" algn="ctr" defTabSz="1333500">
             <a:lnSpc>
               <a:spcPct val="90000"/>
             </a:lnSpc>
@@ -3450,7 +3562,6 @@
             <a:spcAft>
               <a:spcPct val="35000"/>
             </a:spcAft>
-            <a:buNone/>
           </a:pPr>
           <a:r>
             <a:rPr lang="en-US" sz="3000" kern="1200" dirty="0"/>
@@ -3526,7 +3637,7 @@
             <a:spcAft>
               <a:spcPct val="15000"/>
             </a:spcAft>
-            <a:buChar char="•"/>
+            <a:buChar char="••"/>
           </a:pPr>
           <a:r>
             <a:rPr lang="en-US" sz="2000" kern="1200" dirty="0"/>
@@ -3574,7 +3685,7 @@
             <a:spcAft>
               <a:spcPct val="15000"/>
             </a:spcAft>
-            <a:buChar char="•"/>
+            <a:buChar char="••"/>
           </a:pPr>
           <a:r>
             <a:rPr lang="en-US" sz="2000" kern="1200" dirty="0"/>
@@ -3660,7 +3771,7 @@
         </a:bodyPr>
         <a:lstStyle/>
         <a:p>
-          <a:pPr marL="0" lvl="0" indent="0" algn="ctr" defTabSz="1333500">
+          <a:pPr lvl="0" algn="ctr" defTabSz="1333500">
             <a:lnSpc>
               <a:spcPct val="90000"/>
             </a:lnSpc>
@@ -3670,7 +3781,6 @@
             <a:spcAft>
               <a:spcPct val="35000"/>
             </a:spcAft>
-            <a:buNone/>
           </a:pPr>
           <a:r>
             <a:rPr lang="en-US" sz="3000" kern="1200" dirty="0"/>
@@ -3746,7 +3856,7 @@
             <a:spcAft>
               <a:spcPct val="15000"/>
             </a:spcAft>
-            <a:buChar char="•"/>
+            <a:buChar char="••"/>
           </a:pPr>
           <a:r>
             <a:rPr lang="en-US" sz="2000" kern="1200" dirty="0"/>
@@ -3794,7 +3904,7 @@
             <a:spcAft>
               <a:spcPct val="15000"/>
             </a:spcAft>
-            <a:buChar char="•"/>
+            <a:buChar char="••"/>
           </a:pPr>
           <a:r>
             <a:rPr lang="en-US" sz="2000" kern="1200" dirty="0"/>
@@ -3880,7 +3990,7 @@
         </a:bodyPr>
         <a:lstStyle/>
         <a:p>
-          <a:pPr marL="0" lvl="0" indent="0" algn="ctr" defTabSz="1333500">
+          <a:pPr lvl="0" algn="ctr" defTabSz="1333500">
             <a:lnSpc>
               <a:spcPct val="90000"/>
             </a:lnSpc>
@@ -3890,7 +4000,6 @@
             <a:spcAft>
               <a:spcPct val="35000"/>
             </a:spcAft>
-            <a:buNone/>
           </a:pPr>
           <a:r>
             <a:rPr lang="en-US" sz="3000" kern="1200" dirty="0"/>
@@ -3978,7 +4087,7 @@
             <a:spcAft>
               <a:spcPct val="15000"/>
             </a:spcAft>
-            <a:buChar char="•"/>
+            <a:buChar char="••"/>
           </a:pPr>
           <a:r>
             <a:rPr lang="en-US" sz="2000" kern="1200" dirty="0"/>
@@ -4029,7 +4138,7 @@
             <a:spcAft>
               <a:spcPct val="15000"/>
             </a:spcAft>
-            <a:buChar char="•"/>
+            <a:buChar char="••"/>
           </a:pPr>
           <a:r>
             <a:rPr lang="en-US" sz="2000" kern="1200" dirty="0"/>
@@ -4118,7 +4227,7 @@
         </a:bodyPr>
         <a:lstStyle/>
         <a:p>
-          <a:pPr marL="0" lvl="0" indent="0" algn="ctr" defTabSz="1333500">
+          <a:pPr lvl="0" algn="ctr" defTabSz="1333500">
             <a:lnSpc>
               <a:spcPct val="90000"/>
             </a:lnSpc>
@@ -4128,7 +4237,6 @@
             <a:spcAft>
               <a:spcPct val="35000"/>
             </a:spcAft>
-            <a:buNone/>
           </a:pPr>
           <a:r>
             <a:rPr lang="en-US" sz="3000" kern="1200" dirty="0"/>
@@ -4204,7 +4312,7 @@
             <a:spcAft>
               <a:spcPct val="15000"/>
             </a:spcAft>
-            <a:buChar char="•"/>
+            <a:buChar char="••"/>
           </a:pPr>
           <a:r>
             <a:rPr lang="en-US" sz="2000" kern="1200" dirty="0"/>
@@ -4249,7 +4357,7 @@
             <a:spcAft>
               <a:spcPct val="15000"/>
             </a:spcAft>
-            <a:buChar char="•"/>
+            <a:buChar char="••"/>
           </a:pPr>
           <a:r>
             <a:rPr lang="en-US" sz="2000" kern="1200" dirty="0"/>
@@ -4332,7 +4440,7 @@
         </a:bodyPr>
         <a:lstStyle/>
         <a:p>
-          <a:pPr marL="0" lvl="0" indent="0" algn="ctr" defTabSz="1333500">
+          <a:pPr lvl="0" algn="ctr" defTabSz="1333500">
             <a:lnSpc>
               <a:spcPct val="90000"/>
             </a:lnSpc>
@@ -4342,7 +4450,6 @@
             <a:spcAft>
               <a:spcPct val="35000"/>
             </a:spcAft>
-            <a:buNone/>
           </a:pPr>
           <a:r>
             <a:rPr lang="en-US" sz="3000" kern="1200" dirty="0"/>
@@ -4418,7 +4525,7 @@
             <a:spcAft>
               <a:spcPct val="15000"/>
             </a:spcAft>
-            <a:buChar char="•"/>
+            <a:buChar char="••"/>
           </a:pPr>
           <a:r>
             <a:rPr lang="en-US" sz="2000" kern="1200" dirty="0"/>
@@ -4457,7 +4564,7 @@
             <a:spcAft>
               <a:spcPct val="15000"/>
             </a:spcAft>
-            <a:buChar char="•"/>
+            <a:buChar char="••"/>
           </a:pPr>
           <a:r>
             <a:rPr lang="en-US" sz="2000" kern="1200" dirty="0"/>
@@ -4534,7 +4641,7 @@
         </a:bodyPr>
         <a:lstStyle/>
         <a:p>
-          <a:pPr marL="0" lvl="0" indent="0" algn="ctr" defTabSz="1333500">
+          <a:pPr lvl="0" algn="ctr" defTabSz="1333500">
             <a:lnSpc>
               <a:spcPct val="90000"/>
             </a:lnSpc>
@@ -4544,7 +4651,6 @@
             <a:spcAft>
               <a:spcPct val="35000"/>
             </a:spcAft>
-            <a:buNone/>
           </a:pPr>
           <a:r>
             <a:rPr lang="en-US" sz="3000" kern="1200" dirty="0"/>
@@ -4620,7 +4726,7 @@
             <a:spcAft>
               <a:spcPct val="15000"/>
             </a:spcAft>
-            <a:buChar char="•"/>
+            <a:buChar char="••"/>
           </a:pPr>
           <a:r>
             <a:rPr lang="en-US" sz="2000" kern="1200" dirty="0"/>
@@ -4686,7 +4792,7 @@
             <a:spcAft>
               <a:spcPct val="15000"/>
             </a:spcAft>
-            <a:buChar char="•"/>
+            <a:buChar char="••"/>
           </a:pPr>
           <a:r>
             <a:rPr lang="en-US" sz="2000" kern="1200" dirty="0"/>
@@ -4790,7 +4896,7 @@
         </a:bodyPr>
         <a:lstStyle/>
         <a:p>
-          <a:pPr marL="0" lvl="0" indent="0" algn="ctr" defTabSz="1333500">
+          <a:pPr lvl="0" algn="ctr" defTabSz="1333500">
             <a:lnSpc>
               <a:spcPct val="90000"/>
             </a:lnSpc>
@@ -4800,7 +4906,6 @@
             <a:spcAft>
               <a:spcPct val="35000"/>
             </a:spcAft>
-            <a:buNone/>
           </a:pPr>
           <a:r>
             <a:rPr lang="en-US" sz="3000" kern="1200" dirty="0"/>
@@ -7482,7 +7587,7 @@
           <a:p>
             <a:fld id="{A571AFFD-B6CA-41D9-95E6-3CB99A4967AC}" type="datetimeFigureOut">
               <a:rPr lang="en-US" smtClean="0"/>
-              <a:t>4/22/2017</a:t>
+              <a:t>4/24/2017</a:t>
             </a:fld>
             <a:endParaRPr lang="en-US"/>
           </a:p>
@@ -7652,7 +7757,7 @@
           <a:p>
             <a:fld id="{A571AFFD-B6CA-41D9-95E6-3CB99A4967AC}" type="datetimeFigureOut">
               <a:rPr lang="en-US" smtClean="0"/>
-              <a:t>4/22/2017</a:t>
+              <a:t>4/24/2017</a:t>
             </a:fld>
             <a:endParaRPr lang="en-US"/>
           </a:p>
@@ -7832,7 +7937,7 @@
           <a:p>
             <a:fld id="{A571AFFD-B6CA-41D9-95E6-3CB99A4967AC}" type="datetimeFigureOut">
               <a:rPr lang="en-US" smtClean="0"/>
-              <a:t>4/22/2017</a:t>
+              <a:t>4/24/2017</a:t>
             </a:fld>
             <a:endParaRPr lang="en-US"/>
           </a:p>
@@ -8002,7 +8107,7 @@
           <a:p>
             <a:fld id="{A571AFFD-B6CA-41D9-95E6-3CB99A4967AC}" type="datetimeFigureOut">
               <a:rPr lang="en-US" smtClean="0"/>
-              <a:t>4/22/2017</a:t>
+              <a:t>4/24/2017</a:t>
             </a:fld>
             <a:endParaRPr lang="en-US"/>
           </a:p>
@@ -8246,7 +8351,7 @@
           <a:p>
             <a:fld id="{A571AFFD-B6CA-41D9-95E6-3CB99A4967AC}" type="datetimeFigureOut">
               <a:rPr lang="en-US" smtClean="0"/>
-              <a:t>4/22/2017</a:t>
+              <a:t>4/24/2017</a:t>
             </a:fld>
             <a:endParaRPr lang="en-US"/>
           </a:p>
@@ -8478,7 +8583,7 @@
           <a:p>
             <a:fld id="{A571AFFD-B6CA-41D9-95E6-3CB99A4967AC}" type="datetimeFigureOut">
               <a:rPr lang="en-US" smtClean="0"/>
-              <a:t>4/22/2017</a:t>
+              <a:t>4/24/2017</a:t>
             </a:fld>
             <a:endParaRPr lang="en-US"/>
           </a:p>
@@ -8845,7 +8950,7 @@
           <a:p>
             <a:fld id="{A571AFFD-B6CA-41D9-95E6-3CB99A4967AC}" type="datetimeFigureOut">
               <a:rPr lang="en-US" smtClean="0"/>
-              <a:t>4/22/2017</a:t>
+              <a:t>4/24/2017</a:t>
             </a:fld>
             <a:endParaRPr lang="en-US"/>
           </a:p>
@@ -8963,7 +9068,7 @@
           <a:p>
             <a:fld id="{A571AFFD-B6CA-41D9-95E6-3CB99A4967AC}" type="datetimeFigureOut">
               <a:rPr lang="en-US" smtClean="0"/>
-              <a:t>4/22/2017</a:t>
+              <a:t>4/24/2017</a:t>
             </a:fld>
             <a:endParaRPr lang="en-US"/>
           </a:p>
@@ -9058,7 +9163,7 @@
           <a:p>
             <a:fld id="{A571AFFD-B6CA-41D9-95E6-3CB99A4967AC}" type="datetimeFigureOut">
               <a:rPr lang="en-US" smtClean="0"/>
-              <a:t>4/22/2017</a:t>
+              <a:t>4/24/2017</a:t>
             </a:fld>
             <a:endParaRPr lang="en-US"/>
           </a:p>
@@ -9335,7 +9440,7 @@
           <a:p>
             <a:fld id="{A571AFFD-B6CA-41D9-95E6-3CB99A4967AC}" type="datetimeFigureOut">
               <a:rPr lang="en-US" smtClean="0"/>
-              <a:t>4/22/2017</a:t>
+              <a:t>4/24/2017</a:t>
             </a:fld>
             <a:endParaRPr lang="en-US"/>
           </a:p>
@@ -9592,7 +9697,7 @@
           <a:p>
             <a:fld id="{A571AFFD-B6CA-41D9-95E6-3CB99A4967AC}" type="datetimeFigureOut">
               <a:rPr lang="en-US" smtClean="0"/>
-              <a:t>4/22/2017</a:t>
+              <a:t>4/24/2017</a:t>
             </a:fld>
             <a:endParaRPr lang="en-US"/>
           </a:p>
@@ -9805,7 +9910,7 @@
           <a:p>
             <a:fld id="{A571AFFD-B6CA-41D9-95E6-3CB99A4967AC}" type="datetimeFigureOut">
               <a:rPr lang="en-US" smtClean="0"/>
-              <a:t>4/22/2017</a:t>
+              <a:t>4/24/2017</a:t>
             </a:fld>
             <a:endParaRPr lang="en-US"/>
           </a:p>
@@ -11748,7 +11853,7 @@
         <p:spPr>
           <a:xfrm>
             <a:off x="25918102" y="19859529"/>
-            <a:ext cx="9368524" cy="6186309"/>
+            <a:ext cx="9368524" cy="2862322"/>
           </a:xfrm>
           <a:prstGeom prst="rect">
             <a:avLst/>
@@ -11764,71 +11869,6 @@
             <a:r>
               <a:rPr lang="en-US" sz="3600" dirty="0"/>
               <a:t>Automated Black Box tests using Visual Studio’s built in testing suite and Roslyn.</a:t>
-            </a:r>
-          </a:p>
-          <a:p>
-            <a:endParaRPr lang="en-US" sz="3600" dirty="0"/>
-          </a:p>
-          <a:p>
-            <a:r>
-              <a:rPr lang="en-US" sz="3600" dirty="0"/>
-              <a:t>The black box tests do the following</a:t>
-            </a:r>
-          </a:p>
-          <a:p>
-            <a:pPr marL="742950" indent="-742950">
-              <a:buFont typeface="Arial" panose="020B0604020202020204" pitchFamily="34" charset="0"/>
-              <a:buChar char="•"/>
-            </a:pPr>
-            <a:r>
-              <a:rPr lang="en-US" sz="3600" dirty="0"/>
-              <a:t>Run the </a:t>
-            </a:r>
-            <a:r>
-              <a:rPr lang="en-US" sz="3600" dirty="0" err="1"/>
-              <a:t>CreateMappings</a:t>
-            </a:r>
-            <a:r>
-              <a:rPr lang="en-US" sz="3600" dirty="0"/>
-              <a:t> program</a:t>
-            </a:r>
-          </a:p>
-          <a:p>
-            <a:pPr marL="742950" indent="-742950">
-              <a:buFont typeface="Arial" panose="020B0604020202020204" pitchFamily="34" charset="0"/>
-              <a:buChar char="•"/>
-            </a:pPr>
-            <a:r>
-              <a:rPr lang="en-US" sz="3600" dirty="0"/>
-              <a:t>Run the </a:t>
-            </a:r>
-            <a:r>
-              <a:rPr lang="en-US" sz="3600" dirty="0" err="1"/>
-              <a:t>TransformClient</a:t>
-            </a:r>
-            <a:r>
-              <a:rPr lang="en-US" sz="3600" dirty="0"/>
-              <a:t> program</a:t>
-            </a:r>
-          </a:p>
-          <a:p>
-            <a:pPr marL="742950" indent="-742950">
-              <a:buFont typeface="Arial" panose="020B0604020202020204" pitchFamily="34" charset="0"/>
-              <a:buChar char="•"/>
-            </a:pPr>
-            <a:r>
-              <a:rPr lang="en-US" sz="3600" dirty="0"/>
-              <a:t>Use Roslyn to make sure the project compiles </a:t>
-            </a:r>
-          </a:p>
-          <a:p>
-            <a:pPr marL="742950" indent="-742950">
-              <a:buFont typeface="Arial" panose="020B0604020202020204" pitchFamily="34" charset="0"/>
-              <a:buChar char="•"/>
-            </a:pPr>
-            <a:r>
-              <a:rPr lang="en-US" sz="3600" dirty="0"/>
-              <a:t>Run the compiled project and verify output</a:t>
             </a:r>
           </a:p>
           <a:p>
@@ -11889,6 +11929,75 @@
           <a:xfrm>
             <a:off x="16348944" y="21588845"/>
             <a:ext cx="9145301" cy="5585980"/>
+          </a:xfrm>
+          <a:prstGeom prst="rect">
+            <a:avLst/>
+          </a:prstGeom>
+        </p:spPr>
+      </p:pic>
+      <p:pic>
+        <p:nvPicPr>
+          <p:cNvPr id="8" name="Picture 7"/>
+          <p:cNvPicPr>
+            <a:picLocks noChangeAspect="1"/>
+          </p:cNvPicPr>
+          <p:nvPr/>
+        </p:nvPicPr>
+        <p:blipFill rotWithShape="1">
+          <a:blip r:embed="rId17"/>
+          <a:srcRect l="92" t="2952" r="4478" b="52244"/>
+          <a:stretch/>
+        </p:blipFill>
+        <p:spPr>
+          <a:xfrm>
+            <a:off x="25609663" y="22685393"/>
+            <a:ext cx="3581400" cy="4438254"/>
+          </a:xfrm>
+          <a:prstGeom prst="rect">
+            <a:avLst/>
+          </a:prstGeom>
+        </p:spPr>
+      </p:pic>
+      <p:pic>
+        <p:nvPicPr>
+          <p:cNvPr id="14" name="Picture 13"/>
+          <p:cNvPicPr>
+            <a:picLocks noChangeAspect="1"/>
+          </p:cNvPicPr>
+          <p:nvPr/>
+        </p:nvPicPr>
+        <p:blipFill rotWithShape="1">
+          <a:blip r:embed="rId18"/>
+          <a:srcRect l="51" t="2969" r="4437" b="69307"/>
+          <a:stretch/>
+        </p:blipFill>
+        <p:spPr>
+          <a:xfrm>
+            <a:off x="29315849" y="22685393"/>
+            <a:ext cx="3584448" cy="2746357"/>
+          </a:xfrm>
+          <a:prstGeom prst="rect">
+            <a:avLst/>
+          </a:prstGeom>
+        </p:spPr>
+      </p:pic>
+      <p:pic>
+        <p:nvPicPr>
+          <p:cNvPr id="18" name="Picture 17"/>
+          <p:cNvPicPr>
+            <a:picLocks noChangeAspect="1"/>
+          </p:cNvPicPr>
+          <p:nvPr/>
+        </p:nvPicPr>
+        <p:blipFill rotWithShape="1">
+          <a:blip r:embed="rId19"/>
+          <a:srcRect t="2970" r="15787" b="64544"/>
+          <a:stretch/>
+        </p:blipFill>
+        <p:spPr>
+          <a:xfrm>
+            <a:off x="33025083" y="22689808"/>
+            <a:ext cx="3160392" cy="3218192"/>
           </a:xfrm>
           <a:prstGeom prst="rect">
             <a:avLst/>

</xml_diff>

<commit_message>
fix heil poster comments
</commit_message>
<xml_diff>
--- a/documentation/poster.pptx
+++ b/documentation/poster.pptx
@@ -128,9 +128,18 @@
   <p:cmAuthor id="1" name="Alexander Card" initials="AC" lastIdx="3" clrIdx="0">
     <p:extLst/>
   </p:cmAuthor>
-  <p:cmAuthor id="2" name="margaret" initials="m" lastIdx="6" clrIdx="1"/>
+  <p:cmAuthor id="2" name="margaret" initials="m" lastIdx="9" clrIdx="1"/>
   <p:cmAuthor id="3" name="David" initials="" lastIdx="13" clrIdx="2"/>
 </p:cmAuthorLst>
+</file>
+
+<file path=ppt/comments/comment1.xml><?xml version="1.0" encoding="utf-8"?>
+<p:cmLst xmlns:a="http://schemas.openxmlformats.org/drawingml/2006/main" xmlns:r="http://schemas.openxmlformats.org/officeDocument/2006/relationships" xmlns:p="http://schemas.openxmlformats.org/presentationml/2006/main">
+  <p:cm authorId="2" dt="2017-04-25T16:32:35.627" idx="8">
+    <p:pos x="6498" y="3879"/>
+    <p:text>This section is so wordy...can you create short phrases instead and convey the info you need to?</p:text>
+  </p:cm>
+</p:cmLst>
 </file>
 
 <file path=ppt/diagrams/colors1.xml><?xml version="1.0" encoding="utf-8"?>
@@ -1656,7 +1665,7 @@
         <a:lstStyle/>
         <a:p>
           <a:r>
-            <a:rPr lang="en-US" sz="3000" dirty="0"/>
+            <a:rPr lang="en-US" sz="2000" dirty="0"/>
             <a:t>Using Statements</a:t>
           </a:r>
         </a:p>
@@ -1823,7 +1832,7 @@
         <a:lstStyle/>
         <a:p>
           <a:r>
-            <a:rPr lang="en-US" sz="3000" dirty="0"/>
+            <a:rPr lang="en-US" sz="2000" dirty="0"/>
             <a:t>Member Declarations</a:t>
           </a:r>
         </a:p>
@@ -2012,7 +2021,7 @@
         <a:lstStyle/>
         <a:p>
           <a:r>
-            <a:rPr lang="en-US" sz="3000" dirty="0"/>
+            <a:rPr lang="en-US" sz="2000" dirty="0"/>
             <a:t>Fully Qualified Names</a:t>
           </a:r>
         </a:p>
@@ -2065,7 +2074,7 @@
               </a:highlight>
               <a:latin typeface="Consolas" panose="020B0609020204030204" pitchFamily="49" charset="0"/>
             </a:rPr>
-            <a:t>oldNamespace.OldClass</a:t>
+            <a:t>old.OldClass</a:t>
           </a:r>
           <a:r>
             <a:rPr lang="en-US" sz="2000" b="0" i="0" dirty="0">
@@ -2080,7 +2089,7 @@
               </a:highlight>
               <a:latin typeface="Consolas" panose="020B0609020204030204" pitchFamily="49" charset="0"/>
             </a:rPr>
-            <a:t>oldNamespace.OldClass</a:t>
+            <a:t>old.OldClass</a:t>
           </a:r>
           <a:r>
             <a:rPr lang="en-US" sz="2000" b="0" i="0" dirty="0">
@@ -2138,7 +2147,7 @@
               </a:highlight>
               <a:latin typeface="Consolas" panose="020B0609020204030204" pitchFamily="49" charset="0"/>
             </a:rPr>
-            <a:t>newNamespace.NewClass</a:t>
+            <a:t>new.NewClass</a:t>
           </a:r>
           <a:r>
             <a:rPr lang="en-US" sz="2000" b="0" i="0" dirty="0">
@@ -2153,7 +2162,7 @@
               </a:highlight>
               <a:latin typeface="Consolas" panose="020B0609020204030204" pitchFamily="49" charset="0"/>
             </a:rPr>
-            <a:t>newNamespace.NewClass</a:t>
+            <a:t>new.NewClass</a:t>
           </a:r>
           <a:r>
             <a:rPr lang="en-US" sz="2000" b="0" i="0" dirty="0">
@@ -2195,48 +2204,27 @@
         </dgm:presLayoutVars>
       </dgm:prSet>
       <dgm:spPr/>
-      <dgm:t>
-        <a:bodyPr/>
-        <a:lstStyle/>
-        <a:p>
-          <a:endParaRPr lang="en-US"/>
-        </a:p>
-      </dgm:t>
     </dgm:pt>
     <dgm:pt modelId="{C86DE2E3-3485-4D88-991A-33C9416C5246}" type="pres">
       <dgm:prSet presAssocID="{CE704066-F6EC-4A34-BE57-F031F6F97A0E}" presName="linNode" presStyleCnt="0"/>
       <dgm:spPr/>
     </dgm:pt>
     <dgm:pt modelId="{89A3A35E-A31F-4A19-88A6-C711D22D028E}" type="pres">
-      <dgm:prSet presAssocID="{CE704066-F6EC-4A34-BE57-F031F6F97A0E}" presName="parentText" presStyleLbl="node1" presStyleIdx="0" presStyleCnt="3" custScaleX="60689">
+      <dgm:prSet presAssocID="{CE704066-F6EC-4A34-BE57-F031F6F97A0E}" presName="parentText" presStyleLbl="node1" presStyleIdx="0" presStyleCnt="3" custScaleX="38527" custLinFactNeighborX="-25775">
         <dgm:presLayoutVars>
           <dgm:chMax val="1"/>
           <dgm:bulletEnabled val="1"/>
         </dgm:presLayoutVars>
       </dgm:prSet>
       <dgm:spPr/>
-      <dgm:t>
-        <a:bodyPr/>
-        <a:lstStyle/>
-        <a:p>
-          <a:endParaRPr lang="en-US"/>
-        </a:p>
-      </dgm:t>
     </dgm:pt>
     <dgm:pt modelId="{3DC572B2-C7F7-45EE-8266-8D3A0F1AF860}" type="pres">
-      <dgm:prSet presAssocID="{CE704066-F6EC-4A34-BE57-F031F6F97A0E}" presName="descendantText" presStyleLbl="alignAccFollowNode1" presStyleIdx="0" presStyleCnt="3" custScaleX="107426">
+      <dgm:prSet presAssocID="{CE704066-F6EC-4A34-BE57-F031F6F97A0E}" presName="descendantText" presStyleLbl="alignAccFollowNode1" presStyleIdx="0" presStyleCnt="3" custScaleX="83046" custScaleY="97043" custLinFactNeighborX="-49228" custLinFactNeighborY="-1639">
         <dgm:presLayoutVars>
           <dgm:bulletEnabled val="1"/>
         </dgm:presLayoutVars>
       </dgm:prSet>
       <dgm:spPr/>
-      <dgm:t>
-        <a:bodyPr/>
-        <a:lstStyle/>
-        <a:p>
-          <a:endParaRPr lang="en-US"/>
-        </a:p>
-      </dgm:t>
     </dgm:pt>
     <dgm:pt modelId="{356BFF2B-59F5-4B2D-A37F-4D545FC129A8}" type="pres">
       <dgm:prSet presAssocID="{2190222A-E708-44B6-912C-16ACA9D69599}" presName="sp" presStyleCnt="0"/>
@@ -2247,35 +2235,21 @@
       <dgm:spPr/>
     </dgm:pt>
     <dgm:pt modelId="{A5D97866-9099-44CF-8392-E4D04C75D305}" type="pres">
-      <dgm:prSet presAssocID="{5D518925-A42D-44F7-8A34-D7EE8C8BA4F6}" presName="parentText" presStyleLbl="node1" presStyleIdx="1" presStyleCnt="3" custScaleX="60219" custLinFactNeighborX="0">
+      <dgm:prSet presAssocID="{5D518925-A42D-44F7-8A34-D7EE8C8BA4F6}" presName="parentText" presStyleLbl="node1" presStyleIdx="1" presStyleCnt="3" custScaleX="38527" custLinFactNeighborX="-25775">
         <dgm:presLayoutVars>
           <dgm:chMax val="1"/>
           <dgm:bulletEnabled val="1"/>
         </dgm:presLayoutVars>
       </dgm:prSet>
       <dgm:spPr/>
-      <dgm:t>
-        <a:bodyPr/>
-        <a:lstStyle/>
-        <a:p>
-          <a:endParaRPr lang="en-US"/>
-        </a:p>
-      </dgm:t>
     </dgm:pt>
     <dgm:pt modelId="{6DA4FE5C-CB21-47E7-B0F0-9CB097B5E464}" type="pres">
-      <dgm:prSet presAssocID="{5D518925-A42D-44F7-8A34-D7EE8C8BA4F6}" presName="descendantText" presStyleLbl="alignAccFollowNode1" presStyleIdx="1" presStyleCnt="3" custScaleX="107426">
+      <dgm:prSet presAssocID="{5D518925-A42D-44F7-8A34-D7EE8C8BA4F6}" presName="descendantText" presStyleLbl="alignAccFollowNode1" presStyleIdx="1" presStyleCnt="3" custScaleX="83513" custScaleY="98778" custLinFactNeighborX="-49429" custLinFactNeighborY="5248">
         <dgm:presLayoutVars>
           <dgm:bulletEnabled val="1"/>
         </dgm:presLayoutVars>
       </dgm:prSet>
       <dgm:spPr/>
-      <dgm:t>
-        <a:bodyPr/>
-        <a:lstStyle/>
-        <a:p>
-          <a:endParaRPr lang="en-US"/>
-        </a:p>
-      </dgm:t>
     </dgm:pt>
     <dgm:pt modelId="{89AEE0E6-A6EE-4F95-9EFD-E7951DB92FAA}" type="pres">
       <dgm:prSet presAssocID="{8E9682BF-077B-49CE-83FC-92F75221525A}" presName="sp" presStyleCnt="0"/>
@@ -2286,57 +2260,43 @@
       <dgm:spPr/>
     </dgm:pt>
     <dgm:pt modelId="{A578B4B1-012F-4704-840D-D9A1F6815359}" type="pres">
-      <dgm:prSet presAssocID="{93B62B81-D7F7-431E-9439-2E3D4CD2353E}" presName="parentText" presStyleLbl="node1" presStyleIdx="2" presStyleCnt="3" custScaleX="60219">
+      <dgm:prSet presAssocID="{93B62B81-D7F7-431E-9439-2E3D4CD2353E}" presName="parentText" presStyleLbl="node1" presStyleIdx="2" presStyleCnt="3" custScaleX="38527" custLinFactNeighborX="-25775">
         <dgm:presLayoutVars>
           <dgm:chMax val="1"/>
           <dgm:bulletEnabled val="1"/>
         </dgm:presLayoutVars>
       </dgm:prSet>
       <dgm:spPr/>
-      <dgm:t>
-        <a:bodyPr/>
-        <a:lstStyle/>
-        <a:p>
-          <a:endParaRPr lang="en-US"/>
-        </a:p>
-      </dgm:t>
     </dgm:pt>
     <dgm:pt modelId="{94FD681E-6FED-4D1A-91A3-94D9AE5BBDC1}" type="pres">
-      <dgm:prSet presAssocID="{93B62B81-D7F7-431E-9439-2E3D4CD2353E}" presName="descendantText" presStyleLbl="alignAccFollowNode1" presStyleIdx="2" presStyleCnt="3" custScaleX="107426">
+      <dgm:prSet presAssocID="{93B62B81-D7F7-431E-9439-2E3D4CD2353E}" presName="descendantText" presStyleLbl="alignAccFollowNode1" presStyleIdx="2" presStyleCnt="3" custScaleX="83693" custScaleY="87287" custLinFactNeighborX="-48773" custLinFactNeighborY="1350">
         <dgm:presLayoutVars>
           <dgm:bulletEnabled val="1"/>
         </dgm:presLayoutVars>
       </dgm:prSet>
       <dgm:spPr/>
-      <dgm:t>
-        <a:bodyPr/>
-        <a:lstStyle/>
-        <a:p>
-          <a:endParaRPr lang="en-US"/>
-        </a:p>
-      </dgm:t>
     </dgm:pt>
   </dgm:ptLst>
   <dgm:cxnLst>
-    <dgm:cxn modelId="{46BEEEEA-8181-4496-8F3E-4B42C7BEC8A4}" srcId="{BE1D1458-5D71-486A-9C06-F8C2979301CE}" destId="{93B62B81-D7F7-431E-9439-2E3D4CD2353E}" srcOrd="2" destOrd="0" parTransId="{CF446EAA-D8CD-45A9-B112-FE71C0FABC3A}" sibTransId="{99D4F5D3-8426-4A0A-9AFF-9CC195309684}"/>
+    <dgm:cxn modelId="{670CE803-5732-44F7-8BFC-139BBB9EFD9D}" srcId="{5D518925-A42D-44F7-8A34-D7EE8C8BA4F6}" destId="{5F3C6D8C-49F5-414A-9B7D-37B3F73CBB71}" srcOrd="1" destOrd="0" parTransId="{21512CD3-C611-4379-A522-10F5A3696ED3}" sibTransId="{CE942B8A-FC02-4475-BE3F-E505BC877B1D}"/>
+    <dgm:cxn modelId="{B7847806-6502-4A85-AA95-FB3B3F9F8E85}" srcId="{93B62B81-D7F7-431E-9439-2E3D4CD2353E}" destId="{491443E3-89AE-4FE4-92A7-C951F26ADF15}" srcOrd="0" destOrd="0" parTransId="{21A27C6B-BD4F-4728-8495-2749C96FF1CC}" sibTransId="{892CAB94-5167-438E-8541-2DCB69385D70}"/>
+    <dgm:cxn modelId="{196DD02D-672C-4265-9958-28C33653829B}" type="presOf" srcId="{96D2705E-7225-4E32-BBCA-73AADEC51771}" destId="{3DC572B2-C7F7-45EE-8266-8D3A0F1AF860}" srcOrd="0" destOrd="0" presId="urn:microsoft.com/office/officeart/2005/8/layout/vList5"/>
+    <dgm:cxn modelId="{B5EA5F30-9689-4546-8120-3309418A9BF6}" type="presOf" srcId="{BE1D1458-5D71-486A-9C06-F8C2979301CE}" destId="{E4832E59-FCA4-4EC2-82F5-B4BFAF552C72}" srcOrd="0" destOrd="0" presId="urn:microsoft.com/office/officeart/2005/8/layout/vList5"/>
     <dgm:cxn modelId="{4C11CF35-6553-44AE-BF05-CC97F67390E3}" type="presOf" srcId="{E4B44728-031A-45B4-A960-6D7C98163EB4}" destId="{3DC572B2-C7F7-45EE-8266-8D3A0F1AF860}" srcOrd="0" destOrd="1" presId="urn:microsoft.com/office/officeart/2005/8/layout/vList5"/>
-    <dgm:cxn modelId="{294848E5-A50B-4122-8FC4-07D10048A02B}" type="presOf" srcId="{491443E3-89AE-4FE4-92A7-C951F26ADF15}" destId="{94FD681E-6FED-4D1A-91A3-94D9AE5BBDC1}" srcOrd="0" destOrd="0" presId="urn:microsoft.com/office/officeart/2005/8/layout/vList5"/>
-    <dgm:cxn modelId="{B3A6FD9F-23A2-4187-BE54-08ED4A00065C}" type="presOf" srcId="{93B62B81-D7F7-431E-9439-2E3D4CD2353E}" destId="{A578B4B1-012F-4704-840D-D9A1F6815359}" srcOrd="0" destOrd="0" presId="urn:microsoft.com/office/officeart/2005/8/layout/vList5"/>
-    <dgm:cxn modelId="{FB5D5687-CBA9-4DC5-BA0C-6E946062A079}" type="presOf" srcId="{72B0AA1E-CB07-4D66-8C5F-5084D4F61D84}" destId="{94FD681E-6FED-4D1A-91A3-94D9AE5BBDC1}" srcOrd="0" destOrd="1" presId="urn:microsoft.com/office/officeart/2005/8/layout/vList5"/>
     <dgm:cxn modelId="{CB5E2C5D-CEAC-421F-B401-2DA7AD423DE3}" srcId="{BE1D1458-5D71-486A-9C06-F8C2979301CE}" destId="{5D518925-A42D-44F7-8A34-D7EE8C8BA4F6}" srcOrd="1" destOrd="0" parTransId="{3F7C9D5E-9B3B-436C-98DD-9AB7ED4F3098}" sibTransId="{8E9682BF-077B-49CE-83FC-92F75221525A}"/>
     <dgm:cxn modelId="{D3E26C67-6F84-4E24-8129-8C98E7E91547}" srcId="{BE1D1458-5D71-486A-9C06-F8C2979301CE}" destId="{CE704066-F6EC-4A34-BE57-F031F6F97A0E}" srcOrd="0" destOrd="0" parTransId="{39B9789B-9256-4F63-B415-E8CB368FCE65}" sibTransId="{2190222A-E708-44B6-912C-16ACA9D69599}"/>
-    <dgm:cxn modelId="{2D5599CD-EE5D-40F9-A0FD-CC1E62ECA14E}" srcId="{CE704066-F6EC-4A34-BE57-F031F6F97A0E}" destId="{E4B44728-031A-45B4-A960-6D7C98163EB4}" srcOrd="1" destOrd="0" parTransId="{A6A79D2A-79DB-436D-AB27-E222CDBC7436}" sibTransId="{F9EF34C1-D145-4D03-BEF0-2842C4F14E8F}"/>
-    <dgm:cxn modelId="{31ED0CFA-3F9C-4EC0-89AC-690C51CC9BA5}" type="presOf" srcId="{5D518925-A42D-44F7-8A34-D7EE8C8BA4F6}" destId="{A5D97866-9099-44CF-8392-E4D04C75D305}" srcOrd="0" destOrd="0" presId="urn:microsoft.com/office/officeart/2005/8/layout/vList5"/>
-    <dgm:cxn modelId="{670CE803-5732-44F7-8BFC-139BBB9EFD9D}" srcId="{5D518925-A42D-44F7-8A34-D7EE8C8BA4F6}" destId="{5F3C6D8C-49F5-414A-9B7D-37B3F73CBB71}" srcOrd="1" destOrd="0" parTransId="{21512CD3-C611-4379-A522-10F5A3696ED3}" sibTransId="{CE942B8A-FC02-4475-BE3F-E505BC877B1D}"/>
-    <dgm:cxn modelId="{BE7532DD-61C4-419A-9602-441A2CB79061}" srcId="{5D518925-A42D-44F7-8A34-D7EE8C8BA4F6}" destId="{FD7D5C93-D69E-40C6-971E-DE23F823AC96}" srcOrd="0" destOrd="0" parTransId="{A885DEA9-B00A-4431-98A9-DE220F925B82}" sibTransId="{F77961E8-CCF0-4884-B78F-402299556199}"/>
     <dgm:cxn modelId="{5D9C2078-89FC-4FB2-BBDB-58805684377A}" srcId="{93B62B81-D7F7-431E-9439-2E3D4CD2353E}" destId="{72B0AA1E-CB07-4D66-8C5F-5084D4F61D84}" srcOrd="1" destOrd="0" parTransId="{C7FF9C0A-64CD-4E9C-AF44-B8A14C148043}" sibTransId="{432643FE-DCC3-4D28-9715-CB09FF1D1DC6}"/>
     <dgm:cxn modelId="{263AB879-3159-43DD-A7DA-56351BC654F5}" srcId="{CE704066-F6EC-4A34-BE57-F031F6F97A0E}" destId="{96D2705E-7225-4E32-BBCA-73AADEC51771}" srcOrd="0" destOrd="0" parTransId="{B6FE3FB8-829C-4505-ADEF-C25B4D0E3D19}" sibTransId="{7D84155D-6B55-476E-8E57-41C47780CABE}"/>
     <dgm:cxn modelId="{33DDB27E-1AF9-41BA-B515-48F3163A6E91}" type="presOf" srcId="{5F3C6D8C-49F5-414A-9B7D-37B3F73CBB71}" destId="{6DA4FE5C-CB21-47E7-B0F0-9CB097B5E464}" srcOrd="0" destOrd="1" presId="urn:microsoft.com/office/officeart/2005/8/layout/vList5"/>
+    <dgm:cxn modelId="{FB5D5687-CBA9-4DC5-BA0C-6E946062A079}" type="presOf" srcId="{72B0AA1E-CB07-4D66-8C5F-5084D4F61D84}" destId="{94FD681E-6FED-4D1A-91A3-94D9AE5BBDC1}" srcOrd="0" destOrd="1" presId="urn:microsoft.com/office/officeart/2005/8/layout/vList5"/>
+    <dgm:cxn modelId="{B3A6FD9F-23A2-4187-BE54-08ED4A00065C}" type="presOf" srcId="{93B62B81-D7F7-431E-9439-2E3D4CD2353E}" destId="{A578B4B1-012F-4704-840D-D9A1F6815359}" srcOrd="0" destOrd="0" presId="urn:microsoft.com/office/officeart/2005/8/layout/vList5"/>
+    <dgm:cxn modelId="{2C8F8EBD-D261-4528-82AD-750347F41495}" type="presOf" srcId="{FD7D5C93-D69E-40C6-971E-DE23F823AC96}" destId="{6DA4FE5C-CB21-47E7-B0F0-9CB097B5E464}" srcOrd="0" destOrd="0" presId="urn:microsoft.com/office/officeart/2005/8/layout/vList5"/>
+    <dgm:cxn modelId="{2D5599CD-EE5D-40F9-A0FD-CC1E62ECA14E}" srcId="{CE704066-F6EC-4A34-BE57-F031F6F97A0E}" destId="{E4B44728-031A-45B4-A960-6D7C98163EB4}" srcOrd="1" destOrd="0" parTransId="{A6A79D2A-79DB-436D-AB27-E222CDBC7436}" sibTransId="{F9EF34C1-D145-4D03-BEF0-2842C4F14E8F}"/>
+    <dgm:cxn modelId="{BE7532DD-61C4-419A-9602-441A2CB79061}" srcId="{5D518925-A42D-44F7-8A34-D7EE8C8BA4F6}" destId="{FD7D5C93-D69E-40C6-971E-DE23F823AC96}" srcOrd="0" destOrd="0" parTransId="{A885DEA9-B00A-4431-98A9-DE220F925B82}" sibTransId="{F77961E8-CCF0-4884-B78F-402299556199}"/>
+    <dgm:cxn modelId="{294848E5-A50B-4122-8FC4-07D10048A02B}" type="presOf" srcId="{491443E3-89AE-4FE4-92A7-C951F26ADF15}" destId="{94FD681E-6FED-4D1A-91A3-94D9AE5BBDC1}" srcOrd="0" destOrd="0" presId="urn:microsoft.com/office/officeart/2005/8/layout/vList5"/>
+    <dgm:cxn modelId="{46BEEEEA-8181-4496-8F3E-4B42C7BEC8A4}" srcId="{BE1D1458-5D71-486A-9C06-F8C2979301CE}" destId="{93B62B81-D7F7-431E-9439-2E3D4CD2353E}" srcOrd="2" destOrd="0" parTransId="{CF446EAA-D8CD-45A9-B112-FE71C0FABC3A}" sibTransId="{99D4F5D3-8426-4A0A-9AFF-9CC195309684}"/>
+    <dgm:cxn modelId="{31ED0CFA-3F9C-4EC0-89AC-690C51CC9BA5}" type="presOf" srcId="{5D518925-A42D-44F7-8A34-D7EE8C8BA4F6}" destId="{A5D97866-9099-44CF-8392-E4D04C75D305}" srcOrd="0" destOrd="0" presId="urn:microsoft.com/office/officeart/2005/8/layout/vList5"/>
     <dgm:cxn modelId="{5F24A8FD-6B4A-49D3-B691-5F99C562E169}" type="presOf" srcId="{CE704066-F6EC-4A34-BE57-F031F6F97A0E}" destId="{89A3A35E-A31F-4A19-88A6-C711D22D028E}" srcOrd="0" destOrd="0" presId="urn:microsoft.com/office/officeart/2005/8/layout/vList5"/>
-    <dgm:cxn modelId="{B7847806-6502-4A85-AA95-FB3B3F9F8E85}" srcId="{93B62B81-D7F7-431E-9439-2E3D4CD2353E}" destId="{491443E3-89AE-4FE4-92A7-C951F26ADF15}" srcOrd="0" destOrd="0" parTransId="{21A27C6B-BD4F-4728-8495-2749C96FF1CC}" sibTransId="{892CAB94-5167-438E-8541-2DCB69385D70}"/>
-    <dgm:cxn modelId="{B5EA5F30-9689-4546-8120-3309418A9BF6}" type="presOf" srcId="{BE1D1458-5D71-486A-9C06-F8C2979301CE}" destId="{E4832E59-FCA4-4EC2-82F5-B4BFAF552C72}" srcOrd="0" destOrd="0" presId="urn:microsoft.com/office/officeart/2005/8/layout/vList5"/>
-    <dgm:cxn modelId="{196DD02D-672C-4265-9958-28C33653829B}" type="presOf" srcId="{96D2705E-7225-4E32-BBCA-73AADEC51771}" destId="{3DC572B2-C7F7-45EE-8266-8D3A0F1AF860}" srcOrd="0" destOrd="0" presId="urn:microsoft.com/office/officeart/2005/8/layout/vList5"/>
-    <dgm:cxn modelId="{2C8F8EBD-D261-4528-82AD-750347F41495}" type="presOf" srcId="{FD7D5C93-D69E-40C6-971E-DE23F823AC96}" destId="{6DA4FE5C-CB21-47E7-B0F0-9CB097B5E464}" srcOrd="0" destOrd="0" presId="urn:microsoft.com/office/officeart/2005/8/layout/vList5"/>
     <dgm:cxn modelId="{28AA4A30-AA5E-429A-819F-57E39EB52A28}" type="presParOf" srcId="{E4832E59-FCA4-4EC2-82F5-B4BFAF552C72}" destId="{C86DE2E3-3485-4D88-991A-33C9416C5246}" srcOrd="0" destOrd="0" presId="urn:microsoft.com/office/officeart/2005/8/layout/vList5"/>
     <dgm:cxn modelId="{F31821A7-9748-44E7-A0CC-6C3DEECFE1DD}" type="presParOf" srcId="{C86DE2E3-3485-4D88-991A-33C9416C5246}" destId="{89A3A35E-A31F-4A19-88A6-C711D22D028E}" srcOrd="0" destOrd="0" presId="urn:microsoft.com/office/officeart/2005/8/layout/vList5"/>
     <dgm:cxn modelId="{1CBED319-C83D-4585-8A7A-594598994B04}" type="presParOf" srcId="{C86DE2E3-3485-4D88-991A-33C9416C5246}" destId="{3DC572B2-C7F7-45EE-8266-8D3A0F1AF860}" srcOrd="1" destOrd="0" presId="urn:microsoft.com/office/officeart/2005/8/layout/vList5"/>
@@ -2353,7 +2313,7 @@
   <dgm:whole/>
   <dgm:extLst>
     <a:ext uri="http://schemas.microsoft.com/office/drawing/2008/diagram">
-      <dsp:dataModelExt xmlns:dsp="http://schemas.microsoft.com/office/drawing/2008/diagram" relId="rId7" minVer="http://schemas.openxmlformats.org/drawingml/2006/diagram"/>
+      <dsp:dataModelExt xmlns:dsp="http://schemas.microsoft.com/office/drawing/2008/diagram" relId="rId6" minVer="http://schemas.openxmlformats.org/drawingml/2006/diagram"/>
     </a:ext>
   </dgm:extLst>
 </dgm:dataModel>
@@ -2388,7 +2348,7 @@
         <a:lstStyle/>
         <a:p>
           <a:r>
-            <a:rPr lang="en-US" sz="3000" dirty="0"/>
+            <a:rPr lang="en-US" sz="2000" dirty="0"/>
             <a:t>Aliases</a:t>
           </a:r>
         </a:p>
@@ -2507,7 +2467,7 @@
         <a:lstStyle/>
         <a:p>
           <a:r>
-            <a:rPr lang="en-US" sz="3000" dirty="0"/>
+            <a:rPr lang="en-US" sz="2000" dirty="0"/>
             <a:t>Casting</a:t>
           </a:r>
         </a:p>
@@ -2620,7 +2580,7 @@
         <a:lstStyle/>
         <a:p>
           <a:r>
-            <a:rPr lang="en-US" sz="3000" dirty="0"/>
+            <a:rPr lang="en-US" sz="2000" dirty="0"/>
             <a:t>Class extensions</a:t>
           </a:r>
         </a:p>
@@ -2727,7 +2687,7 @@
         <a:lstStyle/>
         <a:p>
           <a:r>
-            <a:rPr lang="en-US" sz="3000" dirty="0"/>
+            <a:rPr lang="en-US" sz="2000" dirty="0"/>
             <a:t>Method parameters and return types</a:t>
           </a:r>
         </a:p>
@@ -3156,48 +3116,27 @@
         </dgm:presLayoutVars>
       </dgm:prSet>
       <dgm:spPr/>
-      <dgm:t>
-        <a:bodyPr/>
-        <a:lstStyle/>
-        <a:p>
-          <a:endParaRPr lang="en-US"/>
-        </a:p>
-      </dgm:t>
     </dgm:pt>
     <dgm:pt modelId="{A403ADE2-8A92-4517-8307-DFE248D89559}" type="pres">
       <dgm:prSet presAssocID="{3C84C93E-F276-4672-8306-0D4EDC48291C}" presName="linNode" presStyleCnt="0"/>
       <dgm:spPr/>
     </dgm:pt>
     <dgm:pt modelId="{9DB291ED-CC19-490E-961E-C63E51B3DEBD}" type="pres">
-      <dgm:prSet presAssocID="{3C84C93E-F276-4672-8306-0D4EDC48291C}" presName="parentText" presStyleLbl="node1" presStyleIdx="0" presStyleCnt="4" custLinFactNeighborY="-2861">
+      <dgm:prSet presAssocID="{3C84C93E-F276-4672-8306-0D4EDC48291C}" presName="parentText" presStyleLbl="node1" presStyleIdx="0" presStyleCnt="4" custScaleX="41667" custLinFactNeighborX="-16406" custLinFactNeighborY="-208">
         <dgm:presLayoutVars>
           <dgm:chMax val="1"/>
           <dgm:bulletEnabled val="1"/>
         </dgm:presLayoutVars>
       </dgm:prSet>
       <dgm:spPr/>
-      <dgm:t>
-        <a:bodyPr/>
-        <a:lstStyle/>
-        <a:p>
-          <a:endParaRPr lang="en-US"/>
-        </a:p>
-      </dgm:t>
     </dgm:pt>
     <dgm:pt modelId="{7F9C28E1-28AC-404D-A8EF-ACDB5DFF50D9}" type="pres">
-      <dgm:prSet presAssocID="{3C84C93E-F276-4672-8306-0D4EDC48291C}" presName="descendantText" presStyleLbl="alignAccFollowNode1" presStyleIdx="0" presStyleCnt="4">
+      <dgm:prSet presAssocID="{3C84C93E-F276-4672-8306-0D4EDC48291C}" presName="descendantText" presStyleLbl="alignAccFollowNode1" presStyleIdx="0" presStyleCnt="4" custLinFactNeighborX="-29546">
         <dgm:presLayoutVars>
           <dgm:bulletEnabled val="1"/>
         </dgm:presLayoutVars>
       </dgm:prSet>
       <dgm:spPr/>
-      <dgm:t>
-        <a:bodyPr/>
-        <a:lstStyle/>
-        <a:p>
-          <a:endParaRPr lang="en-US"/>
-        </a:p>
-      </dgm:t>
     </dgm:pt>
     <dgm:pt modelId="{34F37747-6784-4877-8185-2C87ABBCCC9F}" type="pres">
       <dgm:prSet presAssocID="{6F06AEEB-27E4-4060-AD12-431800289540}" presName="sp" presStyleCnt="0"/>
@@ -3208,35 +3147,21 @@
       <dgm:spPr/>
     </dgm:pt>
     <dgm:pt modelId="{7EFE7DE5-404E-420F-BB2C-8D177D4BD0E5}" type="pres">
-      <dgm:prSet presAssocID="{18A5A126-9CDF-408F-AED4-1709B1B7856C}" presName="parentText" presStyleLbl="node1" presStyleIdx="1" presStyleCnt="4">
+      <dgm:prSet presAssocID="{18A5A126-9CDF-408F-AED4-1709B1B7856C}" presName="parentText" presStyleLbl="node1" presStyleIdx="1" presStyleCnt="4" custScaleX="41667" custLinFactNeighborX="-16406">
         <dgm:presLayoutVars>
           <dgm:chMax val="1"/>
           <dgm:bulletEnabled val="1"/>
         </dgm:presLayoutVars>
       </dgm:prSet>
       <dgm:spPr/>
-      <dgm:t>
-        <a:bodyPr/>
-        <a:lstStyle/>
-        <a:p>
-          <a:endParaRPr lang="en-US"/>
-        </a:p>
-      </dgm:t>
     </dgm:pt>
     <dgm:pt modelId="{D510B8BF-35DE-4934-9EDD-BB2C766C9B1D}" type="pres">
-      <dgm:prSet presAssocID="{18A5A126-9CDF-408F-AED4-1709B1B7856C}" presName="descendantText" presStyleLbl="alignAccFollowNode1" presStyleIdx="1" presStyleCnt="4">
+      <dgm:prSet presAssocID="{18A5A126-9CDF-408F-AED4-1709B1B7856C}" presName="descendantText" presStyleLbl="alignAccFollowNode1" presStyleIdx="1" presStyleCnt="4" custLinFactNeighborX="-29546">
         <dgm:presLayoutVars>
           <dgm:bulletEnabled val="1"/>
         </dgm:presLayoutVars>
       </dgm:prSet>
       <dgm:spPr/>
-      <dgm:t>
-        <a:bodyPr/>
-        <a:lstStyle/>
-        <a:p>
-          <a:endParaRPr lang="en-US"/>
-        </a:p>
-      </dgm:t>
     </dgm:pt>
     <dgm:pt modelId="{3848E3C7-E4D3-4713-BA1D-B4C006AC2665}" type="pres">
       <dgm:prSet presAssocID="{1B9835CA-355C-422C-A0F3-E76C387F3609}" presName="sp" presStyleCnt="0"/>
@@ -3247,35 +3172,21 @@
       <dgm:spPr/>
     </dgm:pt>
     <dgm:pt modelId="{2DC11702-8290-49B6-BE15-B41D2A028289}" type="pres">
-      <dgm:prSet presAssocID="{D0F8E683-C4DC-481A-8BCD-4B33BA43D927}" presName="parentText" presStyleLbl="node1" presStyleIdx="2" presStyleCnt="4">
+      <dgm:prSet presAssocID="{D0F8E683-C4DC-481A-8BCD-4B33BA43D927}" presName="parentText" presStyleLbl="node1" presStyleIdx="2" presStyleCnt="4" custScaleX="41667" custLinFactNeighborX="-16406">
         <dgm:presLayoutVars>
           <dgm:chMax val="1"/>
           <dgm:bulletEnabled val="1"/>
         </dgm:presLayoutVars>
       </dgm:prSet>
       <dgm:spPr/>
-      <dgm:t>
-        <a:bodyPr/>
-        <a:lstStyle/>
-        <a:p>
-          <a:endParaRPr lang="en-US"/>
-        </a:p>
-      </dgm:t>
     </dgm:pt>
     <dgm:pt modelId="{37B4A69E-BEAA-483D-A27B-B8066514DC2A}" type="pres">
-      <dgm:prSet presAssocID="{D0F8E683-C4DC-481A-8BCD-4B33BA43D927}" presName="descendantText" presStyleLbl="alignAccFollowNode1" presStyleIdx="2" presStyleCnt="4">
+      <dgm:prSet presAssocID="{D0F8E683-C4DC-481A-8BCD-4B33BA43D927}" presName="descendantText" presStyleLbl="alignAccFollowNode1" presStyleIdx="2" presStyleCnt="4" custLinFactNeighborX="-29546">
         <dgm:presLayoutVars>
           <dgm:bulletEnabled val="1"/>
         </dgm:presLayoutVars>
       </dgm:prSet>
       <dgm:spPr/>
-      <dgm:t>
-        <a:bodyPr/>
-        <a:lstStyle/>
-        <a:p>
-          <a:endParaRPr lang="en-US"/>
-        </a:p>
-      </dgm:t>
     </dgm:pt>
     <dgm:pt modelId="{9CFDBF66-7A98-4500-A454-C13851DB99F5}" type="pres">
       <dgm:prSet presAssocID="{01ADA495-5465-42CE-B1D0-9C68DEAC5498}" presName="sp" presStyleCnt="0"/>
@@ -3286,63 +3197,49 @@
       <dgm:spPr/>
     </dgm:pt>
     <dgm:pt modelId="{96A820CA-BC25-4317-9A27-1A1206B2F40D}" type="pres">
-      <dgm:prSet presAssocID="{20AC9AF4-A267-4D5E-9755-9C098B10F303}" presName="parentText" presStyleLbl="node1" presStyleIdx="3" presStyleCnt="4">
+      <dgm:prSet presAssocID="{20AC9AF4-A267-4D5E-9755-9C098B10F303}" presName="parentText" presStyleLbl="node1" presStyleIdx="3" presStyleCnt="4" custScaleX="41667" custLinFactNeighborX="-16406">
         <dgm:presLayoutVars>
           <dgm:chMax val="1"/>
           <dgm:bulletEnabled val="1"/>
         </dgm:presLayoutVars>
       </dgm:prSet>
       <dgm:spPr/>
-      <dgm:t>
-        <a:bodyPr/>
-        <a:lstStyle/>
-        <a:p>
-          <a:endParaRPr lang="en-US"/>
-        </a:p>
-      </dgm:t>
     </dgm:pt>
     <dgm:pt modelId="{3248EAB6-7CD9-4AF4-8610-E82B5A9C2B0F}" type="pres">
-      <dgm:prSet presAssocID="{20AC9AF4-A267-4D5E-9755-9C098B10F303}" presName="descendantText" presStyleLbl="alignAccFollowNode1" presStyleIdx="3" presStyleCnt="4">
+      <dgm:prSet presAssocID="{20AC9AF4-A267-4D5E-9755-9C098B10F303}" presName="descendantText" presStyleLbl="alignAccFollowNode1" presStyleIdx="3" presStyleCnt="4" custLinFactNeighborX="-29514" custLinFactNeighborY="2426">
         <dgm:presLayoutVars>
           <dgm:bulletEnabled val="1"/>
         </dgm:presLayoutVars>
       </dgm:prSet>
       <dgm:spPr/>
-      <dgm:t>
-        <a:bodyPr/>
-        <a:lstStyle/>
-        <a:p>
-          <a:endParaRPr lang="en-US"/>
-        </a:p>
-      </dgm:t>
     </dgm:pt>
   </dgm:ptLst>
   <dgm:cxnLst>
+    <dgm:cxn modelId="{31ED1609-EE0B-4F1F-AECD-9A7244C2832E}" srcId="{3C84C93E-F276-4672-8306-0D4EDC48291C}" destId="{23807C4C-2DCB-4551-8F2D-7F715C6742A2}" srcOrd="1" destOrd="0" parTransId="{3761A983-A35D-4BA9-861F-A447DD3C1B1C}" sibTransId="{DBCDE35C-4C80-483B-8006-3FB356AD5639}"/>
+    <dgm:cxn modelId="{87C43F12-B864-4A67-B24A-3EB2710BA809}" type="presOf" srcId="{E9A1F835-6E14-423F-892C-1E5350F4D404}" destId="{37B4A69E-BEAA-483D-A27B-B8066514DC2A}" srcOrd="0" destOrd="1" presId="urn:microsoft.com/office/officeart/2005/8/layout/vList5"/>
+    <dgm:cxn modelId="{E631812C-6B9D-4E57-B1E9-B09F0A03AC3B}" srcId="{4655BB5F-4EBC-4207-A5B0-147FC724DAE7}" destId="{D0F8E683-C4DC-481A-8BCD-4B33BA43D927}" srcOrd="2" destOrd="0" parTransId="{6388F7F7-BC70-40EC-8FAF-DD54C0D02487}" sibTransId="{01ADA495-5465-42CE-B1D0-9C68DEAC5498}"/>
+    <dgm:cxn modelId="{84950C3F-C348-4F3F-AF7D-CF2F03A99F71}" type="presOf" srcId="{ACA9C505-CD0B-4752-9300-8A1863EE07ED}" destId="{D510B8BF-35DE-4934-9EDD-BB2C766C9B1D}" srcOrd="0" destOrd="0" presId="urn:microsoft.com/office/officeart/2005/8/layout/vList5"/>
+    <dgm:cxn modelId="{A805535C-45CB-411D-B26B-CB9C35E95BCA}" type="presOf" srcId="{20AC9AF4-A267-4D5E-9755-9C098B10F303}" destId="{96A820CA-BC25-4317-9A27-1A1206B2F40D}" srcOrd="0" destOrd="0" presId="urn:microsoft.com/office/officeart/2005/8/layout/vList5"/>
+    <dgm:cxn modelId="{29AC8E5D-B1F5-4BFA-9435-5A8D5E0E78EF}" type="presOf" srcId="{DAD6FF4F-6573-44CA-BBA6-AA6673522659}" destId="{3248EAB6-7CD9-4AF4-8610-E82B5A9C2B0F}" srcOrd="0" destOrd="0" presId="urn:microsoft.com/office/officeart/2005/8/layout/vList5"/>
+    <dgm:cxn modelId="{8540A648-0CCF-4E4F-B782-9217D67E063C}" type="presOf" srcId="{BA2DB30F-C26A-4431-8C29-A5CB73928175}" destId="{37B4A69E-BEAA-483D-A27B-B8066514DC2A}" srcOrd="0" destOrd="0" presId="urn:microsoft.com/office/officeart/2005/8/layout/vList5"/>
+    <dgm:cxn modelId="{CF1D1650-F396-49FB-A873-6FE141596A3B}" type="presOf" srcId="{9BE3BF22-2E45-4160-B620-9D51AEC383B5}" destId="{3248EAB6-7CD9-4AF4-8610-E82B5A9C2B0F}" srcOrd="0" destOrd="1" presId="urn:microsoft.com/office/officeart/2005/8/layout/vList5"/>
+    <dgm:cxn modelId="{192D5A71-0F14-4D2D-B65E-968D83E4D1B9}" type="presOf" srcId="{AD1158AF-1744-4807-9ED0-BAA14AAB0471}" destId="{7F9C28E1-28AC-404D-A8EF-ACDB5DFF50D9}" srcOrd="0" destOrd="0" presId="urn:microsoft.com/office/officeart/2005/8/layout/vList5"/>
+    <dgm:cxn modelId="{64E39D71-D718-4821-B430-7DED81A1C673}" srcId="{20AC9AF4-A267-4D5E-9755-9C098B10F303}" destId="{9BE3BF22-2E45-4160-B620-9D51AEC383B5}" srcOrd="1" destOrd="0" parTransId="{909D2861-4BA0-4F26-AE5B-7F6CE7BE93D1}" sibTransId="{0A72E7A3-C243-42B6-B3A9-01079EF60D3D}"/>
+    <dgm:cxn modelId="{2EC0C072-6C5C-4C35-AA9F-6D426F1E990B}" srcId="{18A5A126-9CDF-408F-AED4-1709B1B7856C}" destId="{ACA9C505-CD0B-4752-9300-8A1863EE07ED}" srcOrd="0" destOrd="0" parTransId="{722D4FBA-AFE0-4B18-9927-B3D40D502D1F}" sibTransId="{B9A8F6A4-D6F8-4C5E-9CFC-1EC774D0D933}"/>
+    <dgm:cxn modelId="{3B1ED675-063C-47DD-8EFE-6BB9D9426764}" srcId="{4655BB5F-4EBC-4207-A5B0-147FC724DAE7}" destId="{3C84C93E-F276-4672-8306-0D4EDC48291C}" srcOrd="0" destOrd="0" parTransId="{18AAB41D-8D7F-46E1-8A66-47A6E4B44E6E}" sibTransId="{6F06AEEB-27E4-4060-AD12-431800289540}"/>
+    <dgm:cxn modelId="{5FAAE87E-6F02-4A4D-A80D-03B20599D8C7}" srcId="{4655BB5F-4EBC-4207-A5B0-147FC724DAE7}" destId="{18A5A126-9CDF-408F-AED4-1709B1B7856C}" srcOrd="1" destOrd="0" parTransId="{C742BDC9-C7A2-4C81-9DCC-36EC82FCCFE4}" sibTransId="{1B9835CA-355C-422C-A0F3-E76C387F3609}"/>
     <dgm:cxn modelId="{64DD1C90-3C90-46D1-991C-FD2892A0591D}" type="presOf" srcId="{18A5A126-9CDF-408F-AED4-1709B1B7856C}" destId="{7EFE7DE5-404E-420F-BB2C-8D177D4BD0E5}" srcOrd="0" destOrd="0" presId="urn:microsoft.com/office/officeart/2005/8/layout/vList5"/>
-    <dgm:cxn modelId="{2EC0C072-6C5C-4C35-AA9F-6D426F1E990B}" srcId="{18A5A126-9CDF-408F-AED4-1709B1B7856C}" destId="{ACA9C505-CD0B-4752-9300-8A1863EE07ED}" srcOrd="0" destOrd="0" parTransId="{722D4FBA-AFE0-4B18-9927-B3D40D502D1F}" sibTransId="{B9A8F6A4-D6F8-4C5E-9CFC-1EC774D0D933}"/>
+    <dgm:cxn modelId="{61184497-FB9A-4517-B4E6-9A8B93550CFE}" type="presOf" srcId="{BB977D72-290E-42DF-B6F8-2AD2E69D3762}" destId="{D510B8BF-35DE-4934-9EDD-BB2C766C9B1D}" srcOrd="0" destOrd="1" presId="urn:microsoft.com/office/officeart/2005/8/layout/vList5"/>
+    <dgm:cxn modelId="{47CC6B9E-D179-4E52-A25A-91136DB78A3D}" srcId="{20AC9AF4-A267-4D5E-9755-9C098B10F303}" destId="{DAD6FF4F-6573-44CA-BBA6-AA6673522659}" srcOrd="0" destOrd="0" parTransId="{F6B8AF35-B27F-4B48-8A04-B523895CEE27}" sibTransId="{579B0503-F442-4237-ADA4-B2E641B0E6C9}"/>
+    <dgm:cxn modelId="{CE5AC1A0-72AA-4BAE-A979-AC61D3008BD2}" type="presOf" srcId="{4655BB5F-4EBC-4207-A5B0-147FC724DAE7}" destId="{5603229D-4475-4EBD-8B80-5BF85AF5A926}" srcOrd="0" destOrd="0" presId="urn:microsoft.com/office/officeart/2005/8/layout/vList5"/>
+    <dgm:cxn modelId="{7FDA67A2-CC00-44E7-BEB5-D239152E04EE}" srcId="{18A5A126-9CDF-408F-AED4-1709B1B7856C}" destId="{BB977D72-290E-42DF-B6F8-2AD2E69D3762}" srcOrd="1" destOrd="0" parTransId="{5ED6EE6B-050F-4A62-9A97-9909BF63F3BF}" sibTransId="{C467AD86-0A99-4F7B-BF89-07FBA45FAE9A}"/>
+    <dgm:cxn modelId="{B54D4BA8-2D93-401F-9369-3B9FAF11BF1D}" type="presOf" srcId="{23807C4C-2DCB-4551-8F2D-7F715C6742A2}" destId="{7F9C28E1-28AC-404D-A8EF-ACDB5DFF50D9}" srcOrd="0" destOrd="1" presId="urn:microsoft.com/office/officeart/2005/8/layout/vList5"/>
+    <dgm:cxn modelId="{57D385A9-DE56-43F5-9116-499131FF08E3}" srcId="{D0F8E683-C4DC-481A-8BCD-4B33BA43D927}" destId="{BA2DB30F-C26A-4431-8C29-A5CB73928175}" srcOrd="0" destOrd="0" parTransId="{88C1E58E-43BE-42F9-93DF-A962F3F20EB5}" sibTransId="{31F96A22-B396-492D-AFB1-97F5589DC161}"/>
+    <dgm:cxn modelId="{19A200BB-5E81-4D36-8DFD-4D38E266CB4A}" srcId="{4655BB5F-4EBC-4207-A5B0-147FC724DAE7}" destId="{20AC9AF4-A267-4D5E-9755-9C098B10F303}" srcOrd="3" destOrd="0" parTransId="{D44B6C09-6E5C-497C-B00C-B56B66B0907F}" sibTransId="{B7881554-C08F-43C1-AE2C-D1A37106B272}"/>
+    <dgm:cxn modelId="{33370FC1-1A83-45E0-AB6E-3C41CF6AA528}" type="presOf" srcId="{D0F8E683-C4DC-481A-8BCD-4B33BA43D927}" destId="{2DC11702-8290-49B6-BE15-B41D2A028289}" srcOrd="0" destOrd="0" presId="urn:microsoft.com/office/officeart/2005/8/layout/vList5"/>
+    <dgm:cxn modelId="{AFAC89D5-DCF5-433D-B507-927889F835B2}" type="presOf" srcId="{3C84C93E-F276-4672-8306-0D4EDC48291C}" destId="{9DB291ED-CC19-490E-961E-C63E51B3DEBD}" srcOrd="0" destOrd="0" presId="urn:microsoft.com/office/officeart/2005/8/layout/vList5"/>
     <dgm:cxn modelId="{5A9C18E7-DDFB-4820-97E3-B9BF1D799526}" srcId="{D0F8E683-C4DC-481A-8BCD-4B33BA43D927}" destId="{E9A1F835-6E14-423F-892C-1E5350F4D404}" srcOrd="1" destOrd="0" parTransId="{1C8F4CC9-03DA-4CA8-B795-E109B6A3FA9D}" sibTransId="{0ADF2407-687D-4AA9-9C1D-67FF1F383CB0}"/>
-    <dgm:cxn modelId="{AFAC89D5-DCF5-433D-B507-927889F835B2}" type="presOf" srcId="{3C84C93E-F276-4672-8306-0D4EDC48291C}" destId="{9DB291ED-CC19-490E-961E-C63E51B3DEBD}" srcOrd="0" destOrd="0" presId="urn:microsoft.com/office/officeart/2005/8/layout/vList5"/>
-    <dgm:cxn modelId="{CF1D1650-F396-49FB-A873-6FE141596A3B}" type="presOf" srcId="{9BE3BF22-2E45-4160-B620-9D51AEC383B5}" destId="{3248EAB6-7CD9-4AF4-8610-E82B5A9C2B0F}" srcOrd="0" destOrd="1" presId="urn:microsoft.com/office/officeart/2005/8/layout/vList5"/>
-    <dgm:cxn modelId="{31ED1609-EE0B-4F1F-AECD-9A7244C2832E}" srcId="{3C84C93E-F276-4672-8306-0D4EDC48291C}" destId="{23807C4C-2DCB-4551-8F2D-7F715C6742A2}" srcOrd="1" destOrd="0" parTransId="{3761A983-A35D-4BA9-861F-A447DD3C1B1C}" sibTransId="{DBCDE35C-4C80-483B-8006-3FB356AD5639}"/>
-    <dgm:cxn modelId="{8540A648-0CCF-4E4F-B782-9217D67E063C}" type="presOf" srcId="{BA2DB30F-C26A-4431-8C29-A5CB73928175}" destId="{37B4A69E-BEAA-483D-A27B-B8066514DC2A}" srcOrd="0" destOrd="0" presId="urn:microsoft.com/office/officeart/2005/8/layout/vList5"/>
-    <dgm:cxn modelId="{57D385A9-DE56-43F5-9116-499131FF08E3}" srcId="{D0F8E683-C4DC-481A-8BCD-4B33BA43D927}" destId="{BA2DB30F-C26A-4431-8C29-A5CB73928175}" srcOrd="0" destOrd="0" parTransId="{88C1E58E-43BE-42F9-93DF-A962F3F20EB5}" sibTransId="{31F96A22-B396-492D-AFB1-97F5589DC161}"/>
-    <dgm:cxn modelId="{84950C3F-C348-4F3F-AF7D-CF2F03A99F71}" type="presOf" srcId="{ACA9C505-CD0B-4752-9300-8A1863EE07ED}" destId="{D510B8BF-35DE-4934-9EDD-BB2C766C9B1D}" srcOrd="0" destOrd="0" presId="urn:microsoft.com/office/officeart/2005/8/layout/vList5"/>
-    <dgm:cxn modelId="{5FAAE87E-6F02-4A4D-A80D-03B20599D8C7}" srcId="{4655BB5F-4EBC-4207-A5B0-147FC724DAE7}" destId="{18A5A126-9CDF-408F-AED4-1709B1B7856C}" srcOrd="1" destOrd="0" parTransId="{C742BDC9-C7A2-4C81-9DCC-36EC82FCCFE4}" sibTransId="{1B9835CA-355C-422C-A0F3-E76C387F3609}"/>
-    <dgm:cxn modelId="{33370FC1-1A83-45E0-AB6E-3C41CF6AA528}" type="presOf" srcId="{D0F8E683-C4DC-481A-8BCD-4B33BA43D927}" destId="{2DC11702-8290-49B6-BE15-B41D2A028289}" srcOrd="0" destOrd="0" presId="urn:microsoft.com/office/officeart/2005/8/layout/vList5"/>
-    <dgm:cxn modelId="{47CC6B9E-D179-4E52-A25A-91136DB78A3D}" srcId="{20AC9AF4-A267-4D5E-9755-9C098B10F303}" destId="{DAD6FF4F-6573-44CA-BBA6-AA6673522659}" srcOrd="0" destOrd="0" parTransId="{F6B8AF35-B27F-4B48-8A04-B523895CEE27}" sibTransId="{579B0503-F442-4237-ADA4-B2E641B0E6C9}"/>
-    <dgm:cxn modelId="{A805535C-45CB-411D-B26B-CB9C35E95BCA}" type="presOf" srcId="{20AC9AF4-A267-4D5E-9755-9C098B10F303}" destId="{96A820CA-BC25-4317-9A27-1A1206B2F40D}" srcOrd="0" destOrd="0" presId="urn:microsoft.com/office/officeart/2005/8/layout/vList5"/>
-    <dgm:cxn modelId="{61184497-FB9A-4517-B4E6-9A8B93550CFE}" type="presOf" srcId="{BB977D72-290E-42DF-B6F8-2AD2E69D3762}" destId="{D510B8BF-35DE-4934-9EDD-BB2C766C9B1D}" srcOrd="0" destOrd="1" presId="urn:microsoft.com/office/officeart/2005/8/layout/vList5"/>
-    <dgm:cxn modelId="{3B1ED675-063C-47DD-8EFE-6BB9D9426764}" srcId="{4655BB5F-4EBC-4207-A5B0-147FC724DAE7}" destId="{3C84C93E-F276-4672-8306-0D4EDC48291C}" srcOrd="0" destOrd="0" parTransId="{18AAB41D-8D7F-46E1-8A66-47A6E4B44E6E}" sibTransId="{6F06AEEB-27E4-4060-AD12-431800289540}"/>
-    <dgm:cxn modelId="{87C43F12-B864-4A67-B24A-3EB2710BA809}" type="presOf" srcId="{E9A1F835-6E14-423F-892C-1E5350F4D404}" destId="{37B4A69E-BEAA-483D-A27B-B8066514DC2A}" srcOrd="0" destOrd="1" presId="urn:microsoft.com/office/officeart/2005/8/layout/vList5"/>
-    <dgm:cxn modelId="{7FDA67A2-CC00-44E7-BEB5-D239152E04EE}" srcId="{18A5A126-9CDF-408F-AED4-1709B1B7856C}" destId="{BB977D72-290E-42DF-B6F8-2AD2E69D3762}" srcOrd="1" destOrd="0" parTransId="{5ED6EE6B-050F-4A62-9A97-9909BF63F3BF}" sibTransId="{C467AD86-0A99-4F7B-BF89-07FBA45FAE9A}"/>
-    <dgm:cxn modelId="{19A200BB-5E81-4D36-8DFD-4D38E266CB4A}" srcId="{4655BB5F-4EBC-4207-A5B0-147FC724DAE7}" destId="{20AC9AF4-A267-4D5E-9755-9C098B10F303}" srcOrd="3" destOrd="0" parTransId="{D44B6C09-6E5C-497C-B00C-B56B66B0907F}" sibTransId="{B7881554-C08F-43C1-AE2C-D1A37106B272}"/>
-    <dgm:cxn modelId="{E631812C-6B9D-4E57-B1E9-B09F0A03AC3B}" srcId="{4655BB5F-4EBC-4207-A5B0-147FC724DAE7}" destId="{D0F8E683-C4DC-481A-8BCD-4B33BA43D927}" srcOrd="2" destOrd="0" parTransId="{6388F7F7-BC70-40EC-8FAF-DD54C0D02487}" sibTransId="{01ADA495-5465-42CE-B1D0-9C68DEAC5498}"/>
-    <dgm:cxn modelId="{CE5AC1A0-72AA-4BAE-A979-AC61D3008BD2}" type="presOf" srcId="{4655BB5F-4EBC-4207-A5B0-147FC724DAE7}" destId="{5603229D-4475-4EBD-8B80-5BF85AF5A926}" srcOrd="0" destOrd="0" presId="urn:microsoft.com/office/officeart/2005/8/layout/vList5"/>
-    <dgm:cxn modelId="{64E39D71-D718-4821-B430-7DED81A1C673}" srcId="{20AC9AF4-A267-4D5E-9755-9C098B10F303}" destId="{9BE3BF22-2E45-4160-B620-9D51AEC383B5}" srcOrd="1" destOrd="0" parTransId="{909D2861-4BA0-4F26-AE5B-7F6CE7BE93D1}" sibTransId="{0A72E7A3-C243-42B6-B3A9-01079EF60D3D}"/>
-    <dgm:cxn modelId="{B54D4BA8-2D93-401F-9369-3B9FAF11BF1D}" type="presOf" srcId="{23807C4C-2DCB-4551-8F2D-7F715C6742A2}" destId="{7F9C28E1-28AC-404D-A8EF-ACDB5DFF50D9}" srcOrd="0" destOrd="1" presId="urn:microsoft.com/office/officeart/2005/8/layout/vList5"/>
-    <dgm:cxn modelId="{29AC8E5D-B1F5-4BFA-9435-5A8D5E0E78EF}" type="presOf" srcId="{DAD6FF4F-6573-44CA-BBA6-AA6673522659}" destId="{3248EAB6-7CD9-4AF4-8610-E82B5A9C2B0F}" srcOrd="0" destOrd="0" presId="urn:microsoft.com/office/officeart/2005/8/layout/vList5"/>
     <dgm:cxn modelId="{16BD44F1-3513-4BA7-9D63-32D92206830D}" srcId="{3C84C93E-F276-4672-8306-0D4EDC48291C}" destId="{AD1158AF-1744-4807-9ED0-BAA14AAB0471}" srcOrd="0" destOrd="0" parTransId="{76200662-55F0-4D2B-8F4F-9431C761ACA2}" sibTransId="{A170262A-E59C-4C66-B35F-370FAF94CB57}"/>
-    <dgm:cxn modelId="{192D5A71-0F14-4D2D-B65E-968D83E4D1B9}" type="presOf" srcId="{AD1158AF-1744-4807-9ED0-BAA14AAB0471}" destId="{7F9C28E1-28AC-404D-A8EF-ACDB5DFF50D9}" srcOrd="0" destOrd="0" presId="urn:microsoft.com/office/officeart/2005/8/layout/vList5"/>
     <dgm:cxn modelId="{834169B6-AD5A-4387-AC27-FE79BC074758}" type="presParOf" srcId="{5603229D-4475-4EBD-8B80-5BF85AF5A926}" destId="{A403ADE2-8A92-4517-8307-DFE248D89559}" srcOrd="0" destOrd="0" presId="urn:microsoft.com/office/officeart/2005/8/layout/vList5"/>
     <dgm:cxn modelId="{370D849C-3816-46B9-BFAA-D9B257DF3189}" type="presParOf" srcId="{A403ADE2-8A92-4517-8307-DFE248D89559}" destId="{9DB291ED-CC19-490E-961E-C63E51B3DEBD}" srcOrd="0" destOrd="0" presId="urn:microsoft.com/office/officeart/2005/8/layout/vList5"/>
     <dgm:cxn modelId="{385E3975-42D5-4160-9F04-51093E8257B0}" type="presParOf" srcId="{A403ADE2-8A92-4517-8307-DFE248D89559}" destId="{7F9C28E1-28AC-404D-A8EF-ACDB5DFF50D9}" srcOrd="1" destOrd="0" presId="urn:microsoft.com/office/officeart/2005/8/layout/vList5"/>
@@ -3363,7 +3260,7 @@
   <dgm:whole/>
   <dgm:extLst>
     <a:ext uri="http://schemas.microsoft.com/office/drawing/2008/diagram">
-      <dsp:dataModelExt xmlns:dsp="http://schemas.microsoft.com/office/drawing/2008/diagram" relId="rId12" minVer="http://schemas.openxmlformats.org/drawingml/2006/diagram"/>
+      <dsp:dataModelExt xmlns:dsp="http://schemas.microsoft.com/office/drawing/2008/diagram" relId="rId11" minVer="http://schemas.openxmlformats.org/drawingml/2006/diagram"/>
     </a:ext>
   </dgm:extLst>
 </dgm:dataModel>
@@ -3384,8 +3281,8 @@
       </dsp:nvSpPr>
       <dsp:spPr>
         <a:xfrm rot="5400000">
-          <a:off x="7899149" y="-4071845"/>
-          <a:ext cx="1117391" cy="9544661"/>
+          <a:off x="4600991" y="-2821883"/>
+          <a:ext cx="1084343" cy="7008102"/>
         </a:xfrm>
         <a:prstGeom prst="round2SameRect">
           <a:avLst/>
@@ -3440,7 +3337,7 @@
             <a:spcAft>
               <a:spcPct val="15000"/>
             </a:spcAft>
-            <a:buChar char="••"/>
+            <a:buChar char="•"/>
           </a:pPr>
           <a:r>
             <a:rPr lang="en-US" sz="2000" kern="1200" dirty="0"/>
@@ -3477,7 +3374,7 @@
             <a:spcAft>
               <a:spcPct val="15000"/>
             </a:spcAft>
-            <a:buChar char="••"/>
+            <a:buChar char="•"/>
           </a:pPr>
           <a:r>
             <a:rPr lang="en-US" sz="2000" kern="1200" dirty="0"/>
@@ -3505,8 +3402,8 @@
         </a:p>
       </dsp:txBody>
       <dsp:txXfrm rot="-5400000">
-        <a:off x="3685515" y="196336"/>
-        <a:ext cx="9490114" cy="1008297"/>
+        <a:off x="1639112" y="192929"/>
+        <a:ext cx="6955169" cy="978477"/>
       </dsp:txXfrm>
     </dsp:sp>
     <dsp:sp modelId="{89A3A35E-A31F-4A19-88A6-C711D22D028E}">
@@ -3516,8 +3413,8 @@
       </dsp:nvSpPr>
       <dsp:spPr>
         <a:xfrm>
-          <a:off x="652435" y="2116"/>
-          <a:ext cx="3033078" cy="1396738"/>
+          <a:off x="0" y="2116"/>
+          <a:ext cx="1828813" cy="1396730"/>
         </a:xfrm>
         <a:prstGeom prst="roundRect">
           <a:avLst/>
@@ -3547,12 +3444,12 @@
         </a:fontRef>
       </dsp:style>
       <dsp:txBody>
-        <a:bodyPr spcFirstLastPara="0" vert="horz" wrap="square" lIns="114300" tIns="57150" rIns="114300" bIns="57150" numCol="1" spcCol="1270" anchor="ctr" anchorCtr="0">
+        <a:bodyPr spcFirstLastPara="0" vert="horz" wrap="square" lIns="76200" tIns="38100" rIns="76200" bIns="38100" numCol="1" spcCol="1270" anchor="ctr" anchorCtr="0">
           <a:noAutofit/>
         </a:bodyPr>
         <a:lstStyle/>
         <a:p>
-          <a:pPr lvl="0" algn="ctr" defTabSz="1333500">
+          <a:pPr marL="0" lvl="0" indent="0" algn="ctr" defTabSz="889000">
             <a:lnSpc>
               <a:spcPct val="90000"/>
             </a:lnSpc>
@@ -3562,16 +3459,17 @@
             <a:spcAft>
               <a:spcPct val="35000"/>
             </a:spcAft>
+            <a:buNone/>
           </a:pPr>
           <a:r>
-            <a:rPr lang="en-US" sz="3000" kern="1200" dirty="0"/>
+            <a:rPr lang="en-US" sz="2000" kern="1200" dirty="0"/>
             <a:t>Using Statements</a:t>
           </a:r>
         </a:p>
       </dsp:txBody>
       <dsp:txXfrm>
-        <a:off x="720618" y="70299"/>
-        <a:ext cx="2896712" cy="1260372"/>
+        <a:off x="68183" y="70299"/>
+        <a:ext cx="1692447" cy="1260364"/>
       </dsp:txXfrm>
     </dsp:sp>
     <dsp:sp modelId="{6DA4FE5C-CB21-47E7-B0F0-9CB097B5E464}">
@@ -3581,8 +3479,8 @@
       </dsp:nvSpPr>
       <dsp:spPr>
         <a:xfrm rot="5400000">
-          <a:off x="7875659" y="-2605269"/>
-          <a:ext cx="1117391" cy="9544661"/>
+          <a:off x="4601461" y="-1298066"/>
+          <a:ext cx="1103730" cy="7047512"/>
         </a:xfrm>
         <a:prstGeom prst="round2SameRect">
           <a:avLst/>
@@ -3637,7 +3535,7 @@
             <a:spcAft>
               <a:spcPct val="15000"/>
             </a:spcAft>
-            <a:buChar char="••"/>
+            <a:buChar char="•"/>
           </a:pPr>
           <a:r>
             <a:rPr lang="en-US" sz="2000" kern="1200" dirty="0"/>
@@ -3685,7 +3583,7 @@
             <a:spcAft>
               <a:spcPct val="15000"/>
             </a:spcAft>
-            <a:buChar char="••"/>
+            <a:buChar char="•"/>
           </a:pPr>
           <a:r>
             <a:rPr lang="en-US" sz="2000" kern="1200" dirty="0"/>
@@ -3724,8 +3622,8 @@
         </a:p>
       </dsp:txBody>
       <dsp:txXfrm rot="-5400000">
-        <a:off x="3662025" y="1662912"/>
-        <a:ext cx="9490114" cy="1008297"/>
+        <a:off x="1629570" y="1727705"/>
+        <a:ext cx="6993632" cy="995970"/>
       </dsp:txXfrm>
     </dsp:sp>
     <dsp:sp modelId="{A5D97866-9099-44CF-8392-E4D04C75D305}">
@@ -3735,8 +3633,8 @@
       </dsp:nvSpPr>
       <dsp:spPr>
         <a:xfrm>
-          <a:off x="652435" y="1468692"/>
-          <a:ext cx="3009589" cy="1396738"/>
+          <a:off x="0" y="1468683"/>
+          <a:ext cx="1828813" cy="1396730"/>
         </a:xfrm>
         <a:prstGeom prst="roundRect">
           <a:avLst/>
@@ -3766,12 +3664,12 @@
         </a:fontRef>
       </dsp:style>
       <dsp:txBody>
-        <a:bodyPr spcFirstLastPara="0" vert="horz" wrap="square" lIns="114300" tIns="57150" rIns="114300" bIns="57150" numCol="1" spcCol="1270" anchor="ctr" anchorCtr="0">
+        <a:bodyPr spcFirstLastPara="0" vert="horz" wrap="square" lIns="76200" tIns="38100" rIns="76200" bIns="38100" numCol="1" spcCol="1270" anchor="ctr" anchorCtr="0">
           <a:noAutofit/>
         </a:bodyPr>
         <a:lstStyle/>
         <a:p>
-          <a:pPr lvl="0" algn="ctr" defTabSz="1333500">
+          <a:pPr marL="0" lvl="0" indent="0" algn="ctr" defTabSz="889000">
             <a:lnSpc>
               <a:spcPct val="90000"/>
             </a:lnSpc>
@@ -3781,16 +3679,17 @@
             <a:spcAft>
               <a:spcPct val="35000"/>
             </a:spcAft>
+            <a:buNone/>
           </a:pPr>
           <a:r>
-            <a:rPr lang="en-US" sz="3000" kern="1200" dirty="0"/>
+            <a:rPr lang="en-US" sz="2000" kern="1200" dirty="0"/>
             <a:t>Member Declarations</a:t>
           </a:r>
         </a:p>
       </dsp:txBody>
       <dsp:txXfrm>
-        <a:off x="720618" y="1536875"/>
-        <a:ext cx="2873223" cy="1260372"/>
+        <a:off x="68183" y="1536866"/>
+        <a:ext cx="1692447" cy="1260364"/>
       </dsp:txXfrm>
     </dsp:sp>
     <dsp:sp modelId="{94FD681E-6FED-4D1A-91A3-94D9AE5BBDC1}">
@@ -3800,8 +3699,8 @@
       </dsp:nvSpPr>
       <dsp:spPr>
         <a:xfrm rot="5400000">
-          <a:off x="7875659" y="-1138693"/>
-          <a:ext cx="1117391" cy="9544661"/>
+          <a:off x="4704395" y="117350"/>
+          <a:ext cx="975331" cy="7062702"/>
         </a:xfrm>
         <a:prstGeom prst="round2SameRect">
           <a:avLst/>
@@ -3856,7 +3755,7 @@
             <a:spcAft>
               <a:spcPct val="15000"/>
             </a:spcAft>
-            <a:buChar char="••"/>
+            <a:buChar char="•"/>
           </a:pPr>
           <a:r>
             <a:rPr lang="en-US" sz="2000" kern="1200" dirty="0"/>
@@ -3869,7 +3768,7 @@
               </a:highlight>
               <a:latin typeface="Consolas" panose="020B0609020204030204" pitchFamily="49" charset="0"/>
             </a:rPr>
-            <a:t>oldNamespace.OldClass</a:t>
+            <a:t>old.OldClass</a:t>
           </a:r>
           <a:r>
             <a:rPr lang="en-US" sz="2000" b="0" i="0" kern="1200" dirty="0">
@@ -3884,7 +3783,7 @@
               </a:highlight>
               <a:latin typeface="Consolas" panose="020B0609020204030204" pitchFamily="49" charset="0"/>
             </a:rPr>
-            <a:t>oldNamespace.OldClass</a:t>
+            <a:t>old.OldClass</a:t>
           </a:r>
           <a:r>
             <a:rPr lang="en-US" sz="2000" b="0" i="0" kern="1200" dirty="0">
@@ -3904,7 +3803,7 @@
             <a:spcAft>
               <a:spcPct val="15000"/>
             </a:spcAft>
-            <a:buChar char="••"/>
+            <a:buChar char="•"/>
           </a:pPr>
           <a:r>
             <a:rPr lang="en-US" sz="2000" kern="1200" dirty="0"/>
@@ -3917,7 +3816,7 @@
               </a:highlight>
               <a:latin typeface="Consolas" panose="020B0609020204030204" pitchFamily="49" charset="0"/>
             </a:rPr>
-            <a:t>newNamespace.NewClass</a:t>
+            <a:t>new.NewClass</a:t>
           </a:r>
           <a:r>
             <a:rPr lang="en-US" sz="2000" b="0" i="0" kern="1200" dirty="0">
@@ -3932,7 +3831,7 @@
               </a:highlight>
               <a:latin typeface="Consolas" panose="020B0609020204030204" pitchFamily="49" charset="0"/>
             </a:rPr>
-            <a:t>newNamespace.NewClass</a:t>
+            <a:t>new.NewClass</a:t>
           </a:r>
           <a:r>
             <a:rPr lang="en-US" sz="2000" b="0" i="0" kern="1200" dirty="0">
@@ -3943,8 +3842,8 @@
         </a:p>
       </dsp:txBody>
       <dsp:txXfrm rot="-5400000">
-        <a:off x="3662025" y="3129488"/>
-        <a:ext cx="9490114" cy="1008297"/>
+        <a:off x="1660710" y="3208647"/>
+        <a:ext cx="7015090" cy="880107"/>
       </dsp:txXfrm>
     </dsp:sp>
     <dsp:sp modelId="{A578B4B1-012F-4704-840D-D9A1F6815359}">
@@ -3954,8 +3853,8 @@
       </dsp:nvSpPr>
       <dsp:spPr>
         <a:xfrm>
-          <a:off x="652435" y="2935267"/>
-          <a:ext cx="3009589" cy="1396738"/>
+          <a:off x="0" y="2935250"/>
+          <a:ext cx="1828813" cy="1396730"/>
         </a:xfrm>
         <a:prstGeom prst="roundRect">
           <a:avLst/>
@@ -3985,12 +3884,12 @@
         </a:fontRef>
       </dsp:style>
       <dsp:txBody>
-        <a:bodyPr spcFirstLastPara="0" vert="horz" wrap="square" lIns="114300" tIns="57150" rIns="114300" bIns="57150" numCol="1" spcCol="1270" anchor="ctr" anchorCtr="0">
+        <a:bodyPr spcFirstLastPara="0" vert="horz" wrap="square" lIns="76200" tIns="38100" rIns="76200" bIns="38100" numCol="1" spcCol="1270" anchor="ctr" anchorCtr="0">
           <a:noAutofit/>
         </a:bodyPr>
         <a:lstStyle/>
         <a:p>
-          <a:pPr lvl="0" algn="ctr" defTabSz="1333500">
+          <a:pPr marL="0" lvl="0" indent="0" algn="ctr" defTabSz="889000">
             <a:lnSpc>
               <a:spcPct val="90000"/>
             </a:lnSpc>
@@ -4000,16 +3899,17 @@
             <a:spcAft>
               <a:spcPct val="35000"/>
             </a:spcAft>
+            <a:buNone/>
           </a:pPr>
           <a:r>
-            <a:rPr lang="en-US" sz="3000" kern="1200" dirty="0"/>
+            <a:rPr lang="en-US" sz="2000" kern="1200" dirty="0"/>
             <a:t>Fully Qualified Names</a:t>
           </a:r>
         </a:p>
       </dsp:txBody>
       <dsp:txXfrm>
-        <a:off x="720618" y="3003450"/>
-        <a:ext cx="2873223" cy="1260372"/>
+        <a:off x="68183" y="3003433"/>
+        <a:ext cx="1692447" cy="1260364"/>
       </dsp:txXfrm>
     </dsp:sp>
   </dsp:spTree>
@@ -4031,7 +3931,7 @@
       </dsp:nvSpPr>
       <dsp:spPr>
         <a:xfrm rot="5400000">
-          <a:off x="7798193" y="-3283422"/>
+          <a:off x="5221231" y="-3283422"/>
           <a:ext cx="984733" cy="7802880"/>
         </a:xfrm>
         <a:prstGeom prst="round2SameRect">
@@ -4087,7 +3987,7 @@
             <a:spcAft>
               <a:spcPct val="15000"/>
             </a:spcAft>
-            <a:buChar char="••"/>
+            <a:buChar char="•"/>
           </a:pPr>
           <a:r>
             <a:rPr lang="en-US" sz="2000" kern="1200" dirty="0"/>
@@ -4138,7 +4038,7 @@
             <a:spcAft>
               <a:spcPct val="15000"/>
             </a:spcAft>
-            <a:buChar char="••"/>
+            <a:buChar char="•"/>
           </a:pPr>
           <a:r>
             <a:rPr lang="en-US" sz="2000" kern="1200" dirty="0"/>
@@ -4180,7 +4080,7 @@
         </a:p>
       </dsp:txBody>
       <dsp:txXfrm rot="-5400000">
-        <a:off x="4389120" y="173722"/>
+        <a:off x="1812158" y="173722"/>
         <a:ext cx="7754809" cy="888591"/>
       </dsp:txXfrm>
     </dsp:sp>
@@ -4191,8 +4091,8 @@
       </dsp:nvSpPr>
       <dsp:spPr>
         <a:xfrm>
-          <a:off x="0" y="0"/>
-          <a:ext cx="4389120" cy="1230916"/>
+          <a:off x="12" y="0"/>
+          <a:ext cx="1828814" cy="1230916"/>
         </a:xfrm>
         <a:prstGeom prst="roundRect">
           <a:avLst/>
@@ -4222,12 +4122,12 @@
         </a:fontRef>
       </dsp:style>
       <dsp:txBody>
-        <a:bodyPr spcFirstLastPara="0" vert="horz" wrap="square" lIns="114300" tIns="57150" rIns="114300" bIns="57150" numCol="1" spcCol="1270" anchor="ctr" anchorCtr="0">
+        <a:bodyPr spcFirstLastPara="0" vert="horz" wrap="square" lIns="76200" tIns="38100" rIns="76200" bIns="38100" numCol="1" spcCol="1270" anchor="ctr" anchorCtr="0">
           <a:noAutofit/>
         </a:bodyPr>
         <a:lstStyle/>
         <a:p>
-          <a:pPr lvl="0" algn="ctr" defTabSz="1333500">
+          <a:pPr marL="0" lvl="0" indent="0" algn="ctr" defTabSz="889000">
             <a:lnSpc>
               <a:spcPct val="90000"/>
             </a:lnSpc>
@@ -4237,16 +4137,17 @@
             <a:spcAft>
               <a:spcPct val="35000"/>
             </a:spcAft>
+            <a:buNone/>
           </a:pPr>
           <a:r>
-            <a:rPr lang="en-US" sz="3000" kern="1200" dirty="0"/>
+            <a:rPr lang="en-US" sz="2000" kern="1200" dirty="0"/>
             <a:t>Aliases</a:t>
           </a:r>
         </a:p>
       </dsp:txBody>
       <dsp:txXfrm>
-        <a:off x="60088" y="60088"/>
-        <a:ext cx="4268944" cy="1110740"/>
+        <a:off x="60100" y="60088"/>
+        <a:ext cx="1708638" cy="1110740"/>
       </dsp:txXfrm>
     </dsp:sp>
     <dsp:sp modelId="{D510B8BF-35DE-4934-9EDD-BB2C766C9B1D}">
@@ -4256,7 +4157,7 @@
       </dsp:nvSpPr>
       <dsp:spPr>
         <a:xfrm rot="5400000">
-          <a:off x="7798193" y="-1990960"/>
+          <a:off x="5221231" y="-1990960"/>
           <a:ext cx="984733" cy="7802880"/>
         </a:xfrm>
         <a:prstGeom prst="round2SameRect">
@@ -4312,7 +4213,7 @@
             <a:spcAft>
               <a:spcPct val="15000"/>
             </a:spcAft>
-            <a:buChar char="••"/>
+            <a:buChar char="•"/>
           </a:pPr>
           <a:r>
             <a:rPr lang="en-US" sz="2000" kern="1200" dirty="0"/>
@@ -4357,7 +4258,7 @@
             <a:spcAft>
               <a:spcPct val="15000"/>
             </a:spcAft>
-            <a:buChar char="••"/>
+            <a:buChar char="•"/>
           </a:pPr>
           <a:r>
             <a:rPr lang="en-US" sz="2000" kern="1200" dirty="0"/>
@@ -4393,7 +4294,7 @@
         </a:p>
       </dsp:txBody>
       <dsp:txXfrm rot="-5400000">
-        <a:off x="4389120" y="1466184"/>
+        <a:off x="1812158" y="1466184"/>
         <a:ext cx="7754809" cy="888591"/>
       </dsp:txXfrm>
     </dsp:sp>
@@ -4404,8 +4305,8 @@
       </dsp:nvSpPr>
       <dsp:spPr>
         <a:xfrm>
-          <a:off x="0" y="1295021"/>
-          <a:ext cx="4389120" cy="1230916"/>
+          <a:off x="12" y="1295021"/>
+          <a:ext cx="1828814" cy="1230916"/>
         </a:xfrm>
         <a:prstGeom prst="roundRect">
           <a:avLst/>
@@ -4435,12 +4336,12 @@
         </a:fontRef>
       </dsp:style>
       <dsp:txBody>
-        <a:bodyPr spcFirstLastPara="0" vert="horz" wrap="square" lIns="114300" tIns="57150" rIns="114300" bIns="57150" numCol="1" spcCol="1270" anchor="ctr" anchorCtr="0">
+        <a:bodyPr spcFirstLastPara="0" vert="horz" wrap="square" lIns="76200" tIns="38100" rIns="76200" bIns="38100" numCol="1" spcCol="1270" anchor="ctr" anchorCtr="0">
           <a:noAutofit/>
         </a:bodyPr>
         <a:lstStyle/>
         <a:p>
-          <a:pPr lvl="0" algn="ctr" defTabSz="1333500">
+          <a:pPr marL="0" lvl="0" indent="0" algn="ctr" defTabSz="889000">
             <a:lnSpc>
               <a:spcPct val="90000"/>
             </a:lnSpc>
@@ -4450,16 +4351,17 @@
             <a:spcAft>
               <a:spcPct val="35000"/>
             </a:spcAft>
+            <a:buNone/>
           </a:pPr>
           <a:r>
-            <a:rPr lang="en-US" sz="3000" kern="1200" dirty="0"/>
+            <a:rPr lang="en-US" sz="2000" kern="1200" dirty="0"/>
             <a:t>Casting</a:t>
           </a:r>
         </a:p>
       </dsp:txBody>
       <dsp:txXfrm>
-        <a:off x="60088" y="1355109"/>
-        <a:ext cx="4268944" cy="1110740"/>
+        <a:off x="60100" y="1355109"/>
+        <a:ext cx="1708638" cy="1110740"/>
       </dsp:txXfrm>
     </dsp:sp>
     <dsp:sp modelId="{37B4A69E-BEAA-483D-A27B-B8066514DC2A}">
@@ -4469,7 +4371,7 @@
       </dsp:nvSpPr>
       <dsp:spPr>
         <a:xfrm rot="5400000">
-          <a:off x="7798193" y="-698498"/>
+          <a:off x="5221231" y="-698498"/>
           <a:ext cx="984733" cy="7802880"/>
         </a:xfrm>
         <a:prstGeom prst="round2SameRect">
@@ -4525,7 +4427,7 @@
             <a:spcAft>
               <a:spcPct val="15000"/>
             </a:spcAft>
-            <a:buChar char="••"/>
+            <a:buChar char="•"/>
           </a:pPr>
           <a:r>
             <a:rPr lang="en-US" sz="2000" kern="1200" dirty="0"/>
@@ -4564,7 +4466,7 @@
             <a:spcAft>
               <a:spcPct val="15000"/>
             </a:spcAft>
-            <a:buChar char="••"/>
+            <a:buChar char="•"/>
           </a:pPr>
           <a:r>
             <a:rPr lang="en-US" sz="2000" kern="1200" dirty="0"/>
@@ -4594,7 +4496,7 @@
         </a:p>
       </dsp:txBody>
       <dsp:txXfrm rot="-5400000">
-        <a:off x="4389120" y="2758646"/>
+        <a:off x="1812158" y="2758646"/>
         <a:ext cx="7754809" cy="888591"/>
       </dsp:txXfrm>
     </dsp:sp>
@@ -4605,8 +4507,8 @@
       </dsp:nvSpPr>
       <dsp:spPr>
         <a:xfrm>
-          <a:off x="0" y="2587483"/>
-          <a:ext cx="4389120" cy="1230916"/>
+          <a:off x="12" y="2587483"/>
+          <a:ext cx="1828814" cy="1230916"/>
         </a:xfrm>
         <a:prstGeom prst="roundRect">
           <a:avLst/>
@@ -4636,12 +4538,12 @@
         </a:fontRef>
       </dsp:style>
       <dsp:txBody>
-        <a:bodyPr spcFirstLastPara="0" vert="horz" wrap="square" lIns="114300" tIns="57150" rIns="114300" bIns="57150" numCol="1" spcCol="1270" anchor="ctr" anchorCtr="0">
+        <a:bodyPr spcFirstLastPara="0" vert="horz" wrap="square" lIns="76200" tIns="38100" rIns="76200" bIns="38100" numCol="1" spcCol="1270" anchor="ctr" anchorCtr="0">
           <a:noAutofit/>
         </a:bodyPr>
         <a:lstStyle/>
         <a:p>
-          <a:pPr lvl="0" algn="ctr" defTabSz="1333500">
+          <a:pPr marL="0" lvl="0" indent="0" algn="ctr" defTabSz="889000">
             <a:lnSpc>
               <a:spcPct val="90000"/>
             </a:lnSpc>
@@ -4651,16 +4553,17 @@
             <a:spcAft>
               <a:spcPct val="35000"/>
             </a:spcAft>
+            <a:buNone/>
           </a:pPr>
           <a:r>
-            <a:rPr lang="en-US" sz="3000" kern="1200" dirty="0"/>
+            <a:rPr lang="en-US" sz="2000" kern="1200" dirty="0"/>
             <a:t>Class extensions</a:t>
           </a:r>
         </a:p>
       </dsp:txBody>
       <dsp:txXfrm>
-        <a:off x="60088" y="2647571"/>
-        <a:ext cx="4268944" cy="1110740"/>
+        <a:off x="60100" y="2647571"/>
+        <a:ext cx="1708638" cy="1110740"/>
       </dsp:txXfrm>
     </dsp:sp>
     <dsp:sp modelId="{3248EAB6-7CD9-4AF4-8610-E82B5A9C2B0F}">
@@ -4670,7 +4573,7 @@
       </dsp:nvSpPr>
       <dsp:spPr>
         <a:xfrm rot="5400000">
-          <a:off x="7798193" y="593963"/>
+          <a:off x="5222635" y="617853"/>
           <a:ext cx="984733" cy="7802880"/>
         </a:xfrm>
         <a:prstGeom prst="round2SameRect">
@@ -4726,7 +4629,7 @@
             <a:spcAft>
               <a:spcPct val="15000"/>
             </a:spcAft>
-            <a:buChar char="••"/>
+            <a:buChar char="•"/>
           </a:pPr>
           <a:r>
             <a:rPr lang="en-US" sz="2000" kern="1200" dirty="0"/>
@@ -4792,7 +4695,7 @@
             <a:spcAft>
               <a:spcPct val="15000"/>
             </a:spcAft>
-            <a:buChar char="••"/>
+            <a:buChar char="•"/>
           </a:pPr>
           <a:r>
             <a:rPr lang="en-US" sz="2000" kern="1200" dirty="0"/>
@@ -4849,7 +4752,7 @@
         </a:p>
       </dsp:txBody>
       <dsp:txXfrm rot="-5400000">
-        <a:off x="4389120" y="4051108"/>
+        <a:off x="1813562" y="4074998"/>
         <a:ext cx="7754809" cy="888591"/>
       </dsp:txXfrm>
     </dsp:sp>
@@ -4860,8 +4763,8 @@
       </dsp:nvSpPr>
       <dsp:spPr>
         <a:xfrm>
-          <a:off x="0" y="3879945"/>
-          <a:ext cx="4389120" cy="1230916"/>
+          <a:off x="12" y="3879945"/>
+          <a:ext cx="1828814" cy="1230916"/>
         </a:xfrm>
         <a:prstGeom prst="roundRect">
           <a:avLst/>
@@ -4891,12 +4794,12 @@
         </a:fontRef>
       </dsp:style>
       <dsp:txBody>
-        <a:bodyPr spcFirstLastPara="0" vert="horz" wrap="square" lIns="114300" tIns="57150" rIns="114300" bIns="57150" numCol="1" spcCol="1270" anchor="ctr" anchorCtr="0">
+        <a:bodyPr spcFirstLastPara="0" vert="horz" wrap="square" lIns="76200" tIns="38100" rIns="76200" bIns="38100" numCol="1" spcCol="1270" anchor="ctr" anchorCtr="0">
           <a:noAutofit/>
         </a:bodyPr>
         <a:lstStyle/>
         <a:p>
-          <a:pPr lvl="0" algn="ctr" defTabSz="1333500">
+          <a:pPr marL="0" lvl="0" indent="0" algn="ctr" defTabSz="889000">
             <a:lnSpc>
               <a:spcPct val="90000"/>
             </a:lnSpc>
@@ -4906,16 +4809,17 @@
             <a:spcAft>
               <a:spcPct val="35000"/>
             </a:spcAft>
+            <a:buNone/>
           </a:pPr>
           <a:r>
-            <a:rPr lang="en-US" sz="3000" kern="1200" dirty="0"/>
+            <a:rPr lang="en-US" sz="2000" kern="1200" dirty="0"/>
             <a:t>Method parameters and return types</a:t>
           </a:r>
         </a:p>
       </dsp:txBody>
       <dsp:txXfrm>
-        <a:off x="60088" y="3940033"/>
-        <a:ext cx="4268944" cy="1110740"/>
+        <a:off x="60100" y="3940033"/>
+        <a:ext cx="1708638" cy="1110740"/>
       </dsp:txXfrm>
     </dsp:sp>
   </dsp:spTree>
@@ -7587,7 +7491,7 @@
           <a:p>
             <a:fld id="{A571AFFD-B6CA-41D9-95E6-3CB99A4967AC}" type="datetimeFigureOut">
               <a:rPr lang="en-US" smtClean="0"/>
-              <a:t>4/24/2017</a:t>
+              <a:t>4/25/2017</a:t>
             </a:fld>
             <a:endParaRPr lang="en-US"/>
           </a:p>
@@ -7757,7 +7661,7 @@
           <a:p>
             <a:fld id="{A571AFFD-B6CA-41D9-95E6-3CB99A4967AC}" type="datetimeFigureOut">
               <a:rPr lang="en-US" smtClean="0"/>
-              <a:t>4/24/2017</a:t>
+              <a:t>4/25/2017</a:t>
             </a:fld>
             <a:endParaRPr lang="en-US"/>
           </a:p>
@@ -7937,7 +7841,7 @@
           <a:p>
             <a:fld id="{A571AFFD-B6CA-41D9-95E6-3CB99A4967AC}" type="datetimeFigureOut">
               <a:rPr lang="en-US" smtClean="0"/>
-              <a:t>4/24/2017</a:t>
+              <a:t>4/25/2017</a:t>
             </a:fld>
             <a:endParaRPr lang="en-US"/>
           </a:p>
@@ -8107,7 +8011,7 @@
           <a:p>
             <a:fld id="{A571AFFD-B6CA-41D9-95E6-3CB99A4967AC}" type="datetimeFigureOut">
               <a:rPr lang="en-US" smtClean="0"/>
-              <a:t>4/24/2017</a:t>
+              <a:t>4/25/2017</a:t>
             </a:fld>
             <a:endParaRPr lang="en-US"/>
           </a:p>
@@ -8351,7 +8255,7 @@
           <a:p>
             <a:fld id="{A571AFFD-B6CA-41D9-95E6-3CB99A4967AC}" type="datetimeFigureOut">
               <a:rPr lang="en-US" smtClean="0"/>
-              <a:t>4/24/2017</a:t>
+              <a:t>4/25/2017</a:t>
             </a:fld>
             <a:endParaRPr lang="en-US"/>
           </a:p>
@@ -8583,7 +8487,7 @@
           <a:p>
             <a:fld id="{A571AFFD-B6CA-41D9-95E6-3CB99A4967AC}" type="datetimeFigureOut">
               <a:rPr lang="en-US" smtClean="0"/>
-              <a:t>4/24/2017</a:t>
+              <a:t>4/25/2017</a:t>
             </a:fld>
             <a:endParaRPr lang="en-US"/>
           </a:p>
@@ -8950,7 +8854,7 @@
           <a:p>
             <a:fld id="{A571AFFD-B6CA-41D9-95E6-3CB99A4967AC}" type="datetimeFigureOut">
               <a:rPr lang="en-US" smtClean="0"/>
-              <a:t>4/24/2017</a:t>
+              <a:t>4/25/2017</a:t>
             </a:fld>
             <a:endParaRPr lang="en-US"/>
           </a:p>
@@ -9068,7 +8972,7 @@
           <a:p>
             <a:fld id="{A571AFFD-B6CA-41D9-95E6-3CB99A4967AC}" type="datetimeFigureOut">
               <a:rPr lang="en-US" smtClean="0"/>
-              <a:t>4/24/2017</a:t>
+              <a:t>4/25/2017</a:t>
             </a:fld>
             <a:endParaRPr lang="en-US"/>
           </a:p>
@@ -9163,7 +9067,7 @@
           <a:p>
             <a:fld id="{A571AFFD-B6CA-41D9-95E6-3CB99A4967AC}" type="datetimeFigureOut">
               <a:rPr lang="en-US" smtClean="0"/>
-              <a:t>4/24/2017</a:t>
+              <a:t>4/25/2017</a:t>
             </a:fld>
             <a:endParaRPr lang="en-US"/>
           </a:p>
@@ -9440,7 +9344,7 @@
           <a:p>
             <a:fld id="{A571AFFD-B6CA-41D9-95E6-3CB99A4967AC}" type="datetimeFigureOut">
               <a:rPr lang="en-US" smtClean="0"/>
-              <a:t>4/24/2017</a:t>
+              <a:t>4/25/2017</a:t>
             </a:fld>
             <a:endParaRPr lang="en-US"/>
           </a:p>
@@ -9697,7 +9601,7 @@
           <a:p>
             <a:fld id="{A571AFFD-B6CA-41D9-95E6-3CB99A4967AC}" type="datetimeFigureOut">
               <a:rPr lang="en-US" smtClean="0"/>
-              <a:t>4/24/2017</a:t>
+              <a:t>4/25/2017</a:t>
             </a:fld>
             <a:endParaRPr lang="en-US"/>
           </a:p>
@@ -9910,7 +9814,7 @@
           <a:p>
             <a:fld id="{A571AFFD-B6CA-41D9-95E6-3CB99A4967AC}" type="datetimeFigureOut">
               <a:rPr lang="en-US" smtClean="0"/>
-              <a:t>4/24/2017</a:t>
+              <a:t>4/25/2017</a:t>
             </a:fld>
             <a:endParaRPr lang="en-US"/>
           </a:p>
@@ -10345,36 +10249,6 @@
           <a:chExt cx="0" cy="0"/>
         </a:xfrm>
       </p:grpSpPr>
-      <p:pic>
-        <p:nvPicPr>
-          <p:cNvPr id="25" name="Picture 24"/>
-          <p:cNvPicPr>
-            <a:picLocks noChangeAspect="1"/>
-          </p:cNvPicPr>
-          <p:nvPr/>
-        </p:nvPicPr>
-        <p:blipFill>
-          <a:blip r:embed="rId2">
-            <a:extLst>
-              <a:ext uri="{28A0092B-C50C-407E-A947-70E740481C1C}">
-                <a14:useLocalDpi xmlns:a14="http://schemas.microsoft.com/office/drawing/2010/main" val="0"/>
-              </a:ext>
-            </a:extLst>
-          </a:blip>
-          <a:stretch>
-            <a:fillRect/>
-          </a:stretch>
-        </p:blipFill>
-        <p:spPr>
-          <a:xfrm>
-            <a:off x="24626495" y="8298867"/>
-            <a:ext cx="11504254" cy="5800349"/>
-          </a:xfrm>
-          <a:prstGeom prst="rect">
-            <a:avLst/>
-          </a:prstGeom>
-        </p:spPr>
-      </p:pic>
       <p:sp>
         <p:nvSpPr>
           <p:cNvPr id="5" name="TextBox 4"/>
@@ -10417,7 +10291,7 @@
         <p:spPr>
           <a:xfrm>
             <a:off x="390731" y="3814704"/>
-            <a:ext cx="8722453" cy="7294305"/>
+            <a:ext cx="8722453" cy="5632311"/>
           </a:xfrm>
           <a:prstGeom prst="rect">
             <a:avLst/>
@@ -10436,7 +10310,7 @@
             </a:pPr>
             <a:r>
               <a:rPr lang="en-US" sz="3600" dirty="0"/>
-              <a:t>Fujitsu develops C# and Visual Basic SDKs that clients use, but some of the SDKs are being refactored</a:t>
+              <a:t>Fujitsu is refactoring C# and Visual Basic SDKs that clients use</a:t>
             </a:r>
           </a:p>
           <a:p>
@@ -10488,7 +10362,7 @@
             </a:pPr>
             <a:r>
               <a:rPr lang="en-US" sz="3600" dirty="0"/>
-              <a:t>In the refactored SDKs, some of these artifacts may have changed. If a client tries to use the new SDK with their existing project, then their project will not compile</a:t>
+              <a:t>Client projects won’t compile with the new SDKs because artifacts changed</a:t>
             </a:r>
           </a:p>
           <a:p>
@@ -10498,7 +10372,7 @@
             </a:pPr>
             <a:r>
               <a:rPr lang="en-US" sz="3600" dirty="0"/>
-              <a:t>Our project automates changing client source code and project files to use artifacts from the new SDKs</a:t>
+              <a:t>Our project automates changing client source code and project files to the new SDK artifacts</a:t>
             </a:r>
           </a:p>
         </p:txBody>
@@ -10511,8 +10385,8 @@
         </p:nvSpPr>
         <p:spPr>
           <a:xfrm>
-            <a:off x="32298134" y="8867715"/>
-            <a:ext cx="2698175" cy="1023037"/>
+            <a:off x="13899997" y="19990458"/>
+            <a:ext cx="2868540" cy="1023037"/>
           </a:xfrm>
           <a:prstGeom prst="rect">
             <a:avLst/>
@@ -10520,7 +10394,7 @@
           <a:noFill/>
         </p:spPr>
         <p:txBody>
-          <a:bodyPr wrap="none" rtlCol="0">
+          <a:bodyPr wrap="square" rtlCol="0">
             <a:spAutoFit/>
           </a:bodyPr>
           <a:lstStyle/>
@@ -10540,7 +10414,7 @@
         </p:nvSpPr>
         <p:spPr>
           <a:xfrm>
-            <a:off x="16970838" y="17303627"/>
+            <a:off x="25444800" y="6952771"/>
             <a:ext cx="2363578" cy="1023037"/>
           </a:xfrm>
           <a:prstGeom prst="rect">
@@ -10561,30 +10435,6 @@
           </a:p>
         </p:txBody>
       </p:sp>
-      <p:graphicFrame>
-        <p:nvGraphicFramePr>
-          <p:cNvPr id="20" name="Content Placeholder 3"/>
-          <p:cNvGraphicFramePr>
-            <a:graphicFrameLocks/>
-          </p:cNvGraphicFramePr>
-          <p:nvPr>
-            <p:extLst>
-              <p:ext uri="{D42A27DB-BD31-4B8C-83A1-F6EECF244321}">
-                <p14:modId xmlns:p14="http://schemas.microsoft.com/office/powerpoint/2010/main" val="3377572275"/>
-              </p:ext>
-            </p:extLst>
-          </p:nvPr>
-        </p:nvGraphicFramePr>
-        <p:xfrm>
-          <a:off x="9113184" y="3357829"/>
-          <a:ext cx="13882611" cy="4334123"/>
-        </p:xfrm>
-        <a:graphic>
-          <a:graphicData uri="http://schemas.openxmlformats.org/drawingml/2006/diagram">
-            <dgm:relIds xmlns:dgm="http://schemas.openxmlformats.org/drawingml/2006/diagram" xmlns:r="http://schemas.openxmlformats.org/officeDocument/2006/relationships" r:dm="rId3" r:lo="rId4" r:qs="rId5" r:cs="rId6"/>
-          </a:graphicData>
-        </a:graphic>
-      </p:graphicFrame>
       <p:sp>
         <p:nvSpPr>
           <p:cNvPr id="21" name="TextBox 20"/>
@@ -10593,7 +10443,7 @@
         </p:nvSpPr>
         <p:spPr>
           <a:xfrm>
-            <a:off x="13657686" y="2224887"/>
+            <a:off x="183567" y="10857818"/>
             <a:ext cx="7035837" cy="1023037"/>
           </a:xfrm>
           <a:prstGeom prst="rect">
@@ -10614,30 +10464,69 @@
           </a:p>
         </p:txBody>
       </p:sp>
-      <p:graphicFrame>
-        <p:nvGraphicFramePr>
-          <p:cNvPr id="22" name="Content Placeholder 4"/>
-          <p:cNvGraphicFramePr>
-            <a:graphicFrameLocks/>
-          </p:cNvGraphicFramePr>
-          <p:nvPr>
-            <p:extLst>
-              <p:ext uri="{D42A27DB-BD31-4B8C-83A1-F6EECF244321}">
-                <p14:modId xmlns:p14="http://schemas.microsoft.com/office/powerpoint/2010/main" val="3560934225"/>
-              </p:ext>
-            </p:extLst>
-          </p:nvPr>
-        </p:nvGraphicFramePr>
-        <p:xfrm>
-          <a:off x="22995795" y="2584162"/>
-          <a:ext cx="12192000" cy="5113421"/>
-        </p:xfrm>
-        <a:graphic>
-          <a:graphicData uri="http://schemas.openxmlformats.org/drawingml/2006/diagram">
-            <dgm:relIds xmlns:dgm="http://schemas.openxmlformats.org/drawingml/2006/diagram" xmlns:r="http://schemas.openxmlformats.org/officeDocument/2006/relationships" r:dm="rId8" r:lo="rId9" r:qs="rId10" r:cs="rId11"/>
-          </a:graphicData>
-        </a:graphic>
-      </p:graphicFrame>
+      <p:grpSp>
+        <p:nvGrpSpPr>
+          <p:cNvPr id="2" name="Group 1"/>
+          <p:cNvGrpSpPr/>
+          <p:nvPr/>
+        </p:nvGrpSpPr>
+        <p:grpSpPr>
+          <a:xfrm>
+            <a:off x="64931" y="14702655"/>
+            <a:ext cx="13185657" cy="9629399"/>
+            <a:chOff x="64931" y="14898597"/>
+            <a:chExt cx="13185657" cy="9629399"/>
+          </a:xfrm>
+        </p:grpSpPr>
+        <p:graphicFrame>
+          <p:nvGraphicFramePr>
+            <p:cNvPr id="20" name="Content Placeholder 3"/>
+            <p:cNvGraphicFramePr>
+              <a:graphicFrameLocks/>
+            </p:cNvGraphicFramePr>
+            <p:nvPr>
+              <p:extLst>
+                <p:ext uri="{D42A27DB-BD31-4B8C-83A1-F6EECF244321}">
+                  <p14:modId xmlns:p14="http://schemas.microsoft.com/office/powerpoint/2010/main" val="3289948800"/>
+                </p:ext>
+              </p:extLst>
+            </p:nvPr>
+          </p:nvGraphicFramePr>
+          <p:xfrm>
+            <a:off x="64931" y="14898597"/>
+            <a:ext cx="13185657" cy="4334098"/>
+          </p:xfrm>
+          <a:graphic>
+            <a:graphicData uri="http://schemas.openxmlformats.org/drawingml/2006/diagram">
+              <dgm:relIds xmlns:dgm="http://schemas.openxmlformats.org/drawingml/2006/diagram" xmlns:r="http://schemas.openxmlformats.org/officeDocument/2006/relationships" r:dm="rId2" r:lo="rId3" r:qs="rId4" r:cs="rId5"/>
+            </a:graphicData>
+          </a:graphic>
+        </p:graphicFrame>
+        <p:graphicFrame>
+          <p:nvGraphicFramePr>
+            <p:cNvPr id="22" name="Content Placeholder 4"/>
+            <p:cNvGraphicFramePr>
+              <a:graphicFrameLocks/>
+            </p:cNvGraphicFramePr>
+            <p:nvPr>
+              <p:extLst>
+                <p:ext uri="{D42A27DB-BD31-4B8C-83A1-F6EECF244321}">
+                  <p14:modId xmlns:p14="http://schemas.microsoft.com/office/powerpoint/2010/main" val="2760366010"/>
+                </p:ext>
+              </p:extLst>
+            </p:nvPr>
+          </p:nvGraphicFramePr>
+          <p:xfrm>
+            <a:off x="64931" y="19414575"/>
+            <a:ext cx="12192000" cy="5113421"/>
+          </p:xfrm>
+          <a:graphic>
+            <a:graphicData uri="http://schemas.openxmlformats.org/drawingml/2006/diagram">
+              <dgm:relIds xmlns:dgm="http://schemas.openxmlformats.org/drawingml/2006/diagram" xmlns:r="http://schemas.openxmlformats.org/officeDocument/2006/relationships" r:dm="rId7" r:lo="rId8" r:qs="rId9" r:cs="rId10"/>
+            </a:graphicData>
+          </a:graphic>
+        </p:graphicFrame>
+      </p:grpSp>
       <p:pic>
         <p:nvPicPr>
           <p:cNvPr id="36" name="Picture 35"/>
@@ -10647,7 +10536,7 @@
           <p:nvPr/>
         </p:nvPicPr>
         <p:blipFill>
-          <a:blip r:embed="rId13" cstate="print">
+          <a:blip r:embed="rId12" cstate="print">
             <a:extLst>
               <a:ext uri="{28A0092B-C50C-407E-A947-70E740481C1C}">
                 <a14:useLocalDpi xmlns:a14="http://schemas.microsoft.com/office/drawing/2010/main" val="0"/>
@@ -10660,8 +10549,8 @@
         </p:blipFill>
         <p:spPr>
           <a:xfrm>
-            <a:off x="64931" y="26210248"/>
-            <a:ext cx="3082147" cy="1221752"/>
+            <a:off x="64931" y="25892412"/>
+            <a:ext cx="3883961" cy="1539588"/>
           </a:xfrm>
           <a:prstGeom prst="rect">
             <a:avLst/>
@@ -10735,7 +10624,7 @@
             <a:pPr algn="ctr"/>
             <a:r>
               <a:rPr lang="en-US" sz="8000" b="1" dirty="0"/>
-              <a:t>Marketplace Migration and Refactoring</a:t>
+              <a:t>Marketplace Migration &amp; Refactoring</a:t>
             </a:r>
           </a:p>
         </p:txBody>
@@ -10783,7 +10672,7 @@
         </p:nvSpPr>
         <p:spPr>
           <a:xfrm>
-            <a:off x="6504138" y="12954224"/>
+            <a:off x="13350917" y="6862624"/>
             <a:ext cx="3054041" cy="1023037"/>
           </a:xfrm>
           <a:prstGeom prst="rect">
@@ -10812,7 +10701,7 @@
         </p:nvSpPr>
         <p:spPr>
           <a:xfrm>
-            <a:off x="14786015" y="12569730"/>
+            <a:off x="10220089" y="2235336"/>
             <a:ext cx="4644748" cy="1023037"/>
           </a:xfrm>
           <a:prstGeom prst="rect">
@@ -10842,7 +10731,7 @@
           <p:nvPr/>
         </p:nvPicPr>
         <p:blipFill>
-          <a:blip r:embed="rId14" cstate="print">
+          <a:blip r:embed="rId13" cstate="print">
             <a:extLst>
               <a:ext uri="{28A0092B-C50C-407E-A947-70E740481C1C}">
                 <a14:useLocalDpi xmlns:a14="http://schemas.microsoft.com/office/drawing/2010/main" val="0"/>
@@ -10871,8 +10760,8 @@
         </p:nvSpPr>
         <p:spPr>
           <a:xfrm>
-            <a:off x="10106629" y="8004892"/>
-            <a:ext cx="9643801" cy="1200329"/>
+            <a:off x="183567" y="12626682"/>
+            <a:ext cx="8193939" cy="1200329"/>
           </a:xfrm>
           <a:prstGeom prst="rect">
             <a:avLst/>
@@ -10887,7 +10776,7 @@
           <a:p>
             <a:r>
               <a:rPr lang="en-US" sz="3600" dirty="0"/>
-              <a:t>We generalized the changes for all cases of source code artifacts. Examples above</a:t>
+              <a:t>We generalized the changes for all cases of source code artifacts. Examples include:</a:t>
             </a:r>
           </a:p>
         </p:txBody>
@@ -10900,8 +10789,8 @@
         </p:nvSpPr>
         <p:spPr>
           <a:xfrm>
-            <a:off x="16585772" y="18587605"/>
-            <a:ext cx="8171548" cy="2862322"/>
+            <a:off x="24921282" y="8240657"/>
+            <a:ext cx="11140567" cy="2308324"/>
           </a:xfrm>
           <a:prstGeom prst="rect">
             <a:avLst/>
@@ -10940,41 +10829,11 @@
             </a:pPr>
             <a:r>
               <a:rPr lang="en-US" sz="3600" dirty="0"/>
-              <a:t>Allows developers to easily make changes to source code</a:t>
+              <a:t>Allows developers to programmatically make changes to source code</a:t>
             </a:r>
           </a:p>
         </p:txBody>
       </p:sp>
-      <p:pic>
-        <p:nvPicPr>
-          <p:cNvPr id="9" name="Picture 8"/>
-          <p:cNvPicPr>
-            <a:picLocks noChangeAspect="1"/>
-          </p:cNvPicPr>
-          <p:nvPr/>
-        </p:nvPicPr>
-        <p:blipFill>
-          <a:blip r:embed="rId15">
-            <a:extLst>
-              <a:ext uri="{28A0092B-C50C-407E-A947-70E740481C1C}">
-                <a14:useLocalDpi xmlns:a14="http://schemas.microsoft.com/office/drawing/2010/main" val="0"/>
-              </a:ext>
-            </a:extLst>
-          </a:blip>
-          <a:stretch>
-            <a:fillRect/>
-          </a:stretch>
-        </p:blipFill>
-        <p:spPr>
-          <a:xfrm>
-            <a:off x="378307" y="13683345"/>
-            <a:ext cx="15603252" cy="8926132"/>
-          </a:xfrm>
-          <a:prstGeom prst="rect">
-            <a:avLst/>
-          </a:prstGeom>
-        </p:spPr>
-      </p:pic>
       <p:sp>
         <p:nvSpPr>
           <p:cNvPr id="11" name="TextBox 10"/>
@@ -10983,7 +10842,7 @@
         </p:nvSpPr>
         <p:spPr>
           <a:xfrm>
-            <a:off x="532301" y="22952684"/>
+            <a:off x="10108420" y="8073411"/>
             <a:ext cx="12593076" cy="2862322"/>
           </a:xfrm>
           <a:prstGeom prst="rect">
@@ -11013,7 +10872,7 @@
             </a:pPr>
             <a:r>
               <a:rPr lang="en-US" sz="3600" dirty="0"/>
-              <a:t>Artifacts are found using Reflection on the assembly files</a:t>
+              <a:t>Artifacts are found using reflection on the assembly files</a:t>
             </a:r>
           </a:p>
           <a:p>
@@ -11022,8 +10881,15 @@
               <a:buChar char="•"/>
             </a:pPr>
             <a:r>
+              <a:rPr lang="en-US" sz="3600" dirty="0">
+                <a:latin typeface="Consolas" panose="020B0609020204030204" pitchFamily="49" charset="0"/>
+                <a:cs typeface="Consolas" panose="020B0609020204030204" pitchFamily="49" charset="0"/>
+              </a:rPr>
+              <a:t>ModelIdentifier</a:t>
+            </a:r>
+            <a:r>
               <a:rPr lang="en-US" sz="3600" dirty="0"/>
-              <a:t>ModelIdentifier is a guaranteed unique identifier for a class</a:t>
+              <a:t> is a guaranteed unique identifier for a class</a:t>
             </a:r>
           </a:p>
           <a:p>
@@ -11056,8 +10922,8 @@
         </p:nvSpPr>
         <p:spPr>
           <a:xfrm>
-            <a:off x="25446891" y="14850997"/>
-            <a:ext cx="9457558" cy="2862322"/>
+            <a:off x="9962006" y="21428120"/>
+            <a:ext cx="5576450" cy="5078313"/>
           </a:xfrm>
           <a:prstGeom prst="rect">
             <a:avLst/>
@@ -11119,7 +10985,7 @@
         </p:nvSpPr>
         <p:spPr>
           <a:xfrm>
-            <a:off x="12681864" y="10095796"/>
+            <a:off x="14218129" y="3873433"/>
             <a:ext cx="4735286" cy="2076704"/>
           </a:xfrm>
           <a:prstGeom prst="roundRect">
@@ -11172,7 +11038,7 @@
         </p:nvSpPr>
         <p:spPr>
           <a:xfrm>
-            <a:off x="19334416" y="10038760"/>
+            <a:off x="20870681" y="3816397"/>
             <a:ext cx="4735286" cy="2076704"/>
           </a:xfrm>
           <a:prstGeom prst="roundRect">
@@ -11218,7 +11084,7 @@
         </p:nvSpPr>
         <p:spPr>
           <a:xfrm>
-            <a:off x="19339407" y="13926953"/>
+            <a:off x="27523233" y="3873433"/>
             <a:ext cx="4735286" cy="2076704"/>
           </a:xfrm>
           <a:prstGeom prst="roundRect">
@@ -11271,7 +11137,7 @@
         </p:nvSpPr>
         <p:spPr>
           <a:xfrm>
-            <a:off x="8741754" y="10106695"/>
+            <a:off x="10278019" y="3884332"/>
             <a:ext cx="2671794" cy="1038228"/>
           </a:xfrm>
           <a:prstGeom prst="rect">
@@ -11350,7 +11216,7 @@
         </p:nvSpPr>
         <p:spPr>
           <a:xfrm>
-            <a:off x="8741754" y="11423864"/>
+            <a:off x="10278019" y="5201501"/>
             <a:ext cx="2671794" cy="1038228"/>
           </a:xfrm>
           <a:prstGeom prst="rect">
@@ -11431,7 +11297,7 @@
         </p:nvCxnSpPr>
         <p:spPr>
           <a:xfrm>
-            <a:off x="11413548" y="10625809"/>
+            <a:off x="12949813" y="4403446"/>
             <a:ext cx="1280160" cy="0"/>
           </a:xfrm>
           <a:prstGeom prst="straightConnector1">
@@ -11467,7 +11333,7 @@
         </p:nvCxnSpPr>
         <p:spPr>
           <a:xfrm>
-            <a:off x="11401704" y="11768809"/>
+            <a:off x="12937969" y="5546446"/>
             <a:ext cx="1280160" cy="0"/>
           </a:xfrm>
           <a:prstGeom prst="straightConnector1">
@@ -11505,7 +11371,7 @@
         </p:nvCxnSpPr>
         <p:spPr>
           <a:xfrm>
-            <a:off x="17417150" y="11400043"/>
+            <a:off x="18953415" y="4850063"/>
             <a:ext cx="1917266" cy="0"/>
           </a:xfrm>
           <a:prstGeom prst="straightConnector1">
@@ -11541,7 +11407,7 @@
         </p:nvSpPr>
         <p:spPr>
           <a:xfrm>
-            <a:off x="17574420" y="10900644"/>
+            <a:off x="19052787" y="4326843"/>
             <a:ext cx="1981774" cy="523220"/>
           </a:xfrm>
           <a:prstGeom prst="rect">
@@ -11562,45 +11428,6 @@
           </a:p>
         </p:txBody>
       </p:sp>
-      <p:cxnSp>
-        <p:nvCxnSpPr>
-          <p:cNvPr id="46" name="Straight Arrow Connector 45"/>
-          <p:cNvCxnSpPr>
-            <a:cxnSpLocks/>
-            <a:endCxn id="39" idx="0"/>
-          </p:cNvCxnSpPr>
-          <p:nvPr/>
-        </p:nvCxnSpPr>
-        <p:spPr>
-          <a:xfrm flipH="1">
-            <a:off x="21707050" y="12115464"/>
-            <a:ext cx="17656" cy="1811489"/>
-          </a:xfrm>
-          <a:prstGeom prst="straightConnector1">
-            <a:avLst/>
-          </a:prstGeom>
-          <a:ln w="57150">
-            <a:solidFill>
-              <a:schemeClr val="tx1"/>
-            </a:solidFill>
-            <a:tailEnd type="triangle"/>
-          </a:ln>
-        </p:spPr>
-        <p:style>
-          <a:lnRef idx="1">
-            <a:schemeClr val="accent1"/>
-          </a:lnRef>
-          <a:fillRef idx="0">
-            <a:schemeClr val="accent1"/>
-          </a:fillRef>
-          <a:effectRef idx="0">
-            <a:schemeClr val="accent1"/>
-          </a:effectRef>
-          <a:fontRef idx="minor">
-            <a:schemeClr val="tx1"/>
-          </a:fontRef>
-        </p:style>
-      </p:cxnSp>
       <p:sp>
         <p:nvSpPr>
           <p:cNvPr id="48" name="TextBox 47"/>
@@ -11608,8 +11435,8 @@
           <p:nvPr/>
         </p:nvSpPr>
         <p:spPr>
-          <a:xfrm rot="5400000">
-            <a:off x="21002863" y="12831546"/>
+          <a:xfrm>
+            <a:off x="25651896" y="4403446"/>
             <a:ext cx="1981774" cy="523220"/>
           </a:xfrm>
           <a:prstGeom prst="rect">
@@ -11638,7 +11465,7 @@
         </p:nvSpPr>
         <p:spPr>
           <a:xfrm>
-            <a:off x="20706614" y="16562125"/>
+            <a:off x="32975550" y="4251002"/>
             <a:ext cx="2000872" cy="1321566"/>
           </a:xfrm>
           <a:prstGeom prst="rect">
@@ -11690,14 +11517,13 @@
           <p:cNvPr id="52" name="Straight Arrow Connector 51"/>
           <p:cNvCxnSpPr>
             <a:cxnSpLocks/>
-            <a:stCxn id="39" idx="2"/>
           </p:cNvCxnSpPr>
           <p:nvPr/>
         </p:nvCxnSpPr>
         <p:spPr>
           <a:xfrm>
-            <a:off x="21707050" y="16003657"/>
-            <a:ext cx="0" cy="590350"/>
+            <a:off x="32258519" y="4936111"/>
+            <a:ext cx="717031" cy="0"/>
           </a:xfrm>
           <a:prstGeom prst="straightConnector1">
             <a:avLst/>
@@ -11732,7 +11558,7 @@
         </p:nvSpPr>
         <p:spPr>
           <a:xfrm>
-            <a:off x="20074139" y="8307366"/>
+            <a:off x="28589911" y="2218161"/>
             <a:ext cx="3171517" cy="1038228"/>
           </a:xfrm>
           <a:prstGeom prst="rect">
@@ -11816,8 +11642,8 @@
         </p:nvCxnSpPr>
         <p:spPr>
           <a:xfrm>
-            <a:off x="21723505" y="9370322"/>
-            <a:ext cx="0" cy="668438"/>
+            <a:off x="29984700" y="3255565"/>
+            <a:ext cx="610" cy="616477"/>
           </a:xfrm>
           <a:prstGeom prst="straightConnector1">
             <a:avLst/>
@@ -11852,8 +11678,8 @@
         </p:nvSpPr>
         <p:spPr>
           <a:xfrm>
-            <a:off x="25918102" y="19859529"/>
-            <a:ext cx="9368524" cy="2862322"/>
+            <a:off x="26067557" y="21922094"/>
+            <a:ext cx="9368524" cy="3970318"/>
           </a:xfrm>
           <a:prstGeom prst="rect">
             <a:avLst/>
@@ -11866,18 +11692,33 @@
           </a:bodyPr>
           <a:lstStyle/>
           <a:p>
+            <a:pPr marL="571500" indent="-571500">
+              <a:buFont typeface="Arial" panose="020B0604020202020204" pitchFamily="34" charset="0"/>
+              <a:buChar char="•"/>
+            </a:pPr>
             <a:r>
               <a:rPr lang="en-US" sz="3600" dirty="0"/>
-              <a:t>Automated Black Box tests using Visual Studio’s built in testing suite and Roslyn.</a:t>
+              <a:t>45 passing, automated Black Box tests using Visual Studio’s built in testing suite and Roslyn</a:t>
             </a:r>
           </a:p>
           <a:p>
-            <a:endParaRPr lang="en-US" sz="3600" dirty="0"/>
-          </a:p>
-          <a:p>
+            <a:pPr marL="571500" indent="-571500">
+              <a:buFont typeface="Arial" panose="020B0604020202020204" pitchFamily="34" charset="0"/>
+              <a:buChar char="•"/>
+            </a:pPr>
             <a:r>
               <a:rPr lang="en-US" sz="3600" dirty="0"/>
-              <a:t>The tests use a common file structure, allowing more tests to be added with minimal effort.</a:t>
+              <a:t>No unit testing or code coverage because Black Box tests cover the majority of use cases</a:t>
+            </a:r>
+          </a:p>
+          <a:p>
+            <a:pPr marL="571500" indent="-571500">
+              <a:buFont typeface="Arial" panose="020B0604020202020204" pitchFamily="34" charset="0"/>
+              <a:buChar char="•"/>
+            </a:pPr>
+            <a:r>
+              <a:rPr lang="en-US" sz="3600" dirty="0"/>
+              <a:t>The tests use a common file structure, allowing more tests to be added with minimal effort</a:t>
             </a:r>
           </a:p>
         </p:txBody>
@@ -11890,7 +11731,7 @@
         </p:nvSpPr>
         <p:spPr>
           <a:xfrm>
-            <a:off x="25918102" y="18465100"/>
+            <a:off x="26383571" y="20619460"/>
             <a:ext cx="3901489" cy="1023037"/>
           </a:xfrm>
           <a:prstGeom prst="rect">
@@ -11911,24 +11752,62 @@
           </a:p>
         </p:txBody>
       </p:sp>
+      <p:cxnSp>
+        <p:nvCxnSpPr>
+          <p:cNvPr id="44" name="Straight Arrow Connector 43"/>
+          <p:cNvCxnSpPr>
+            <a:cxnSpLocks/>
+          </p:cNvCxnSpPr>
+          <p:nvPr/>
+        </p:nvCxnSpPr>
+        <p:spPr>
+          <a:xfrm>
+            <a:off x="25605967" y="4911785"/>
+            <a:ext cx="1917266" cy="0"/>
+          </a:xfrm>
+          <a:prstGeom prst="straightConnector1">
+            <a:avLst/>
+          </a:prstGeom>
+          <a:ln w="57150">
+            <a:solidFill>
+              <a:schemeClr val="tx1"/>
+            </a:solidFill>
+            <a:tailEnd type="triangle"/>
+          </a:ln>
+        </p:spPr>
+        <p:style>
+          <a:lnRef idx="1">
+            <a:schemeClr val="accent1"/>
+          </a:lnRef>
+          <a:fillRef idx="0">
+            <a:schemeClr val="accent1"/>
+          </a:fillRef>
+          <a:effectRef idx="0">
+            <a:schemeClr val="accent1"/>
+          </a:effectRef>
+          <a:fontRef idx="minor">
+            <a:schemeClr val="tx1"/>
+          </a:fontRef>
+        </p:style>
+      </p:cxnSp>
       <p:pic>
         <p:nvPicPr>
-          <p:cNvPr id="64" name="Picture 63"/>
+          <p:cNvPr id="35" name="Picture 34"/>
           <p:cNvPicPr>
             <a:picLocks noChangeAspect="1"/>
           </p:cNvPicPr>
           <p:nvPr/>
         </p:nvPicPr>
         <p:blipFill>
-          <a:blip r:embed="rId16"/>
+          <a:blip r:embed="rId14"/>
           <a:stretch>
             <a:fillRect/>
           </a:stretch>
         </p:blipFill>
         <p:spPr>
           <a:xfrm>
-            <a:off x="16348944" y="21588845"/>
-            <a:ext cx="9145301" cy="5585980"/>
+            <a:off x="30088566" y="10992079"/>
+            <a:ext cx="5970609" cy="8598599"/>
           </a:xfrm>
           <a:prstGeom prst="rect">
             <a:avLst/>
@@ -11937,21 +11816,22 @@
       </p:pic>
       <p:pic>
         <p:nvPicPr>
-          <p:cNvPr id="8" name="Picture 7"/>
+          <p:cNvPr id="47" name="Picture 46"/>
           <p:cNvPicPr>
             <a:picLocks noChangeAspect="1"/>
           </p:cNvPicPr>
           <p:nvPr/>
         </p:nvPicPr>
-        <p:blipFill rotWithShape="1">
-          <a:blip r:embed="rId17"/>
-          <a:srcRect l="92" t="2952" r="4478" b="52244"/>
-          <a:stretch/>
+        <p:blipFill>
+          <a:blip r:embed="rId15"/>
+          <a:stretch>
+            <a:fillRect/>
+          </a:stretch>
         </p:blipFill>
         <p:spPr>
           <a:xfrm>
-            <a:off x="25609663" y="22685393"/>
-            <a:ext cx="3581400" cy="4438254"/>
+            <a:off x="24275624" y="10993270"/>
+            <a:ext cx="5612578" cy="5720512"/>
           </a:xfrm>
           <a:prstGeom prst="rect">
             <a:avLst/>
@@ -11960,21 +11840,28 @@
       </p:pic>
       <p:pic>
         <p:nvPicPr>
-          <p:cNvPr id="14" name="Picture 13"/>
+          <p:cNvPr id="51" name="Picture 50"/>
           <p:cNvPicPr>
             <a:picLocks noChangeAspect="1"/>
           </p:cNvPicPr>
           <p:nvPr/>
         </p:nvPicPr>
-        <p:blipFill rotWithShape="1">
-          <a:blip r:embed="rId18"/>
-          <a:srcRect l="51" t="2969" r="4437" b="69307"/>
-          <a:stretch/>
+        <p:blipFill>
+          <a:blip r:embed="rId16">
+            <a:extLst>
+              <a:ext uri="{28A0092B-C50C-407E-A947-70E740481C1C}">
+                <a14:useLocalDpi xmlns:a14="http://schemas.microsoft.com/office/drawing/2010/main" val="0"/>
+              </a:ext>
+            </a:extLst>
+          </a:blip>
+          <a:stretch>
+            <a:fillRect/>
+          </a:stretch>
         </p:blipFill>
         <p:spPr>
           <a:xfrm>
-            <a:off x="29315849" y="22685393"/>
-            <a:ext cx="3584448" cy="2746357"/>
+            <a:off x="9808024" y="11109009"/>
+            <a:ext cx="13731922" cy="7855603"/>
           </a:xfrm>
           <a:prstGeom prst="rect">
             <a:avLst/>
@@ -11983,21 +11870,28 @@
       </p:pic>
       <p:pic>
         <p:nvPicPr>
-          <p:cNvPr id="18" name="Picture 17"/>
+          <p:cNvPr id="53" name="Picture 52"/>
           <p:cNvPicPr>
             <a:picLocks noChangeAspect="1"/>
           </p:cNvPicPr>
           <p:nvPr/>
         </p:nvPicPr>
-        <p:blipFill rotWithShape="1">
-          <a:blip r:embed="rId19"/>
-          <a:srcRect t="2970" r="15787" b="64544"/>
-          <a:stretch/>
+        <p:blipFill>
+          <a:blip r:embed="rId17">
+            <a:extLst>
+              <a:ext uri="{28A0092B-C50C-407E-A947-70E740481C1C}">
+                <a14:useLocalDpi xmlns:a14="http://schemas.microsoft.com/office/drawing/2010/main" val="0"/>
+              </a:ext>
+            </a:extLst>
+          </a:blip>
+          <a:stretch>
+            <a:fillRect/>
+          </a:stretch>
         </p:blipFill>
         <p:spPr>
           <a:xfrm>
-            <a:off x="33025083" y="22689808"/>
-            <a:ext cx="3160392" cy="3218192"/>
+            <a:off x="15703303" y="19232695"/>
+            <a:ext cx="10199407" cy="8062773"/>
           </a:xfrm>
           <a:prstGeom prst="rect">
             <a:avLst/>

</xml_diff>

<commit_message>
changed some of the test section of the poster
</commit_message>
<xml_diff>
--- a/documentation/poster.pptx
+++ b/documentation/poster.pptx
@@ -2204,6 +2204,13 @@
         </dgm:presLayoutVars>
       </dgm:prSet>
       <dgm:spPr/>
+      <dgm:t>
+        <a:bodyPr/>
+        <a:lstStyle/>
+        <a:p>
+          <a:endParaRPr lang="en-US"/>
+        </a:p>
+      </dgm:t>
     </dgm:pt>
     <dgm:pt modelId="{C86DE2E3-3485-4D88-991A-33C9416C5246}" type="pres">
       <dgm:prSet presAssocID="{CE704066-F6EC-4A34-BE57-F031F6F97A0E}" presName="linNode" presStyleCnt="0"/>
@@ -2217,6 +2224,13 @@
         </dgm:presLayoutVars>
       </dgm:prSet>
       <dgm:spPr/>
+      <dgm:t>
+        <a:bodyPr/>
+        <a:lstStyle/>
+        <a:p>
+          <a:endParaRPr lang="en-US"/>
+        </a:p>
+      </dgm:t>
     </dgm:pt>
     <dgm:pt modelId="{3DC572B2-C7F7-45EE-8266-8D3A0F1AF860}" type="pres">
       <dgm:prSet presAssocID="{CE704066-F6EC-4A34-BE57-F031F6F97A0E}" presName="descendantText" presStyleLbl="alignAccFollowNode1" presStyleIdx="0" presStyleCnt="3" custScaleX="83046" custScaleY="97043" custLinFactNeighborX="-49228" custLinFactNeighborY="-1639">
@@ -2225,6 +2239,13 @@
         </dgm:presLayoutVars>
       </dgm:prSet>
       <dgm:spPr/>
+      <dgm:t>
+        <a:bodyPr/>
+        <a:lstStyle/>
+        <a:p>
+          <a:endParaRPr lang="en-US"/>
+        </a:p>
+      </dgm:t>
     </dgm:pt>
     <dgm:pt modelId="{356BFF2B-59F5-4B2D-A37F-4D545FC129A8}" type="pres">
       <dgm:prSet presAssocID="{2190222A-E708-44B6-912C-16ACA9D69599}" presName="sp" presStyleCnt="0"/>
@@ -2242,6 +2263,13 @@
         </dgm:presLayoutVars>
       </dgm:prSet>
       <dgm:spPr/>
+      <dgm:t>
+        <a:bodyPr/>
+        <a:lstStyle/>
+        <a:p>
+          <a:endParaRPr lang="en-US"/>
+        </a:p>
+      </dgm:t>
     </dgm:pt>
     <dgm:pt modelId="{6DA4FE5C-CB21-47E7-B0F0-9CB097B5E464}" type="pres">
       <dgm:prSet presAssocID="{5D518925-A42D-44F7-8A34-D7EE8C8BA4F6}" presName="descendantText" presStyleLbl="alignAccFollowNode1" presStyleIdx="1" presStyleCnt="3" custScaleX="83513" custScaleY="98778" custLinFactNeighborX="-49429" custLinFactNeighborY="5248">
@@ -2250,6 +2278,13 @@
         </dgm:presLayoutVars>
       </dgm:prSet>
       <dgm:spPr/>
+      <dgm:t>
+        <a:bodyPr/>
+        <a:lstStyle/>
+        <a:p>
+          <a:endParaRPr lang="en-US"/>
+        </a:p>
+      </dgm:t>
     </dgm:pt>
     <dgm:pt modelId="{89AEE0E6-A6EE-4F95-9EFD-E7951DB92FAA}" type="pres">
       <dgm:prSet presAssocID="{8E9682BF-077B-49CE-83FC-92F75221525A}" presName="sp" presStyleCnt="0"/>
@@ -2267,6 +2302,13 @@
         </dgm:presLayoutVars>
       </dgm:prSet>
       <dgm:spPr/>
+      <dgm:t>
+        <a:bodyPr/>
+        <a:lstStyle/>
+        <a:p>
+          <a:endParaRPr lang="en-US"/>
+        </a:p>
+      </dgm:t>
     </dgm:pt>
     <dgm:pt modelId="{94FD681E-6FED-4D1A-91A3-94D9AE5BBDC1}" type="pres">
       <dgm:prSet presAssocID="{93B62B81-D7F7-431E-9439-2E3D4CD2353E}" presName="descendantText" presStyleLbl="alignAccFollowNode1" presStyleIdx="2" presStyleCnt="3" custScaleX="83693" custScaleY="87287" custLinFactNeighborX="-48773" custLinFactNeighborY="1350">
@@ -2275,28 +2317,35 @@
         </dgm:presLayoutVars>
       </dgm:prSet>
       <dgm:spPr/>
+      <dgm:t>
+        <a:bodyPr/>
+        <a:lstStyle/>
+        <a:p>
+          <a:endParaRPr lang="en-US"/>
+        </a:p>
+      </dgm:t>
     </dgm:pt>
   </dgm:ptLst>
   <dgm:cxnLst>
-    <dgm:cxn modelId="{670CE803-5732-44F7-8BFC-139BBB9EFD9D}" srcId="{5D518925-A42D-44F7-8A34-D7EE8C8BA4F6}" destId="{5F3C6D8C-49F5-414A-9B7D-37B3F73CBB71}" srcOrd="1" destOrd="0" parTransId="{21512CD3-C611-4379-A522-10F5A3696ED3}" sibTransId="{CE942B8A-FC02-4475-BE3F-E505BC877B1D}"/>
-    <dgm:cxn modelId="{B7847806-6502-4A85-AA95-FB3B3F9F8E85}" srcId="{93B62B81-D7F7-431E-9439-2E3D4CD2353E}" destId="{491443E3-89AE-4FE4-92A7-C951F26ADF15}" srcOrd="0" destOrd="0" parTransId="{21A27C6B-BD4F-4728-8495-2749C96FF1CC}" sibTransId="{892CAB94-5167-438E-8541-2DCB69385D70}"/>
-    <dgm:cxn modelId="{196DD02D-672C-4265-9958-28C33653829B}" type="presOf" srcId="{96D2705E-7225-4E32-BBCA-73AADEC51771}" destId="{3DC572B2-C7F7-45EE-8266-8D3A0F1AF860}" srcOrd="0" destOrd="0" presId="urn:microsoft.com/office/officeart/2005/8/layout/vList5"/>
-    <dgm:cxn modelId="{B5EA5F30-9689-4546-8120-3309418A9BF6}" type="presOf" srcId="{BE1D1458-5D71-486A-9C06-F8C2979301CE}" destId="{E4832E59-FCA4-4EC2-82F5-B4BFAF552C72}" srcOrd="0" destOrd="0" presId="urn:microsoft.com/office/officeart/2005/8/layout/vList5"/>
+    <dgm:cxn modelId="{46BEEEEA-8181-4496-8F3E-4B42C7BEC8A4}" srcId="{BE1D1458-5D71-486A-9C06-F8C2979301CE}" destId="{93B62B81-D7F7-431E-9439-2E3D4CD2353E}" srcOrd="2" destOrd="0" parTransId="{CF446EAA-D8CD-45A9-B112-FE71C0FABC3A}" sibTransId="{99D4F5D3-8426-4A0A-9AFF-9CC195309684}"/>
     <dgm:cxn modelId="{4C11CF35-6553-44AE-BF05-CC97F67390E3}" type="presOf" srcId="{E4B44728-031A-45B4-A960-6D7C98163EB4}" destId="{3DC572B2-C7F7-45EE-8266-8D3A0F1AF860}" srcOrd="0" destOrd="1" presId="urn:microsoft.com/office/officeart/2005/8/layout/vList5"/>
+    <dgm:cxn modelId="{294848E5-A50B-4122-8FC4-07D10048A02B}" type="presOf" srcId="{491443E3-89AE-4FE4-92A7-C951F26ADF15}" destId="{94FD681E-6FED-4D1A-91A3-94D9AE5BBDC1}" srcOrd="0" destOrd="0" presId="urn:microsoft.com/office/officeart/2005/8/layout/vList5"/>
+    <dgm:cxn modelId="{B3A6FD9F-23A2-4187-BE54-08ED4A00065C}" type="presOf" srcId="{93B62B81-D7F7-431E-9439-2E3D4CD2353E}" destId="{A578B4B1-012F-4704-840D-D9A1F6815359}" srcOrd="0" destOrd="0" presId="urn:microsoft.com/office/officeart/2005/8/layout/vList5"/>
+    <dgm:cxn modelId="{FB5D5687-CBA9-4DC5-BA0C-6E946062A079}" type="presOf" srcId="{72B0AA1E-CB07-4D66-8C5F-5084D4F61D84}" destId="{94FD681E-6FED-4D1A-91A3-94D9AE5BBDC1}" srcOrd="0" destOrd="1" presId="urn:microsoft.com/office/officeart/2005/8/layout/vList5"/>
     <dgm:cxn modelId="{CB5E2C5D-CEAC-421F-B401-2DA7AD423DE3}" srcId="{BE1D1458-5D71-486A-9C06-F8C2979301CE}" destId="{5D518925-A42D-44F7-8A34-D7EE8C8BA4F6}" srcOrd="1" destOrd="0" parTransId="{3F7C9D5E-9B3B-436C-98DD-9AB7ED4F3098}" sibTransId="{8E9682BF-077B-49CE-83FC-92F75221525A}"/>
     <dgm:cxn modelId="{D3E26C67-6F84-4E24-8129-8C98E7E91547}" srcId="{BE1D1458-5D71-486A-9C06-F8C2979301CE}" destId="{CE704066-F6EC-4A34-BE57-F031F6F97A0E}" srcOrd="0" destOrd="0" parTransId="{39B9789B-9256-4F63-B415-E8CB368FCE65}" sibTransId="{2190222A-E708-44B6-912C-16ACA9D69599}"/>
+    <dgm:cxn modelId="{2D5599CD-EE5D-40F9-A0FD-CC1E62ECA14E}" srcId="{CE704066-F6EC-4A34-BE57-F031F6F97A0E}" destId="{E4B44728-031A-45B4-A960-6D7C98163EB4}" srcOrd="1" destOrd="0" parTransId="{A6A79D2A-79DB-436D-AB27-E222CDBC7436}" sibTransId="{F9EF34C1-D145-4D03-BEF0-2842C4F14E8F}"/>
+    <dgm:cxn modelId="{31ED0CFA-3F9C-4EC0-89AC-690C51CC9BA5}" type="presOf" srcId="{5D518925-A42D-44F7-8A34-D7EE8C8BA4F6}" destId="{A5D97866-9099-44CF-8392-E4D04C75D305}" srcOrd="0" destOrd="0" presId="urn:microsoft.com/office/officeart/2005/8/layout/vList5"/>
+    <dgm:cxn modelId="{670CE803-5732-44F7-8BFC-139BBB9EFD9D}" srcId="{5D518925-A42D-44F7-8A34-D7EE8C8BA4F6}" destId="{5F3C6D8C-49F5-414A-9B7D-37B3F73CBB71}" srcOrd="1" destOrd="0" parTransId="{21512CD3-C611-4379-A522-10F5A3696ED3}" sibTransId="{CE942B8A-FC02-4475-BE3F-E505BC877B1D}"/>
+    <dgm:cxn modelId="{BE7532DD-61C4-419A-9602-441A2CB79061}" srcId="{5D518925-A42D-44F7-8A34-D7EE8C8BA4F6}" destId="{FD7D5C93-D69E-40C6-971E-DE23F823AC96}" srcOrd="0" destOrd="0" parTransId="{A885DEA9-B00A-4431-98A9-DE220F925B82}" sibTransId="{F77961E8-CCF0-4884-B78F-402299556199}"/>
     <dgm:cxn modelId="{5D9C2078-89FC-4FB2-BBDB-58805684377A}" srcId="{93B62B81-D7F7-431E-9439-2E3D4CD2353E}" destId="{72B0AA1E-CB07-4D66-8C5F-5084D4F61D84}" srcOrd="1" destOrd="0" parTransId="{C7FF9C0A-64CD-4E9C-AF44-B8A14C148043}" sibTransId="{432643FE-DCC3-4D28-9715-CB09FF1D1DC6}"/>
     <dgm:cxn modelId="{263AB879-3159-43DD-A7DA-56351BC654F5}" srcId="{CE704066-F6EC-4A34-BE57-F031F6F97A0E}" destId="{96D2705E-7225-4E32-BBCA-73AADEC51771}" srcOrd="0" destOrd="0" parTransId="{B6FE3FB8-829C-4505-ADEF-C25B4D0E3D19}" sibTransId="{7D84155D-6B55-476E-8E57-41C47780CABE}"/>
     <dgm:cxn modelId="{33DDB27E-1AF9-41BA-B515-48F3163A6E91}" type="presOf" srcId="{5F3C6D8C-49F5-414A-9B7D-37B3F73CBB71}" destId="{6DA4FE5C-CB21-47E7-B0F0-9CB097B5E464}" srcOrd="0" destOrd="1" presId="urn:microsoft.com/office/officeart/2005/8/layout/vList5"/>
-    <dgm:cxn modelId="{FB5D5687-CBA9-4DC5-BA0C-6E946062A079}" type="presOf" srcId="{72B0AA1E-CB07-4D66-8C5F-5084D4F61D84}" destId="{94FD681E-6FED-4D1A-91A3-94D9AE5BBDC1}" srcOrd="0" destOrd="1" presId="urn:microsoft.com/office/officeart/2005/8/layout/vList5"/>
-    <dgm:cxn modelId="{B3A6FD9F-23A2-4187-BE54-08ED4A00065C}" type="presOf" srcId="{93B62B81-D7F7-431E-9439-2E3D4CD2353E}" destId="{A578B4B1-012F-4704-840D-D9A1F6815359}" srcOrd="0" destOrd="0" presId="urn:microsoft.com/office/officeart/2005/8/layout/vList5"/>
+    <dgm:cxn modelId="{5F24A8FD-6B4A-49D3-B691-5F99C562E169}" type="presOf" srcId="{CE704066-F6EC-4A34-BE57-F031F6F97A0E}" destId="{89A3A35E-A31F-4A19-88A6-C711D22D028E}" srcOrd="0" destOrd="0" presId="urn:microsoft.com/office/officeart/2005/8/layout/vList5"/>
+    <dgm:cxn modelId="{B7847806-6502-4A85-AA95-FB3B3F9F8E85}" srcId="{93B62B81-D7F7-431E-9439-2E3D4CD2353E}" destId="{491443E3-89AE-4FE4-92A7-C951F26ADF15}" srcOrd="0" destOrd="0" parTransId="{21A27C6B-BD4F-4728-8495-2749C96FF1CC}" sibTransId="{892CAB94-5167-438E-8541-2DCB69385D70}"/>
+    <dgm:cxn modelId="{B5EA5F30-9689-4546-8120-3309418A9BF6}" type="presOf" srcId="{BE1D1458-5D71-486A-9C06-F8C2979301CE}" destId="{E4832E59-FCA4-4EC2-82F5-B4BFAF552C72}" srcOrd="0" destOrd="0" presId="urn:microsoft.com/office/officeart/2005/8/layout/vList5"/>
+    <dgm:cxn modelId="{196DD02D-672C-4265-9958-28C33653829B}" type="presOf" srcId="{96D2705E-7225-4E32-BBCA-73AADEC51771}" destId="{3DC572B2-C7F7-45EE-8266-8D3A0F1AF860}" srcOrd="0" destOrd="0" presId="urn:microsoft.com/office/officeart/2005/8/layout/vList5"/>
     <dgm:cxn modelId="{2C8F8EBD-D261-4528-82AD-750347F41495}" type="presOf" srcId="{FD7D5C93-D69E-40C6-971E-DE23F823AC96}" destId="{6DA4FE5C-CB21-47E7-B0F0-9CB097B5E464}" srcOrd="0" destOrd="0" presId="urn:microsoft.com/office/officeart/2005/8/layout/vList5"/>
-    <dgm:cxn modelId="{2D5599CD-EE5D-40F9-A0FD-CC1E62ECA14E}" srcId="{CE704066-F6EC-4A34-BE57-F031F6F97A0E}" destId="{E4B44728-031A-45B4-A960-6D7C98163EB4}" srcOrd="1" destOrd="0" parTransId="{A6A79D2A-79DB-436D-AB27-E222CDBC7436}" sibTransId="{F9EF34C1-D145-4D03-BEF0-2842C4F14E8F}"/>
-    <dgm:cxn modelId="{BE7532DD-61C4-419A-9602-441A2CB79061}" srcId="{5D518925-A42D-44F7-8A34-D7EE8C8BA4F6}" destId="{FD7D5C93-D69E-40C6-971E-DE23F823AC96}" srcOrd="0" destOrd="0" parTransId="{A885DEA9-B00A-4431-98A9-DE220F925B82}" sibTransId="{F77961E8-CCF0-4884-B78F-402299556199}"/>
-    <dgm:cxn modelId="{294848E5-A50B-4122-8FC4-07D10048A02B}" type="presOf" srcId="{491443E3-89AE-4FE4-92A7-C951F26ADF15}" destId="{94FD681E-6FED-4D1A-91A3-94D9AE5BBDC1}" srcOrd="0" destOrd="0" presId="urn:microsoft.com/office/officeart/2005/8/layout/vList5"/>
-    <dgm:cxn modelId="{46BEEEEA-8181-4496-8F3E-4B42C7BEC8A4}" srcId="{BE1D1458-5D71-486A-9C06-F8C2979301CE}" destId="{93B62B81-D7F7-431E-9439-2E3D4CD2353E}" srcOrd="2" destOrd="0" parTransId="{CF446EAA-D8CD-45A9-B112-FE71C0FABC3A}" sibTransId="{99D4F5D3-8426-4A0A-9AFF-9CC195309684}"/>
-    <dgm:cxn modelId="{31ED0CFA-3F9C-4EC0-89AC-690C51CC9BA5}" type="presOf" srcId="{5D518925-A42D-44F7-8A34-D7EE8C8BA4F6}" destId="{A5D97866-9099-44CF-8392-E4D04C75D305}" srcOrd="0" destOrd="0" presId="urn:microsoft.com/office/officeart/2005/8/layout/vList5"/>
-    <dgm:cxn modelId="{5F24A8FD-6B4A-49D3-B691-5F99C562E169}" type="presOf" srcId="{CE704066-F6EC-4A34-BE57-F031F6F97A0E}" destId="{89A3A35E-A31F-4A19-88A6-C711D22D028E}" srcOrd="0" destOrd="0" presId="urn:microsoft.com/office/officeart/2005/8/layout/vList5"/>
     <dgm:cxn modelId="{28AA4A30-AA5E-429A-819F-57E39EB52A28}" type="presParOf" srcId="{E4832E59-FCA4-4EC2-82F5-B4BFAF552C72}" destId="{C86DE2E3-3485-4D88-991A-33C9416C5246}" srcOrd="0" destOrd="0" presId="urn:microsoft.com/office/officeart/2005/8/layout/vList5"/>
     <dgm:cxn modelId="{F31821A7-9748-44E7-A0CC-6C3DEECFE1DD}" type="presParOf" srcId="{C86DE2E3-3485-4D88-991A-33C9416C5246}" destId="{89A3A35E-A31F-4A19-88A6-C711D22D028E}" srcOrd="0" destOrd="0" presId="urn:microsoft.com/office/officeart/2005/8/layout/vList5"/>
     <dgm:cxn modelId="{1CBED319-C83D-4585-8A7A-594598994B04}" type="presParOf" srcId="{C86DE2E3-3485-4D88-991A-33C9416C5246}" destId="{3DC572B2-C7F7-45EE-8266-8D3A0F1AF860}" srcOrd="1" destOrd="0" presId="urn:microsoft.com/office/officeart/2005/8/layout/vList5"/>
@@ -3116,6 +3165,13 @@
         </dgm:presLayoutVars>
       </dgm:prSet>
       <dgm:spPr/>
+      <dgm:t>
+        <a:bodyPr/>
+        <a:lstStyle/>
+        <a:p>
+          <a:endParaRPr lang="en-US"/>
+        </a:p>
+      </dgm:t>
     </dgm:pt>
     <dgm:pt modelId="{A403ADE2-8A92-4517-8307-DFE248D89559}" type="pres">
       <dgm:prSet presAssocID="{3C84C93E-F276-4672-8306-0D4EDC48291C}" presName="linNode" presStyleCnt="0"/>
@@ -3129,6 +3185,13 @@
         </dgm:presLayoutVars>
       </dgm:prSet>
       <dgm:spPr/>
+      <dgm:t>
+        <a:bodyPr/>
+        <a:lstStyle/>
+        <a:p>
+          <a:endParaRPr lang="en-US"/>
+        </a:p>
+      </dgm:t>
     </dgm:pt>
     <dgm:pt modelId="{7F9C28E1-28AC-404D-A8EF-ACDB5DFF50D9}" type="pres">
       <dgm:prSet presAssocID="{3C84C93E-F276-4672-8306-0D4EDC48291C}" presName="descendantText" presStyleLbl="alignAccFollowNode1" presStyleIdx="0" presStyleCnt="4" custLinFactNeighborX="-29546">
@@ -3137,6 +3200,13 @@
         </dgm:presLayoutVars>
       </dgm:prSet>
       <dgm:spPr/>
+      <dgm:t>
+        <a:bodyPr/>
+        <a:lstStyle/>
+        <a:p>
+          <a:endParaRPr lang="en-US"/>
+        </a:p>
+      </dgm:t>
     </dgm:pt>
     <dgm:pt modelId="{34F37747-6784-4877-8185-2C87ABBCCC9F}" type="pres">
       <dgm:prSet presAssocID="{6F06AEEB-27E4-4060-AD12-431800289540}" presName="sp" presStyleCnt="0"/>
@@ -3154,6 +3224,13 @@
         </dgm:presLayoutVars>
       </dgm:prSet>
       <dgm:spPr/>
+      <dgm:t>
+        <a:bodyPr/>
+        <a:lstStyle/>
+        <a:p>
+          <a:endParaRPr lang="en-US"/>
+        </a:p>
+      </dgm:t>
     </dgm:pt>
     <dgm:pt modelId="{D510B8BF-35DE-4934-9EDD-BB2C766C9B1D}" type="pres">
       <dgm:prSet presAssocID="{18A5A126-9CDF-408F-AED4-1709B1B7856C}" presName="descendantText" presStyleLbl="alignAccFollowNode1" presStyleIdx="1" presStyleCnt="4" custLinFactNeighborX="-29546">
@@ -3162,6 +3239,13 @@
         </dgm:presLayoutVars>
       </dgm:prSet>
       <dgm:spPr/>
+      <dgm:t>
+        <a:bodyPr/>
+        <a:lstStyle/>
+        <a:p>
+          <a:endParaRPr lang="en-US"/>
+        </a:p>
+      </dgm:t>
     </dgm:pt>
     <dgm:pt modelId="{3848E3C7-E4D3-4713-BA1D-B4C006AC2665}" type="pres">
       <dgm:prSet presAssocID="{1B9835CA-355C-422C-A0F3-E76C387F3609}" presName="sp" presStyleCnt="0"/>
@@ -3179,6 +3263,13 @@
         </dgm:presLayoutVars>
       </dgm:prSet>
       <dgm:spPr/>
+      <dgm:t>
+        <a:bodyPr/>
+        <a:lstStyle/>
+        <a:p>
+          <a:endParaRPr lang="en-US"/>
+        </a:p>
+      </dgm:t>
     </dgm:pt>
     <dgm:pt modelId="{37B4A69E-BEAA-483D-A27B-B8066514DC2A}" type="pres">
       <dgm:prSet presAssocID="{D0F8E683-C4DC-481A-8BCD-4B33BA43D927}" presName="descendantText" presStyleLbl="alignAccFollowNode1" presStyleIdx="2" presStyleCnt="4" custLinFactNeighborX="-29546">
@@ -3187,6 +3278,13 @@
         </dgm:presLayoutVars>
       </dgm:prSet>
       <dgm:spPr/>
+      <dgm:t>
+        <a:bodyPr/>
+        <a:lstStyle/>
+        <a:p>
+          <a:endParaRPr lang="en-US"/>
+        </a:p>
+      </dgm:t>
     </dgm:pt>
     <dgm:pt modelId="{9CFDBF66-7A98-4500-A454-C13851DB99F5}" type="pres">
       <dgm:prSet presAssocID="{01ADA495-5465-42CE-B1D0-9C68DEAC5498}" presName="sp" presStyleCnt="0"/>
@@ -3204,6 +3302,13 @@
         </dgm:presLayoutVars>
       </dgm:prSet>
       <dgm:spPr/>
+      <dgm:t>
+        <a:bodyPr/>
+        <a:lstStyle/>
+        <a:p>
+          <a:endParaRPr lang="en-US"/>
+        </a:p>
+      </dgm:t>
     </dgm:pt>
     <dgm:pt modelId="{3248EAB6-7CD9-4AF4-8610-E82B5A9C2B0F}" type="pres">
       <dgm:prSet presAssocID="{20AC9AF4-A267-4D5E-9755-9C098B10F303}" presName="descendantText" presStyleLbl="alignAccFollowNode1" presStyleIdx="3" presStyleCnt="4" custLinFactNeighborX="-29514" custLinFactNeighborY="2426">
@@ -3212,34 +3317,41 @@
         </dgm:presLayoutVars>
       </dgm:prSet>
       <dgm:spPr/>
+      <dgm:t>
+        <a:bodyPr/>
+        <a:lstStyle/>
+        <a:p>
+          <a:endParaRPr lang="en-US"/>
+        </a:p>
+      </dgm:t>
     </dgm:pt>
   </dgm:ptLst>
   <dgm:cxnLst>
+    <dgm:cxn modelId="{64DD1C90-3C90-46D1-991C-FD2892A0591D}" type="presOf" srcId="{18A5A126-9CDF-408F-AED4-1709B1B7856C}" destId="{7EFE7DE5-404E-420F-BB2C-8D177D4BD0E5}" srcOrd="0" destOrd="0" presId="urn:microsoft.com/office/officeart/2005/8/layout/vList5"/>
+    <dgm:cxn modelId="{2EC0C072-6C5C-4C35-AA9F-6D426F1E990B}" srcId="{18A5A126-9CDF-408F-AED4-1709B1B7856C}" destId="{ACA9C505-CD0B-4752-9300-8A1863EE07ED}" srcOrd="0" destOrd="0" parTransId="{722D4FBA-AFE0-4B18-9927-B3D40D502D1F}" sibTransId="{B9A8F6A4-D6F8-4C5E-9CFC-1EC774D0D933}"/>
+    <dgm:cxn modelId="{5A9C18E7-DDFB-4820-97E3-B9BF1D799526}" srcId="{D0F8E683-C4DC-481A-8BCD-4B33BA43D927}" destId="{E9A1F835-6E14-423F-892C-1E5350F4D404}" srcOrd="1" destOrd="0" parTransId="{1C8F4CC9-03DA-4CA8-B795-E109B6A3FA9D}" sibTransId="{0ADF2407-687D-4AA9-9C1D-67FF1F383CB0}"/>
+    <dgm:cxn modelId="{AFAC89D5-DCF5-433D-B507-927889F835B2}" type="presOf" srcId="{3C84C93E-F276-4672-8306-0D4EDC48291C}" destId="{9DB291ED-CC19-490E-961E-C63E51B3DEBD}" srcOrd="0" destOrd="0" presId="urn:microsoft.com/office/officeart/2005/8/layout/vList5"/>
+    <dgm:cxn modelId="{CF1D1650-F396-49FB-A873-6FE141596A3B}" type="presOf" srcId="{9BE3BF22-2E45-4160-B620-9D51AEC383B5}" destId="{3248EAB6-7CD9-4AF4-8610-E82B5A9C2B0F}" srcOrd="0" destOrd="1" presId="urn:microsoft.com/office/officeart/2005/8/layout/vList5"/>
     <dgm:cxn modelId="{31ED1609-EE0B-4F1F-AECD-9A7244C2832E}" srcId="{3C84C93E-F276-4672-8306-0D4EDC48291C}" destId="{23807C4C-2DCB-4551-8F2D-7F715C6742A2}" srcOrd="1" destOrd="0" parTransId="{3761A983-A35D-4BA9-861F-A447DD3C1B1C}" sibTransId="{DBCDE35C-4C80-483B-8006-3FB356AD5639}"/>
+    <dgm:cxn modelId="{8540A648-0CCF-4E4F-B782-9217D67E063C}" type="presOf" srcId="{BA2DB30F-C26A-4431-8C29-A5CB73928175}" destId="{37B4A69E-BEAA-483D-A27B-B8066514DC2A}" srcOrd="0" destOrd="0" presId="urn:microsoft.com/office/officeart/2005/8/layout/vList5"/>
+    <dgm:cxn modelId="{57D385A9-DE56-43F5-9116-499131FF08E3}" srcId="{D0F8E683-C4DC-481A-8BCD-4B33BA43D927}" destId="{BA2DB30F-C26A-4431-8C29-A5CB73928175}" srcOrd="0" destOrd="0" parTransId="{88C1E58E-43BE-42F9-93DF-A962F3F20EB5}" sibTransId="{31F96A22-B396-492D-AFB1-97F5589DC161}"/>
+    <dgm:cxn modelId="{84950C3F-C348-4F3F-AF7D-CF2F03A99F71}" type="presOf" srcId="{ACA9C505-CD0B-4752-9300-8A1863EE07ED}" destId="{D510B8BF-35DE-4934-9EDD-BB2C766C9B1D}" srcOrd="0" destOrd="0" presId="urn:microsoft.com/office/officeart/2005/8/layout/vList5"/>
+    <dgm:cxn modelId="{5FAAE87E-6F02-4A4D-A80D-03B20599D8C7}" srcId="{4655BB5F-4EBC-4207-A5B0-147FC724DAE7}" destId="{18A5A126-9CDF-408F-AED4-1709B1B7856C}" srcOrd="1" destOrd="0" parTransId="{C742BDC9-C7A2-4C81-9DCC-36EC82FCCFE4}" sibTransId="{1B9835CA-355C-422C-A0F3-E76C387F3609}"/>
+    <dgm:cxn modelId="{33370FC1-1A83-45E0-AB6E-3C41CF6AA528}" type="presOf" srcId="{D0F8E683-C4DC-481A-8BCD-4B33BA43D927}" destId="{2DC11702-8290-49B6-BE15-B41D2A028289}" srcOrd="0" destOrd="0" presId="urn:microsoft.com/office/officeart/2005/8/layout/vList5"/>
+    <dgm:cxn modelId="{47CC6B9E-D179-4E52-A25A-91136DB78A3D}" srcId="{20AC9AF4-A267-4D5E-9755-9C098B10F303}" destId="{DAD6FF4F-6573-44CA-BBA6-AA6673522659}" srcOrd="0" destOrd="0" parTransId="{F6B8AF35-B27F-4B48-8A04-B523895CEE27}" sibTransId="{579B0503-F442-4237-ADA4-B2E641B0E6C9}"/>
+    <dgm:cxn modelId="{A805535C-45CB-411D-B26B-CB9C35E95BCA}" type="presOf" srcId="{20AC9AF4-A267-4D5E-9755-9C098B10F303}" destId="{96A820CA-BC25-4317-9A27-1A1206B2F40D}" srcOrd="0" destOrd="0" presId="urn:microsoft.com/office/officeart/2005/8/layout/vList5"/>
+    <dgm:cxn modelId="{61184497-FB9A-4517-B4E6-9A8B93550CFE}" type="presOf" srcId="{BB977D72-290E-42DF-B6F8-2AD2E69D3762}" destId="{D510B8BF-35DE-4934-9EDD-BB2C766C9B1D}" srcOrd="0" destOrd="1" presId="urn:microsoft.com/office/officeart/2005/8/layout/vList5"/>
+    <dgm:cxn modelId="{3B1ED675-063C-47DD-8EFE-6BB9D9426764}" srcId="{4655BB5F-4EBC-4207-A5B0-147FC724DAE7}" destId="{3C84C93E-F276-4672-8306-0D4EDC48291C}" srcOrd="0" destOrd="0" parTransId="{18AAB41D-8D7F-46E1-8A66-47A6E4B44E6E}" sibTransId="{6F06AEEB-27E4-4060-AD12-431800289540}"/>
     <dgm:cxn modelId="{87C43F12-B864-4A67-B24A-3EB2710BA809}" type="presOf" srcId="{E9A1F835-6E14-423F-892C-1E5350F4D404}" destId="{37B4A69E-BEAA-483D-A27B-B8066514DC2A}" srcOrd="0" destOrd="1" presId="urn:microsoft.com/office/officeart/2005/8/layout/vList5"/>
+    <dgm:cxn modelId="{7FDA67A2-CC00-44E7-BEB5-D239152E04EE}" srcId="{18A5A126-9CDF-408F-AED4-1709B1B7856C}" destId="{BB977D72-290E-42DF-B6F8-2AD2E69D3762}" srcOrd="1" destOrd="0" parTransId="{5ED6EE6B-050F-4A62-9A97-9909BF63F3BF}" sibTransId="{C467AD86-0A99-4F7B-BF89-07FBA45FAE9A}"/>
+    <dgm:cxn modelId="{19A200BB-5E81-4D36-8DFD-4D38E266CB4A}" srcId="{4655BB5F-4EBC-4207-A5B0-147FC724DAE7}" destId="{20AC9AF4-A267-4D5E-9755-9C098B10F303}" srcOrd="3" destOrd="0" parTransId="{D44B6C09-6E5C-497C-B00C-B56B66B0907F}" sibTransId="{B7881554-C08F-43C1-AE2C-D1A37106B272}"/>
     <dgm:cxn modelId="{E631812C-6B9D-4E57-B1E9-B09F0A03AC3B}" srcId="{4655BB5F-4EBC-4207-A5B0-147FC724DAE7}" destId="{D0F8E683-C4DC-481A-8BCD-4B33BA43D927}" srcOrd="2" destOrd="0" parTransId="{6388F7F7-BC70-40EC-8FAF-DD54C0D02487}" sibTransId="{01ADA495-5465-42CE-B1D0-9C68DEAC5498}"/>
-    <dgm:cxn modelId="{84950C3F-C348-4F3F-AF7D-CF2F03A99F71}" type="presOf" srcId="{ACA9C505-CD0B-4752-9300-8A1863EE07ED}" destId="{D510B8BF-35DE-4934-9EDD-BB2C766C9B1D}" srcOrd="0" destOrd="0" presId="urn:microsoft.com/office/officeart/2005/8/layout/vList5"/>
-    <dgm:cxn modelId="{A805535C-45CB-411D-B26B-CB9C35E95BCA}" type="presOf" srcId="{20AC9AF4-A267-4D5E-9755-9C098B10F303}" destId="{96A820CA-BC25-4317-9A27-1A1206B2F40D}" srcOrd="0" destOrd="0" presId="urn:microsoft.com/office/officeart/2005/8/layout/vList5"/>
+    <dgm:cxn modelId="{CE5AC1A0-72AA-4BAE-A979-AC61D3008BD2}" type="presOf" srcId="{4655BB5F-4EBC-4207-A5B0-147FC724DAE7}" destId="{5603229D-4475-4EBD-8B80-5BF85AF5A926}" srcOrd="0" destOrd="0" presId="urn:microsoft.com/office/officeart/2005/8/layout/vList5"/>
+    <dgm:cxn modelId="{64E39D71-D718-4821-B430-7DED81A1C673}" srcId="{20AC9AF4-A267-4D5E-9755-9C098B10F303}" destId="{9BE3BF22-2E45-4160-B620-9D51AEC383B5}" srcOrd="1" destOrd="0" parTransId="{909D2861-4BA0-4F26-AE5B-7F6CE7BE93D1}" sibTransId="{0A72E7A3-C243-42B6-B3A9-01079EF60D3D}"/>
+    <dgm:cxn modelId="{B54D4BA8-2D93-401F-9369-3B9FAF11BF1D}" type="presOf" srcId="{23807C4C-2DCB-4551-8F2D-7F715C6742A2}" destId="{7F9C28E1-28AC-404D-A8EF-ACDB5DFF50D9}" srcOrd="0" destOrd="1" presId="urn:microsoft.com/office/officeart/2005/8/layout/vList5"/>
     <dgm:cxn modelId="{29AC8E5D-B1F5-4BFA-9435-5A8D5E0E78EF}" type="presOf" srcId="{DAD6FF4F-6573-44CA-BBA6-AA6673522659}" destId="{3248EAB6-7CD9-4AF4-8610-E82B5A9C2B0F}" srcOrd="0" destOrd="0" presId="urn:microsoft.com/office/officeart/2005/8/layout/vList5"/>
-    <dgm:cxn modelId="{8540A648-0CCF-4E4F-B782-9217D67E063C}" type="presOf" srcId="{BA2DB30F-C26A-4431-8C29-A5CB73928175}" destId="{37B4A69E-BEAA-483D-A27B-B8066514DC2A}" srcOrd="0" destOrd="0" presId="urn:microsoft.com/office/officeart/2005/8/layout/vList5"/>
-    <dgm:cxn modelId="{CF1D1650-F396-49FB-A873-6FE141596A3B}" type="presOf" srcId="{9BE3BF22-2E45-4160-B620-9D51AEC383B5}" destId="{3248EAB6-7CD9-4AF4-8610-E82B5A9C2B0F}" srcOrd="0" destOrd="1" presId="urn:microsoft.com/office/officeart/2005/8/layout/vList5"/>
+    <dgm:cxn modelId="{16BD44F1-3513-4BA7-9D63-32D92206830D}" srcId="{3C84C93E-F276-4672-8306-0D4EDC48291C}" destId="{AD1158AF-1744-4807-9ED0-BAA14AAB0471}" srcOrd="0" destOrd="0" parTransId="{76200662-55F0-4D2B-8F4F-9431C761ACA2}" sibTransId="{A170262A-E59C-4C66-B35F-370FAF94CB57}"/>
     <dgm:cxn modelId="{192D5A71-0F14-4D2D-B65E-968D83E4D1B9}" type="presOf" srcId="{AD1158AF-1744-4807-9ED0-BAA14AAB0471}" destId="{7F9C28E1-28AC-404D-A8EF-ACDB5DFF50D9}" srcOrd="0" destOrd="0" presId="urn:microsoft.com/office/officeart/2005/8/layout/vList5"/>
-    <dgm:cxn modelId="{64E39D71-D718-4821-B430-7DED81A1C673}" srcId="{20AC9AF4-A267-4D5E-9755-9C098B10F303}" destId="{9BE3BF22-2E45-4160-B620-9D51AEC383B5}" srcOrd="1" destOrd="0" parTransId="{909D2861-4BA0-4F26-AE5B-7F6CE7BE93D1}" sibTransId="{0A72E7A3-C243-42B6-B3A9-01079EF60D3D}"/>
-    <dgm:cxn modelId="{2EC0C072-6C5C-4C35-AA9F-6D426F1E990B}" srcId="{18A5A126-9CDF-408F-AED4-1709B1B7856C}" destId="{ACA9C505-CD0B-4752-9300-8A1863EE07ED}" srcOrd="0" destOrd="0" parTransId="{722D4FBA-AFE0-4B18-9927-B3D40D502D1F}" sibTransId="{B9A8F6A4-D6F8-4C5E-9CFC-1EC774D0D933}"/>
-    <dgm:cxn modelId="{3B1ED675-063C-47DD-8EFE-6BB9D9426764}" srcId="{4655BB5F-4EBC-4207-A5B0-147FC724DAE7}" destId="{3C84C93E-F276-4672-8306-0D4EDC48291C}" srcOrd="0" destOrd="0" parTransId="{18AAB41D-8D7F-46E1-8A66-47A6E4B44E6E}" sibTransId="{6F06AEEB-27E4-4060-AD12-431800289540}"/>
-    <dgm:cxn modelId="{5FAAE87E-6F02-4A4D-A80D-03B20599D8C7}" srcId="{4655BB5F-4EBC-4207-A5B0-147FC724DAE7}" destId="{18A5A126-9CDF-408F-AED4-1709B1B7856C}" srcOrd="1" destOrd="0" parTransId="{C742BDC9-C7A2-4C81-9DCC-36EC82FCCFE4}" sibTransId="{1B9835CA-355C-422C-A0F3-E76C387F3609}"/>
-    <dgm:cxn modelId="{64DD1C90-3C90-46D1-991C-FD2892A0591D}" type="presOf" srcId="{18A5A126-9CDF-408F-AED4-1709B1B7856C}" destId="{7EFE7DE5-404E-420F-BB2C-8D177D4BD0E5}" srcOrd="0" destOrd="0" presId="urn:microsoft.com/office/officeart/2005/8/layout/vList5"/>
-    <dgm:cxn modelId="{61184497-FB9A-4517-B4E6-9A8B93550CFE}" type="presOf" srcId="{BB977D72-290E-42DF-B6F8-2AD2E69D3762}" destId="{D510B8BF-35DE-4934-9EDD-BB2C766C9B1D}" srcOrd="0" destOrd="1" presId="urn:microsoft.com/office/officeart/2005/8/layout/vList5"/>
-    <dgm:cxn modelId="{47CC6B9E-D179-4E52-A25A-91136DB78A3D}" srcId="{20AC9AF4-A267-4D5E-9755-9C098B10F303}" destId="{DAD6FF4F-6573-44CA-BBA6-AA6673522659}" srcOrd="0" destOrd="0" parTransId="{F6B8AF35-B27F-4B48-8A04-B523895CEE27}" sibTransId="{579B0503-F442-4237-ADA4-B2E641B0E6C9}"/>
-    <dgm:cxn modelId="{CE5AC1A0-72AA-4BAE-A979-AC61D3008BD2}" type="presOf" srcId="{4655BB5F-4EBC-4207-A5B0-147FC724DAE7}" destId="{5603229D-4475-4EBD-8B80-5BF85AF5A926}" srcOrd="0" destOrd="0" presId="urn:microsoft.com/office/officeart/2005/8/layout/vList5"/>
-    <dgm:cxn modelId="{7FDA67A2-CC00-44E7-BEB5-D239152E04EE}" srcId="{18A5A126-9CDF-408F-AED4-1709B1B7856C}" destId="{BB977D72-290E-42DF-B6F8-2AD2E69D3762}" srcOrd="1" destOrd="0" parTransId="{5ED6EE6B-050F-4A62-9A97-9909BF63F3BF}" sibTransId="{C467AD86-0A99-4F7B-BF89-07FBA45FAE9A}"/>
-    <dgm:cxn modelId="{B54D4BA8-2D93-401F-9369-3B9FAF11BF1D}" type="presOf" srcId="{23807C4C-2DCB-4551-8F2D-7F715C6742A2}" destId="{7F9C28E1-28AC-404D-A8EF-ACDB5DFF50D9}" srcOrd="0" destOrd="1" presId="urn:microsoft.com/office/officeart/2005/8/layout/vList5"/>
-    <dgm:cxn modelId="{57D385A9-DE56-43F5-9116-499131FF08E3}" srcId="{D0F8E683-C4DC-481A-8BCD-4B33BA43D927}" destId="{BA2DB30F-C26A-4431-8C29-A5CB73928175}" srcOrd="0" destOrd="0" parTransId="{88C1E58E-43BE-42F9-93DF-A962F3F20EB5}" sibTransId="{31F96A22-B396-492D-AFB1-97F5589DC161}"/>
-    <dgm:cxn modelId="{19A200BB-5E81-4D36-8DFD-4D38E266CB4A}" srcId="{4655BB5F-4EBC-4207-A5B0-147FC724DAE7}" destId="{20AC9AF4-A267-4D5E-9755-9C098B10F303}" srcOrd="3" destOrd="0" parTransId="{D44B6C09-6E5C-497C-B00C-B56B66B0907F}" sibTransId="{B7881554-C08F-43C1-AE2C-D1A37106B272}"/>
-    <dgm:cxn modelId="{33370FC1-1A83-45E0-AB6E-3C41CF6AA528}" type="presOf" srcId="{D0F8E683-C4DC-481A-8BCD-4B33BA43D927}" destId="{2DC11702-8290-49B6-BE15-B41D2A028289}" srcOrd="0" destOrd="0" presId="urn:microsoft.com/office/officeart/2005/8/layout/vList5"/>
-    <dgm:cxn modelId="{AFAC89D5-DCF5-433D-B507-927889F835B2}" type="presOf" srcId="{3C84C93E-F276-4672-8306-0D4EDC48291C}" destId="{9DB291ED-CC19-490E-961E-C63E51B3DEBD}" srcOrd="0" destOrd="0" presId="urn:microsoft.com/office/officeart/2005/8/layout/vList5"/>
-    <dgm:cxn modelId="{5A9C18E7-DDFB-4820-97E3-B9BF1D799526}" srcId="{D0F8E683-C4DC-481A-8BCD-4B33BA43D927}" destId="{E9A1F835-6E14-423F-892C-1E5350F4D404}" srcOrd="1" destOrd="0" parTransId="{1C8F4CC9-03DA-4CA8-B795-E109B6A3FA9D}" sibTransId="{0ADF2407-687D-4AA9-9C1D-67FF1F383CB0}"/>
-    <dgm:cxn modelId="{16BD44F1-3513-4BA7-9D63-32D92206830D}" srcId="{3C84C93E-F276-4672-8306-0D4EDC48291C}" destId="{AD1158AF-1744-4807-9ED0-BAA14AAB0471}" srcOrd="0" destOrd="0" parTransId="{76200662-55F0-4D2B-8F4F-9431C761ACA2}" sibTransId="{A170262A-E59C-4C66-B35F-370FAF94CB57}"/>
     <dgm:cxn modelId="{834169B6-AD5A-4387-AC27-FE79BC074758}" type="presParOf" srcId="{5603229D-4475-4EBD-8B80-5BF85AF5A926}" destId="{A403ADE2-8A92-4517-8307-DFE248D89559}" srcOrd="0" destOrd="0" presId="urn:microsoft.com/office/officeart/2005/8/layout/vList5"/>
     <dgm:cxn modelId="{370D849C-3816-46B9-BFAA-D9B257DF3189}" type="presParOf" srcId="{A403ADE2-8A92-4517-8307-DFE248D89559}" destId="{9DB291ED-CC19-490E-961E-C63E51B3DEBD}" srcOrd="0" destOrd="0" presId="urn:microsoft.com/office/officeart/2005/8/layout/vList5"/>
     <dgm:cxn modelId="{385E3975-42D5-4160-9F04-51093E8257B0}" type="presParOf" srcId="{A403ADE2-8A92-4517-8307-DFE248D89559}" destId="{7F9C28E1-28AC-404D-A8EF-ACDB5DFF50D9}" srcOrd="1" destOrd="0" presId="urn:microsoft.com/office/officeart/2005/8/layout/vList5"/>
@@ -3337,7 +3449,7 @@
             <a:spcAft>
               <a:spcPct val="15000"/>
             </a:spcAft>
-            <a:buChar char="•"/>
+            <a:buChar char="••"/>
           </a:pPr>
           <a:r>
             <a:rPr lang="en-US" sz="2000" kern="1200" dirty="0"/>
@@ -3374,7 +3486,7 @@
             <a:spcAft>
               <a:spcPct val="15000"/>
             </a:spcAft>
-            <a:buChar char="•"/>
+            <a:buChar char="••"/>
           </a:pPr>
           <a:r>
             <a:rPr lang="en-US" sz="2000" kern="1200" dirty="0"/>
@@ -3449,7 +3561,7 @@
         </a:bodyPr>
         <a:lstStyle/>
         <a:p>
-          <a:pPr marL="0" lvl="0" indent="0" algn="ctr" defTabSz="889000">
+          <a:pPr lvl="0" algn="ctr" defTabSz="889000">
             <a:lnSpc>
               <a:spcPct val="90000"/>
             </a:lnSpc>
@@ -3459,7 +3571,6 @@
             <a:spcAft>
               <a:spcPct val="35000"/>
             </a:spcAft>
-            <a:buNone/>
           </a:pPr>
           <a:r>
             <a:rPr lang="en-US" sz="2000" kern="1200" dirty="0"/>
@@ -3535,7 +3646,7 @@
             <a:spcAft>
               <a:spcPct val="15000"/>
             </a:spcAft>
-            <a:buChar char="•"/>
+            <a:buChar char="••"/>
           </a:pPr>
           <a:r>
             <a:rPr lang="en-US" sz="2000" kern="1200" dirty="0"/>
@@ -3583,7 +3694,7 @@
             <a:spcAft>
               <a:spcPct val="15000"/>
             </a:spcAft>
-            <a:buChar char="•"/>
+            <a:buChar char="••"/>
           </a:pPr>
           <a:r>
             <a:rPr lang="en-US" sz="2000" kern="1200" dirty="0"/>
@@ -3669,7 +3780,7 @@
         </a:bodyPr>
         <a:lstStyle/>
         <a:p>
-          <a:pPr marL="0" lvl="0" indent="0" algn="ctr" defTabSz="889000">
+          <a:pPr lvl="0" algn="ctr" defTabSz="889000">
             <a:lnSpc>
               <a:spcPct val="90000"/>
             </a:lnSpc>
@@ -3679,7 +3790,6 @@
             <a:spcAft>
               <a:spcPct val="35000"/>
             </a:spcAft>
-            <a:buNone/>
           </a:pPr>
           <a:r>
             <a:rPr lang="en-US" sz="2000" kern="1200" dirty="0"/>
@@ -3755,7 +3865,7 @@
             <a:spcAft>
               <a:spcPct val="15000"/>
             </a:spcAft>
-            <a:buChar char="•"/>
+            <a:buChar char="••"/>
           </a:pPr>
           <a:r>
             <a:rPr lang="en-US" sz="2000" kern="1200" dirty="0"/>
@@ -3803,7 +3913,7 @@
             <a:spcAft>
               <a:spcPct val="15000"/>
             </a:spcAft>
-            <a:buChar char="•"/>
+            <a:buChar char="••"/>
           </a:pPr>
           <a:r>
             <a:rPr lang="en-US" sz="2000" kern="1200" dirty="0"/>
@@ -3889,7 +3999,7 @@
         </a:bodyPr>
         <a:lstStyle/>
         <a:p>
-          <a:pPr marL="0" lvl="0" indent="0" algn="ctr" defTabSz="889000">
+          <a:pPr lvl="0" algn="ctr" defTabSz="889000">
             <a:lnSpc>
               <a:spcPct val="90000"/>
             </a:lnSpc>
@@ -3899,7 +4009,6 @@
             <a:spcAft>
               <a:spcPct val="35000"/>
             </a:spcAft>
-            <a:buNone/>
           </a:pPr>
           <a:r>
             <a:rPr lang="en-US" sz="2000" kern="1200" dirty="0"/>
@@ -3987,7 +4096,7 @@
             <a:spcAft>
               <a:spcPct val="15000"/>
             </a:spcAft>
-            <a:buChar char="•"/>
+            <a:buChar char="••"/>
           </a:pPr>
           <a:r>
             <a:rPr lang="en-US" sz="2000" kern="1200" dirty="0"/>
@@ -4038,7 +4147,7 @@
             <a:spcAft>
               <a:spcPct val="15000"/>
             </a:spcAft>
-            <a:buChar char="•"/>
+            <a:buChar char="••"/>
           </a:pPr>
           <a:r>
             <a:rPr lang="en-US" sz="2000" kern="1200" dirty="0"/>
@@ -4127,7 +4236,7 @@
         </a:bodyPr>
         <a:lstStyle/>
         <a:p>
-          <a:pPr marL="0" lvl="0" indent="0" algn="ctr" defTabSz="889000">
+          <a:pPr lvl="0" algn="ctr" defTabSz="889000">
             <a:lnSpc>
               <a:spcPct val="90000"/>
             </a:lnSpc>
@@ -4137,7 +4246,6 @@
             <a:spcAft>
               <a:spcPct val="35000"/>
             </a:spcAft>
-            <a:buNone/>
           </a:pPr>
           <a:r>
             <a:rPr lang="en-US" sz="2000" kern="1200" dirty="0"/>
@@ -4213,7 +4321,7 @@
             <a:spcAft>
               <a:spcPct val="15000"/>
             </a:spcAft>
-            <a:buChar char="•"/>
+            <a:buChar char="••"/>
           </a:pPr>
           <a:r>
             <a:rPr lang="en-US" sz="2000" kern="1200" dirty="0"/>
@@ -4258,7 +4366,7 @@
             <a:spcAft>
               <a:spcPct val="15000"/>
             </a:spcAft>
-            <a:buChar char="•"/>
+            <a:buChar char="••"/>
           </a:pPr>
           <a:r>
             <a:rPr lang="en-US" sz="2000" kern="1200" dirty="0"/>
@@ -4341,7 +4449,7 @@
         </a:bodyPr>
         <a:lstStyle/>
         <a:p>
-          <a:pPr marL="0" lvl="0" indent="0" algn="ctr" defTabSz="889000">
+          <a:pPr lvl="0" algn="ctr" defTabSz="889000">
             <a:lnSpc>
               <a:spcPct val="90000"/>
             </a:lnSpc>
@@ -4351,7 +4459,6 @@
             <a:spcAft>
               <a:spcPct val="35000"/>
             </a:spcAft>
-            <a:buNone/>
           </a:pPr>
           <a:r>
             <a:rPr lang="en-US" sz="2000" kern="1200" dirty="0"/>
@@ -4427,7 +4534,7 @@
             <a:spcAft>
               <a:spcPct val="15000"/>
             </a:spcAft>
-            <a:buChar char="•"/>
+            <a:buChar char="••"/>
           </a:pPr>
           <a:r>
             <a:rPr lang="en-US" sz="2000" kern="1200" dirty="0"/>
@@ -4466,7 +4573,7 @@
             <a:spcAft>
               <a:spcPct val="15000"/>
             </a:spcAft>
-            <a:buChar char="•"/>
+            <a:buChar char="••"/>
           </a:pPr>
           <a:r>
             <a:rPr lang="en-US" sz="2000" kern="1200" dirty="0"/>
@@ -4543,7 +4650,7 @@
         </a:bodyPr>
         <a:lstStyle/>
         <a:p>
-          <a:pPr marL="0" lvl="0" indent="0" algn="ctr" defTabSz="889000">
+          <a:pPr lvl="0" algn="ctr" defTabSz="889000">
             <a:lnSpc>
               <a:spcPct val="90000"/>
             </a:lnSpc>
@@ -4553,7 +4660,6 @@
             <a:spcAft>
               <a:spcPct val="35000"/>
             </a:spcAft>
-            <a:buNone/>
           </a:pPr>
           <a:r>
             <a:rPr lang="en-US" sz="2000" kern="1200" dirty="0"/>
@@ -4629,7 +4735,7 @@
             <a:spcAft>
               <a:spcPct val="15000"/>
             </a:spcAft>
-            <a:buChar char="•"/>
+            <a:buChar char="••"/>
           </a:pPr>
           <a:r>
             <a:rPr lang="en-US" sz="2000" kern="1200" dirty="0"/>
@@ -4695,7 +4801,7 @@
             <a:spcAft>
               <a:spcPct val="15000"/>
             </a:spcAft>
-            <a:buChar char="•"/>
+            <a:buChar char="••"/>
           </a:pPr>
           <a:r>
             <a:rPr lang="en-US" sz="2000" kern="1200" dirty="0"/>
@@ -4799,7 +4905,7 @@
         </a:bodyPr>
         <a:lstStyle/>
         <a:p>
-          <a:pPr marL="0" lvl="0" indent="0" algn="ctr" defTabSz="889000">
+          <a:pPr lvl="0" algn="ctr" defTabSz="889000">
             <a:lnSpc>
               <a:spcPct val="90000"/>
             </a:lnSpc>
@@ -4809,7 +4915,6 @@
             <a:spcAft>
               <a:spcPct val="35000"/>
             </a:spcAft>
-            <a:buNone/>
           </a:pPr>
           <a:r>
             <a:rPr lang="en-US" sz="2000" kern="1200" dirty="0"/>
@@ -11678,8 +11783,8 @@
         </p:nvSpPr>
         <p:spPr>
           <a:xfrm>
-            <a:off x="26067557" y="21922094"/>
-            <a:ext cx="9368524" cy="3970318"/>
+            <a:off x="26169410" y="21642497"/>
+            <a:ext cx="9673165" cy="5632311"/>
           </a:xfrm>
           <a:prstGeom prst="rect">
             <a:avLst/>
@@ -11707,9 +11812,20 @@
               <a:buChar char="•"/>
             </a:pPr>
             <a:r>
-              <a:rPr lang="en-US" sz="3600" dirty="0"/>
-              <a:t>No unit testing or code coverage because Black Box tests cover the majority of use cases</a:t>
-            </a:r>
+              <a:rPr lang="en-US" sz="3600" dirty="0" smtClean="0"/>
+              <a:t>No unit testing for main code because Black Box tests cover the majority of use cases</a:t>
+            </a:r>
+          </a:p>
+          <a:p>
+            <a:pPr marL="571500" lvl="1" indent="-571500">
+              <a:buFont typeface="Arial" panose="020B0604020202020204" pitchFamily="34" charset="0"/>
+              <a:buChar char="•"/>
+            </a:pPr>
+            <a:r>
+              <a:rPr lang="en-US" sz="3600" dirty="0" smtClean="0"/>
+              <a:t>Because of parse tree complexity, Black Box tests cover use cases we wouldn’t come up with</a:t>
+            </a:r>
+            <a:endParaRPr lang="en-US" sz="3600" dirty="0" smtClean="0"/>
           </a:p>
           <a:p>
             <a:pPr marL="571500" indent="-571500">
@@ -11717,8 +11833,27 @@
               <a:buChar char="•"/>
             </a:pPr>
             <a:r>
+              <a:rPr lang="en-US" sz="3600" dirty="0" smtClean="0"/>
+              <a:t>Unit test for all database functions</a:t>
+            </a:r>
+            <a:endParaRPr lang="en-US" sz="3600" dirty="0"/>
+          </a:p>
+          <a:p>
+            <a:pPr marL="571500" indent="-571500">
+              <a:buFont typeface="Arial" panose="020B0604020202020204" pitchFamily="34" charset="0"/>
+              <a:buChar char="•"/>
+            </a:pPr>
+            <a:r>
               <a:rPr lang="en-US" sz="3600" dirty="0"/>
-              <a:t>The tests use a common file structure, allowing more tests to be added with minimal effort</a:t>
+              <a:t>The </a:t>
+            </a:r>
+            <a:r>
+              <a:rPr lang="en-US" sz="3600" dirty="0" smtClean="0"/>
+              <a:t>Black Box tests </a:t>
+            </a:r>
+            <a:r>
+              <a:rPr lang="en-US" sz="3600" dirty="0"/>
+              <a:t>use a common file structure, allowing more tests to be added with minimal effort</a:t>
             </a:r>
           </a:p>
         </p:txBody>

</xml_diff>

<commit_message>
renamed black box classes to indicate that they are black box classes
</commit_message>
<xml_diff>
--- a/documentation/poster.pptx
+++ b/documentation/poster.pptx
@@ -3329,9 +3329,9 @@
   <dgm:cxnLst>
     <dgm:cxn modelId="{64DD1C90-3C90-46D1-991C-FD2892A0591D}" type="presOf" srcId="{18A5A126-9CDF-408F-AED4-1709B1B7856C}" destId="{7EFE7DE5-404E-420F-BB2C-8D177D4BD0E5}" srcOrd="0" destOrd="0" presId="urn:microsoft.com/office/officeart/2005/8/layout/vList5"/>
     <dgm:cxn modelId="{2EC0C072-6C5C-4C35-AA9F-6D426F1E990B}" srcId="{18A5A126-9CDF-408F-AED4-1709B1B7856C}" destId="{ACA9C505-CD0B-4752-9300-8A1863EE07ED}" srcOrd="0" destOrd="0" parTransId="{722D4FBA-AFE0-4B18-9927-B3D40D502D1F}" sibTransId="{B9A8F6A4-D6F8-4C5E-9CFC-1EC774D0D933}"/>
+    <dgm:cxn modelId="{CF1D1650-F396-49FB-A873-6FE141596A3B}" type="presOf" srcId="{9BE3BF22-2E45-4160-B620-9D51AEC383B5}" destId="{3248EAB6-7CD9-4AF4-8610-E82B5A9C2B0F}" srcOrd="0" destOrd="1" presId="urn:microsoft.com/office/officeart/2005/8/layout/vList5"/>
+    <dgm:cxn modelId="{AFAC89D5-DCF5-433D-B507-927889F835B2}" type="presOf" srcId="{3C84C93E-F276-4672-8306-0D4EDC48291C}" destId="{9DB291ED-CC19-490E-961E-C63E51B3DEBD}" srcOrd="0" destOrd="0" presId="urn:microsoft.com/office/officeart/2005/8/layout/vList5"/>
     <dgm:cxn modelId="{5A9C18E7-DDFB-4820-97E3-B9BF1D799526}" srcId="{D0F8E683-C4DC-481A-8BCD-4B33BA43D927}" destId="{E9A1F835-6E14-423F-892C-1E5350F4D404}" srcOrd="1" destOrd="0" parTransId="{1C8F4CC9-03DA-4CA8-B795-E109B6A3FA9D}" sibTransId="{0ADF2407-687D-4AA9-9C1D-67FF1F383CB0}"/>
-    <dgm:cxn modelId="{AFAC89D5-DCF5-433D-B507-927889F835B2}" type="presOf" srcId="{3C84C93E-F276-4672-8306-0D4EDC48291C}" destId="{9DB291ED-CC19-490E-961E-C63E51B3DEBD}" srcOrd="0" destOrd="0" presId="urn:microsoft.com/office/officeart/2005/8/layout/vList5"/>
-    <dgm:cxn modelId="{CF1D1650-F396-49FB-A873-6FE141596A3B}" type="presOf" srcId="{9BE3BF22-2E45-4160-B620-9D51AEC383B5}" destId="{3248EAB6-7CD9-4AF4-8610-E82B5A9C2B0F}" srcOrd="0" destOrd="1" presId="urn:microsoft.com/office/officeart/2005/8/layout/vList5"/>
     <dgm:cxn modelId="{31ED1609-EE0B-4F1F-AECD-9A7244C2832E}" srcId="{3C84C93E-F276-4672-8306-0D4EDC48291C}" destId="{23807C4C-2DCB-4551-8F2D-7F715C6742A2}" srcOrd="1" destOrd="0" parTransId="{3761A983-A35D-4BA9-861F-A447DD3C1B1C}" sibTransId="{DBCDE35C-4C80-483B-8006-3FB356AD5639}"/>
     <dgm:cxn modelId="{8540A648-0CCF-4E4F-B782-9217D67E063C}" type="presOf" srcId="{BA2DB30F-C26A-4431-8C29-A5CB73928175}" destId="{37B4A69E-BEAA-483D-A27B-B8066514DC2A}" srcOrd="0" destOrd="0" presId="urn:microsoft.com/office/officeart/2005/8/layout/vList5"/>
     <dgm:cxn modelId="{57D385A9-DE56-43F5-9116-499131FF08E3}" srcId="{D0F8E683-C4DC-481A-8BCD-4B33BA43D927}" destId="{BA2DB30F-C26A-4431-8C29-A5CB73928175}" srcOrd="0" destOrd="0" parTransId="{88C1E58E-43BE-42F9-93DF-A962F3F20EB5}" sibTransId="{31F96A22-B396-492D-AFB1-97F5589DC161}"/>
@@ -11784,7 +11784,7 @@
         <p:spPr>
           <a:xfrm>
             <a:off x="26169410" y="21642497"/>
-            <a:ext cx="9673165" cy="5632311"/>
+            <a:ext cx="9520765" cy="5078313"/>
           </a:xfrm>
           <a:prstGeom prst="rect">
             <a:avLst/>
@@ -11813,17 +11813,11 @@
             </a:pPr>
             <a:r>
               <a:rPr lang="en-US" sz="3600" dirty="0" smtClean="0"/>
-              <a:t>No unit testing for main code because Black Box tests cover the majority of use cases</a:t>
-            </a:r>
-          </a:p>
-          <a:p>
-            <a:pPr marL="571500" lvl="1" indent="-571500">
-              <a:buFont typeface="Arial" panose="020B0604020202020204" pitchFamily="34" charset="0"/>
-              <a:buChar char="•"/>
-            </a:pPr>
+              <a:t>No unit testing for main code because Black Box tests cover the majority of use </a:t>
+            </a:r>
             <a:r>
               <a:rPr lang="en-US" sz="3600" dirty="0" smtClean="0"/>
-              <a:t>Because of parse tree complexity, Black Box tests cover use cases we wouldn’t come up with</a:t>
+              <a:t>cases, along with cases we wouldn’t have come up with</a:t>
             </a:r>
             <a:endParaRPr lang="en-US" sz="3600" dirty="0" smtClean="0"/>
           </a:p>

</xml_diff>

<commit_message>
move headers down 7
</commit_message>
<xml_diff>
--- a/documentation/poster.pptx
+++ b/documentation/poster.pptx
@@ -133,15 +133,6 @@
 </p:cmAuthorLst>
 </file>
 
-<file path=ppt/comments/comment1.xml><?xml version="1.0" encoding="utf-8"?>
-<p:cmLst xmlns:a="http://schemas.openxmlformats.org/drawingml/2006/main" xmlns:r="http://schemas.openxmlformats.org/officeDocument/2006/relationships" xmlns:p="http://schemas.openxmlformats.org/presentationml/2006/main">
-  <p:cm authorId="2" dt="2017-04-25T16:32:35.627" idx="8">
-    <p:pos x="6498" y="3879"/>
-    <p:text>This section is so wordy...can you create short phrases instead and convey the info you need to?</p:text>
-  </p:cm>
-</p:cmLst>
-</file>
-
 <file path=ppt/diagrams/colors1.xml><?xml version="1.0" encoding="utf-8"?>
 <dgm:colorsDef xmlns:dgm="http://schemas.openxmlformats.org/drawingml/2006/diagram" xmlns:a="http://schemas.openxmlformats.org/drawingml/2006/main" uniqueId="urn:microsoft.com/office/officeart/2005/8/colors/accent1_2">
   <dgm:title val=""/>
@@ -2204,13 +2195,6 @@
         </dgm:presLayoutVars>
       </dgm:prSet>
       <dgm:spPr/>
-      <dgm:t>
-        <a:bodyPr/>
-        <a:lstStyle/>
-        <a:p>
-          <a:endParaRPr lang="en-US"/>
-        </a:p>
-      </dgm:t>
     </dgm:pt>
     <dgm:pt modelId="{C86DE2E3-3485-4D88-991A-33C9416C5246}" type="pres">
       <dgm:prSet presAssocID="{CE704066-F6EC-4A34-BE57-F031F6F97A0E}" presName="linNode" presStyleCnt="0"/>
@@ -2224,13 +2208,6 @@
         </dgm:presLayoutVars>
       </dgm:prSet>
       <dgm:spPr/>
-      <dgm:t>
-        <a:bodyPr/>
-        <a:lstStyle/>
-        <a:p>
-          <a:endParaRPr lang="en-US"/>
-        </a:p>
-      </dgm:t>
     </dgm:pt>
     <dgm:pt modelId="{3DC572B2-C7F7-45EE-8266-8D3A0F1AF860}" type="pres">
       <dgm:prSet presAssocID="{CE704066-F6EC-4A34-BE57-F031F6F97A0E}" presName="descendantText" presStyleLbl="alignAccFollowNode1" presStyleIdx="0" presStyleCnt="3" custScaleX="83046" custScaleY="97043" custLinFactNeighborX="-49228" custLinFactNeighborY="-1639">
@@ -2239,13 +2216,6 @@
         </dgm:presLayoutVars>
       </dgm:prSet>
       <dgm:spPr/>
-      <dgm:t>
-        <a:bodyPr/>
-        <a:lstStyle/>
-        <a:p>
-          <a:endParaRPr lang="en-US"/>
-        </a:p>
-      </dgm:t>
     </dgm:pt>
     <dgm:pt modelId="{356BFF2B-59F5-4B2D-A37F-4D545FC129A8}" type="pres">
       <dgm:prSet presAssocID="{2190222A-E708-44B6-912C-16ACA9D69599}" presName="sp" presStyleCnt="0"/>
@@ -2263,13 +2233,6 @@
         </dgm:presLayoutVars>
       </dgm:prSet>
       <dgm:spPr/>
-      <dgm:t>
-        <a:bodyPr/>
-        <a:lstStyle/>
-        <a:p>
-          <a:endParaRPr lang="en-US"/>
-        </a:p>
-      </dgm:t>
     </dgm:pt>
     <dgm:pt modelId="{6DA4FE5C-CB21-47E7-B0F0-9CB097B5E464}" type="pres">
       <dgm:prSet presAssocID="{5D518925-A42D-44F7-8A34-D7EE8C8BA4F6}" presName="descendantText" presStyleLbl="alignAccFollowNode1" presStyleIdx="1" presStyleCnt="3" custScaleX="83513" custScaleY="98778" custLinFactNeighborX="-49429" custLinFactNeighborY="5248">
@@ -2278,13 +2241,6 @@
         </dgm:presLayoutVars>
       </dgm:prSet>
       <dgm:spPr/>
-      <dgm:t>
-        <a:bodyPr/>
-        <a:lstStyle/>
-        <a:p>
-          <a:endParaRPr lang="en-US"/>
-        </a:p>
-      </dgm:t>
     </dgm:pt>
     <dgm:pt modelId="{89AEE0E6-A6EE-4F95-9EFD-E7951DB92FAA}" type="pres">
       <dgm:prSet presAssocID="{8E9682BF-077B-49CE-83FC-92F75221525A}" presName="sp" presStyleCnt="0"/>
@@ -2302,13 +2258,6 @@
         </dgm:presLayoutVars>
       </dgm:prSet>
       <dgm:spPr/>
-      <dgm:t>
-        <a:bodyPr/>
-        <a:lstStyle/>
-        <a:p>
-          <a:endParaRPr lang="en-US"/>
-        </a:p>
-      </dgm:t>
     </dgm:pt>
     <dgm:pt modelId="{94FD681E-6FED-4D1A-91A3-94D9AE5BBDC1}" type="pres">
       <dgm:prSet presAssocID="{93B62B81-D7F7-431E-9439-2E3D4CD2353E}" presName="descendantText" presStyleLbl="alignAccFollowNode1" presStyleIdx="2" presStyleCnt="3" custScaleX="83693" custScaleY="87287" custLinFactNeighborX="-48773" custLinFactNeighborY="1350">
@@ -2317,35 +2266,28 @@
         </dgm:presLayoutVars>
       </dgm:prSet>
       <dgm:spPr/>
-      <dgm:t>
-        <a:bodyPr/>
-        <a:lstStyle/>
-        <a:p>
-          <a:endParaRPr lang="en-US"/>
-        </a:p>
-      </dgm:t>
     </dgm:pt>
   </dgm:ptLst>
   <dgm:cxnLst>
-    <dgm:cxn modelId="{46BEEEEA-8181-4496-8F3E-4B42C7BEC8A4}" srcId="{BE1D1458-5D71-486A-9C06-F8C2979301CE}" destId="{93B62B81-D7F7-431E-9439-2E3D4CD2353E}" srcOrd="2" destOrd="0" parTransId="{CF446EAA-D8CD-45A9-B112-FE71C0FABC3A}" sibTransId="{99D4F5D3-8426-4A0A-9AFF-9CC195309684}"/>
+    <dgm:cxn modelId="{670CE803-5732-44F7-8BFC-139BBB9EFD9D}" srcId="{5D518925-A42D-44F7-8A34-D7EE8C8BA4F6}" destId="{5F3C6D8C-49F5-414A-9B7D-37B3F73CBB71}" srcOrd="1" destOrd="0" parTransId="{21512CD3-C611-4379-A522-10F5A3696ED3}" sibTransId="{CE942B8A-FC02-4475-BE3F-E505BC877B1D}"/>
+    <dgm:cxn modelId="{B7847806-6502-4A85-AA95-FB3B3F9F8E85}" srcId="{93B62B81-D7F7-431E-9439-2E3D4CD2353E}" destId="{491443E3-89AE-4FE4-92A7-C951F26ADF15}" srcOrd="0" destOrd="0" parTransId="{21A27C6B-BD4F-4728-8495-2749C96FF1CC}" sibTransId="{892CAB94-5167-438E-8541-2DCB69385D70}"/>
+    <dgm:cxn modelId="{196DD02D-672C-4265-9958-28C33653829B}" type="presOf" srcId="{96D2705E-7225-4E32-BBCA-73AADEC51771}" destId="{3DC572B2-C7F7-45EE-8266-8D3A0F1AF860}" srcOrd="0" destOrd="0" presId="urn:microsoft.com/office/officeart/2005/8/layout/vList5"/>
+    <dgm:cxn modelId="{B5EA5F30-9689-4546-8120-3309418A9BF6}" type="presOf" srcId="{BE1D1458-5D71-486A-9C06-F8C2979301CE}" destId="{E4832E59-FCA4-4EC2-82F5-B4BFAF552C72}" srcOrd="0" destOrd="0" presId="urn:microsoft.com/office/officeart/2005/8/layout/vList5"/>
     <dgm:cxn modelId="{4C11CF35-6553-44AE-BF05-CC97F67390E3}" type="presOf" srcId="{E4B44728-031A-45B4-A960-6D7C98163EB4}" destId="{3DC572B2-C7F7-45EE-8266-8D3A0F1AF860}" srcOrd="0" destOrd="1" presId="urn:microsoft.com/office/officeart/2005/8/layout/vList5"/>
-    <dgm:cxn modelId="{294848E5-A50B-4122-8FC4-07D10048A02B}" type="presOf" srcId="{491443E3-89AE-4FE4-92A7-C951F26ADF15}" destId="{94FD681E-6FED-4D1A-91A3-94D9AE5BBDC1}" srcOrd="0" destOrd="0" presId="urn:microsoft.com/office/officeart/2005/8/layout/vList5"/>
-    <dgm:cxn modelId="{B3A6FD9F-23A2-4187-BE54-08ED4A00065C}" type="presOf" srcId="{93B62B81-D7F7-431E-9439-2E3D4CD2353E}" destId="{A578B4B1-012F-4704-840D-D9A1F6815359}" srcOrd="0" destOrd="0" presId="urn:microsoft.com/office/officeart/2005/8/layout/vList5"/>
-    <dgm:cxn modelId="{FB5D5687-CBA9-4DC5-BA0C-6E946062A079}" type="presOf" srcId="{72B0AA1E-CB07-4D66-8C5F-5084D4F61D84}" destId="{94FD681E-6FED-4D1A-91A3-94D9AE5BBDC1}" srcOrd="0" destOrd="1" presId="urn:microsoft.com/office/officeart/2005/8/layout/vList5"/>
     <dgm:cxn modelId="{CB5E2C5D-CEAC-421F-B401-2DA7AD423DE3}" srcId="{BE1D1458-5D71-486A-9C06-F8C2979301CE}" destId="{5D518925-A42D-44F7-8A34-D7EE8C8BA4F6}" srcOrd="1" destOrd="0" parTransId="{3F7C9D5E-9B3B-436C-98DD-9AB7ED4F3098}" sibTransId="{8E9682BF-077B-49CE-83FC-92F75221525A}"/>
     <dgm:cxn modelId="{D3E26C67-6F84-4E24-8129-8C98E7E91547}" srcId="{BE1D1458-5D71-486A-9C06-F8C2979301CE}" destId="{CE704066-F6EC-4A34-BE57-F031F6F97A0E}" srcOrd="0" destOrd="0" parTransId="{39B9789B-9256-4F63-B415-E8CB368FCE65}" sibTransId="{2190222A-E708-44B6-912C-16ACA9D69599}"/>
-    <dgm:cxn modelId="{2D5599CD-EE5D-40F9-A0FD-CC1E62ECA14E}" srcId="{CE704066-F6EC-4A34-BE57-F031F6F97A0E}" destId="{E4B44728-031A-45B4-A960-6D7C98163EB4}" srcOrd="1" destOrd="0" parTransId="{A6A79D2A-79DB-436D-AB27-E222CDBC7436}" sibTransId="{F9EF34C1-D145-4D03-BEF0-2842C4F14E8F}"/>
-    <dgm:cxn modelId="{31ED0CFA-3F9C-4EC0-89AC-690C51CC9BA5}" type="presOf" srcId="{5D518925-A42D-44F7-8A34-D7EE8C8BA4F6}" destId="{A5D97866-9099-44CF-8392-E4D04C75D305}" srcOrd="0" destOrd="0" presId="urn:microsoft.com/office/officeart/2005/8/layout/vList5"/>
-    <dgm:cxn modelId="{670CE803-5732-44F7-8BFC-139BBB9EFD9D}" srcId="{5D518925-A42D-44F7-8A34-D7EE8C8BA4F6}" destId="{5F3C6D8C-49F5-414A-9B7D-37B3F73CBB71}" srcOrd="1" destOrd="0" parTransId="{21512CD3-C611-4379-A522-10F5A3696ED3}" sibTransId="{CE942B8A-FC02-4475-BE3F-E505BC877B1D}"/>
-    <dgm:cxn modelId="{BE7532DD-61C4-419A-9602-441A2CB79061}" srcId="{5D518925-A42D-44F7-8A34-D7EE8C8BA4F6}" destId="{FD7D5C93-D69E-40C6-971E-DE23F823AC96}" srcOrd="0" destOrd="0" parTransId="{A885DEA9-B00A-4431-98A9-DE220F925B82}" sibTransId="{F77961E8-CCF0-4884-B78F-402299556199}"/>
     <dgm:cxn modelId="{5D9C2078-89FC-4FB2-BBDB-58805684377A}" srcId="{93B62B81-D7F7-431E-9439-2E3D4CD2353E}" destId="{72B0AA1E-CB07-4D66-8C5F-5084D4F61D84}" srcOrd="1" destOrd="0" parTransId="{C7FF9C0A-64CD-4E9C-AF44-B8A14C148043}" sibTransId="{432643FE-DCC3-4D28-9715-CB09FF1D1DC6}"/>
     <dgm:cxn modelId="{263AB879-3159-43DD-A7DA-56351BC654F5}" srcId="{CE704066-F6EC-4A34-BE57-F031F6F97A0E}" destId="{96D2705E-7225-4E32-BBCA-73AADEC51771}" srcOrd="0" destOrd="0" parTransId="{B6FE3FB8-829C-4505-ADEF-C25B4D0E3D19}" sibTransId="{7D84155D-6B55-476E-8E57-41C47780CABE}"/>
     <dgm:cxn modelId="{33DDB27E-1AF9-41BA-B515-48F3163A6E91}" type="presOf" srcId="{5F3C6D8C-49F5-414A-9B7D-37B3F73CBB71}" destId="{6DA4FE5C-CB21-47E7-B0F0-9CB097B5E464}" srcOrd="0" destOrd="1" presId="urn:microsoft.com/office/officeart/2005/8/layout/vList5"/>
+    <dgm:cxn modelId="{FB5D5687-CBA9-4DC5-BA0C-6E946062A079}" type="presOf" srcId="{72B0AA1E-CB07-4D66-8C5F-5084D4F61D84}" destId="{94FD681E-6FED-4D1A-91A3-94D9AE5BBDC1}" srcOrd="0" destOrd="1" presId="urn:microsoft.com/office/officeart/2005/8/layout/vList5"/>
+    <dgm:cxn modelId="{B3A6FD9F-23A2-4187-BE54-08ED4A00065C}" type="presOf" srcId="{93B62B81-D7F7-431E-9439-2E3D4CD2353E}" destId="{A578B4B1-012F-4704-840D-D9A1F6815359}" srcOrd="0" destOrd="0" presId="urn:microsoft.com/office/officeart/2005/8/layout/vList5"/>
+    <dgm:cxn modelId="{2C8F8EBD-D261-4528-82AD-750347F41495}" type="presOf" srcId="{FD7D5C93-D69E-40C6-971E-DE23F823AC96}" destId="{6DA4FE5C-CB21-47E7-B0F0-9CB097B5E464}" srcOrd="0" destOrd="0" presId="urn:microsoft.com/office/officeart/2005/8/layout/vList5"/>
+    <dgm:cxn modelId="{2D5599CD-EE5D-40F9-A0FD-CC1E62ECA14E}" srcId="{CE704066-F6EC-4A34-BE57-F031F6F97A0E}" destId="{E4B44728-031A-45B4-A960-6D7C98163EB4}" srcOrd="1" destOrd="0" parTransId="{A6A79D2A-79DB-436D-AB27-E222CDBC7436}" sibTransId="{F9EF34C1-D145-4D03-BEF0-2842C4F14E8F}"/>
+    <dgm:cxn modelId="{BE7532DD-61C4-419A-9602-441A2CB79061}" srcId="{5D518925-A42D-44F7-8A34-D7EE8C8BA4F6}" destId="{FD7D5C93-D69E-40C6-971E-DE23F823AC96}" srcOrd="0" destOrd="0" parTransId="{A885DEA9-B00A-4431-98A9-DE220F925B82}" sibTransId="{F77961E8-CCF0-4884-B78F-402299556199}"/>
+    <dgm:cxn modelId="{294848E5-A50B-4122-8FC4-07D10048A02B}" type="presOf" srcId="{491443E3-89AE-4FE4-92A7-C951F26ADF15}" destId="{94FD681E-6FED-4D1A-91A3-94D9AE5BBDC1}" srcOrd="0" destOrd="0" presId="urn:microsoft.com/office/officeart/2005/8/layout/vList5"/>
+    <dgm:cxn modelId="{46BEEEEA-8181-4496-8F3E-4B42C7BEC8A4}" srcId="{BE1D1458-5D71-486A-9C06-F8C2979301CE}" destId="{93B62B81-D7F7-431E-9439-2E3D4CD2353E}" srcOrd="2" destOrd="0" parTransId="{CF446EAA-D8CD-45A9-B112-FE71C0FABC3A}" sibTransId="{99D4F5D3-8426-4A0A-9AFF-9CC195309684}"/>
+    <dgm:cxn modelId="{31ED0CFA-3F9C-4EC0-89AC-690C51CC9BA5}" type="presOf" srcId="{5D518925-A42D-44F7-8A34-D7EE8C8BA4F6}" destId="{A5D97866-9099-44CF-8392-E4D04C75D305}" srcOrd="0" destOrd="0" presId="urn:microsoft.com/office/officeart/2005/8/layout/vList5"/>
     <dgm:cxn modelId="{5F24A8FD-6B4A-49D3-B691-5F99C562E169}" type="presOf" srcId="{CE704066-F6EC-4A34-BE57-F031F6F97A0E}" destId="{89A3A35E-A31F-4A19-88A6-C711D22D028E}" srcOrd="0" destOrd="0" presId="urn:microsoft.com/office/officeart/2005/8/layout/vList5"/>
-    <dgm:cxn modelId="{B7847806-6502-4A85-AA95-FB3B3F9F8E85}" srcId="{93B62B81-D7F7-431E-9439-2E3D4CD2353E}" destId="{491443E3-89AE-4FE4-92A7-C951F26ADF15}" srcOrd="0" destOrd="0" parTransId="{21A27C6B-BD4F-4728-8495-2749C96FF1CC}" sibTransId="{892CAB94-5167-438E-8541-2DCB69385D70}"/>
-    <dgm:cxn modelId="{B5EA5F30-9689-4546-8120-3309418A9BF6}" type="presOf" srcId="{BE1D1458-5D71-486A-9C06-F8C2979301CE}" destId="{E4832E59-FCA4-4EC2-82F5-B4BFAF552C72}" srcOrd="0" destOrd="0" presId="urn:microsoft.com/office/officeart/2005/8/layout/vList5"/>
-    <dgm:cxn modelId="{196DD02D-672C-4265-9958-28C33653829B}" type="presOf" srcId="{96D2705E-7225-4E32-BBCA-73AADEC51771}" destId="{3DC572B2-C7F7-45EE-8266-8D3A0F1AF860}" srcOrd="0" destOrd="0" presId="urn:microsoft.com/office/officeart/2005/8/layout/vList5"/>
-    <dgm:cxn modelId="{2C8F8EBD-D261-4528-82AD-750347F41495}" type="presOf" srcId="{FD7D5C93-D69E-40C6-971E-DE23F823AC96}" destId="{6DA4FE5C-CB21-47E7-B0F0-9CB097B5E464}" srcOrd="0" destOrd="0" presId="urn:microsoft.com/office/officeart/2005/8/layout/vList5"/>
     <dgm:cxn modelId="{28AA4A30-AA5E-429A-819F-57E39EB52A28}" type="presParOf" srcId="{E4832E59-FCA4-4EC2-82F5-B4BFAF552C72}" destId="{C86DE2E3-3485-4D88-991A-33C9416C5246}" srcOrd="0" destOrd="0" presId="urn:microsoft.com/office/officeart/2005/8/layout/vList5"/>
     <dgm:cxn modelId="{F31821A7-9748-44E7-A0CC-6C3DEECFE1DD}" type="presParOf" srcId="{C86DE2E3-3485-4D88-991A-33C9416C5246}" destId="{89A3A35E-A31F-4A19-88A6-C711D22D028E}" srcOrd="0" destOrd="0" presId="urn:microsoft.com/office/officeart/2005/8/layout/vList5"/>
     <dgm:cxn modelId="{1CBED319-C83D-4585-8A7A-594598994B04}" type="presParOf" srcId="{C86DE2E3-3485-4D88-991A-33C9416C5246}" destId="{3DC572B2-C7F7-45EE-8266-8D3A0F1AF860}" srcOrd="1" destOrd="0" presId="urn:microsoft.com/office/officeart/2005/8/layout/vList5"/>
@@ -3165,13 +3107,6 @@
         </dgm:presLayoutVars>
       </dgm:prSet>
       <dgm:spPr/>
-      <dgm:t>
-        <a:bodyPr/>
-        <a:lstStyle/>
-        <a:p>
-          <a:endParaRPr lang="en-US"/>
-        </a:p>
-      </dgm:t>
     </dgm:pt>
     <dgm:pt modelId="{A403ADE2-8A92-4517-8307-DFE248D89559}" type="pres">
       <dgm:prSet presAssocID="{3C84C93E-F276-4672-8306-0D4EDC48291C}" presName="linNode" presStyleCnt="0"/>
@@ -3185,13 +3120,6 @@
         </dgm:presLayoutVars>
       </dgm:prSet>
       <dgm:spPr/>
-      <dgm:t>
-        <a:bodyPr/>
-        <a:lstStyle/>
-        <a:p>
-          <a:endParaRPr lang="en-US"/>
-        </a:p>
-      </dgm:t>
     </dgm:pt>
     <dgm:pt modelId="{7F9C28E1-28AC-404D-A8EF-ACDB5DFF50D9}" type="pres">
       <dgm:prSet presAssocID="{3C84C93E-F276-4672-8306-0D4EDC48291C}" presName="descendantText" presStyleLbl="alignAccFollowNode1" presStyleIdx="0" presStyleCnt="4" custLinFactNeighborX="-29546">
@@ -3200,13 +3128,6 @@
         </dgm:presLayoutVars>
       </dgm:prSet>
       <dgm:spPr/>
-      <dgm:t>
-        <a:bodyPr/>
-        <a:lstStyle/>
-        <a:p>
-          <a:endParaRPr lang="en-US"/>
-        </a:p>
-      </dgm:t>
     </dgm:pt>
     <dgm:pt modelId="{34F37747-6784-4877-8185-2C87ABBCCC9F}" type="pres">
       <dgm:prSet presAssocID="{6F06AEEB-27E4-4060-AD12-431800289540}" presName="sp" presStyleCnt="0"/>
@@ -3224,13 +3145,6 @@
         </dgm:presLayoutVars>
       </dgm:prSet>
       <dgm:spPr/>
-      <dgm:t>
-        <a:bodyPr/>
-        <a:lstStyle/>
-        <a:p>
-          <a:endParaRPr lang="en-US"/>
-        </a:p>
-      </dgm:t>
     </dgm:pt>
     <dgm:pt modelId="{D510B8BF-35DE-4934-9EDD-BB2C766C9B1D}" type="pres">
       <dgm:prSet presAssocID="{18A5A126-9CDF-408F-AED4-1709B1B7856C}" presName="descendantText" presStyleLbl="alignAccFollowNode1" presStyleIdx="1" presStyleCnt="4" custLinFactNeighborX="-29546">
@@ -3239,13 +3153,6 @@
         </dgm:presLayoutVars>
       </dgm:prSet>
       <dgm:spPr/>
-      <dgm:t>
-        <a:bodyPr/>
-        <a:lstStyle/>
-        <a:p>
-          <a:endParaRPr lang="en-US"/>
-        </a:p>
-      </dgm:t>
     </dgm:pt>
     <dgm:pt modelId="{3848E3C7-E4D3-4713-BA1D-B4C006AC2665}" type="pres">
       <dgm:prSet presAssocID="{1B9835CA-355C-422C-A0F3-E76C387F3609}" presName="sp" presStyleCnt="0"/>
@@ -3263,13 +3170,6 @@
         </dgm:presLayoutVars>
       </dgm:prSet>
       <dgm:spPr/>
-      <dgm:t>
-        <a:bodyPr/>
-        <a:lstStyle/>
-        <a:p>
-          <a:endParaRPr lang="en-US"/>
-        </a:p>
-      </dgm:t>
     </dgm:pt>
     <dgm:pt modelId="{37B4A69E-BEAA-483D-A27B-B8066514DC2A}" type="pres">
       <dgm:prSet presAssocID="{D0F8E683-C4DC-481A-8BCD-4B33BA43D927}" presName="descendantText" presStyleLbl="alignAccFollowNode1" presStyleIdx="2" presStyleCnt="4" custLinFactNeighborX="-29546">
@@ -3278,13 +3178,6 @@
         </dgm:presLayoutVars>
       </dgm:prSet>
       <dgm:spPr/>
-      <dgm:t>
-        <a:bodyPr/>
-        <a:lstStyle/>
-        <a:p>
-          <a:endParaRPr lang="en-US"/>
-        </a:p>
-      </dgm:t>
     </dgm:pt>
     <dgm:pt modelId="{9CFDBF66-7A98-4500-A454-C13851DB99F5}" type="pres">
       <dgm:prSet presAssocID="{01ADA495-5465-42CE-B1D0-9C68DEAC5498}" presName="sp" presStyleCnt="0"/>
@@ -3302,13 +3195,6 @@
         </dgm:presLayoutVars>
       </dgm:prSet>
       <dgm:spPr/>
-      <dgm:t>
-        <a:bodyPr/>
-        <a:lstStyle/>
-        <a:p>
-          <a:endParaRPr lang="en-US"/>
-        </a:p>
-      </dgm:t>
     </dgm:pt>
     <dgm:pt modelId="{3248EAB6-7CD9-4AF4-8610-E82B5A9C2B0F}" type="pres">
       <dgm:prSet presAssocID="{20AC9AF4-A267-4D5E-9755-9C098B10F303}" presName="descendantText" presStyleLbl="alignAccFollowNode1" presStyleIdx="3" presStyleCnt="4" custLinFactNeighborX="-29514" custLinFactNeighborY="2426">
@@ -3317,41 +3203,34 @@
         </dgm:presLayoutVars>
       </dgm:prSet>
       <dgm:spPr/>
-      <dgm:t>
-        <a:bodyPr/>
-        <a:lstStyle/>
-        <a:p>
-          <a:endParaRPr lang="en-US"/>
-        </a:p>
-      </dgm:t>
     </dgm:pt>
   </dgm:ptLst>
   <dgm:cxnLst>
+    <dgm:cxn modelId="{31ED1609-EE0B-4F1F-AECD-9A7244C2832E}" srcId="{3C84C93E-F276-4672-8306-0D4EDC48291C}" destId="{23807C4C-2DCB-4551-8F2D-7F715C6742A2}" srcOrd="1" destOrd="0" parTransId="{3761A983-A35D-4BA9-861F-A447DD3C1B1C}" sibTransId="{DBCDE35C-4C80-483B-8006-3FB356AD5639}"/>
+    <dgm:cxn modelId="{87C43F12-B864-4A67-B24A-3EB2710BA809}" type="presOf" srcId="{E9A1F835-6E14-423F-892C-1E5350F4D404}" destId="{37B4A69E-BEAA-483D-A27B-B8066514DC2A}" srcOrd="0" destOrd="1" presId="urn:microsoft.com/office/officeart/2005/8/layout/vList5"/>
+    <dgm:cxn modelId="{E631812C-6B9D-4E57-B1E9-B09F0A03AC3B}" srcId="{4655BB5F-4EBC-4207-A5B0-147FC724DAE7}" destId="{D0F8E683-C4DC-481A-8BCD-4B33BA43D927}" srcOrd="2" destOrd="0" parTransId="{6388F7F7-BC70-40EC-8FAF-DD54C0D02487}" sibTransId="{01ADA495-5465-42CE-B1D0-9C68DEAC5498}"/>
+    <dgm:cxn modelId="{84950C3F-C348-4F3F-AF7D-CF2F03A99F71}" type="presOf" srcId="{ACA9C505-CD0B-4752-9300-8A1863EE07ED}" destId="{D510B8BF-35DE-4934-9EDD-BB2C766C9B1D}" srcOrd="0" destOrd="0" presId="urn:microsoft.com/office/officeart/2005/8/layout/vList5"/>
+    <dgm:cxn modelId="{A805535C-45CB-411D-B26B-CB9C35E95BCA}" type="presOf" srcId="{20AC9AF4-A267-4D5E-9755-9C098B10F303}" destId="{96A820CA-BC25-4317-9A27-1A1206B2F40D}" srcOrd="0" destOrd="0" presId="urn:microsoft.com/office/officeart/2005/8/layout/vList5"/>
+    <dgm:cxn modelId="{29AC8E5D-B1F5-4BFA-9435-5A8D5E0E78EF}" type="presOf" srcId="{DAD6FF4F-6573-44CA-BBA6-AA6673522659}" destId="{3248EAB6-7CD9-4AF4-8610-E82B5A9C2B0F}" srcOrd="0" destOrd="0" presId="urn:microsoft.com/office/officeart/2005/8/layout/vList5"/>
+    <dgm:cxn modelId="{8540A648-0CCF-4E4F-B782-9217D67E063C}" type="presOf" srcId="{BA2DB30F-C26A-4431-8C29-A5CB73928175}" destId="{37B4A69E-BEAA-483D-A27B-B8066514DC2A}" srcOrd="0" destOrd="0" presId="urn:microsoft.com/office/officeart/2005/8/layout/vList5"/>
+    <dgm:cxn modelId="{CF1D1650-F396-49FB-A873-6FE141596A3B}" type="presOf" srcId="{9BE3BF22-2E45-4160-B620-9D51AEC383B5}" destId="{3248EAB6-7CD9-4AF4-8610-E82B5A9C2B0F}" srcOrd="0" destOrd="1" presId="urn:microsoft.com/office/officeart/2005/8/layout/vList5"/>
+    <dgm:cxn modelId="{192D5A71-0F14-4D2D-B65E-968D83E4D1B9}" type="presOf" srcId="{AD1158AF-1744-4807-9ED0-BAA14AAB0471}" destId="{7F9C28E1-28AC-404D-A8EF-ACDB5DFF50D9}" srcOrd="0" destOrd="0" presId="urn:microsoft.com/office/officeart/2005/8/layout/vList5"/>
+    <dgm:cxn modelId="{64E39D71-D718-4821-B430-7DED81A1C673}" srcId="{20AC9AF4-A267-4D5E-9755-9C098B10F303}" destId="{9BE3BF22-2E45-4160-B620-9D51AEC383B5}" srcOrd="1" destOrd="0" parTransId="{909D2861-4BA0-4F26-AE5B-7F6CE7BE93D1}" sibTransId="{0A72E7A3-C243-42B6-B3A9-01079EF60D3D}"/>
+    <dgm:cxn modelId="{2EC0C072-6C5C-4C35-AA9F-6D426F1E990B}" srcId="{18A5A126-9CDF-408F-AED4-1709B1B7856C}" destId="{ACA9C505-CD0B-4752-9300-8A1863EE07ED}" srcOrd="0" destOrd="0" parTransId="{722D4FBA-AFE0-4B18-9927-B3D40D502D1F}" sibTransId="{B9A8F6A4-D6F8-4C5E-9CFC-1EC774D0D933}"/>
+    <dgm:cxn modelId="{3B1ED675-063C-47DD-8EFE-6BB9D9426764}" srcId="{4655BB5F-4EBC-4207-A5B0-147FC724DAE7}" destId="{3C84C93E-F276-4672-8306-0D4EDC48291C}" srcOrd="0" destOrd="0" parTransId="{18AAB41D-8D7F-46E1-8A66-47A6E4B44E6E}" sibTransId="{6F06AEEB-27E4-4060-AD12-431800289540}"/>
+    <dgm:cxn modelId="{5FAAE87E-6F02-4A4D-A80D-03B20599D8C7}" srcId="{4655BB5F-4EBC-4207-A5B0-147FC724DAE7}" destId="{18A5A126-9CDF-408F-AED4-1709B1B7856C}" srcOrd="1" destOrd="0" parTransId="{C742BDC9-C7A2-4C81-9DCC-36EC82FCCFE4}" sibTransId="{1B9835CA-355C-422C-A0F3-E76C387F3609}"/>
     <dgm:cxn modelId="{64DD1C90-3C90-46D1-991C-FD2892A0591D}" type="presOf" srcId="{18A5A126-9CDF-408F-AED4-1709B1B7856C}" destId="{7EFE7DE5-404E-420F-BB2C-8D177D4BD0E5}" srcOrd="0" destOrd="0" presId="urn:microsoft.com/office/officeart/2005/8/layout/vList5"/>
-    <dgm:cxn modelId="{2EC0C072-6C5C-4C35-AA9F-6D426F1E990B}" srcId="{18A5A126-9CDF-408F-AED4-1709B1B7856C}" destId="{ACA9C505-CD0B-4752-9300-8A1863EE07ED}" srcOrd="0" destOrd="0" parTransId="{722D4FBA-AFE0-4B18-9927-B3D40D502D1F}" sibTransId="{B9A8F6A4-D6F8-4C5E-9CFC-1EC774D0D933}"/>
-    <dgm:cxn modelId="{CF1D1650-F396-49FB-A873-6FE141596A3B}" type="presOf" srcId="{9BE3BF22-2E45-4160-B620-9D51AEC383B5}" destId="{3248EAB6-7CD9-4AF4-8610-E82B5A9C2B0F}" srcOrd="0" destOrd="1" presId="urn:microsoft.com/office/officeart/2005/8/layout/vList5"/>
+    <dgm:cxn modelId="{61184497-FB9A-4517-B4E6-9A8B93550CFE}" type="presOf" srcId="{BB977D72-290E-42DF-B6F8-2AD2E69D3762}" destId="{D510B8BF-35DE-4934-9EDD-BB2C766C9B1D}" srcOrd="0" destOrd="1" presId="urn:microsoft.com/office/officeart/2005/8/layout/vList5"/>
+    <dgm:cxn modelId="{47CC6B9E-D179-4E52-A25A-91136DB78A3D}" srcId="{20AC9AF4-A267-4D5E-9755-9C098B10F303}" destId="{DAD6FF4F-6573-44CA-BBA6-AA6673522659}" srcOrd="0" destOrd="0" parTransId="{F6B8AF35-B27F-4B48-8A04-B523895CEE27}" sibTransId="{579B0503-F442-4237-ADA4-B2E641B0E6C9}"/>
+    <dgm:cxn modelId="{CE5AC1A0-72AA-4BAE-A979-AC61D3008BD2}" type="presOf" srcId="{4655BB5F-4EBC-4207-A5B0-147FC724DAE7}" destId="{5603229D-4475-4EBD-8B80-5BF85AF5A926}" srcOrd="0" destOrd="0" presId="urn:microsoft.com/office/officeart/2005/8/layout/vList5"/>
+    <dgm:cxn modelId="{7FDA67A2-CC00-44E7-BEB5-D239152E04EE}" srcId="{18A5A126-9CDF-408F-AED4-1709B1B7856C}" destId="{BB977D72-290E-42DF-B6F8-2AD2E69D3762}" srcOrd="1" destOrd="0" parTransId="{5ED6EE6B-050F-4A62-9A97-9909BF63F3BF}" sibTransId="{C467AD86-0A99-4F7B-BF89-07FBA45FAE9A}"/>
+    <dgm:cxn modelId="{B54D4BA8-2D93-401F-9369-3B9FAF11BF1D}" type="presOf" srcId="{23807C4C-2DCB-4551-8F2D-7F715C6742A2}" destId="{7F9C28E1-28AC-404D-A8EF-ACDB5DFF50D9}" srcOrd="0" destOrd="1" presId="urn:microsoft.com/office/officeart/2005/8/layout/vList5"/>
+    <dgm:cxn modelId="{57D385A9-DE56-43F5-9116-499131FF08E3}" srcId="{D0F8E683-C4DC-481A-8BCD-4B33BA43D927}" destId="{BA2DB30F-C26A-4431-8C29-A5CB73928175}" srcOrd="0" destOrd="0" parTransId="{88C1E58E-43BE-42F9-93DF-A962F3F20EB5}" sibTransId="{31F96A22-B396-492D-AFB1-97F5589DC161}"/>
+    <dgm:cxn modelId="{19A200BB-5E81-4D36-8DFD-4D38E266CB4A}" srcId="{4655BB5F-4EBC-4207-A5B0-147FC724DAE7}" destId="{20AC9AF4-A267-4D5E-9755-9C098B10F303}" srcOrd="3" destOrd="0" parTransId="{D44B6C09-6E5C-497C-B00C-B56B66B0907F}" sibTransId="{B7881554-C08F-43C1-AE2C-D1A37106B272}"/>
+    <dgm:cxn modelId="{33370FC1-1A83-45E0-AB6E-3C41CF6AA528}" type="presOf" srcId="{D0F8E683-C4DC-481A-8BCD-4B33BA43D927}" destId="{2DC11702-8290-49B6-BE15-B41D2A028289}" srcOrd="0" destOrd="0" presId="urn:microsoft.com/office/officeart/2005/8/layout/vList5"/>
     <dgm:cxn modelId="{AFAC89D5-DCF5-433D-B507-927889F835B2}" type="presOf" srcId="{3C84C93E-F276-4672-8306-0D4EDC48291C}" destId="{9DB291ED-CC19-490E-961E-C63E51B3DEBD}" srcOrd="0" destOrd="0" presId="urn:microsoft.com/office/officeart/2005/8/layout/vList5"/>
     <dgm:cxn modelId="{5A9C18E7-DDFB-4820-97E3-B9BF1D799526}" srcId="{D0F8E683-C4DC-481A-8BCD-4B33BA43D927}" destId="{E9A1F835-6E14-423F-892C-1E5350F4D404}" srcOrd="1" destOrd="0" parTransId="{1C8F4CC9-03DA-4CA8-B795-E109B6A3FA9D}" sibTransId="{0ADF2407-687D-4AA9-9C1D-67FF1F383CB0}"/>
-    <dgm:cxn modelId="{31ED1609-EE0B-4F1F-AECD-9A7244C2832E}" srcId="{3C84C93E-F276-4672-8306-0D4EDC48291C}" destId="{23807C4C-2DCB-4551-8F2D-7F715C6742A2}" srcOrd="1" destOrd="0" parTransId="{3761A983-A35D-4BA9-861F-A447DD3C1B1C}" sibTransId="{DBCDE35C-4C80-483B-8006-3FB356AD5639}"/>
-    <dgm:cxn modelId="{8540A648-0CCF-4E4F-B782-9217D67E063C}" type="presOf" srcId="{BA2DB30F-C26A-4431-8C29-A5CB73928175}" destId="{37B4A69E-BEAA-483D-A27B-B8066514DC2A}" srcOrd="0" destOrd="0" presId="urn:microsoft.com/office/officeart/2005/8/layout/vList5"/>
-    <dgm:cxn modelId="{57D385A9-DE56-43F5-9116-499131FF08E3}" srcId="{D0F8E683-C4DC-481A-8BCD-4B33BA43D927}" destId="{BA2DB30F-C26A-4431-8C29-A5CB73928175}" srcOrd="0" destOrd="0" parTransId="{88C1E58E-43BE-42F9-93DF-A962F3F20EB5}" sibTransId="{31F96A22-B396-492D-AFB1-97F5589DC161}"/>
-    <dgm:cxn modelId="{84950C3F-C348-4F3F-AF7D-CF2F03A99F71}" type="presOf" srcId="{ACA9C505-CD0B-4752-9300-8A1863EE07ED}" destId="{D510B8BF-35DE-4934-9EDD-BB2C766C9B1D}" srcOrd="0" destOrd="0" presId="urn:microsoft.com/office/officeart/2005/8/layout/vList5"/>
-    <dgm:cxn modelId="{5FAAE87E-6F02-4A4D-A80D-03B20599D8C7}" srcId="{4655BB5F-4EBC-4207-A5B0-147FC724DAE7}" destId="{18A5A126-9CDF-408F-AED4-1709B1B7856C}" srcOrd="1" destOrd="0" parTransId="{C742BDC9-C7A2-4C81-9DCC-36EC82FCCFE4}" sibTransId="{1B9835CA-355C-422C-A0F3-E76C387F3609}"/>
-    <dgm:cxn modelId="{33370FC1-1A83-45E0-AB6E-3C41CF6AA528}" type="presOf" srcId="{D0F8E683-C4DC-481A-8BCD-4B33BA43D927}" destId="{2DC11702-8290-49B6-BE15-B41D2A028289}" srcOrd="0" destOrd="0" presId="urn:microsoft.com/office/officeart/2005/8/layout/vList5"/>
-    <dgm:cxn modelId="{47CC6B9E-D179-4E52-A25A-91136DB78A3D}" srcId="{20AC9AF4-A267-4D5E-9755-9C098B10F303}" destId="{DAD6FF4F-6573-44CA-BBA6-AA6673522659}" srcOrd="0" destOrd="0" parTransId="{F6B8AF35-B27F-4B48-8A04-B523895CEE27}" sibTransId="{579B0503-F442-4237-ADA4-B2E641B0E6C9}"/>
-    <dgm:cxn modelId="{A805535C-45CB-411D-B26B-CB9C35E95BCA}" type="presOf" srcId="{20AC9AF4-A267-4D5E-9755-9C098B10F303}" destId="{96A820CA-BC25-4317-9A27-1A1206B2F40D}" srcOrd="0" destOrd="0" presId="urn:microsoft.com/office/officeart/2005/8/layout/vList5"/>
-    <dgm:cxn modelId="{61184497-FB9A-4517-B4E6-9A8B93550CFE}" type="presOf" srcId="{BB977D72-290E-42DF-B6F8-2AD2E69D3762}" destId="{D510B8BF-35DE-4934-9EDD-BB2C766C9B1D}" srcOrd="0" destOrd="1" presId="urn:microsoft.com/office/officeart/2005/8/layout/vList5"/>
-    <dgm:cxn modelId="{3B1ED675-063C-47DD-8EFE-6BB9D9426764}" srcId="{4655BB5F-4EBC-4207-A5B0-147FC724DAE7}" destId="{3C84C93E-F276-4672-8306-0D4EDC48291C}" srcOrd="0" destOrd="0" parTransId="{18AAB41D-8D7F-46E1-8A66-47A6E4B44E6E}" sibTransId="{6F06AEEB-27E4-4060-AD12-431800289540}"/>
-    <dgm:cxn modelId="{87C43F12-B864-4A67-B24A-3EB2710BA809}" type="presOf" srcId="{E9A1F835-6E14-423F-892C-1E5350F4D404}" destId="{37B4A69E-BEAA-483D-A27B-B8066514DC2A}" srcOrd="0" destOrd="1" presId="urn:microsoft.com/office/officeart/2005/8/layout/vList5"/>
-    <dgm:cxn modelId="{7FDA67A2-CC00-44E7-BEB5-D239152E04EE}" srcId="{18A5A126-9CDF-408F-AED4-1709B1B7856C}" destId="{BB977D72-290E-42DF-B6F8-2AD2E69D3762}" srcOrd="1" destOrd="0" parTransId="{5ED6EE6B-050F-4A62-9A97-9909BF63F3BF}" sibTransId="{C467AD86-0A99-4F7B-BF89-07FBA45FAE9A}"/>
-    <dgm:cxn modelId="{19A200BB-5E81-4D36-8DFD-4D38E266CB4A}" srcId="{4655BB5F-4EBC-4207-A5B0-147FC724DAE7}" destId="{20AC9AF4-A267-4D5E-9755-9C098B10F303}" srcOrd="3" destOrd="0" parTransId="{D44B6C09-6E5C-497C-B00C-B56B66B0907F}" sibTransId="{B7881554-C08F-43C1-AE2C-D1A37106B272}"/>
-    <dgm:cxn modelId="{E631812C-6B9D-4E57-B1E9-B09F0A03AC3B}" srcId="{4655BB5F-4EBC-4207-A5B0-147FC724DAE7}" destId="{D0F8E683-C4DC-481A-8BCD-4B33BA43D927}" srcOrd="2" destOrd="0" parTransId="{6388F7F7-BC70-40EC-8FAF-DD54C0D02487}" sibTransId="{01ADA495-5465-42CE-B1D0-9C68DEAC5498}"/>
-    <dgm:cxn modelId="{CE5AC1A0-72AA-4BAE-A979-AC61D3008BD2}" type="presOf" srcId="{4655BB5F-4EBC-4207-A5B0-147FC724DAE7}" destId="{5603229D-4475-4EBD-8B80-5BF85AF5A926}" srcOrd="0" destOrd="0" presId="urn:microsoft.com/office/officeart/2005/8/layout/vList5"/>
-    <dgm:cxn modelId="{64E39D71-D718-4821-B430-7DED81A1C673}" srcId="{20AC9AF4-A267-4D5E-9755-9C098B10F303}" destId="{9BE3BF22-2E45-4160-B620-9D51AEC383B5}" srcOrd="1" destOrd="0" parTransId="{909D2861-4BA0-4F26-AE5B-7F6CE7BE93D1}" sibTransId="{0A72E7A3-C243-42B6-B3A9-01079EF60D3D}"/>
-    <dgm:cxn modelId="{B54D4BA8-2D93-401F-9369-3B9FAF11BF1D}" type="presOf" srcId="{23807C4C-2DCB-4551-8F2D-7F715C6742A2}" destId="{7F9C28E1-28AC-404D-A8EF-ACDB5DFF50D9}" srcOrd="0" destOrd="1" presId="urn:microsoft.com/office/officeart/2005/8/layout/vList5"/>
-    <dgm:cxn modelId="{29AC8E5D-B1F5-4BFA-9435-5A8D5E0E78EF}" type="presOf" srcId="{DAD6FF4F-6573-44CA-BBA6-AA6673522659}" destId="{3248EAB6-7CD9-4AF4-8610-E82B5A9C2B0F}" srcOrd="0" destOrd="0" presId="urn:microsoft.com/office/officeart/2005/8/layout/vList5"/>
     <dgm:cxn modelId="{16BD44F1-3513-4BA7-9D63-32D92206830D}" srcId="{3C84C93E-F276-4672-8306-0D4EDC48291C}" destId="{AD1158AF-1744-4807-9ED0-BAA14AAB0471}" srcOrd="0" destOrd="0" parTransId="{76200662-55F0-4D2B-8F4F-9431C761ACA2}" sibTransId="{A170262A-E59C-4C66-B35F-370FAF94CB57}"/>
-    <dgm:cxn modelId="{192D5A71-0F14-4D2D-B65E-968D83E4D1B9}" type="presOf" srcId="{AD1158AF-1744-4807-9ED0-BAA14AAB0471}" destId="{7F9C28E1-28AC-404D-A8EF-ACDB5DFF50D9}" srcOrd="0" destOrd="0" presId="urn:microsoft.com/office/officeart/2005/8/layout/vList5"/>
     <dgm:cxn modelId="{834169B6-AD5A-4387-AC27-FE79BC074758}" type="presParOf" srcId="{5603229D-4475-4EBD-8B80-5BF85AF5A926}" destId="{A403ADE2-8A92-4517-8307-DFE248D89559}" srcOrd="0" destOrd="0" presId="urn:microsoft.com/office/officeart/2005/8/layout/vList5"/>
     <dgm:cxn modelId="{370D849C-3816-46B9-BFAA-D9B257DF3189}" type="presParOf" srcId="{A403ADE2-8A92-4517-8307-DFE248D89559}" destId="{9DB291ED-CC19-490E-961E-C63E51B3DEBD}" srcOrd="0" destOrd="0" presId="urn:microsoft.com/office/officeart/2005/8/layout/vList5"/>
     <dgm:cxn modelId="{385E3975-42D5-4160-9F04-51093E8257B0}" type="presParOf" srcId="{A403ADE2-8A92-4517-8307-DFE248D89559}" destId="{7F9C28E1-28AC-404D-A8EF-ACDB5DFF50D9}" srcOrd="1" destOrd="0" presId="urn:microsoft.com/office/officeart/2005/8/layout/vList5"/>
@@ -3449,7 +3328,7 @@
             <a:spcAft>
               <a:spcPct val="15000"/>
             </a:spcAft>
-            <a:buChar char="••"/>
+            <a:buChar char="•"/>
           </a:pPr>
           <a:r>
             <a:rPr lang="en-US" sz="2000" kern="1200" dirty="0"/>
@@ -3486,7 +3365,7 @@
             <a:spcAft>
               <a:spcPct val="15000"/>
             </a:spcAft>
-            <a:buChar char="••"/>
+            <a:buChar char="•"/>
           </a:pPr>
           <a:r>
             <a:rPr lang="en-US" sz="2000" kern="1200" dirty="0"/>
@@ -3561,7 +3440,7 @@
         </a:bodyPr>
         <a:lstStyle/>
         <a:p>
-          <a:pPr lvl="0" algn="ctr" defTabSz="889000">
+          <a:pPr marL="0" lvl="0" indent="0" algn="ctr" defTabSz="889000">
             <a:lnSpc>
               <a:spcPct val="90000"/>
             </a:lnSpc>
@@ -3571,6 +3450,7 @@
             <a:spcAft>
               <a:spcPct val="35000"/>
             </a:spcAft>
+            <a:buNone/>
           </a:pPr>
           <a:r>
             <a:rPr lang="en-US" sz="2000" kern="1200" dirty="0"/>
@@ -3646,7 +3526,7 @@
             <a:spcAft>
               <a:spcPct val="15000"/>
             </a:spcAft>
-            <a:buChar char="••"/>
+            <a:buChar char="•"/>
           </a:pPr>
           <a:r>
             <a:rPr lang="en-US" sz="2000" kern="1200" dirty="0"/>
@@ -3694,7 +3574,7 @@
             <a:spcAft>
               <a:spcPct val="15000"/>
             </a:spcAft>
-            <a:buChar char="••"/>
+            <a:buChar char="•"/>
           </a:pPr>
           <a:r>
             <a:rPr lang="en-US" sz="2000" kern="1200" dirty="0"/>
@@ -3780,7 +3660,7 @@
         </a:bodyPr>
         <a:lstStyle/>
         <a:p>
-          <a:pPr lvl="0" algn="ctr" defTabSz="889000">
+          <a:pPr marL="0" lvl="0" indent="0" algn="ctr" defTabSz="889000">
             <a:lnSpc>
               <a:spcPct val="90000"/>
             </a:lnSpc>
@@ -3790,6 +3670,7 @@
             <a:spcAft>
               <a:spcPct val="35000"/>
             </a:spcAft>
+            <a:buNone/>
           </a:pPr>
           <a:r>
             <a:rPr lang="en-US" sz="2000" kern="1200" dirty="0"/>
@@ -3865,7 +3746,7 @@
             <a:spcAft>
               <a:spcPct val="15000"/>
             </a:spcAft>
-            <a:buChar char="••"/>
+            <a:buChar char="•"/>
           </a:pPr>
           <a:r>
             <a:rPr lang="en-US" sz="2000" kern="1200" dirty="0"/>
@@ -3913,7 +3794,7 @@
             <a:spcAft>
               <a:spcPct val="15000"/>
             </a:spcAft>
-            <a:buChar char="••"/>
+            <a:buChar char="•"/>
           </a:pPr>
           <a:r>
             <a:rPr lang="en-US" sz="2000" kern="1200" dirty="0"/>
@@ -3999,7 +3880,7 @@
         </a:bodyPr>
         <a:lstStyle/>
         <a:p>
-          <a:pPr lvl="0" algn="ctr" defTabSz="889000">
+          <a:pPr marL="0" lvl="0" indent="0" algn="ctr" defTabSz="889000">
             <a:lnSpc>
               <a:spcPct val="90000"/>
             </a:lnSpc>
@@ -4009,6 +3890,7 @@
             <a:spcAft>
               <a:spcPct val="35000"/>
             </a:spcAft>
+            <a:buNone/>
           </a:pPr>
           <a:r>
             <a:rPr lang="en-US" sz="2000" kern="1200" dirty="0"/>
@@ -4096,7 +3978,7 @@
             <a:spcAft>
               <a:spcPct val="15000"/>
             </a:spcAft>
-            <a:buChar char="••"/>
+            <a:buChar char="•"/>
           </a:pPr>
           <a:r>
             <a:rPr lang="en-US" sz="2000" kern="1200" dirty="0"/>
@@ -4147,7 +4029,7 @@
             <a:spcAft>
               <a:spcPct val="15000"/>
             </a:spcAft>
-            <a:buChar char="••"/>
+            <a:buChar char="•"/>
           </a:pPr>
           <a:r>
             <a:rPr lang="en-US" sz="2000" kern="1200" dirty="0"/>
@@ -4236,7 +4118,7 @@
         </a:bodyPr>
         <a:lstStyle/>
         <a:p>
-          <a:pPr lvl="0" algn="ctr" defTabSz="889000">
+          <a:pPr marL="0" lvl="0" indent="0" algn="ctr" defTabSz="889000">
             <a:lnSpc>
               <a:spcPct val="90000"/>
             </a:lnSpc>
@@ -4246,6 +4128,7 @@
             <a:spcAft>
               <a:spcPct val="35000"/>
             </a:spcAft>
+            <a:buNone/>
           </a:pPr>
           <a:r>
             <a:rPr lang="en-US" sz="2000" kern="1200" dirty="0"/>
@@ -4321,7 +4204,7 @@
             <a:spcAft>
               <a:spcPct val="15000"/>
             </a:spcAft>
-            <a:buChar char="••"/>
+            <a:buChar char="•"/>
           </a:pPr>
           <a:r>
             <a:rPr lang="en-US" sz="2000" kern="1200" dirty="0"/>
@@ -4366,7 +4249,7 @@
             <a:spcAft>
               <a:spcPct val="15000"/>
             </a:spcAft>
-            <a:buChar char="••"/>
+            <a:buChar char="•"/>
           </a:pPr>
           <a:r>
             <a:rPr lang="en-US" sz="2000" kern="1200" dirty="0"/>
@@ -4449,7 +4332,7 @@
         </a:bodyPr>
         <a:lstStyle/>
         <a:p>
-          <a:pPr lvl="0" algn="ctr" defTabSz="889000">
+          <a:pPr marL="0" lvl="0" indent="0" algn="ctr" defTabSz="889000">
             <a:lnSpc>
               <a:spcPct val="90000"/>
             </a:lnSpc>
@@ -4459,6 +4342,7 @@
             <a:spcAft>
               <a:spcPct val="35000"/>
             </a:spcAft>
+            <a:buNone/>
           </a:pPr>
           <a:r>
             <a:rPr lang="en-US" sz="2000" kern="1200" dirty="0"/>
@@ -4534,7 +4418,7 @@
             <a:spcAft>
               <a:spcPct val="15000"/>
             </a:spcAft>
-            <a:buChar char="••"/>
+            <a:buChar char="•"/>
           </a:pPr>
           <a:r>
             <a:rPr lang="en-US" sz="2000" kern="1200" dirty="0"/>
@@ -4573,7 +4457,7 @@
             <a:spcAft>
               <a:spcPct val="15000"/>
             </a:spcAft>
-            <a:buChar char="••"/>
+            <a:buChar char="•"/>
           </a:pPr>
           <a:r>
             <a:rPr lang="en-US" sz="2000" kern="1200" dirty="0"/>
@@ -4650,7 +4534,7 @@
         </a:bodyPr>
         <a:lstStyle/>
         <a:p>
-          <a:pPr lvl="0" algn="ctr" defTabSz="889000">
+          <a:pPr marL="0" lvl="0" indent="0" algn="ctr" defTabSz="889000">
             <a:lnSpc>
               <a:spcPct val="90000"/>
             </a:lnSpc>
@@ -4660,6 +4544,7 @@
             <a:spcAft>
               <a:spcPct val="35000"/>
             </a:spcAft>
+            <a:buNone/>
           </a:pPr>
           <a:r>
             <a:rPr lang="en-US" sz="2000" kern="1200" dirty="0"/>
@@ -4735,7 +4620,7 @@
             <a:spcAft>
               <a:spcPct val="15000"/>
             </a:spcAft>
-            <a:buChar char="••"/>
+            <a:buChar char="•"/>
           </a:pPr>
           <a:r>
             <a:rPr lang="en-US" sz="2000" kern="1200" dirty="0"/>
@@ -4801,7 +4686,7 @@
             <a:spcAft>
               <a:spcPct val="15000"/>
             </a:spcAft>
-            <a:buChar char="••"/>
+            <a:buChar char="•"/>
           </a:pPr>
           <a:r>
             <a:rPr lang="en-US" sz="2000" kern="1200" dirty="0"/>
@@ -4905,7 +4790,7 @@
         </a:bodyPr>
         <a:lstStyle/>
         <a:p>
-          <a:pPr lvl="0" algn="ctr" defTabSz="889000">
+          <a:pPr marL="0" lvl="0" indent="0" algn="ctr" defTabSz="889000">
             <a:lnSpc>
               <a:spcPct val="90000"/>
             </a:lnSpc>
@@ -4915,6 +4800,7 @@
             <a:spcAft>
               <a:spcPct val="35000"/>
             </a:spcAft>
+            <a:buNone/>
           </a:pPr>
           <a:r>
             <a:rPr lang="en-US" sz="2000" kern="1200" dirty="0"/>
@@ -7596,7 +7482,7 @@
           <a:p>
             <a:fld id="{A571AFFD-B6CA-41D9-95E6-3CB99A4967AC}" type="datetimeFigureOut">
               <a:rPr lang="en-US" smtClean="0"/>
-              <a:t>4/25/2017</a:t>
+              <a:t>4/26/2017</a:t>
             </a:fld>
             <a:endParaRPr lang="en-US"/>
           </a:p>
@@ -7766,7 +7652,7 @@
           <a:p>
             <a:fld id="{A571AFFD-B6CA-41D9-95E6-3CB99A4967AC}" type="datetimeFigureOut">
               <a:rPr lang="en-US" smtClean="0"/>
-              <a:t>4/25/2017</a:t>
+              <a:t>4/26/2017</a:t>
             </a:fld>
             <a:endParaRPr lang="en-US"/>
           </a:p>
@@ -7946,7 +7832,7 @@
           <a:p>
             <a:fld id="{A571AFFD-B6CA-41D9-95E6-3CB99A4967AC}" type="datetimeFigureOut">
               <a:rPr lang="en-US" smtClean="0"/>
-              <a:t>4/25/2017</a:t>
+              <a:t>4/26/2017</a:t>
             </a:fld>
             <a:endParaRPr lang="en-US"/>
           </a:p>
@@ -8116,7 +8002,7 @@
           <a:p>
             <a:fld id="{A571AFFD-B6CA-41D9-95E6-3CB99A4967AC}" type="datetimeFigureOut">
               <a:rPr lang="en-US" smtClean="0"/>
-              <a:t>4/25/2017</a:t>
+              <a:t>4/26/2017</a:t>
             </a:fld>
             <a:endParaRPr lang="en-US"/>
           </a:p>
@@ -8360,7 +8246,7 @@
           <a:p>
             <a:fld id="{A571AFFD-B6CA-41D9-95E6-3CB99A4967AC}" type="datetimeFigureOut">
               <a:rPr lang="en-US" smtClean="0"/>
-              <a:t>4/25/2017</a:t>
+              <a:t>4/26/2017</a:t>
             </a:fld>
             <a:endParaRPr lang="en-US"/>
           </a:p>
@@ -8592,7 +8478,7 @@
           <a:p>
             <a:fld id="{A571AFFD-B6CA-41D9-95E6-3CB99A4967AC}" type="datetimeFigureOut">
               <a:rPr lang="en-US" smtClean="0"/>
-              <a:t>4/25/2017</a:t>
+              <a:t>4/26/2017</a:t>
             </a:fld>
             <a:endParaRPr lang="en-US"/>
           </a:p>
@@ -8959,7 +8845,7 @@
           <a:p>
             <a:fld id="{A571AFFD-B6CA-41D9-95E6-3CB99A4967AC}" type="datetimeFigureOut">
               <a:rPr lang="en-US" smtClean="0"/>
-              <a:t>4/25/2017</a:t>
+              <a:t>4/26/2017</a:t>
             </a:fld>
             <a:endParaRPr lang="en-US"/>
           </a:p>
@@ -9077,7 +8963,7 @@
           <a:p>
             <a:fld id="{A571AFFD-B6CA-41D9-95E6-3CB99A4967AC}" type="datetimeFigureOut">
               <a:rPr lang="en-US" smtClean="0"/>
-              <a:t>4/25/2017</a:t>
+              <a:t>4/26/2017</a:t>
             </a:fld>
             <a:endParaRPr lang="en-US"/>
           </a:p>
@@ -9172,7 +9058,7 @@
           <a:p>
             <a:fld id="{A571AFFD-B6CA-41D9-95E6-3CB99A4967AC}" type="datetimeFigureOut">
               <a:rPr lang="en-US" smtClean="0"/>
-              <a:t>4/25/2017</a:t>
+              <a:t>4/26/2017</a:t>
             </a:fld>
             <a:endParaRPr lang="en-US"/>
           </a:p>
@@ -9449,7 +9335,7 @@
           <a:p>
             <a:fld id="{A571AFFD-B6CA-41D9-95E6-3CB99A4967AC}" type="datetimeFigureOut">
               <a:rPr lang="en-US" smtClean="0"/>
-              <a:t>4/25/2017</a:t>
+              <a:t>4/26/2017</a:t>
             </a:fld>
             <a:endParaRPr lang="en-US"/>
           </a:p>
@@ -9706,7 +9592,7 @@
           <a:p>
             <a:fld id="{A571AFFD-B6CA-41D9-95E6-3CB99A4967AC}" type="datetimeFigureOut">
               <a:rPr lang="en-US" smtClean="0"/>
-              <a:t>4/25/2017</a:t>
+              <a:t>4/26/2017</a:t>
             </a:fld>
             <a:endParaRPr lang="en-US"/>
           </a:p>
@@ -9919,7 +9805,7 @@
           <a:p>
             <a:fld id="{A571AFFD-B6CA-41D9-95E6-3CB99A4967AC}" type="datetimeFigureOut">
               <a:rPr lang="en-US" smtClean="0"/>
-              <a:t>4/25/2017</a:t>
+              <a:t>4/26/2017</a:t>
             </a:fld>
             <a:endParaRPr lang="en-US"/>
           </a:p>
@@ -10362,7 +10248,7 @@
         </p:nvSpPr>
         <p:spPr>
           <a:xfrm>
-            <a:off x="532301" y="2233748"/>
+            <a:off x="532301" y="2462347"/>
             <a:ext cx="6381224" cy="1953740"/>
           </a:xfrm>
           <a:prstGeom prst="rect">
@@ -10806,7 +10692,7 @@
         </p:nvSpPr>
         <p:spPr>
           <a:xfrm>
-            <a:off x="10220089" y="2235336"/>
+            <a:off x="10220089" y="2463935"/>
             <a:ext cx="4644748" cy="1023037"/>
           </a:xfrm>
           <a:prstGeom prst="rect">
@@ -11090,7 +10976,7 @@
         </p:nvSpPr>
         <p:spPr>
           <a:xfrm>
-            <a:off x="14218129" y="3873433"/>
+            <a:off x="14218129" y="4102032"/>
             <a:ext cx="4735286" cy="2076704"/>
           </a:xfrm>
           <a:prstGeom prst="roundRect">
@@ -11143,7 +11029,7 @@
         </p:nvSpPr>
         <p:spPr>
           <a:xfrm>
-            <a:off x="20870681" y="3816397"/>
+            <a:off x="20870681" y="4044996"/>
             <a:ext cx="4735286" cy="2076704"/>
           </a:xfrm>
           <a:prstGeom prst="roundRect">
@@ -11189,7 +11075,7 @@
         </p:nvSpPr>
         <p:spPr>
           <a:xfrm>
-            <a:off x="27523233" y="3873433"/>
+            <a:off x="27523233" y="4102032"/>
             <a:ext cx="4735286" cy="2076704"/>
           </a:xfrm>
           <a:prstGeom prst="roundRect">
@@ -11242,7 +11128,7 @@
         </p:nvSpPr>
         <p:spPr>
           <a:xfrm>
-            <a:off x="10278019" y="3884332"/>
+            <a:off x="10278019" y="4112931"/>
             <a:ext cx="2671794" cy="1038228"/>
           </a:xfrm>
           <a:prstGeom prst="rect">
@@ -11321,7 +11207,7 @@
         </p:nvSpPr>
         <p:spPr>
           <a:xfrm>
-            <a:off x="10278019" y="5201501"/>
+            <a:off x="10278019" y="5430100"/>
             <a:ext cx="2671794" cy="1038228"/>
           </a:xfrm>
           <a:prstGeom prst="rect">
@@ -11402,7 +11288,7 @@
         </p:nvCxnSpPr>
         <p:spPr>
           <a:xfrm>
-            <a:off x="12949813" y="4403446"/>
+            <a:off x="12949813" y="4632045"/>
             <a:ext cx="1280160" cy="0"/>
           </a:xfrm>
           <a:prstGeom prst="straightConnector1">
@@ -11438,7 +11324,7 @@
         </p:nvCxnSpPr>
         <p:spPr>
           <a:xfrm>
-            <a:off x="12937969" y="5546446"/>
+            <a:off x="12937969" y="5775045"/>
             <a:ext cx="1280160" cy="0"/>
           </a:xfrm>
           <a:prstGeom prst="straightConnector1">
@@ -11476,7 +11362,7 @@
         </p:nvCxnSpPr>
         <p:spPr>
           <a:xfrm>
-            <a:off x="18953415" y="4850063"/>
+            <a:off x="18953415" y="5078662"/>
             <a:ext cx="1917266" cy="0"/>
           </a:xfrm>
           <a:prstGeom prst="straightConnector1">
@@ -11512,7 +11398,7 @@
         </p:nvSpPr>
         <p:spPr>
           <a:xfrm>
-            <a:off x="19052787" y="4326843"/>
+            <a:off x="19052787" y="4555442"/>
             <a:ext cx="1981774" cy="523220"/>
           </a:xfrm>
           <a:prstGeom prst="rect">
@@ -11541,7 +11427,7 @@
         </p:nvSpPr>
         <p:spPr>
           <a:xfrm>
-            <a:off x="25651896" y="4403446"/>
+            <a:off x="25651896" y="4632045"/>
             <a:ext cx="1981774" cy="523220"/>
           </a:xfrm>
           <a:prstGeom prst="rect">
@@ -11570,7 +11456,7 @@
         </p:nvSpPr>
         <p:spPr>
           <a:xfrm>
-            <a:off x="32975550" y="4251002"/>
+            <a:off x="32975550" y="4479601"/>
             <a:ext cx="2000872" cy="1321566"/>
           </a:xfrm>
           <a:prstGeom prst="rect">
@@ -11627,7 +11513,7 @@
         </p:nvCxnSpPr>
         <p:spPr>
           <a:xfrm>
-            <a:off x="32258519" y="4936111"/>
+            <a:off x="32258519" y="5164710"/>
             <a:ext cx="717031" cy="0"/>
           </a:xfrm>
           <a:prstGeom prst="straightConnector1">
@@ -11663,7 +11549,7 @@
         </p:nvSpPr>
         <p:spPr>
           <a:xfrm>
-            <a:off x="28589911" y="2218161"/>
+            <a:off x="28589911" y="2446760"/>
             <a:ext cx="3171517" cy="1038228"/>
           </a:xfrm>
           <a:prstGeom prst="rect">
@@ -11747,7 +11633,7 @@
         </p:nvCxnSpPr>
         <p:spPr>
           <a:xfrm>
-            <a:off x="29984700" y="3255565"/>
+            <a:off x="29984700" y="3484164"/>
             <a:ext cx="610" cy="616477"/>
           </a:xfrm>
           <a:prstGeom prst="straightConnector1">
@@ -11812,14 +11698,9 @@
               <a:buChar char="•"/>
             </a:pPr>
             <a:r>
-              <a:rPr lang="en-US" sz="3600" dirty="0" smtClean="0"/>
-              <a:t>No unit testing for main code because Black Box tests cover the majority of use </a:t>
-            </a:r>
-            <a:r>
-              <a:rPr lang="en-US" sz="3600" dirty="0" smtClean="0"/>
-              <a:t>cases, along with cases we wouldn’t have come up with</a:t>
-            </a:r>
-            <a:endParaRPr lang="en-US" sz="3600" dirty="0" smtClean="0"/>
+              <a:rPr lang="en-US" sz="3600" dirty="0"/>
+              <a:t>No unit testing for main code because Black Box tests cover the majority of use cases, along with cases we wouldn’t have come up with</a:t>
+            </a:r>
           </a:p>
           <a:p>
             <a:pPr marL="571500" indent="-571500">
@@ -11827,10 +11708,9 @@
               <a:buChar char="•"/>
             </a:pPr>
             <a:r>
-              <a:rPr lang="en-US" sz="3600" dirty="0" smtClean="0"/>
+              <a:rPr lang="en-US" sz="3600" dirty="0"/>
               <a:t>Unit test for all database functions</a:t>
             </a:r>
-            <a:endParaRPr lang="en-US" sz="3600" dirty="0"/>
           </a:p>
           <a:p>
             <a:pPr marL="571500" indent="-571500">
@@ -11839,15 +11719,7 @@
             </a:pPr>
             <a:r>
               <a:rPr lang="en-US" sz="3600" dirty="0"/>
-              <a:t>The </a:t>
-            </a:r>
-            <a:r>
-              <a:rPr lang="en-US" sz="3600" dirty="0" smtClean="0"/>
-              <a:t>Black Box tests </a:t>
-            </a:r>
-            <a:r>
-              <a:rPr lang="en-US" sz="3600" dirty="0"/>
-              <a:t>use a common file structure, allowing more tests to be added with minimal effort</a:t>
+              <a:t>The Black Box tests use a common file structure, allowing more tests to be added with minimal effort</a:t>
             </a:r>
           </a:p>
         </p:txBody>
@@ -11891,7 +11763,7 @@
         </p:nvCxnSpPr>
         <p:spPr>
           <a:xfrm>
-            <a:off x="25605967" y="4911785"/>
+            <a:off x="25605967" y="5140384"/>
             <a:ext cx="1917266" cy="0"/>
           </a:xfrm>
           <a:prstGeom prst="straightConnector1">

</xml_diff>